<commit_message>
worked a bit on the poster
</commit_message>
<xml_diff>
--- a/Poster.pptx
+++ b/Poster.pptx
@@ -287,7 +287,7 @@
               <a:pPr>
                 <a:defRPr/>
               </a:pPr>
-              <a:t>3/13/2017</a:t>
+              <a:t>3/14/17</a:t>
             </a:fld>
             <a:endParaRPr lang="en-US" dirty="0"/>
           </a:p>
@@ -4630,6 +4630,15 @@
                 </a:rPr>
                 <a:t>PosterPresentations.com</a:t>
               </a:r>
+              <a:r>
+                <a:rPr lang="en-US" sz="2800" dirty="0">
+                  <a:solidFill>
+                    <a:schemeClr val="bg1"/>
+                  </a:solidFill>
+                  <a:latin typeface="Trebuchet MS" pitchFamily="34" charset="0"/>
+                </a:rPr>
+                <a:t/>
+              </a:r>
               <a:br>
                 <a:rPr lang="en-US" sz="2800" dirty="0">
                   <a:solidFill>
@@ -4865,6 +4874,15 @@
             </a:p>
             <a:p>
               <a:pPr algn="l"/>
+              <a:r>
+                <a:rPr lang="en-US" sz="2800" b="1" baseline="0" dirty="0">
+                  <a:solidFill>
+                    <a:schemeClr val="bg1"/>
+                  </a:solidFill>
+                  <a:latin typeface="Trebuchet MS" pitchFamily="34" charset="0"/>
+                </a:rPr>
+                <a:t/>
+              </a:r>
               <a:br>
                 <a:rPr lang="en-US" sz="2800" b="1" baseline="0" dirty="0">
                   <a:solidFill>
@@ -5473,7 +5491,7 @@
               <a:graphicData uri="http://schemas.openxmlformats.org/presentationml/2006/ole">
                 <mc:AlternateContent xmlns:mc="http://schemas.openxmlformats.org/markup-compatibility/2006">
                   <mc:Choice xmlns:v="urn:schemas-microsoft-com:vml" Requires="v">
-                    <p:oleObj spid="_x0000_s1064" name="Image" r:id="rId8" imgW="1828440" imgH="1117440" progId="Photoshop.Image.13">
+                    <p:oleObj spid="_x0000_s1069" name="Image" r:id="rId8" imgW="1828440" imgH="1117440" progId="Photoshop.Image.13">
                       <p:embed/>
                     </p:oleObj>
                   </mc:Choice>
@@ -5530,7 +5548,7 @@
               <a:graphicData uri="http://schemas.openxmlformats.org/presentationml/2006/ole">
                 <mc:AlternateContent xmlns:mc="http://schemas.openxmlformats.org/markup-compatibility/2006">
                   <mc:Choice xmlns:v="urn:schemas-microsoft-com:vml" Requires="v">
-                    <p:oleObj spid="_x0000_s1065" name="Image" r:id="rId10" imgW="1828440" imgH="1117440" progId="Photoshop.Image.13">
+                    <p:oleObj spid="_x0000_s1070" name="Image" r:id="rId10" imgW="1828440" imgH="1117440" progId="Photoshop.Image.13">
                       <p:embed/>
                     </p:oleObj>
                   </mc:Choice>
@@ -6653,7 +6671,7 @@
             <a:graphicData uri="http://schemas.openxmlformats.org/presentationml/2006/ole">
               <mc:AlternateContent xmlns:mc="http://schemas.openxmlformats.org/markup-compatibility/2006">
                 <mc:Choice xmlns:v="urn:schemas-microsoft-com:vml" Requires="v">
-                  <p:oleObj spid="_x0000_s1066" name="Image" r:id="rId12" imgW="4571280" imgH="1688760" progId="Photoshop.Image.13">
+                  <p:oleObj spid="_x0000_s1071" name="Image" r:id="rId12" imgW="4571280" imgH="1688760" progId="Photoshop.Image.13">
                     <p:embed/>
                   </p:oleObj>
                 </mc:Choice>
@@ -6737,7 +6755,7 @@
             <a:graphicData uri="http://schemas.openxmlformats.org/presentationml/2006/ole">
               <mc:AlternateContent xmlns:mc="http://schemas.openxmlformats.org/markup-compatibility/2006">
                 <mc:Choice xmlns:v="urn:schemas-microsoft-com:vml" Requires="v">
-                  <p:oleObj spid="_x0000_s1067" name="Image" r:id="rId15" imgW="1574280" imgH="1053720" progId="Photoshop.Image.13">
+                  <p:oleObj spid="_x0000_s1072" name="Image" r:id="rId15" imgW="1574280" imgH="1053720" progId="Photoshop.Image.13">
                     <p:embed/>
                   </p:oleObj>
                 </mc:Choice>
@@ -7065,6 +7083,14 @@
                   </a:solidFill>
                 </a:rPr>
                 <a:t>94710</a:t>
+              </a:r>
+              <a:r>
+                <a:rPr lang="en-US" sz="2400" baseline="0" dirty="0">
+                  <a:solidFill>
+                    <a:schemeClr val="bg1"/>
+                  </a:solidFill>
+                </a:rPr>
+                <a:t/>
               </a:r>
               <a:br>
                 <a:rPr lang="en-US" sz="2400" baseline="0" dirty="0">
@@ -8145,6 +8171,15 @@
                 </a:rPr>
                 <a:t>PosterPresentations.com</a:t>
               </a:r>
+              <a:r>
+                <a:rPr lang="en-US" sz="2800" dirty="0">
+                  <a:solidFill>
+                    <a:schemeClr val="bg1"/>
+                  </a:solidFill>
+                  <a:latin typeface="Trebuchet MS" pitchFamily="34" charset="0"/>
+                </a:rPr>
+                <a:t/>
+              </a:r>
               <a:br>
                 <a:rPr lang="en-US" sz="2800" dirty="0">
                   <a:solidFill>
@@ -8380,6 +8415,15 @@
             </a:p>
             <a:p>
               <a:pPr algn="l"/>
+              <a:r>
+                <a:rPr lang="en-US" sz="2800" b="1" baseline="0" dirty="0">
+                  <a:solidFill>
+                    <a:schemeClr val="bg1"/>
+                  </a:solidFill>
+                  <a:latin typeface="Trebuchet MS" pitchFamily="34" charset="0"/>
+                </a:rPr>
+                <a:t/>
+              </a:r>
               <a:br>
                 <a:rPr lang="en-US" sz="2800" b="1" baseline="0" dirty="0">
                   <a:solidFill>
@@ -8988,7 +9032,7 @@
               <a:graphicData uri="http://schemas.openxmlformats.org/presentationml/2006/ole">
                 <mc:AlternateContent xmlns:mc="http://schemas.openxmlformats.org/markup-compatibility/2006">
                   <mc:Choice xmlns:v="urn:schemas-microsoft-com:vml" Requires="v">
-                    <p:oleObj spid="_x0000_s2088" name="Image" r:id="rId8" imgW="1828440" imgH="1117440" progId="Photoshop.Image.13">
+                    <p:oleObj spid="_x0000_s2093" name="Image" r:id="rId8" imgW="1828440" imgH="1117440" progId="Photoshop.Image.13">
                       <p:embed/>
                     </p:oleObj>
                   </mc:Choice>
@@ -9045,7 +9089,7 @@
               <a:graphicData uri="http://schemas.openxmlformats.org/presentationml/2006/ole">
                 <mc:AlternateContent xmlns:mc="http://schemas.openxmlformats.org/markup-compatibility/2006">
                   <mc:Choice xmlns:v="urn:schemas-microsoft-com:vml" Requires="v">
-                    <p:oleObj spid="_x0000_s2089" name="Image" r:id="rId10" imgW="1828440" imgH="1117440" progId="Photoshop.Image.13">
+                    <p:oleObj spid="_x0000_s2094" name="Image" r:id="rId10" imgW="1828440" imgH="1117440" progId="Photoshop.Image.13">
                       <p:embed/>
                     </p:oleObj>
                   </mc:Choice>
@@ -10168,7 +10212,7 @@
             <a:graphicData uri="http://schemas.openxmlformats.org/presentationml/2006/ole">
               <mc:AlternateContent xmlns:mc="http://schemas.openxmlformats.org/markup-compatibility/2006">
                 <mc:Choice xmlns:v="urn:schemas-microsoft-com:vml" Requires="v">
-                  <p:oleObj spid="_x0000_s2090" name="Image" r:id="rId12" imgW="4571280" imgH="1688760" progId="Photoshop.Image.13">
+                  <p:oleObj spid="_x0000_s2095" name="Image" r:id="rId12" imgW="4571280" imgH="1688760" progId="Photoshop.Image.13">
                     <p:embed/>
                   </p:oleObj>
                 </mc:Choice>
@@ -10252,7 +10296,7 @@
             <a:graphicData uri="http://schemas.openxmlformats.org/presentationml/2006/ole">
               <mc:AlternateContent xmlns:mc="http://schemas.openxmlformats.org/markup-compatibility/2006">
                 <mc:Choice xmlns:v="urn:schemas-microsoft-com:vml" Requires="v">
-                  <p:oleObj spid="_x0000_s2091" name="Image" r:id="rId15" imgW="1574280" imgH="1053720" progId="Photoshop.Image.13">
+                  <p:oleObj spid="_x0000_s2096" name="Image" r:id="rId15" imgW="1574280" imgH="1053720" progId="Photoshop.Image.13">
                     <p:embed/>
                   </p:oleObj>
                 </mc:Choice>
@@ -10581,6 +10625,14 @@
                 </a:solidFill>
               </a:rPr>
               <a:t>94710</a:t>
+            </a:r>
+            <a:r>
+              <a:rPr lang="en-US" sz="2400" baseline="0" dirty="0">
+                <a:solidFill>
+                  <a:schemeClr val="bg1"/>
+                </a:solidFill>
+              </a:rPr>
+              <a:t/>
             </a:r>
             <a:br>
               <a:rPr lang="en-US" sz="2400" baseline="0" dirty="0">
@@ -11844,6 +11896,15 @@
                 </a:rPr>
                 <a:t>PosterPresentations.com</a:t>
               </a:r>
+              <a:r>
+                <a:rPr lang="en-US" sz="2800" dirty="0">
+                  <a:solidFill>
+                    <a:schemeClr val="bg1"/>
+                  </a:solidFill>
+                  <a:latin typeface="Trebuchet MS" pitchFamily="34" charset="0"/>
+                </a:rPr>
+                <a:t/>
+              </a:r>
               <a:br>
                 <a:rPr lang="en-US" sz="2800" dirty="0">
                   <a:solidFill>
@@ -12079,6 +12140,15 @@
             </a:p>
             <a:p>
               <a:pPr algn="l"/>
+              <a:r>
+                <a:rPr lang="en-US" sz="2800" b="1" baseline="0" dirty="0">
+                  <a:solidFill>
+                    <a:schemeClr val="bg1"/>
+                  </a:solidFill>
+                  <a:latin typeface="Trebuchet MS" pitchFamily="34" charset="0"/>
+                </a:rPr>
+                <a:t/>
+              </a:r>
               <a:br>
                 <a:rPr lang="en-US" sz="2800" b="1" baseline="0" dirty="0">
                   <a:solidFill>
@@ -12687,7 +12757,7 @@
               <a:graphicData uri="http://schemas.openxmlformats.org/presentationml/2006/ole">
                 <mc:AlternateContent xmlns:mc="http://schemas.openxmlformats.org/markup-compatibility/2006">
                   <mc:Choice xmlns:v="urn:schemas-microsoft-com:vml" Requires="v">
-                    <p:oleObj spid="_x0000_s3112" name="Image" r:id="rId8" imgW="1828440" imgH="1117440" progId="Photoshop.Image.13">
+                    <p:oleObj spid="_x0000_s3117" name="Image" r:id="rId8" imgW="1828440" imgH="1117440" progId="Photoshop.Image.13">
                       <p:embed/>
                     </p:oleObj>
                   </mc:Choice>
@@ -12744,7 +12814,7 @@
               <a:graphicData uri="http://schemas.openxmlformats.org/presentationml/2006/ole">
                 <mc:AlternateContent xmlns:mc="http://schemas.openxmlformats.org/markup-compatibility/2006">
                   <mc:Choice xmlns:v="urn:schemas-microsoft-com:vml" Requires="v">
-                    <p:oleObj spid="_x0000_s3113" name="Image" r:id="rId10" imgW="1828440" imgH="1117440" progId="Photoshop.Image.13">
+                    <p:oleObj spid="_x0000_s3118" name="Image" r:id="rId10" imgW="1828440" imgH="1117440" progId="Photoshop.Image.13">
                       <p:embed/>
                     </p:oleObj>
                   </mc:Choice>
@@ -13867,7 +13937,7 @@
             <a:graphicData uri="http://schemas.openxmlformats.org/presentationml/2006/ole">
               <mc:AlternateContent xmlns:mc="http://schemas.openxmlformats.org/markup-compatibility/2006">
                 <mc:Choice xmlns:v="urn:schemas-microsoft-com:vml" Requires="v">
-                  <p:oleObj spid="_x0000_s3114" name="Image" r:id="rId12" imgW="4571280" imgH="1688760" progId="Photoshop.Image.13">
+                  <p:oleObj spid="_x0000_s3119" name="Image" r:id="rId12" imgW="4571280" imgH="1688760" progId="Photoshop.Image.13">
                     <p:embed/>
                   </p:oleObj>
                 </mc:Choice>
@@ -13951,7 +14021,7 @@
             <a:graphicData uri="http://schemas.openxmlformats.org/presentationml/2006/ole">
               <mc:AlternateContent xmlns:mc="http://schemas.openxmlformats.org/markup-compatibility/2006">
                 <mc:Choice xmlns:v="urn:schemas-microsoft-com:vml" Requires="v">
-                  <p:oleObj spid="_x0000_s3115" name="Image" r:id="rId15" imgW="1574280" imgH="1053720" progId="Photoshop.Image.13">
+                  <p:oleObj spid="_x0000_s3120" name="Image" r:id="rId15" imgW="1574280" imgH="1053720" progId="Photoshop.Image.13">
                     <p:embed/>
                   </p:oleObj>
                 </mc:Choice>
@@ -14280,6 +14350,14 @@
                 </a:solidFill>
               </a:rPr>
               <a:t>94710</a:t>
+            </a:r>
+            <a:r>
+              <a:rPr lang="en-US" sz="2400" baseline="0" dirty="0">
+                <a:solidFill>
+                  <a:schemeClr val="bg1"/>
+                </a:solidFill>
+              </a:rPr>
+              <a:t/>
             </a:r>
             <a:br>
               <a:rPr lang="en-US" sz="2400" baseline="0" dirty="0">
@@ -15024,8 +15102,21 @@
           <a:p>
             <a:r>
               <a:rPr lang="en-US" sz="6600" dirty="0"/>
-              <a:t>How our project works</a:t>
+              <a:t>How </a:t>
             </a:r>
+            <a:r>
+              <a:rPr lang="en-US" sz="6600" dirty="0" smtClean="0"/>
+              <a:t>the Project </a:t>
+            </a:r>
+            <a:r>
+              <a:rPr lang="en-US" sz="6600" dirty="0"/>
+              <a:t>W</a:t>
+            </a:r>
+            <a:r>
+              <a:rPr lang="en-US" sz="6600" dirty="0" smtClean="0"/>
+              <a:t>orks</a:t>
+            </a:r>
+            <a:endParaRPr lang="en-US" sz="6600" dirty="0"/>
           </a:p>
         </p:txBody>
       </p:sp>
@@ -15051,7 +15142,23 @@
           <a:p>
             <a:r>
               <a:rPr lang="en-US" dirty="0"/>
-              <a:t>We used python 3 to accomplish all the backend processing, segmenting and transcribing of the audio files. For speaker recognition and transcription, we used Microsoft’s Bing Speaker Identification and Speech to Text APIs. We used a HTML/CSS/JavaScript frontend along with the </a:t>
+              <a:t>We used </a:t>
+            </a:r>
+            <a:r>
+              <a:rPr lang="en-US" dirty="0" smtClean="0"/>
+              <a:t>Python </a:t>
+            </a:r>
+            <a:r>
+              <a:rPr lang="en-US" dirty="0"/>
+              <a:t>3 to accomplish all the backend processing, segmenting and transcribing of the audio files. For speaker recognition and transcription, we used Microsoft’s Bing Speaker Identification and Speech to Text APIs. </a:t>
+            </a:r>
+            <a:r>
+              <a:rPr lang="en-US" dirty="0" smtClean="0"/>
+              <a:t>We </a:t>
+            </a:r>
+            <a:r>
+              <a:rPr lang="en-US" dirty="0"/>
+              <a:t>used a HTML/CSS/JavaScript frontend along with the </a:t>
             </a:r>
             <a:r>
               <a:rPr lang="en-US" dirty="0" err="1"/>
@@ -15059,7 +15166,19 @@
             </a:r>
             <a:r>
               <a:rPr lang="en-US" dirty="0"/>
-              <a:t> library for displaying and manipulating waveforms to the user during the initial interface.</a:t>
+              <a:t> library </a:t>
+            </a:r>
+            <a:r>
+              <a:rPr lang="en-US" dirty="0" smtClean="0"/>
+              <a:t>for manipulating </a:t>
+            </a:r>
+            <a:r>
+              <a:rPr lang="en-US" dirty="0"/>
+              <a:t>waveforms </a:t>
+            </a:r>
+            <a:r>
+              <a:rPr lang="en-US" dirty="0" smtClean="0"/>
+              <a:t>and displaying them to the user. </a:t>
             </a:r>
           </a:p>
         </p:txBody>
@@ -15081,8 +15200,13 @@
           <a:p>
             <a:r>
               <a:rPr lang="en-US" dirty="0"/>
-              <a:t>How we built our project</a:t>
+              <a:t>How we </a:t>
             </a:r>
+            <a:r>
+              <a:rPr lang="en-US" dirty="0" smtClean="0"/>
+              <a:t>Built the Project</a:t>
+            </a:r>
+            <a:endParaRPr lang="en-US" dirty="0"/>
           </a:p>
         </p:txBody>
       </p:sp>
@@ -15120,7 +15244,19 @@
           <a:bodyPr/>
           <a:lstStyle/>
           <a:p>
-            <a:endParaRPr lang="en-US"/>
+            <a:r>
+              <a:rPr lang="en-US" dirty="0" smtClean="0"/>
+              <a:t>Performance of the Transcription </a:t>
+            </a:r>
+            <a:r>
+              <a:rPr lang="en-US" dirty="0"/>
+              <a:t>S</a:t>
+            </a:r>
+            <a:r>
+              <a:rPr lang="en-US" dirty="0" smtClean="0"/>
+              <a:t>oftware</a:t>
+            </a:r>
+            <a:endParaRPr lang="en-US" dirty="0"/>
           </a:p>
         </p:txBody>
       </p:sp>
@@ -15139,7 +15275,11 @@
           <a:bodyPr/>
           <a:lstStyle/>
           <a:p>
-            <a:endParaRPr lang="en-US"/>
+            <a:r>
+              <a:rPr lang="en-US" dirty="0" smtClean="0"/>
+              <a:t>The Interface</a:t>
+            </a:r>
+            <a:endParaRPr lang="en-US" dirty="0"/>
           </a:p>
         </p:txBody>
       </p:sp>
@@ -15158,7 +15298,11 @@
           <a:bodyPr/>
           <a:lstStyle/>
           <a:p>
-            <a:endParaRPr lang="en-US"/>
+            <a:r>
+              <a:rPr lang="en-US" dirty="0" smtClean="0"/>
+              <a:t>Please see screenshots and captions of the user interface below.</a:t>
+            </a:r>
+            <a:endParaRPr lang="en-US" dirty="0"/>
           </a:p>
         </p:txBody>
       </p:sp>
@@ -15177,7 +15321,11 @@
           <a:bodyPr/>
           <a:lstStyle/>
           <a:p>
-            <a:endParaRPr lang="en-US"/>
+            <a:r>
+              <a:rPr lang="en-US" dirty="0" smtClean="0"/>
+              <a:t>Conclusions</a:t>
+            </a:r>
+            <a:endParaRPr lang="en-US" dirty="0"/>
           </a:p>
         </p:txBody>
       </p:sp>

</xml_diff>

<commit_message>
Added to problem section on poster
</commit_message>
<xml_diff>
--- a/Poster.pptx
+++ b/Poster.pptx
@@ -5473,7 +5473,7 @@
               <a:graphicData uri="http://schemas.openxmlformats.org/presentationml/2006/ole">
                 <mc:AlternateContent xmlns:mc="http://schemas.openxmlformats.org/markup-compatibility/2006">
                   <mc:Choice xmlns:v="urn:schemas-microsoft-com:vml" Requires="v">
-                    <p:oleObj spid="_x0000_s1119" name="Image" r:id="rId8" imgW="1828440" imgH="1117440" progId="Photoshop.Image.13">
+                    <p:oleObj spid="_x0000_s1127" name="Image" r:id="rId8" imgW="1828440" imgH="1117440" progId="Photoshop.Image.13">
                       <p:embed/>
                     </p:oleObj>
                   </mc:Choice>
@@ -5530,7 +5530,7 @@
               <a:graphicData uri="http://schemas.openxmlformats.org/presentationml/2006/ole">
                 <mc:AlternateContent xmlns:mc="http://schemas.openxmlformats.org/markup-compatibility/2006">
                   <mc:Choice xmlns:v="urn:schemas-microsoft-com:vml" Requires="v">
-                    <p:oleObj spid="_x0000_s1120" name="Image" r:id="rId10" imgW="1828440" imgH="1117440" progId="Photoshop.Image.13">
+                    <p:oleObj spid="_x0000_s1128" name="Image" r:id="rId10" imgW="1828440" imgH="1117440" progId="Photoshop.Image.13">
                       <p:embed/>
                     </p:oleObj>
                   </mc:Choice>
@@ -6653,7 +6653,7 @@
             <a:graphicData uri="http://schemas.openxmlformats.org/presentationml/2006/ole">
               <mc:AlternateContent xmlns:mc="http://schemas.openxmlformats.org/markup-compatibility/2006">
                 <mc:Choice xmlns:v="urn:schemas-microsoft-com:vml" Requires="v">
-                  <p:oleObj spid="_x0000_s1121" name="Image" r:id="rId12" imgW="4571280" imgH="1688760" progId="Photoshop.Image.13">
+                  <p:oleObj spid="_x0000_s1129" name="Image" r:id="rId12" imgW="4571280" imgH="1688760" progId="Photoshop.Image.13">
                     <p:embed/>
                   </p:oleObj>
                 </mc:Choice>
@@ -6737,7 +6737,7 @@
             <a:graphicData uri="http://schemas.openxmlformats.org/presentationml/2006/ole">
               <mc:AlternateContent xmlns:mc="http://schemas.openxmlformats.org/markup-compatibility/2006">
                 <mc:Choice xmlns:v="urn:schemas-microsoft-com:vml" Requires="v">
-                  <p:oleObj spid="_x0000_s1122" name="Image" r:id="rId15" imgW="1574280" imgH="1053720" progId="Photoshop.Image.13">
+                  <p:oleObj spid="_x0000_s1130" name="Image" r:id="rId15" imgW="1574280" imgH="1053720" progId="Photoshop.Image.13">
                     <p:embed/>
                   </p:oleObj>
                 </mc:Choice>
@@ -8988,7 +8988,7 @@
               <a:graphicData uri="http://schemas.openxmlformats.org/presentationml/2006/ole">
                 <mc:AlternateContent xmlns:mc="http://schemas.openxmlformats.org/markup-compatibility/2006">
                   <mc:Choice xmlns:v="urn:schemas-microsoft-com:vml" Requires="v">
-                    <p:oleObj spid="_x0000_s2143" name="Image" r:id="rId8" imgW="1828440" imgH="1117440" progId="Photoshop.Image.13">
+                    <p:oleObj spid="_x0000_s2151" name="Image" r:id="rId8" imgW="1828440" imgH="1117440" progId="Photoshop.Image.13">
                       <p:embed/>
                     </p:oleObj>
                   </mc:Choice>
@@ -9045,7 +9045,7 @@
               <a:graphicData uri="http://schemas.openxmlformats.org/presentationml/2006/ole">
                 <mc:AlternateContent xmlns:mc="http://schemas.openxmlformats.org/markup-compatibility/2006">
                   <mc:Choice xmlns:v="urn:schemas-microsoft-com:vml" Requires="v">
-                    <p:oleObj spid="_x0000_s2144" name="Image" r:id="rId10" imgW="1828440" imgH="1117440" progId="Photoshop.Image.13">
+                    <p:oleObj spid="_x0000_s2152" name="Image" r:id="rId10" imgW="1828440" imgH="1117440" progId="Photoshop.Image.13">
                       <p:embed/>
                     </p:oleObj>
                   </mc:Choice>
@@ -10168,7 +10168,7 @@
             <a:graphicData uri="http://schemas.openxmlformats.org/presentationml/2006/ole">
               <mc:AlternateContent xmlns:mc="http://schemas.openxmlformats.org/markup-compatibility/2006">
                 <mc:Choice xmlns:v="urn:schemas-microsoft-com:vml" Requires="v">
-                  <p:oleObj spid="_x0000_s2145" name="Image" r:id="rId12" imgW="4571280" imgH="1688760" progId="Photoshop.Image.13">
+                  <p:oleObj spid="_x0000_s2153" name="Image" r:id="rId12" imgW="4571280" imgH="1688760" progId="Photoshop.Image.13">
                     <p:embed/>
                   </p:oleObj>
                 </mc:Choice>
@@ -10252,7 +10252,7 @@
             <a:graphicData uri="http://schemas.openxmlformats.org/presentationml/2006/ole">
               <mc:AlternateContent xmlns:mc="http://schemas.openxmlformats.org/markup-compatibility/2006">
                 <mc:Choice xmlns:v="urn:schemas-microsoft-com:vml" Requires="v">
-                  <p:oleObj spid="_x0000_s2146" name="Image" r:id="rId15" imgW="1574280" imgH="1053720" progId="Photoshop.Image.13">
+                  <p:oleObj spid="_x0000_s2154" name="Image" r:id="rId15" imgW="1574280" imgH="1053720" progId="Photoshop.Image.13">
                     <p:embed/>
                   </p:oleObj>
                 </mc:Choice>
@@ -12687,7 +12687,7 @@
               <a:graphicData uri="http://schemas.openxmlformats.org/presentationml/2006/ole">
                 <mc:AlternateContent xmlns:mc="http://schemas.openxmlformats.org/markup-compatibility/2006">
                   <mc:Choice xmlns:v="urn:schemas-microsoft-com:vml" Requires="v">
-                    <p:oleObj spid="_x0000_s3167" name="Image" r:id="rId8" imgW="1828440" imgH="1117440" progId="Photoshop.Image.13">
+                    <p:oleObj spid="_x0000_s3175" name="Image" r:id="rId8" imgW="1828440" imgH="1117440" progId="Photoshop.Image.13">
                       <p:embed/>
                     </p:oleObj>
                   </mc:Choice>
@@ -12744,7 +12744,7 @@
               <a:graphicData uri="http://schemas.openxmlformats.org/presentationml/2006/ole">
                 <mc:AlternateContent xmlns:mc="http://schemas.openxmlformats.org/markup-compatibility/2006">
                   <mc:Choice xmlns:v="urn:schemas-microsoft-com:vml" Requires="v">
-                    <p:oleObj spid="_x0000_s3168" name="Image" r:id="rId10" imgW="1828440" imgH="1117440" progId="Photoshop.Image.13">
+                    <p:oleObj spid="_x0000_s3176" name="Image" r:id="rId10" imgW="1828440" imgH="1117440" progId="Photoshop.Image.13">
                       <p:embed/>
                     </p:oleObj>
                   </mc:Choice>
@@ -13867,7 +13867,7 @@
             <a:graphicData uri="http://schemas.openxmlformats.org/presentationml/2006/ole">
               <mc:AlternateContent xmlns:mc="http://schemas.openxmlformats.org/markup-compatibility/2006">
                 <mc:Choice xmlns:v="urn:schemas-microsoft-com:vml" Requires="v">
-                  <p:oleObj spid="_x0000_s3169" name="Image" r:id="rId12" imgW="4571280" imgH="1688760" progId="Photoshop.Image.13">
+                  <p:oleObj spid="_x0000_s3177" name="Image" r:id="rId12" imgW="4571280" imgH="1688760" progId="Photoshop.Image.13">
                     <p:embed/>
                   </p:oleObj>
                 </mc:Choice>
@@ -13951,7 +13951,7 @@
             <a:graphicData uri="http://schemas.openxmlformats.org/presentationml/2006/ole">
               <mc:AlternateContent xmlns:mc="http://schemas.openxmlformats.org/markup-compatibility/2006">
                 <mc:Choice xmlns:v="urn:schemas-microsoft-com:vml" Requires="v">
-                  <p:oleObj spid="_x0000_s3170" name="Image" r:id="rId15" imgW="1574280" imgH="1053720" progId="Photoshop.Image.13">
+                  <p:oleObj spid="_x0000_s3178" name="Image" r:id="rId15" imgW="1574280" imgH="1053720" progId="Photoshop.Image.13">
                     <p:embed/>
                   </p:oleObj>
                 </mc:Choice>
@@ -14934,7 +14934,7 @@
         <p:spPr>
           <a:xfrm>
             <a:off x="1054885" y="6525551"/>
-            <a:ext cx="15856490" cy="4836462"/>
+            <a:ext cx="15856490" cy="8776002"/>
           </a:xfrm>
         </p:spPr>
         <p:txBody>
@@ -14945,6 +14945,15 @@
               <a:rPr lang="en-US" sz="4000" dirty="0"/>
               <a:t>The main motivation for our project is to provide a tool for transcribing interviews, podcasts, and anything in which two or more people are talking and an auto-generated caption might be useful. This would be a tool that journalists could use to streamline their workflow and concentrate their efforts on other aspects of their job, as opposed to the menial and often time-consuming task of transcription. At the very least, this tool aims to reduce the amount of work a journalist must spend on transcription.  </a:t>
             </a:r>
+          </a:p>
+          <a:p>
+            <a:r>
+              <a:rPr lang="en-US" sz="4000" dirty="0"/>
+              <a:t>Tools for both speech transcription and speaker identification already exist but they do not work in parallel to identify multiple speakers in a single audio file while assigning transcribed words to their respective speaker. Our project’s goal is to combine these two existing tools and make one streamlined interface for creating transcriptions from an audio file.</a:t>
+            </a:r>
+          </a:p>
+          <a:p>
+            <a:endParaRPr lang="en-US" sz="4000" dirty="0"/>
           </a:p>
         </p:txBody>
       </p:sp>

</xml_diff>

<commit_message>
redid interface slides to have larger screen shots, less clutter... added to references section as well
</commit_message>
<xml_diff>
--- a/Poster.pptx
+++ b/Poster.pptx
@@ -287,7 +287,7 @@
               <a:pPr>
                 <a:defRPr/>
               </a:pPr>
-              <a:t>3/15/2017</a:t>
+              <a:t>3/15/17</a:t>
             </a:fld>
             <a:endParaRPr lang="en-US" dirty="0"/>
           </a:p>
@@ -4630,6 +4630,15 @@
                 </a:rPr>
                 <a:t>PosterPresentations.com</a:t>
               </a:r>
+              <a:r>
+                <a:rPr lang="en-US" sz="2800" dirty="0">
+                  <a:solidFill>
+                    <a:schemeClr val="bg1"/>
+                  </a:solidFill>
+                  <a:latin typeface="Trebuchet MS" pitchFamily="34" charset="0"/>
+                </a:rPr>
+                <a:t/>
+              </a:r>
               <a:br>
                 <a:rPr lang="en-US" sz="2800" dirty="0">
                   <a:solidFill>
@@ -4865,6 +4874,15 @@
             </a:p>
             <a:p>
               <a:pPr algn="l"/>
+              <a:r>
+                <a:rPr lang="en-US" sz="2800" b="1" baseline="0" dirty="0">
+                  <a:solidFill>
+                    <a:schemeClr val="bg1"/>
+                  </a:solidFill>
+                  <a:latin typeface="Trebuchet MS" pitchFamily="34" charset="0"/>
+                </a:rPr>
+                <a:t/>
+              </a:r>
               <a:br>
                 <a:rPr lang="en-US" sz="2800" b="1" baseline="0" dirty="0">
                   <a:solidFill>
@@ -5473,7 +5491,7 @@
               <a:graphicData uri="http://schemas.openxmlformats.org/presentationml/2006/ole">
                 <mc:AlternateContent xmlns:mc="http://schemas.openxmlformats.org/markup-compatibility/2006">
                   <mc:Choice xmlns:v="urn:schemas-microsoft-com:vml" Requires="v">
-                    <p:oleObj spid="_x0000_s1127" name="Image" r:id="rId8" imgW="1828440" imgH="1117440" progId="Photoshop.Image.13">
+                    <p:oleObj spid="_x0000_s1144" name="Image" r:id="rId8" imgW="1828440" imgH="1117440" progId="Photoshop.Image.13">
                       <p:embed/>
                     </p:oleObj>
                   </mc:Choice>
@@ -5530,7 +5548,7 @@
               <a:graphicData uri="http://schemas.openxmlformats.org/presentationml/2006/ole">
                 <mc:AlternateContent xmlns:mc="http://schemas.openxmlformats.org/markup-compatibility/2006">
                   <mc:Choice xmlns:v="urn:schemas-microsoft-com:vml" Requires="v">
-                    <p:oleObj spid="_x0000_s1128" name="Image" r:id="rId10" imgW="1828440" imgH="1117440" progId="Photoshop.Image.13">
+                    <p:oleObj spid="_x0000_s1145" name="Image" r:id="rId10" imgW="1828440" imgH="1117440" progId="Photoshop.Image.13">
                       <p:embed/>
                     </p:oleObj>
                   </mc:Choice>
@@ -6653,7 +6671,7 @@
             <a:graphicData uri="http://schemas.openxmlformats.org/presentationml/2006/ole">
               <mc:AlternateContent xmlns:mc="http://schemas.openxmlformats.org/markup-compatibility/2006">
                 <mc:Choice xmlns:v="urn:schemas-microsoft-com:vml" Requires="v">
-                  <p:oleObj spid="_x0000_s1129" name="Image" r:id="rId12" imgW="4571280" imgH="1688760" progId="Photoshop.Image.13">
+                  <p:oleObj spid="_x0000_s1146" name="Image" r:id="rId12" imgW="4571280" imgH="1688760" progId="Photoshop.Image.13">
                     <p:embed/>
                   </p:oleObj>
                 </mc:Choice>
@@ -6737,7 +6755,7 @@
             <a:graphicData uri="http://schemas.openxmlformats.org/presentationml/2006/ole">
               <mc:AlternateContent xmlns:mc="http://schemas.openxmlformats.org/markup-compatibility/2006">
                 <mc:Choice xmlns:v="urn:schemas-microsoft-com:vml" Requires="v">
-                  <p:oleObj spid="_x0000_s1130" name="Image" r:id="rId15" imgW="1574280" imgH="1053720" progId="Photoshop.Image.13">
+                  <p:oleObj spid="_x0000_s1147" name="Image" r:id="rId15" imgW="1574280" imgH="1053720" progId="Photoshop.Image.13">
                     <p:embed/>
                   </p:oleObj>
                 </mc:Choice>
@@ -7065,6 +7083,14 @@
                   </a:solidFill>
                 </a:rPr>
                 <a:t>94710</a:t>
+              </a:r>
+              <a:r>
+                <a:rPr lang="en-US" sz="2400" baseline="0" dirty="0">
+                  <a:solidFill>
+                    <a:schemeClr val="bg1"/>
+                  </a:solidFill>
+                </a:rPr>
+                <a:t/>
               </a:r>
               <a:br>
                 <a:rPr lang="en-US" sz="2400" baseline="0" dirty="0">
@@ -8145,6 +8171,15 @@
                 </a:rPr>
                 <a:t>PosterPresentations.com</a:t>
               </a:r>
+              <a:r>
+                <a:rPr lang="en-US" sz="2800" dirty="0">
+                  <a:solidFill>
+                    <a:schemeClr val="bg1"/>
+                  </a:solidFill>
+                  <a:latin typeface="Trebuchet MS" pitchFamily="34" charset="0"/>
+                </a:rPr>
+                <a:t/>
+              </a:r>
               <a:br>
                 <a:rPr lang="en-US" sz="2800" dirty="0">
                   <a:solidFill>
@@ -8380,6 +8415,15 @@
             </a:p>
             <a:p>
               <a:pPr algn="l"/>
+              <a:r>
+                <a:rPr lang="en-US" sz="2800" b="1" baseline="0" dirty="0">
+                  <a:solidFill>
+                    <a:schemeClr val="bg1"/>
+                  </a:solidFill>
+                  <a:latin typeface="Trebuchet MS" pitchFamily="34" charset="0"/>
+                </a:rPr>
+                <a:t/>
+              </a:r>
               <a:br>
                 <a:rPr lang="en-US" sz="2800" b="1" baseline="0" dirty="0">
                   <a:solidFill>
@@ -8988,7 +9032,7 @@
               <a:graphicData uri="http://schemas.openxmlformats.org/presentationml/2006/ole">
                 <mc:AlternateContent xmlns:mc="http://schemas.openxmlformats.org/markup-compatibility/2006">
                   <mc:Choice xmlns:v="urn:schemas-microsoft-com:vml" Requires="v">
-                    <p:oleObj spid="_x0000_s2151" name="Image" r:id="rId8" imgW="1828440" imgH="1117440" progId="Photoshop.Image.13">
+                    <p:oleObj spid="_x0000_s2168" name="Image" r:id="rId8" imgW="1828440" imgH="1117440" progId="Photoshop.Image.13">
                       <p:embed/>
                     </p:oleObj>
                   </mc:Choice>
@@ -9045,7 +9089,7 @@
               <a:graphicData uri="http://schemas.openxmlformats.org/presentationml/2006/ole">
                 <mc:AlternateContent xmlns:mc="http://schemas.openxmlformats.org/markup-compatibility/2006">
                   <mc:Choice xmlns:v="urn:schemas-microsoft-com:vml" Requires="v">
-                    <p:oleObj spid="_x0000_s2152" name="Image" r:id="rId10" imgW="1828440" imgH="1117440" progId="Photoshop.Image.13">
+                    <p:oleObj spid="_x0000_s2169" name="Image" r:id="rId10" imgW="1828440" imgH="1117440" progId="Photoshop.Image.13">
                       <p:embed/>
                     </p:oleObj>
                   </mc:Choice>
@@ -10168,7 +10212,7 @@
             <a:graphicData uri="http://schemas.openxmlformats.org/presentationml/2006/ole">
               <mc:AlternateContent xmlns:mc="http://schemas.openxmlformats.org/markup-compatibility/2006">
                 <mc:Choice xmlns:v="urn:schemas-microsoft-com:vml" Requires="v">
-                  <p:oleObj spid="_x0000_s2153" name="Image" r:id="rId12" imgW="4571280" imgH="1688760" progId="Photoshop.Image.13">
+                  <p:oleObj spid="_x0000_s2170" name="Image" r:id="rId12" imgW="4571280" imgH="1688760" progId="Photoshop.Image.13">
                     <p:embed/>
                   </p:oleObj>
                 </mc:Choice>
@@ -10252,7 +10296,7 @@
             <a:graphicData uri="http://schemas.openxmlformats.org/presentationml/2006/ole">
               <mc:AlternateContent xmlns:mc="http://schemas.openxmlformats.org/markup-compatibility/2006">
                 <mc:Choice xmlns:v="urn:schemas-microsoft-com:vml" Requires="v">
-                  <p:oleObj spid="_x0000_s2154" name="Image" r:id="rId15" imgW="1574280" imgH="1053720" progId="Photoshop.Image.13">
+                  <p:oleObj spid="_x0000_s2171" name="Image" r:id="rId15" imgW="1574280" imgH="1053720" progId="Photoshop.Image.13">
                     <p:embed/>
                   </p:oleObj>
                 </mc:Choice>
@@ -10581,6 +10625,14 @@
                 </a:solidFill>
               </a:rPr>
               <a:t>94710</a:t>
+            </a:r>
+            <a:r>
+              <a:rPr lang="en-US" sz="2400" baseline="0" dirty="0">
+                <a:solidFill>
+                  <a:schemeClr val="bg1"/>
+                </a:solidFill>
+              </a:rPr>
+              <a:t/>
             </a:r>
             <a:br>
               <a:rPr lang="en-US" sz="2400" baseline="0" dirty="0">
@@ -11844,6 +11896,15 @@
                 </a:rPr>
                 <a:t>PosterPresentations.com</a:t>
               </a:r>
+              <a:r>
+                <a:rPr lang="en-US" sz="2800" dirty="0">
+                  <a:solidFill>
+                    <a:schemeClr val="bg1"/>
+                  </a:solidFill>
+                  <a:latin typeface="Trebuchet MS" pitchFamily="34" charset="0"/>
+                </a:rPr>
+                <a:t/>
+              </a:r>
               <a:br>
                 <a:rPr lang="en-US" sz="2800" dirty="0">
                   <a:solidFill>
@@ -12079,6 +12140,15 @@
             </a:p>
             <a:p>
               <a:pPr algn="l"/>
+              <a:r>
+                <a:rPr lang="en-US" sz="2800" b="1" baseline="0" dirty="0">
+                  <a:solidFill>
+                    <a:schemeClr val="bg1"/>
+                  </a:solidFill>
+                  <a:latin typeface="Trebuchet MS" pitchFamily="34" charset="0"/>
+                </a:rPr>
+                <a:t/>
+              </a:r>
               <a:br>
                 <a:rPr lang="en-US" sz="2800" b="1" baseline="0" dirty="0">
                   <a:solidFill>
@@ -12687,7 +12757,7 @@
               <a:graphicData uri="http://schemas.openxmlformats.org/presentationml/2006/ole">
                 <mc:AlternateContent xmlns:mc="http://schemas.openxmlformats.org/markup-compatibility/2006">
                   <mc:Choice xmlns:v="urn:schemas-microsoft-com:vml" Requires="v">
-                    <p:oleObj spid="_x0000_s3175" name="Image" r:id="rId8" imgW="1828440" imgH="1117440" progId="Photoshop.Image.13">
+                    <p:oleObj spid="_x0000_s3192" name="Image" r:id="rId8" imgW="1828440" imgH="1117440" progId="Photoshop.Image.13">
                       <p:embed/>
                     </p:oleObj>
                   </mc:Choice>
@@ -12744,7 +12814,7 @@
               <a:graphicData uri="http://schemas.openxmlformats.org/presentationml/2006/ole">
                 <mc:AlternateContent xmlns:mc="http://schemas.openxmlformats.org/markup-compatibility/2006">
                   <mc:Choice xmlns:v="urn:schemas-microsoft-com:vml" Requires="v">
-                    <p:oleObj spid="_x0000_s3176" name="Image" r:id="rId10" imgW="1828440" imgH="1117440" progId="Photoshop.Image.13">
+                    <p:oleObj spid="_x0000_s3193" name="Image" r:id="rId10" imgW="1828440" imgH="1117440" progId="Photoshop.Image.13">
                       <p:embed/>
                     </p:oleObj>
                   </mc:Choice>
@@ -13867,7 +13937,7 @@
             <a:graphicData uri="http://schemas.openxmlformats.org/presentationml/2006/ole">
               <mc:AlternateContent xmlns:mc="http://schemas.openxmlformats.org/markup-compatibility/2006">
                 <mc:Choice xmlns:v="urn:schemas-microsoft-com:vml" Requires="v">
-                  <p:oleObj spid="_x0000_s3177" name="Image" r:id="rId12" imgW="4571280" imgH="1688760" progId="Photoshop.Image.13">
+                  <p:oleObj spid="_x0000_s3194" name="Image" r:id="rId12" imgW="4571280" imgH="1688760" progId="Photoshop.Image.13">
                     <p:embed/>
                   </p:oleObj>
                 </mc:Choice>
@@ -13951,7 +14021,7 @@
             <a:graphicData uri="http://schemas.openxmlformats.org/presentationml/2006/ole">
               <mc:AlternateContent xmlns:mc="http://schemas.openxmlformats.org/markup-compatibility/2006">
                 <mc:Choice xmlns:v="urn:schemas-microsoft-com:vml" Requires="v">
-                  <p:oleObj spid="_x0000_s3178" name="Image" r:id="rId15" imgW="1574280" imgH="1053720" progId="Photoshop.Image.13">
+                  <p:oleObj spid="_x0000_s3195" name="Image" r:id="rId15" imgW="1574280" imgH="1053720" progId="Photoshop.Image.13">
                     <p:embed/>
                   </p:oleObj>
                 </mc:Choice>
@@ -14280,6 +14350,14 @@
                 </a:solidFill>
               </a:rPr>
               <a:t>94710</a:t>
+            </a:r>
+            <a:r>
+              <a:rPr lang="en-US" sz="2400" baseline="0" dirty="0">
+                <a:solidFill>
+                  <a:schemeClr val="bg1"/>
+                </a:solidFill>
+              </a:rPr>
+              <a:t/>
             </a:r>
             <a:br>
               <a:rPr lang="en-US" sz="2400" baseline="0" dirty="0">
@@ -15177,33 +15255,6 @@
       </p:sp>
       <p:sp>
         <p:nvSpPr>
-          <p:cNvPr id="225" name="Text Placeholder 224"/>
-          <p:cNvSpPr>
-            <a:spLocks noGrp="1"/>
-          </p:cNvSpPr>
-          <p:nvPr>
-            <p:ph type="body" sz="quarter" idx="26"/>
-          </p:nvPr>
-        </p:nvSpPr>
-        <p:spPr>
-          <a:xfrm>
-            <a:off x="34295031" y="6420045"/>
-            <a:ext cx="15838700" cy="835367"/>
-          </a:xfrm>
-        </p:spPr>
-        <p:txBody>
-          <a:bodyPr/>
-          <a:lstStyle/>
-          <a:p>
-            <a:r>
-              <a:rPr lang="en-US" sz="2000" dirty="0"/>
-              <a:t>Please see screenshots and captions of the user interface below.</a:t>
-            </a:r>
-          </a:p>
-        </p:txBody>
-      </p:sp>
-      <p:sp>
-        <p:nvSpPr>
           <p:cNvPr id="226" name="Text Placeholder 225"/>
           <p:cNvSpPr>
             <a:spLocks noGrp="1"/>
@@ -15273,6 +15324,10 @@
           <a:bodyPr/>
           <a:lstStyle/>
           <a:p>
+            <a:r>
+              <a:rPr lang="en-US" dirty="0" smtClean="0"/>
+              <a:t>References</a:t>
+            </a:r>
             <a:endParaRPr lang="en-US" dirty="0"/>
           </a:p>
         </p:txBody>
@@ -15290,14 +15345,271 @@
         <p:spPr>
           <a:xfrm>
             <a:off x="34292096" y="29592363"/>
-            <a:ext cx="15844570" cy="958478"/>
+            <a:ext cx="15844570" cy="1561720"/>
           </a:xfrm>
         </p:spPr>
         <p:txBody>
           <a:bodyPr/>
           <a:lstStyle/>
           <a:p>
-            <a:endParaRPr lang="en-US" dirty="0"/>
+            <a:r>
+              <a:rPr lang="en-US" sz="1200" dirty="0"/>
+              <a:t> </a:t>
+            </a:r>
+            <a:r>
+              <a:rPr lang="en-US" sz="1200" dirty="0" smtClean="0"/>
+              <a:t>    </a:t>
+            </a:r>
+            <a:r>
+              <a:rPr lang="en-US" sz="1200" dirty="0" err="1" smtClean="0"/>
+              <a:t>Bongjun</a:t>
+            </a:r>
+            <a:r>
+              <a:rPr lang="en-US" sz="1200" dirty="0" smtClean="0"/>
+              <a:t> Kim and Bryan Pardo. </a:t>
+            </a:r>
+            <a:r>
+              <a:rPr lang="en-US" sz="1200" dirty="0" smtClean="0"/>
+              <a:t>2017. I-SED: an Interactive Sound Event Detector. In </a:t>
+            </a:r>
+            <a:r>
+              <a:rPr lang="en-US" sz="1200" i="1" dirty="0" smtClean="0"/>
+              <a:t>ACM </a:t>
+            </a:r>
+            <a:r>
+              <a:rPr lang="en-US" sz="1200" i="1" dirty="0"/>
+              <a:t>International Conference on Intelligent User </a:t>
+            </a:r>
+            <a:r>
+              <a:rPr lang="en-US" sz="1200" i="1" dirty="0" smtClean="0"/>
+              <a:t>Interfaces. </a:t>
+            </a:r>
+            <a:r>
+              <a:rPr lang="en-US" sz="1200" dirty="0"/>
+              <a:t>Retrieved from </a:t>
+            </a:r>
+            <a:r>
+              <a:rPr lang="en-US" sz="1200" dirty="0">
+                <a:hlinkClick r:id="rId3"/>
+              </a:rPr>
+              <a:t>http://</a:t>
+            </a:r>
+            <a:r>
+              <a:rPr lang="en-US" sz="1200" dirty="0" smtClean="0">
+                <a:hlinkClick r:id="rId3"/>
+              </a:rPr>
+              <a:t>music.cs.northwestern.edu/publications/Kim_Pardo_IUI2017.pdf</a:t>
+            </a:r>
+            <a:r>
+              <a:rPr lang="en-US" sz="1200" dirty="0" smtClean="0"/>
+              <a:t>.</a:t>
+            </a:r>
+            <a:endParaRPr lang="en-US" sz="1200" i="1" dirty="0" smtClean="0"/>
+          </a:p>
+          <a:p>
+            <a:r>
+              <a:rPr lang="en-US" sz="1200" dirty="0" smtClean="0"/>
+              <a:t>     Steve Rubin, </a:t>
+            </a:r>
+            <a:r>
+              <a:rPr lang="en-US" sz="1200" dirty="0" err="1"/>
+              <a:t>Floraine</a:t>
+            </a:r>
+            <a:r>
+              <a:rPr lang="en-US" sz="1200" dirty="0"/>
+              <a:t> </a:t>
+            </a:r>
+            <a:r>
+              <a:rPr lang="en-US" sz="1200" dirty="0" err="1" smtClean="0"/>
+              <a:t>Berthouzoz</a:t>
+            </a:r>
+            <a:r>
+              <a:rPr lang="en-US" sz="1200" dirty="0" smtClean="0"/>
+              <a:t>, </a:t>
+            </a:r>
+            <a:r>
+              <a:rPr lang="en-US" sz="1200" dirty="0" err="1"/>
+              <a:t>Gautham</a:t>
+            </a:r>
+            <a:r>
+              <a:rPr lang="en-US" sz="1200" dirty="0"/>
+              <a:t> J. </a:t>
+            </a:r>
+            <a:r>
+              <a:rPr lang="en-US" sz="1200" dirty="0" smtClean="0"/>
+              <a:t>Mysore, </a:t>
+            </a:r>
+            <a:r>
+              <a:rPr lang="en-US" sz="1200" dirty="0"/>
+              <a:t>Wilmot </a:t>
+            </a:r>
+            <a:r>
+              <a:rPr lang="en-US" sz="1200" dirty="0" smtClean="0"/>
+              <a:t>Li, and </a:t>
+            </a:r>
+            <a:r>
+              <a:rPr lang="en-US" sz="1200" dirty="0" err="1"/>
+              <a:t>Maneesh</a:t>
+            </a:r>
+            <a:r>
+              <a:rPr lang="en-US" sz="1200" dirty="0"/>
+              <a:t> </a:t>
+            </a:r>
+            <a:r>
+              <a:rPr lang="en-US" sz="1200" dirty="0" err="1" smtClean="0"/>
+              <a:t>Agrawala</a:t>
+            </a:r>
+            <a:r>
+              <a:rPr lang="en-US" sz="1200" dirty="0" smtClean="0"/>
+              <a:t>. 2013.  Content-Based Tools for Editing Audio Stories. In </a:t>
+            </a:r>
+            <a:r>
+              <a:rPr lang="en-US" sz="1200" i="1" dirty="0"/>
+              <a:t>UIST 2013, October 2013. pp. </a:t>
+            </a:r>
+            <a:r>
+              <a:rPr lang="en-US" sz="1200" dirty="0" smtClean="0"/>
+              <a:t>113-122. Retrieved </a:t>
+            </a:r>
+            <a:r>
+              <a:rPr lang="en-US" sz="1200" dirty="0"/>
+              <a:t>from </a:t>
+            </a:r>
+            <a:r>
+              <a:rPr lang="en-US" sz="1200" dirty="0">
+                <a:hlinkClick r:id="rId4"/>
+              </a:rPr>
+              <a:t>http://</a:t>
+            </a:r>
+            <a:r>
+              <a:rPr lang="en-US" sz="1200" dirty="0" smtClean="0">
+                <a:hlinkClick r:id="rId4"/>
+              </a:rPr>
+              <a:t>vis.berkeley.edu/papers/audiostories/audiostories.pdf</a:t>
+            </a:r>
+            <a:r>
+              <a:rPr lang="en-US" sz="1200" dirty="0" smtClean="0"/>
+              <a:t>.</a:t>
+            </a:r>
+          </a:p>
+          <a:p>
+            <a:r>
+              <a:rPr lang="en-US" sz="1200" i="1" dirty="0" smtClean="0"/>
+              <a:t>     </a:t>
+            </a:r>
+            <a:r>
+              <a:rPr lang="en-US" sz="1200" dirty="0" smtClean="0"/>
+              <a:t>Waveforms on the interface were created </a:t>
+            </a:r>
+            <a:r>
+              <a:rPr lang="en-US" sz="1200" dirty="0"/>
+              <a:t>with </a:t>
+            </a:r>
+            <a:r>
+              <a:rPr lang="en-US" sz="1200" dirty="0" err="1"/>
+              <a:t>wavesurfer.js</a:t>
+            </a:r>
+            <a:r>
+              <a:rPr lang="en-US" sz="1200" dirty="0" smtClean="0"/>
+              <a:t>. </a:t>
+            </a:r>
+            <a:r>
+              <a:rPr lang="en-US" sz="1200" smtClean="0"/>
+              <a:t>Retrieved from </a:t>
+            </a:r>
+            <a:r>
+              <a:rPr lang="en-US" sz="1200" dirty="0">
+                <a:hlinkClick r:id="rId5"/>
+              </a:rPr>
+              <a:t>https://wavesurfer-js.org</a:t>
+            </a:r>
+            <a:r>
+              <a:rPr lang="en-US" sz="1200" dirty="0" smtClean="0">
+                <a:hlinkClick r:id="rId5"/>
+              </a:rPr>
+              <a:t>/</a:t>
+            </a:r>
+            <a:r>
+              <a:rPr lang="en-US" sz="1200" dirty="0" smtClean="0"/>
+              <a:t> </a:t>
+            </a:r>
+          </a:p>
+          <a:p>
+            <a:r>
+              <a:rPr lang="en-US" sz="1200" i="1" dirty="0"/>
+              <a:t> </a:t>
+            </a:r>
+            <a:r>
+              <a:rPr lang="en-US" sz="1200" i="1" dirty="0" smtClean="0"/>
+              <a:t>    </a:t>
+            </a:r>
+            <a:r>
+              <a:rPr lang="en-US" sz="1200" dirty="0" err="1"/>
+              <a:t>Theodoros</a:t>
+            </a:r>
+            <a:r>
+              <a:rPr lang="en-US" sz="1200" dirty="0"/>
+              <a:t> </a:t>
+            </a:r>
+            <a:r>
+              <a:rPr lang="en-US" sz="1200" dirty="0" smtClean="0"/>
+              <a:t>Giannakopoulos. 2015. </a:t>
+            </a:r>
+            <a:r>
+              <a:rPr lang="en-US" sz="1200" dirty="0" err="1" smtClean="0"/>
+              <a:t>pyAudioAnalysis</a:t>
+            </a:r>
+            <a:r>
+              <a:rPr lang="en-US" sz="1200" dirty="0"/>
+              <a:t>: An Open-Source Python Library for Audio Signal Analysis. </a:t>
+            </a:r>
+            <a:r>
+              <a:rPr lang="en-US" sz="1200" dirty="0" smtClean="0"/>
+              <a:t>In </a:t>
+            </a:r>
+            <a:r>
+              <a:rPr lang="en-US" sz="1200" i="1" dirty="0" err="1" smtClean="0"/>
+              <a:t>PLoS</a:t>
+            </a:r>
+            <a:r>
+              <a:rPr lang="en-US" sz="1200" i="1" dirty="0" smtClean="0"/>
+              <a:t> </a:t>
+            </a:r>
+            <a:r>
+              <a:rPr lang="en-US" sz="1200" i="1" dirty="0"/>
+              <a:t>ONE 10(12</a:t>
+            </a:r>
+            <a:r>
+              <a:rPr lang="en-US" sz="1200" i="1" dirty="0" smtClean="0"/>
+              <a:t>). </a:t>
+            </a:r>
+            <a:r>
+              <a:rPr lang="en-US" sz="1200" dirty="0" smtClean="0"/>
+              <a:t> Retrieved from </a:t>
+            </a:r>
+            <a:r>
+              <a:rPr lang="en-US" sz="1200" dirty="0" smtClean="0">
+                <a:hlinkClick r:id="rId6"/>
+              </a:rPr>
+              <a:t>http</a:t>
+            </a:r>
+            <a:r>
+              <a:rPr lang="en-US" sz="1200" dirty="0">
+                <a:hlinkClick r:id="rId6"/>
+              </a:rPr>
+              <a:t>://</a:t>
+            </a:r>
+            <a:r>
+              <a:rPr lang="en-US" sz="1200" dirty="0" smtClean="0">
+                <a:hlinkClick r:id="rId6"/>
+              </a:rPr>
+              <a:t>journals.plos.org/plosone/article/file?id=10.1371/journal.pone.0144610&amp;type=printable</a:t>
+            </a:r>
+            <a:r>
+              <a:rPr lang="en-US" sz="1200" dirty="0" smtClean="0"/>
+              <a:t>. </a:t>
+            </a:r>
+            <a:endParaRPr lang="en-US" sz="1200" i="1" dirty="0"/>
           </a:p>
         </p:txBody>
       </p:sp>
@@ -15320,7 +15632,7 @@
           <a:p>
             <a:r>
               <a:rPr lang="en-US" dirty="0">
-                <a:hlinkClick r:id="rId3"/>
+                <a:hlinkClick r:id="rId7"/>
               </a:rPr>
               <a:t>vincentbommier2018@u.northwestern.edu</a:t>
             </a:r>
@@ -15330,7 +15642,7 @@
             </a:r>
             <a:r>
               <a:rPr lang="en-US" dirty="0">
-                <a:hlinkClick r:id="rId4"/>
+                <a:hlinkClick r:id="rId8"/>
               </a:rPr>
               <a:t>jeremykaish2018@u.northwestern.edu</a:t>
             </a:r>
@@ -15340,7 +15652,7 @@
             </a:r>
             <a:r>
               <a:rPr lang="en-US" dirty="0">
-                <a:hlinkClick r:id="rId5"/>
+                <a:hlinkClick r:id="rId9"/>
               </a:rPr>
               <a:t>madhavghei2018@u.northwestern.edu</a:t>
             </a:r>
@@ -15535,7 +15847,7 @@
           <p:nvPr/>
         </p:nvPicPr>
         <p:blipFill>
-          <a:blip r:embed="rId6" cstate="print">
+          <a:blip r:embed="rId10" cstate="print">
             <a:extLst>
               <a:ext uri="{28A0092B-C50C-407E-A947-70E740481C1C}">
                 <a14:useLocalDpi xmlns:a14="http://schemas.microsoft.com/office/drawing/2010/main" val="0"/>
@@ -15548,7 +15860,7 @@
         </p:blipFill>
         <p:spPr>
           <a:xfrm>
-            <a:off x="34805070" y="7361122"/>
+            <a:off x="34805070" y="6446708"/>
             <a:ext cx="6660842" cy="3656698"/>
           </a:xfrm>
           <a:prstGeom prst="rect">
@@ -15558,165 +15870,7 @@
       </p:pic>
       <p:pic>
         <p:nvPicPr>
-          <p:cNvPr id="5" name="Picture 4"/>
-          <p:cNvPicPr>
-            <a:picLocks noChangeAspect="1"/>
-          </p:cNvPicPr>
-          <p:nvPr/>
-        </p:nvPicPr>
-        <p:blipFill>
-          <a:blip r:embed="rId7">
-            <a:extLst>
-              <a:ext uri="{28A0092B-C50C-407E-A947-70E740481C1C}">
-                <a14:useLocalDpi xmlns:a14="http://schemas.microsoft.com/office/drawing/2010/main" val="0"/>
-              </a:ext>
-            </a:extLst>
-          </a:blip>
-          <a:stretch>
-            <a:fillRect/>
-          </a:stretch>
-        </p:blipFill>
-        <p:spPr>
-          <a:xfrm>
-            <a:off x="43333136" y="7400815"/>
-            <a:ext cx="3771900" cy="1574800"/>
-          </a:xfrm>
-          <a:prstGeom prst="rect">
-            <a:avLst/>
-          </a:prstGeom>
-        </p:spPr>
-      </p:pic>
-      <p:pic>
-        <p:nvPicPr>
-          <p:cNvPr id="6" name="Picture 5"/>
-          <p:cNvPicPr>
-            <a:picLocks noChangeAspect="1"/>
-          </p:cNvPicPr>
-          <p:nvPr/>
-        </p:nvPicPr>
-        <p:blipFill>
-          <a:blip r:embed="rId8" cstate="print">
-            <a:extLst>
-              <a:ext uri="{28A0092B-C50C-407E-A947-70E740481C1C}">
-                <a14:useLocalDpi xmlns:a14="http://schemas.microsoft.com/office/drawing/2010/main" val="0"/>
-              </a:ext>
-            </a:extLst>
-          </a:blip>
-          <a:stretch>
-            <a:fillRect/>
-          </a:stretch>
-        </p:blipFill>
-        <p:spPr>
-          <a:xfrm>
-            <a:off x="34805069" y="11412387"/>
-            <a:ext cx="6660843" cy="3646187"/>
-          </a:xfrm>
-          <a:prstGeom prst="rect">
-            <a:avLst/>
-          </a:prstGeom>
-        </p:spPr>
-      </p:pic>
-      <p:pic>
-        <p:nvPicPr>
-          <p:cNvPr id="9" name="Picture 8"/>
-          <p:cNvPicPr>
-            <a:picLocks noChangeAspect="1"/>
-          </p:cNvPicPr>
-          <p:nvPr/>
-        </p:nvPicPr>
-        <p:blipFill>
-          <a:blip r:embed="rId9" cstate="print">
-            <a:extLst>
-              <a:ext uri="{28A0092B-C50C-407E-A947-70E740481C1C}">
-                <a14:useLocalDpi xmlns:a14="http://schemas.microsoft.com/office/drawing/2010/main" val="0"/>
-              </a:ext>
-            </a:extLst>
-          </a:blip>
-          <a:stretch>
-            <a:fillRect/>
-          </a:stretch>
-        </p:blipFill>
-        <p:spPr>
-          <a:xfrm>
-            <a:off x="46211386" y="13095017"/>
-            <a:ext cx="1912913" cy="1767995"/>
-          </a:xfrm>
-          <a:prstGeom prst="rect">
-            <a:avLst/>
-          </a:prstGeom>
-        </p:spPr>
-      </p:pic>
-      <p:pic>
-        <p:nvPicPr>
           <p:cNvPr id="10" name="Picture 9"/>
-          <p:cNvPicPr>
-            <a:picLocks noChangeAspect="1"/>
-          </p:cNvPicPr>
-          <p:nvPr/>
-        </p:nvPicPr>
-        <p:blipFill>
-          <a:blip r:embed="rId10">
-            <a:extLst>
-              <a:ext uri="{28A0092B-C50C-407E-A947-70E740481C1C}">
-                <a14:useLocalDpi xmlns:a14="http://schemas.microsoft.com/office/drawing/2010/main" val="0"/>
-              </a:ext>
-            </a:extLst>
-          </a:blip>
-          <a:stretch>
-            <a:fillRect/>
-          </a:stretch>
-        </p:blipFill>
-        <p:spPr>
-          <a:xfrm>
-            <a:off x="34805070" y="15491252"/>
-            <a:ext cx="6660843" cy="2776969"/>
-          </a:xfrm>
-          <a:prstGeom prst="rect">
-            <a:avLst/>
-          </a:prstGeom>
-        </p:spPr>
-      </p:pic>
-      <p:cxnSp>
-        <p:nvCxnSpPr>
-          <p:cNvPr id="23" name="Elbow Connector 22"/>
-          <p:cNvCxnSpPr>
-            <a:stCxn id="6" idx="3"/>
-            <a:endCxn id="211" idx="1"/>
-          </p:cNvCxnSpPr>
-          <p:nvPr/>
-        </p:nvCxnSpPr>
-        <p:spPr>
-          <a:xfrm flipV="1">
-            <a:off x="41465912" y="12014807"/>
-            <a:ext cx="847960" cy="1220674"/>
-          </a:xfrm>
-          <a:prstGeom prst="bentConnector3">
-            <a:avLst>
-              <a:gd name="adj1" fmla="val 50000"/>
-            </a:avLst>
-          </a:prstGeom>
-          <a:ln>
-            <a:tailEnd type="triangle"/>
-          </a:ln>
-        </p:spPr>
-        <p:style>
-          <a:lnRef idx="3">
-            <a:schemeClr val="accent2"/>
-          </a:lnRef>
-          <a:fillRef idx="0">
-            <a:schemeClr val="accent2"/>
-          </a:fillRef>
-          <a:effectRef idx="2">
-            <a:schemeClr val="accent2"/>
-          </a:effectRef>
-          <a:fontRef idx="minor">
-            <a:schemeClr val="tx1"/>
-          </a:fontRef>
-        </p:style>
-      </p:cxnSp>
-      <p:pic>
-        <p:nvPicPr>
-          <p:cNvPr id="47" name="Picture 46"/>
           <p:cNvPicPr>
             <a:picLocks noChangeAspect="1"/>
           </p:cNvPicPr>
@@ -15736,8 +15890,38 @@
         </p:blipFill>
         <p:spPr>
           <a:xfrm>
-            <a:off x="43333136" y="9355025"/>
-            <a:ext cx="3771900" cy="1206500"/>
+            <a:off x="42012882" y="14248243"/>
+            <a:ext cx="6751813" cy="2943929"/>
+          </a:xfrm>
+          <a:prstGeom prst="rect">
+            <a:avLst/>
+          </a:prstGeom>
+        </p:spPr>
+      </p:pic>
+      <p:pic>
+        <p:nvPicPr>
+          <p:cNvPr id="47" name="Picture 46"/>
+          <p:cNvPicPr>
+            <a:picLocks noChangeAspect="1"/>
+          </p:cNvPicPr>
+          <p:nvPr/>
+        </p:nvPicPr>
+        <p:blipFill>
+          <a:blip r:embed="rId12">
+            <a:extLst>
+              <a:ext uri="{28A0092B-C50C-407E-A947-70E740481C1C}">
+                <a14:useLocalDpi xmlns:a14="http://schemas.microsoft.com/office/drawing/2010/main" val="0"/>
+              </a:ext>
+            </a:extLst>
+          </a:blip>
+          <a:stretch>
+            <a:fillRect/>
+          </a:stretch>
+        </p:blipFill>
+        <p:spPr>
+          <a:xfrm>
+            <a:off x="42012881" y="7192378"/>
+            <a:ext cx="6751813" cy="2159671"/>
           </a:xfrm>
           <a:prstGeom prst="rect">
             <a:avLst/>
@@ -15747,88 +15931,13 @@
       <p:cxnSp>
         <p:nvCxnSpPr>
           <p:cNvPr id="50" name="Elbow Connector 49"/>
-          <p:cNvCxnSpPr>
-            <a:stCxn id="4" idx="3"/>
-            <a:endCxn id="5" idx="1"/>
-          </p:cNvCxnSpPr>
+          <p:cNvCxnSpPr/>
           <p:nvPr/>
         </p:nvCxnSpPr>
         <p:spPr>
           <a:xfrm flipV="1">
-            <a:off x="41465912" y="8188215"/>
-            <a:ext cx="1867224" cy="1001256"/>
-          </a:xfrm>
-          <a:prstGeom prst="bentConnector3">
-            <a:avLst/>
-          </a:prstGeom>
-          <a:ln>
-            <a:tailEnd type="triangle"/>
-          </a:ln>
-        </p:spPr>
-        <p:style>
-          <a:lnRef idx="3">
-            <a:schemeClr val="accent2"/>
-          </a:lnRef>
-          <a:fillRef idx="0">
-            <a:schemeClr val="accent2"/>
-          </a:fillRef>
-          <a:effectRef idx="2">
-            <a:schemeClr val="accent2"/>
-          </a:effectRef>
-          <a:fontRef idx="minor">
-            <a:schemeClr val="tx1"/>
-          </a:fontRef>
-        </p:style>
-      </p:cxnSp>
-      <p:cxnSp>
-        <p:nvCxnSpPr>
-          <p:cNvPr id="53" name="Straight Arrow Connector 52"/>
-          <p:cNvCxnSpPr>
-            <a:stCxn id="5" idx="2"/>
-            <a:endCxn id="47" idx="0"/>
-          </p:cNvCxnSpPr>
-          <p:nvPr/>
-        </p:nvCxnSpPr>
-        <p:spPr>
-          <a:xfrm>
-            <a:off x="45219086" y="8975615"/>
-            <a:ext cx="0" cy="379410"/>
-          </a:xfrm>
-          <a:prstGeom prst="straightConnector1">
-            <a:avLst/>
-          </a:prstGeom>
-          <a:ln>
-            <a:tailEnd type="triangle"/>
-          </a:ln>
-        </p:spPr>
-        <p:style>
-          <a:lnRef idx="3">
-            <a:schemeClr val="accent2"/>
-          </a:lnRef>
-          <a:fillRef idx="0">
-            <a:schemeClr val="accent2"/>
-          </a:fillRef>
-          <a:effectRef idx="2">
-            <a:schemeClr val="accent2"/>
-          </a:effectRef>
-          <a:fontRef idx="minor">
-            <a:schemeClr val="tx1"/>
-          </a:fontRef>
-        </p:style>
-      </p:cxnSp>
-      <p:cxnSp>
-        <p:nvCxnSpPr>
-          <p:cNvPr id="194" name="Elbow Connector 193"/>
-          <p:cNvCxnSpPr>
-            <a:stCxn id="47" idx="2"/>
-            <a:endCxn id="6" idx="0"/>
-          </p:cNvCxnSpPr>
-          <p:nvPr/>
-        </p:nvCxnSpPr>
-        <p:spPr>
-          <a:xfrm rot="5400000">
-            <a:off x="41251858" y="7445159"/>
-            <a:ext cx="850862" cy="7083595"/>
+            <a:off x="60308435" y="252839"/>
+            <a:ext cx="2359853" cy="14413"/>
           </a:xfrm>
           <a:prstGeom prst="bentConnector3">
             <a:avLst/>
@@ -15860,8 +15969,8 @@
         </p:nvSpPr>
         <p:spPr>
           <a:xfrm>
-            <a:off x="41061250" y="7378523"/>
-            <a:ext cx="415281" cy="523220"/>
+            <a:off x="40898617" y="6447499"/>
+            <a:ext cx="561289" cy="523220"/>
           </a:xfrm>
           <a:prstGeom prst="rect">
             <a:avLst/>
@@ -15877,28 +15986,35 @@
           <a:lstStyle/>
           <a:p>
             <a:r>
-              <a:rPr lang="en-US" sz="2800" dirty="0">
+              <a:rPr lang="en-US" sz="2800" smtClean="0">
                 <a:solidFill>
                   <a:schemeClr val="bg1"/>
                 </a:solidFill>
                 <a:latin typeface="Times New Roman" panose="02020603050405020304" pitchFamily="18" charset="0"/>
                 <a:cs typeface="Times New Roman" panose="02020603050405020304" pitchFamily="18" charset="0"/>
               </a:rPr>
-              <a:t>1</a:t>
-            </a:r>
+              <a:t>1a</a:t>
+            </a:r>
+            <a:endParaRPr lang="en-US" sz="2800" dirty="0">
+              <a:solidFill>
+                <a:schemeClr val="bg1"/>
+              </a:solidFill>
+              <a:latin typeface="Times New Roman" panose="02020603050405020304" pitchFamily="18" charset="0"/>
+              <a:cs typeface="Times New Roman" panose="02020603050405020304" pitchFamily="18" charset="0"/>
+            </a:endParaRPr>
           </a:p>
         </p:txBody>
       </p:sp>
       <p:sp>
         <p:nvSpPr>
-          <p:cNvPr id="197" name="TextBox 196"/>
+          <p:cNvPr id="198" name="TextBox 197"/>
           <p:cNvSpPr txBox="1"/>
           <p:nvPr/>
         </p:nvSpPr>
         <p:spPr>
           <a:xfrm>
-            <a:off x="46824480" y="7420556"/>
-            <a:ext cx="280556" cy="523220"/>
+            <a:off x="48197192" y="7193487"/>
+            <a:ext cx="567503" cy="523220"/>
           </a:xfrm>
           <a:prstGeom prst="rect">
             <a:avLst/>
@@ -15914,371 +16030,25 @@
           <a:lstStyle/>
           <a:p>
             <a:r>
-              <a:rPr lang="en-US" sz="2800" dirty="0">
+              <a:rPr lang="en-US" sz="2800" smtClean="0">
                 <a:solidFill>
                   <a:schemeClr val="bg1"/>
                 </a:solidFill>
                 <a:latin typeface="Times New Roman" panose="02020603050405020304" pitchFamily="18" charset="0"/>
                 <a:cs typeface="Times New Roman" panose="02020603050405020304" pitchFamily="18" charset="0"/>
               </a:rPr>
-              <a:t>a</a:t>
-            </a:r>
+              <a:t>1b</a:t>
+            </a:r>
+            <a:endParaRPr lang="en-US" sz="2800" dirty="0">
+              <a:solidFill>
+                <a:schemeClr val="bg1"/>
+              </a:solidFill>
+              <a:latin typeface="Times New Roman" panose="02020603050405020304" pitchFamily="18" charset="0"/>
+              <a:cs typeface="Times New Roman" panose="02020603050405020304" pitchFamily="18" charset="0"/>
+            </a:endParaRPr>
           </a:p>
         </p:txBody>
       </p:sp>
-      <p:sp>
-        <p:nvSpPr>
-          <p:cNvPr id="198" name="TextBox 197"/>
-          <p:cNvSpPr txBox="1"/>
-          <p:nvPr/>
-        </p:nvSpPr>
-        <p:spPr>
-          <a:xfrm>
-            <a:off x="46824480" y="9363883"/>
-            <a:ext cx="280556" cy="523220"/>
-          </a:xfrm>
-          <a:prstGeom prst="rect">
-            <a:avLst/>
-          </a:prstGeom>
-          <a:solidFill>
-            <a:schemeClr val="tx1"/>
-          </a:solidFill>
-        </p:spPr>
-        <p:txBody>
-          <a:bodyPr wrap="square" rtlCol="0">
-            <a:spAutoFit/>
-          </a:bodyPr>
-          <a:lstStyle/>
-          <a:p>
-            <a:r>
-              <a:rPr lang="en-US" sz="2800" dirty="0">
-                <a:solidFill>
-                  <a:schemeClr val="bg1"/>
-                </a:solidFill>
-                <a:latin typeface="Times New Roman" panose="02020603050405020304" pitchFamily="18" charset="0"/>
-                <a:cs typeface="Times New Roman" panose="02020603050405020304" pitchFamily="18" charset="0"/>
-              </a:rPr>
-              <a:t>b</a:t>
-            </a:r>
-          </a:p>
-        </p:txBody>
-      </p:sp>
-      <p:sp>
-        <p:nvSpPr>
-          <p:cNvPr id="202" name="TextBox 201"/>
-          <p:cNvSpPr txBox="1"/>
-          <p:nvPr/>
-        </p:nvSpPr>
-        <p:spPr>
-          <a:xfrm>
-            <a:off x="41050631" y="11412386"/>
-            <a:ext cx="415281" cy="523220"/>
-          </a:xfrm>
-          <a:prstGeom prst="rect">
-            <a:avLst/>
-          </a:prstGeom>
-          <a:solidFill>
-            <a:schemeClr val="tx1"/>
-          </a:solidFill>
-        </p:spPr>
-        <p:txBody>
-          <a:bodyPr wrap="square" rtlCol="0">
-            <a:spAutoFit/>
-          </a:bodyPr>
-          <a:lstStyle/>
-          <a:p>
-            <a:r>
-              <a:rPr lang="en-US" sz="2800" dirty="0">
-                <a:solidFill>
-                  <a:schemeClr val="bg1"/>
-                </a:solidFill>
-                <a:latin typeface="Times New Roman" panose="02020603050405020304" pitchFamily="18" charset="0"/>
-                <a:cs typeface="Times New Roman" panose="02020603050405020304" pitchFamily="18" charset="0"/>
-              </a:rPr>
-              <a:t>2</a:t>
-            </a:r>
-          </a:p>
-        </p:txBody>
-      </p:sp>
-      <p:sp>
-        <p:nvSpPr>
-          <p:cNvPr id="205" name="TextBox 204"/>
-          <p:cNvSpPr txBox="1"/>
-          <p:nvPr/>
-        </p:nvSpPr>
-        <p:spPr>
-          <a:xfrm>
-            <a:off x="47807727" y="13094944"/>
-            <a:ext cx="316572" cy="520888"/>
-          </a:xfrm>
-          <a:prstGeom prst="rect">
-            <a:avLst/>
-          </a:prstGeom>
-          <a:solidFill>
-            <a:schemeClr val="tx1"/>
-          </a:solidFill>
-        </p:spPr>
-        <p:txBody>
-          <a:bodyPr wrap="square" rtlCol="0">
-            <a:spAutoFit/>
-          </a:bodyPr>
-          <a:lstStyle/>
-          <a:p>
-            <a:r>
-              <a:rPr lang="en-US" sz="2800" dirty="0">
-                <a:solidFill>
-                  <a:schemeClr val="bg1"/>
-                </a:solidFill>
-                <a:latin typeface="Times New Roman" panose="02020603050405020304" pitchFamily="18" charset="0"/>
-                <a:cs typeface="Times New Roman" panose="02020603050405020304" pitchFamily="18" charset="0"/>
-              </a:rPr>
-              <a:t>c</a:t>
-            </a:r>
-          </a:p>
-        </p:txBody>
-      </p:sp>
-      <p:pic>
-        <p:nvPicPr>
-          <p:cNvPr id="206" name="Picture 205"/>
-          <p:cNvPicPr>
-            <a:picLocks noChangeAspect="1"/>
-          </p:cNvPicPr>
-          <p:nvPr/>
-        </p:nvPicPr>
-        <p:blipFill>
-          <a:blip r:embed="rId12" cstate="print">
-            <a:extLst>
-              <a:ext uri="{28A0092B-C50C-407E-A947-70E740481C1C}">
-                <a14:useLocalDpi xmlns:a14="http://schemas.microsoft.com/office/drawing/2010/main" val="0"/>
-              </a:ext>
-            </a:extLst>
-          </a:blip>
-          <a:stretch>
-            <a:fillRect/>
-          </a:stretch>
-        </p:blipFill>
-        <p:spPr>
-          <a:xfrm>
-            <a:off x="42385909" y="13150095"/>
-            <a:ext cx="2939636" cy="1687569"/>
-          </a:xfrm>
-          <a:prstGeom prst="rect">
-            <a:avLst/>
-          </a:prstGeom>
-        </p:spPr>
-      </p:pic>
-      <p:sp>
-        <p:nvSpPr>
-          <p:cNvPr id="204" name="TextBox 203"/>
-          <p:cNvSpPr txBox="1"/>
-          <p:nvPr/>
-        </p:nvSpPr>
-        <p:spPr>
-          <a:xfrm>
-            <a:off x="45001935" y="13150095"/>
-            <a:ext cx="323610" cy="523220"/>
-          </a:xfrm>
-          <a:prstGeom prst="rect">
-            <a:avLst/>
-          </a:prstGeom>
-          <a:solidFill>
-            <a:schemeClr val="tx1"/>
-          </a:solidFill>
-        </p:spPr>
-        <p:txBody>
-          <a:bodyPr wrap="square" rtlCol="0">
-            <a:spAutoFit/>
-          </a:bodyPr>
-          <a:lstStyle/>
-          <a:p>
-            <a:r>
-              <a:rPr lang="en-US" sz="2800" dirty="0">
-                <a:solidFill>
-                  <a:schemeClr val="bg1"/>
-                </a:solidFill>
-                <a:latin typeface="Times New Roman" panose="02020603050405020304" pitchFamily="18" charset="0"/>
-                <a:cs typeface="Times New Roman" panose="02020603050405020304" pitchFamily="18" charset="0"/>
-              </a:rPr>
-              <a:t>b</a:t>
-            </a:r>
-          </a:p>
-        </p:txBody>
-      </p:sp>
-      <p:pic>
-        <p:nvPicPr>
-          <p:cNvPr id="211" name="Picture 210"/>
-          <p:cNvPicPr>
-            <a:picLocks noChangeAspect="1"/>
-          </p:cNvPicPr>
-          <p:nvPr/>
-        </p:nvPicPr>
-        <p:blipFill>
-          <a:blip r:embed="rId13" cstate="print">
-            <a:extLst>
-              <a:ext uri="{28A0092B-C50C-407E-A947-70E740481C1C}">
-                <a14:useLocalDpi xmlns:a14="http://schemas.microsoft.com/office/drawing/2010/main" val="0"/>
-              </a:ext>
-            </a:extLst>
-          </a:blip>
-          <a:stretch>
-            <a:fillRect/>
-          </a:stretch>
-        </p:blipFill>
-        <p:spPr>
-          <a:xfrm>
-            <a:off x="42313872" y="11412464"/>
-            <a:ext cx="5810427" cy="1204686"/>
-          </a:xfrm>
-          <a:prstGeom prst="rect">
-            <a:avLst/>
-          </a:prstGeom>
-        </p:spPr>
-      </p:pic>
-      <p:sp>
-        <p:nvSpPr>
-          <p:cNvPr id="203" name="TextBox 202"/>
-          <p:cNvSpPr txBox="1"/>
-          <p:nvPr/>
-        </p:nvSpPr>
-        <p:spPr>
-          <a:xfrm>
-            <a:off x="47800689" y="11405883"/>
-            <a:ext cx="323610" cy="523220"/>
-          </a:xfrm>
-          <a:prstGeom prst="rect">
-            <a:avLst/>
-          </a:prstGeom>
-          <a:solidFill>
-            <a:schemeClr val="tx1"/>
-          </a:solidFill>
-        </p:spPr>
-        <p:txBody>
-          <a:bodyPr wrap="square" rtlCol="0">
-            <a:spAutoFit/>
-          </a:bodyPr>
-          <a:lstStyle/>
-          <a:p>
-            <a:r>
-              <a:rPr lang="en-US" sz="2800" dirty="0">
-                <a:solidFill>
-                  <a:schemeClr val="bg1"/>
-                </a:solidFill>
-                <a:latin typeface="Times New Roman" panose="02020603050405020304" pitchFamily="18" charset="0"/>
-                <a:cs typeface="Times New Roman" panose="02020603050405020304" pitchFamily="18" charset="0"/>
-              </a:rPr>
-              <a:t>a</a:t>
-            </a:r>
-          </a:p>
-        </p:txBody>
-      </p:sp>
-      <p:cxnSp>
-        <p:nvCxnSpPr>
-          <p:cNvPr id="237" name="Elbow Connector 236"/>
-          <p:cNvCxnSpPr>
-            <a:stCxn id="211" idx="2"/>
-            <a:endCxn id="206" idx="0"/>
-          </p:cNvCxnSpPr>
-          <p:nvPr/>
-        </p:nvCxnSpPr>
-        <p:spPr>
-          <a:xfrm rot="5400000">
-            <a:off x="44270935" y="12201943"/>
-            <a:ext cx="532945" cy="1363359"/>
-          </a:xfrm>
-          <a:prstGeom prst="bentConnector3">
-            <a:avLst/>
-          </a:prstGeom>
-          <a:ln>
-            <a:tailEnd type="triangle"/>
-          </a:ln>
-        </p:spPr>
-        <p:style>
-          <a:lnRef idx="3">
-            <a:schemeClr val="accent2"/>
-          </a:lnRef>
-          <a:fillRef idx="0">
-            <a:schemeClr val="accent2"/>
-          </a:fillRef>
-          <a:effectRef idx="2">
-            <a:schemeClr val="accent2"/>
-          </a:effectRef>
-          <a:fontRef idx="minor">
-            <a:schemeClr val="tx1"/>
-          </a:fontRef>
-        </p:style>
-      </p:cxnSp>
-      <p:cxnSp>
-        <p:nvCxnSpPr>
-          <p:cNvPr id="241" name="Straight Arrow Connector 240"/>
-          <p:cNvCxnSpPr>
-            <a:stCxn id="206" idx="3"/>
-            <a:endCxn id="9" idx="1"/>
-          </p:cNvCxnSpPr>
-          <p:nvPr/>
-        </p:nvCxnSpPr>
-        <p:spPr>
-          <a:xfrm flipV="1">
-            <a:off x="45325545" y="13979015"/>
-            <a:ext cx="885841" cy="14865"/>
-          </a:xfrm>
-          <a:prstGeom prst="straightConnector1">
-            <a:avLst/>
-          </a:prstGeom>
-          <a:ln>
-            <a:tailEnd type="triangle"/>
-          </a:ln>
-        </p:spPr>
-        <p:style>
-          <a:lnRef idx="3">
-            <a:schemeClr val="accent2"/>
-          </a:lnRef>
-          <a:fillRef idx="0">
-            <a:schemeClr val="accent2"/>
-          </a:fillRef>
-          <a:effectRef idx="2">
-            <a:schemeClr val="accent2"/>
-          </a:effectRef>
-          <a:fontRef idx="minor">
-            <a:schemeClr val="tx1"/>
-          </a:fontRef>
-        </p:style>
-      </p:cxnSp>
-      <p:cxnSp>
-        <p:nvCxnSpPr>
-          <p:cNvPr id="253" name="Elbow Connector 252"/>
-          <p:cNvCxnSpPr>
-            <a:stCxn id="9" idx="2"/>
-            <a:endCxn id="10" idx="0"/>
-          </p:cNvCxnSpPr>
-          <p:nvPr/>
-        </p:nvCxnSpPr>
-        <p:spPr>
-          <a:xfrm rot="5400000">
-            <a:off x="42337548" y="10660957"/>
-            <a:ext cx="628240" cy="9032351"/>
-          </a:xfrm>
-          <a:prstGeom prst="bentConnector3">
-            <a:avLst/>
-          </a:prstGeom>
-          <a:ln>
-            <a:tailEnd type="triangle"/>
-          </a:ln>
-        </p:spPr>
-        <p:style>
-          <a:lnRef idx="3">
-            <a:schemeClr val="accent2"/>
-          </a:lnRef>
-          <a:fillRef idx="0">
-            <a:schemeClr val="accent2"/>
-          </a:fillRef>
-          <a:effectRef idx="2">
-            <a:schemeClr val="accent2"/>
-          </a:effectRef>
-          <a:fontRef idx="minor">
-            <a:schemeClr val="tx1"/>
-          </a:fontRef>
-        </p:style>
-      </p:cxnSp>
       <p:sp>
         <p:nvSpPr>
           <p:cNvPr id="255" name="TextBox 254"/>
@@ -16287,8 +16057,8 @@
         </p:nvSpPr>
         <p:spPr>
           <a:xfrm>
-            <a:off x="34805070" y="18357341"/>
-            <a:ext cx="7114455" cy="4093428"/>
+            <a:off x="42012883" y="17542703"/>
+            <a:ext cx="7415815" cy="4401205"/>
           </a:xfrm>
           <a:prstGeom prst="rect">
             <a:avLst/>
@@ -16315,7 +16085,14 @@
                 <a:latin typeface="Times New Roman" panose="02020603050405020304" pitchFamily="18" charset="0"/>
                 <a:cs typeface="Times New Roman" panose="02020603050405020304" pitchFamily="18" charset="0"/>
               </a:rPr>
-              <a:t>  a. User must upload a .wav file</a:t>
+              <a:t>  a. </a:t>
+            </a:r>
+            <a:r>
+              <a:rPr lang="en-US" sz="2000" dirty="0" smtClean="0">
+                <a:latin typeface="Times New Roman" panose="02020603050405020304" pitchFamily="18" charset="0"/>
+                <a:cs typeface="Times New Roman" panose="02020603050405020304" pitchFamily="18" charset="0"/>
+              </a:rPr>
+              <a:t>Home screen</a:t>
             </a:r>
           </a:p>
           <a:p>
@@ -16324,8 +16101,26 @@
                 <a:latin typeface="Times New Roman" panose="02020603050405020304" pitchFamily="18" charset="0"/>
                 <a:cs typeface="Times New Roman" panose="02020603050405020304" pitchFamily="18" charset="0"/>
               </a:rPr>
-              <a:t>  b. User uploads .wav file</a:t>
-            </a:r>
+              <a:t> </a:t>
+            </a:r>
+            <a:r>
+              <a:rPr lang="en-US" sz="2000" dirty="0" smtClean="0">
+                <a:latin typeface="Times New Roman" panose="02020603050405020304" pitchFamily="18" charset="0"/>
+                <a:cs typeface="Times New Roman" panose="02020603050405020304" pitchFamily="18" charset="0"/>
+              </a:rPr>
+              <a:t> b. </a:t>
+            </a:r>
+            <a:r>
+              <a:rPr lang="en-US" sz="2000" dirty="0" smtClean="0">
+                <a:latin typeface="Times New Roman" panose="02020603050405020304" pitchFamily="18" charset="0"/>
+                <a:cs typeface="Times New Roman" panose="02020603050405020304" pitchFamily="18" charset="0"/>
+              </a:rPr>
+              <a:t>User uploads .wav file (system will reject if not wav format)</a:t>
+            </a:r>
+            <a:endParaRPr lang="en-US" sz="2000" dirty="0">
+              <a:latin typeface="Times New Roman" panose="02020603050405020304" pitchFamily="18" charset="0"/>
+              <a:cs typeface="Times New Roman" panose="02020603050405020304" pitchFamily="18" charset="0"/>
+            </a:endParaRPr>
           </a:p>
           <a:p>
             <a:endParaRPr lang="en-US" sz="2000" dirty="0">
@@ -16348,17 +16143,53 @@
                 <a:latin typeface="Times New Roman" panose="02020603050405020304" pitchFamily="18" charset="0"/>
                 <a:cs typeface="Times New Roman" panose="02020603050405020304" pitchFamily="18" charset="0"/>
               </a:rPr>
-              <a:t>  a. User selects portions of audio where only one speaker is talking</a:t>
-            </a:r>
-          </a:p>
-          <a:p>
+              <a:t>  a. User selects portions of audio </a:t>
+            </a:r>
+            <a:r>
+              <a:rPr lang="en-US" sz="2000" dirty="0" smtClean="0">
+                <a:latin typeface="Times New Roman" panose="02020603050405020304" pitchFamily="18" charset="0"/>
+                <a:cs typeface="Times New Roman" panose="02020603050405020304" pitchFamily="18" charset="0"/>
+              </a:rPr>
+              <a:t>in which only </a:t>
+            </a:r>
             <a:r>
               <a:rPr lang="en-US" sz="2000" dirty="0">
                 <a:latin typeface="Times New Roman" panose="02020603050405020304" pitchFamily="18" charset="0"/>
                 <a:cs typeface="Times New Roman" panose="02020603050405020304" pitchFamily="18" charset="0"/>
               </a:rPr>
-              <a:t>  b. User assigns a name to the speaker of the current selection</a:t>
-            </a:r>
+              <a:t>one speaker is </a:t>
+            </a:r>
+            <a:r>
+              <a:rPr lang="en-US" sz="2000" dirty="0" smtClean="0">
+                <a:latin typeface="Times New Roman" panose="02020603050405020304" pitchFamily="18" charset="0"/>
+                <a:cs typeface="Times New Roman" panose="02020603050405020304" pitchFamily="18" charset="0"/>
+              </a:rPr>
+              <a:t>talking</a:t>
+            </a:r>
+            <a:endParaRPr lang="en-US" sz="2000" dirty="0">
+              <a:latin typeface="Times New Roman" panose="02020603050405020304" pitchFamily="18" charset="0"/>
+              <a:cs typeface="Times New Roman" panose="02020603050405020304" pitchFamily="18" charset="0"/>
+            </a:endParaRPr>
+          </a:p>
+          <a:p>
+            <a:r>
+              <a:rPr lang="en-US" sz="2000" dirty="0">
+                <a:latin typeface="Times New Roman" panose="02020603050405020304" pitchFamily="18" charset="0"/>
+                <a:cs typeface="Times New Roman" panose="02020603050405020304" pitchFamily="18" charset="0"/>
+              </a:rPr>
+              <a:t>  b. User assigns a name to the speaker of the current </a:t>
+            </a:r>
+            <a:r>
+              <a:rPr lang="en-US" sz="2000" dirty="0" smtClean="0">
+                <a:latin typeface="Times New Roman" panose="02020603050405020304" pitchFamily="18" charset="0"/>
+                <a:cs typeface="Times New Roman" panose="02020603050405020304" pitchFamily="18" charset="0"/>
+              </a:rPr>
+              <a:t>selection and enrolls the speaker (training the speaker recognition API)</a:t>
+            </a:r>
+            <a:endParaRPr lang="en-US" sz="2000" dirty="0">
+              <a:latin typeface="Times New Roman" panose="02020603050405020304" pitchFamily="18" charset="0"/>
+              <a:cs typeface="Times New Roman" panose="02020603050405020304" pitchFamily="18" charset="0"/>
+            </a:endParaRPr>
           </a:p>
           <a:p>
             <a:r>
@@ -16409,8 +16240,8 @@
         </p:nvSpPr>
         <p:spPr>
           <a:xfrm>
-            <a:off x="41061250" y="15491252"/>
-            <a:ext cx="415281" cy="523220"/>
+            <a:off x="48206546" y="14248226"/>
+            <a:ext cx="565997" cy="518588"/>
           </a:xfrm>
           <a:prstGeom prst="rect">
             <a:avLst/>
@@ -16426,15 +16257,22 @@
           <a:lstStyle/>
           <a:p>
             <a:r>
-              <a:rPr lang="en-US" sz="2800" dirty="0">
+              <a:rPr lang="en-US" sz="2800" smtClean="0">
                 <a:solidFill>
                   <a:schemeClr val="bg1"/>
                 </a:solidFill>
                 <a:latin typeface="Times New Roman" panose="02020603050405020304" pitchFamily="18" charset="0"/>
                 <a:cs typeface="Times New Roman" panose="02020603050405020304" pitchFamily="18" charset="0"/>
               </a:rPr>
-              <a:t>d</a:t>
-            </a:r>
+              <a:t>2d</a:t>
+            </a:r>
+            <a:endParaRPr lang="en-US" sz="2800" dirty="0">
+              <a:solidFill>
+                <a:schemeClr val="bg1"/>
+              </a:solidFill>
+              <a:latin typeface="Times New Roman" panose="02020603050405020304" pitchFamily="18" charset="0"/>
+              <a:cs typeface="Times New Roman" panose="02020603050405020304" pitchFamily="18" charset="0"/>
+            </a:endParaRPr>
           </a:p>
         </p:txBody>
       </p:sp>
@@ -16447,11 +16285,11 @@
           <p:nvPr/>
         </p:nvPicPr>
         <p:blipFill>
-          <a:blip r:embed="rId14">
+          <a:blip r:embed="rId13">
             <a:extLst>
               <a:ext uri="{BEBA8EAE-BF5A-486C-A8C5-ECC9F3942E4B}">
                 <a14:imgProps xmlns:a14="http://schemas.microsoft.com/office/drawing/2010/main">
-                  <a14:imgLayer r:embed="rId15">
+                  <a14:imgLayer r:embed="rId14">
                     <a14:imgEffect>
                       <a14:brightnessContrast bright="20000" contrast="20000"/>
                     </a14:imgEffect>
@@ -16905,6 +16743,372 @@
           </a:p>
         </p:txBody>
       </p:sp>
+      <p:pic>
+        <p:nvPicPr>
+          <p:cNvPr id="39" name="Picture 38"/>
+          <p:cNvPicPr>
+            <a:picLocks noChangeAspect="1"/>
+          </p:cNvPicPr>
+          <p:nvPr/>
+        </p:nvPicPr>
+        <p:blipFill>
+          <a:blip r:embed="rId15">
+            <a:extLst>
+              <a:ext uri="{28A0092B-C50C-407E-A947-70E740481C1C}">
+                <a14:useLocalDpi xmlns:a14="http://schemas.microsoft.com/office/drawing/2010/main" val="0"/>
+              </a:ext>
+            </a:extLst>
+          </a:blip>
+          <a:stretch>
+            <a:fillRect/>
+          </a:stretch>
+        </p:blipFill>
+        <p:spPr>
+          <a:xfrm>
+            <a:off x="34781560" y="10393302"/>
+            <a:ext cx="6678346" cy="3531930"/>
+          </a:xfrm>
+          <a:prstGeom prst="rect">
+            <a:avLst/>
+          </a:prstGeom>
+        </p:spPr>
+      </p:pic>
+      <p:pic>
+        <p:nvPicPr>
+          <p:cNvPr id="71" name="Picture 70"/>
+          <p:cNvPicPr>
+            <a:picLocks noChangeAspect="1"/>
+          </p:cNvPicPr>
+          <p:nvPr/>
+        </p:nvPicPr>
+        <p:blipFill>
+          <a:blip r:embed="rId16">
+            <a:extLst>
+              <a:ext uri="{28A0092B-C50C-407E-A947-70E740481C1C}">
+                <a14:useLocalDpi xmlns:a14="http://schemas.microsoft.com/office/drawing/2010/main" val="0"/>
+              </a:ext>
+            </a:extLst>
+          </a:blip>
+          <a:stretch>
+            <a:fillRect/>
+          </a:stretch>
+        </p:blipFill>
+        <p:spPr>
+          <a:xfrm>
+            <a:off x="42012882" y="10359617"/>
+            <a:ext cx="6751813" cy="3599300"/>
+          </a:xfrm>
+          <a:prstGeom prst="rect">
+            <a:avLst/>
+          </a:prstGeom>
+        </p:spPr>
+      </p:pic>
+      <p:sp>
+        <p:nvSpPr>
+          <p:cNvPr id="202" name="TextBox 201"/>
+          <p:cNvSpPr txBox="1"/>
+          <p:nvPr/>
+        </p:nvSpPr>
+        <p:spPr>
+          <a:xfrm>
+            <a:off x="40898617" y="10391027"/>
+            <a:ext cx="561289" cy="523220"/>
+          </a:xfrm>
+          <a:prstGeom prst="rect">
+            <a:avLst/>
+          </a:prstGeom>
+          <a:solidFill>
+            <a:schemeClr val="tx1"/>
+          </a:solidFill>
+        </p:spPr>
+        <p:txBody>
+          <a:bodyPr wrap="square" rtlCol="0">
+            <a:spAutoFit/>
+          </a:bodyPr>
+          <a:lstStyle/>
+          <a:p>
+            <a:r>
+              <a:rPr lang="en-US" sz="2800" smtClean="0">
+                <a:solidFill>
+                  <a:schemeClr val="bg1"/>
+                </a:solidFill>
+                <a:latin typeface="Times New Roman" panose="02020603050405020304" pitchFamily="18" charset="0"/>
+                <a:cs typeface="Times New Roman" panose="02020603050405020304" pitchFamily="18" charset="0"/>
+              </a:rPr>
+              <a:t>2a</a:t>
+            </a:r>
+            <a:endParaRPr lang="en-US" sz="2800" dirty="0">
+              <a:solidFill>
+                <a:schemeClr val="bg1"/>
+              </a:solidFill>
+              <a:latin typeface="Times New Roman" panose="02020603050405020304" pitchFamily="18" charset="0"/>
+              <a:cs typeface="Times New Roman" panose="02020603050405020304" pitchFamily="18" charset="0"/>
+            </a:endParaRPr>
+          </a:p>
+        </p:txBody>
+      </p:sp>
+      <p:sp>
+        <p:nvSpPr>
+          <p:cNvPr id="203" name="TextBox 202"/>
+          <p:cNvSpPr txBox="1"/>
+          <p:nvPr/>
+        </p:nvSpPr>
+        <p:spPr>
+          <a:xfrm>
+            <a:off x="48197192" y="10403509"/>
+            <a:ext cx="567503" cy="523220"/>
+          </a:xfrm>
+          <a:prstGeom prst="rect">
+            <a:avLst/>
+          </a:prstGeom>
+          <a:solidFill>
+            <a:schemeClr val="tx1"/>
+          </a:solidFill>
+        </p:spPr>
+        <p:txBody>
+          <a:bodyPr wrap="square" rtlCol="0">
+            <a:spAutoFit/>
+          </a:bodyPr>
+          <a:lstStyle/>
+          <a:p>
+            <a:r>
+              <a:rPr lang="en-US" sz="2800" dirty="0" smtClean="0">
+                <a:solidFill>
+                  <a:schemeClr val="bg1"/>
+                </a:solidFill>
+                <a:latin typeface="Times New Roman" panose="02020603050405020304" pitchFamily="18" charset="0"/>
+                <a:cs typeface="Times New Roman" panose="02020603050405020304" pitchFamily="18" charset="0"/>
+              </a:rPr>
+              <a:t>2b</a:t>
+            </a:r>
+            <a:endParaRPr lang="en-US" sz="2800" dirty="0">
+              <a:solidFill>
+                <a:schemeClr val="bg1"/>
+              </a:solidFill>
+              <a:latin typeface="Times New Roman" panose="02020603050405020304" pitchFamily="18" charset="0"/>
+              <a:cs typeface="Times New Roman" panose="02020603050405020304" pitchFamily="18" charset="0"/>
+            </a:endParaRPr>
+          </a:p>
+        </p:txBody>
+      </p:sp>
+      <p:pic>
+        <p:nvPicPr>
+          <p:cNvPr id="74" name="Picture 73"/>
+          <p:cNvPicPr>
+            <a:picLocks noChangeAspect="1"/>
+          </p:cNvPicPr>
+          <p:nvPr/>
+        </p:nvPicPr>
+        <p:blipFill>
+          <a:blip r:embed="rId17">
+            <a:extLst>
+              <a:ext uri="{28A0092B-C50C-407E-A947-70E740481C1C}">
+                <a14:useLocalDpi xmlns:a14="http://schemas.microsoft.com/office/drawing/2010/main" val="0"/>
+              </a:ext>
+            </a:extLst>
+          </a:blip>
+          <a:stretch>
+            <a:fillRect/>
+          </a:stretch>
+        </p:blipFill>
+        <p:spPr>
+          <a:xfrm>
+            <a:off x="34781560" y="14248243"/>
+            <a:ext cx="6619910" cy="2946667"/>
+          </a:xfrm>
+          <a:prstGeom prst="rect">
+            <a:avLst/>
+          </a:prstGeom>
+        </p:spPr>
+      </p:pic>
+      <p:sp>
+        <p:nvSpPr>
+          <p:cNvPr id="205" name="TextBox 204"/>
+          <p:cNvSpPr txBox="1"/>
+          <p:nvPr/>
+        </p:nvSpPr>
+        <p:spPr>
+          <a:xfrm>
+            <a:off x="40841098" y="14254660"/>
+            <a:ext cx="560372" cy="523220"/>
+          </a:xfrm>
+          <a:prstGeom prst="rect">
+            <a:avLst/>
+          </a:prstGeom>
+          <a:solidFill>
+            <a:schemeClr val="tx1"/>
+          </a:solidFill>
+        </p:spPr>
+        <p:txBody>
+          <a:bodyPr wrap="square" rtlCol="0">
+            <a:spAutoFit/>
+          </a:bodyPr>
+          <a:lstStyle/>
+          <a:p>
+            <a:r>
+              <a:rPr lang="en-US" sz="2800" smtClean="0">
+                <a:solidFill>
+                  <a:schemeClr val="bg1"/>
+                </a:solidFill>
+                <a:latin typeface="Times New Roman" panose="02020603050405020304" pitchFamily="18" charset="0"/>
+                <a:cs typeface="Times New Roman" panose="02020603050405020304" pitchFamily="18" charset="0"/>
+              </a:rPr>
+              <a:t>2c</a:t>
+            </a:r>
+            <a:endParaRPr lang="en-US" sz="2800" dirty="0">
+              <a:solidFill>
+                <a:schemeClr val="bg1"/>
+              </a:solidFill>
+              <a:latin typeface="Times New Roman" panose="02020603050405020304" pitchFamily="18" charset="0"/>
+              <a:cs typeface="Times New Roman" panose="02020603050405020304" pitchFamily="18" charset="0"/>
+            </a:endParaRPr>
+          </a:p>
+        </p:txBody>
+      </p:sp>
+      <p:cxnSp>
+        <p:nvCxnSpPr>
+          <p:cNvPr id="76" name="Straight Arrow Connector 75"/>
+          <p:cNvCxnSpPr>
+            <a:stCxn id="4" idx="3"/>
+            <a:endCxn id="47" idx="1"/>
+          </p:cNvCxnSpPr>
+          <p:nvPr/>
+        </p:nvCxnSpPr>
+        <p:spPr>
+          <a:xfrm flipV="1">
+            <a:off x="41465912" y="8272214"/>
+            <a:ext cx="546969" cy="2843"/>
+          </a:xfrm>
+          <a:prstGeom prst="straightConnector1">
+            <a:avLst/>
+          </a:prstGeom>
+          <a:ln>
+            <a:tailEnd type="triangle"/>
+          </a:ln>
+        </p:spPr>
+        <p:style>
+          <a:lnRef idx="3">
+            <a:schemeClr val="accent2"/>
+          </a:lnRef>
+          <a:fillRef idx="0">
+            <a:schemeClr val="accent2"/>
+          </a:fillRef>
+          <a:effectRef idx="2">
+            <a:schemeClr val="accent2"/>
+          </a:effectRef>
+          <a:fontRef idx="minor">
+            <a:schemeClr val="tx1"/>
+          </a:fontRef>
+        </p:style>
+      </p:cxnSp>
+      <p:cxnSp>
+        <p:nvCxnSpPr>
+          <p:cNvPr id="80" name="Straight Arrow Connector 79"/>
+          <p:cNvCxnSpPr>
+            <a:stCxn id="39" idx="3"/>
+            <a:endCxn id="71" idx="1"/>
+          </p:cNvCxnSpPr>
+          <p:nvPr/>
+        </p:nvCxnSpPr>
+        <p:spPr>
+          <a:xfrm>
+            <a:off x="41459906" y="12159267"/>
+            <a:ext cx="552976" cy="0"/>
+          </a:xfrm>
+          <a:prstGeom prst="straightConnector1">
+            <a:avLst/>
+          </a:prstGeom>
+          <a:ln>
+            <a:tailEnd type="triangle"/>
+          </a:ln>
+        </p:spPr>
+        <p:style>
+          <a:lnRef idx="3">
+            <a:schemeClr val="accent2"/>
+          </a:lnRef>
+          <a:fillRef idx="0">
+            <a:schemeClr val="accent2"/>
+          </a:fillRef>
+          <a:effectRef idx="2">
+            <a:schemeClr val="accent2"/>
+          </a:effectRef>
+          <a:fontRef idx="minor">
+            <a:schemeClr val="tx1"/>
+          </a:fontRef>
+        </p:style>
+      </p:cxnSp>
+      <p:cxnSp>
+        <p:nvCxnSpPr>
+          <p:cNvPr id="84" name="Elbow Connector 83"/>
+          <p:cNvCxnSpPr>
+            <a:stCxn id="71" idx="2"/>
+            <a:endCxn id="74" idx="0"/>
+          </p:cNvCxnSpPr>
+          <p:nvPr/>
+        </p:nvCxnSpPr>
+        <p:spPr>
+          <a:xfrm rot="5400000">
+            <a:off x="41595489" y="10454943"/>
+            <a:ext cx="289326" cy="7297274"/>
+          </a:xfrm>
+          <a:prstGeom prst="bentConnector3">
+            <a:avLst/>
+          </a:prstGeom>
+          <a:ln>
+            <a:tailEnd type="triangle"/>
+          </a:ln>
+        </p:spPr>
+        <p:style>
+          <a:lnRef idx="3">
+            <a:schemeClr val="accent2"/>
+          </a:lnRef>
+          <a:fillRef idx="0">
+            <a:schemeClr val="accent2"/>
+          </a:fillRef>
+          <a:effectRef idx="2">
+            <a:schemeClr val="accent2"/>
+          </a:effectRef>
+          <a:fontRef idx="minor">
+            <a:schemeClr val="tx1"/>
+          </a:fontRef>
+        </p:style>
+      </p:cxnSp>
+      <p:cxnSp>
+        <p:nvCxnSpPr>
+          <p:cNvPr id="87" name="Straight Arrow Connector 86"/>
+          <p:cNvCxnSpPr>
+            <a:stCxn id="74" idx="3"/>
+            <a:endCxn id="10" idx="1"/>
+          </p:cNvCxnSpPr>
+          <p:nvPr/>
+        </p:nvCxnSpPr>
+        <p:spPr>
+          <a:xfrm flipV="1">
+            <a:off x="41401470" y="15720208"/>
+            <a:ext cx="611412" cy="1369"/>
+          </a:xfrm>
+          <a:prstGeom prst="straightConnector1">
+            <a:avLst/>
+          </a:prstGeom>
+          <a:ln>
+            <a:tailEnd type="triangle"/>
+          </a:ln>
+        </p:spPr>
+        <p:style>
+          <a:lnRef idx="3">
+            <a:schemeClr val="accent2"/>
+          </a:lnRef>
+          <a:fillRef idx="0">
+            <a:schemeClr val="accent2"/>
+          </a:fillRef>
+          <a:effectRef idx="2">
+            <a:schemeClr val="accent2"/>
+          </a:effectRef>
+          <a:fontRef idx="minor">
+            <a:schemeClr val="tx1"/>
+          </a:fontRef>
+        </p:style>
+      </p:cxnSp>
     </p:spTree>
     <p:extLst>
       <p:ext uri="{BB962C8B-B14F-4D97-AF65-F5344CB8AC3E}">

</xml_diff>

<commit_message>
added some text to conclusion section
</commit_message>
<xml_diff>
--- a/Poster.pptx
+++ b/Poster.pptx
@@ -287,7 +287,7 @@
               <a:pPr>
                 <a:defRPr/>
               </a:pPr>
-              <a:t>3/15/17</a:t>
+              <a:t>3/16/17</a:t>
             </a:fld>
             <a:endParaRPr lang="en-US" dirty="0"/>
           </a:p>
@@ -5491,7 +5491,7 @@
               <a:graphicData uri="http://schemas.openxmlformats.org/presentationml/2006/ole">
                 <mc:AlternateContent xmlns:mc="http://schemas.openxmlformats.org/markup-compatibility/2006">
                   <mc:Choice xmlns:v="urn:schemas-microsoft-com:vml" Requires="v">
-                    <p:oleObj spid="_x0000_s1144" name="Image" r:id="rId8" imgW="1828440" imgH="1117440" progId="Photoshop.Image.13">
+                    <p:oleObj spid="_x0000_s1153" name="Image" r:id="rId8" imgW="1828440" imgH="1117440" progId="Photoshop.Image.13">
                       <p:embed/>
                     </p:oleObj>
                   </mc:Choice>
@@ -5548,7 +5548,7 @@
               <a:graphicData uri="http://schemas.openxmlformats.org/presentationml/2006/ole">
                 <mc:AlternateContent xmlns:mc="http://schemas.openxmlformats.org/markup-compatibility/2006">
                   <mc:Choice xmlns:v="urn:schemas-microsoft-com:vml" Requires="v">
-                    <p:oleObj spid="_x0000_s1145" name="Image" r:id="rId10" imgW="1828440" imgH="1117440" progId="Photoshop.Image.13">
+                    <p:oleObj spid="_x0000_s1154" name="Image" r:id="rId10" imgW="1828440" imgH="1117440" progId="Photoshop.Image.13">
                       <p:embed/>
                     </p:oleObj>
                   </mc:Choice>
@@ -6671,7 +6671,7 @@
             <a:graphicData uri="http://schemas.openxmlformats.org/presentationml/2006/ole">
               <mc:AlternateContent xmlns:mc="http://schemas.openxmlformats.org/markup-compatibility/2006">
                 <mc:Choice xmlns:v="urn:schemas-microsoft-com:vml" Requires="v">
-                  <p:oleObj spid="_x0000_s1146" name="Image" r:id="rId12" imgW="4571280" imgH="1688760" progId="Photoshop.Image.13">
+                  <p:oleObj spid="_x0000_s1155" name="Image" r:id="rId12" imgW="4571280" imgH="1688760" progId="Photoshop.Image.13">
                     <p:embed/>
                   </p:oleObj>
                 </mc:Choice>
@@ -6755,7 +6755,7 @@
             <a:graphicData uri="http://schemas.openxmlformats.org/presentationml/2006/ole">
               <mc:AlternateContent xmlns:mc="http://schemas.openxmlformats.org/markup-compatibility/2006">
                 <mc:Choice xmlns:v="urn:schemas-microsoft-com:vml" Requires="v">
-                  <p:oleObj spid="_x0000_s1147" name="Image" r:id="rId15" imgW="1574280" imgH="1053720" progId="Photoshop.Image.13">
+                  <p:oleObj spid="_x0000_s1156" name="Image" r:id="rId15" imgW="1574280" imgH="1053720" progId="Photoshop.Image.13">
                     <p:embed/>
                   </p:oleObj>
                 </mc:Choice>
@@ -9032,7 +9032,7 @@
               <a:graphicData uri="http://schemas.openxmlformats.org/presentationml/2006/ole">
                 <mc:AlternateContent xmlns:mc="http://schemas.openxmlformats.org/markup-compatibility/2006">
                   <mc:Choice xmlns:v="urn:schemas-microsoft-com:vml" Requires="v">
-                    <p:oleObj spid="_x0000_s2168" name="Image" r:id="rId8" imgW="1828440" imgH="1117440" progId="Photoshop.Image.13">
+                    <p:oleObj spid="_x0000_s2177" name="Image" r:id="rId8" imgW="1828440" imgH="1117440" progId="Photoshop.Image.13">
                       <p:embed/>
                     </p:oleObj>
                   </mc:Choice>
@@ -9089,7 +9089,7 @@
               <a:graphicData uri="http://schemas.openxmlformats.org/presentationml/2006/ole">
                 <mc:AlternateContent xmlns:mc="http://schemas.openxmlformats.org/markup-compatibility/2006">
                   <mc:Choice xmlns:v="urn:schemas-microsoft-com:vml" Requires="v">
-                    <p:oleObj spid="_x0000_s2169" name="Image" r:id="rId10" imgW="1828440" imgH="1117440" progId="Photoshop.Image.13">
+                    <p:oleObj spid="_x0000_s2178" name="Image" r:id="rId10" imgW="1828440" imgH="1117440" progId="Photoshop.Image.13">
                       <p:embed/>
                     </p:oleObj>
                   </mc:Choice>
@@ -10212,7 +10212,7 @@
             <a:graphicData uri="http://schemas.openxmlformats.org/presentationml/2006/ole">
               <mc:AlternateContent xmlns:mc="http://schemas.openxmlformats.org/markup-compatibility/2006">
                 <mc:Choice xmlns:v="urn:schemas-microsoft-com:vml" Requires="v">
-                  <p:oleObj spid="_x0000_s2170" name="Image" r:id="rId12" imgW="4571280" imgH="1688760" progId="Photoshop.Image.13">
+                  <p:oleObj spid="_x0000_s2179" name="Image" r:id="rId12" imgW="4571280" imgH="1688760" progId="Photoshop.Image.13">
                     <p:embed/>
                   </p:oleObj>
                 </mc:Choice>
@@ -10296,7 +10296,7 @@
             <a:graphicData uri="http://schemas.openxmlformats.org/presentationml/2006/ole">
               <mc:AlternateContent xmlns:mc="http://schemas.openxmlformats.org/markup-compatibility/2006">
                 <mc:Choice xmlns:v="urn:schemas-microsoft-com:vml" Requires="v">
-                  <p:oleObj spid="_x0000_s2171" name="Image" r:id="rId15" imgW="1574280" imgH="1053720" progId="Photoshop.Image.13">
+                  <p:oleObj spid="_x0000_s2180" name="Image" r:id="rId15" imgW="1574280" imgH="1053720" progId="Photoshop.Image.13">
                     <p:embed/>
                   </p:oleObj>
                 </mc:Choice>
@@ -12757,7 +12757,7 @@
               <a:graphicData uri="http://schemas.openxmlformats.org/presentationml/2006/ole">
                 <mc:AlternateContent xmlns:mc="http://schemas.openxmlformats.org/markup-compatibility/2006">
                   <mc:Choice xmlns:v="urn:schemas-microsoft-com:vml" Requires="v">
-                    <p:oleObj spid="_x0000_s3192" name="Image" r:id="rId8" imgW="1828440" imgH="1117440" progId="Photoshop.Image.13">
+                    <p:oleObj spid="_x0000_s3201" name="Image" r:id="rId8" imgW="1828440" imgH="1117440" progId="Photoshop.Image.13">
                       <p:embed/>
                     </p:oleObj>
                   </mc:Choice>
@@ -12814,7 +12814,7 @@
               <a:graphicData uri="http://schemas.openxmlformats.org/presentationml/2006/ole">
                 <mc:AlternateContent xmlns:mc="http://schemas.openxmlformats.org/markup-compatibility/2006">
                   <mc:Choice xmlns:v="urn:schemas-microsoft-com:vml" Requires="v">
-                    <p:oleObj spid="_x0000_s3193" name="Image" r:id="rId10" imgW="1828440" imgH="1117440" progId="Photoshop.Image.13">
+                    <p:oleObj spid="_x0000_s3202" name="Image" r:id="rId10" imgW="1828440" imgH="1117440" progId="Photoshop.Image.13">
                       <p:embed/>
                     </p:oleObj>
                   </mc:Choice>
@@ -13937,7 +13937,7 @@
             <a:graphicData uri="http://schemas.openxmlformats.org/presentationml/2006/ole">
               <mc:AlternateContent xmlns:mc="http://schemas.openxmlformats.org/markup-compatibility/2006">
                 <mc:Choice xmlns:v="urn:schemas-microsoft-com:vml" Requires="v">
-                  <p:oleObj spid="_x0000_s3194" name="Image" r:id="rId12" imgW="4571280" imgH="1688760" progId="Photoshop.Image.13">
+                  <p:oleObj spid="_x0000_s3203" name="Image" r:id="rId12" imgW="4571280" imgH="1688760" progId="Photoshop.Image.13">
                     <p:embed/>
                   </p:oleObj>
                 </mc:Choice>
@@ -14021,7 +14021,7 @@
             <a:graphicData uri="http://schemas.openxmlformats.org/presentationml/2006/ole">
               <mc:AlternateContent xmlns:mc="http://schemas.openxmlformats.org/markup-compatibility/2006">
                 <mc:Choice xmlns:v="urn:schemas-microsoft-com:vml" Requires="v">
-                  <p:oleObj spid="_x0000_s3195" name="Image" r:id="rId15" imgW="1574280" imgH="1053720" progId="Photoshop.Image.13">
+                  <p:oleObj spid="_x0000_s3204" name="Image" r:id="rId15" imgW="1574280" imgH="1053720" progId="Photoshop.Image.13">
                     <p:embed/>
                   </p:oleObj>
                 </mc:Choice>
@@ -15293,14 +15293,27 @@
         <p:spPr>
           <a:xfrm>
             <a:off x="34292096" y="23584125"/>
-            <a:ext cx="15844570" cy="958478"/>
+            <a:ext cx="15844570" cy="4147043"/>
           </a:xfrm>
         </p:spPr>
         <p:txBody>
           <a:bodyPr/>
           <a:lstStyle/>
           <a:p>
-            <a:endParaRPr lang="en-US"/>
+            <a:r>
+              <a:rPr lang="en-US" dirty="0" smtClean="0"/>
+              <a:t>After all the work we have done, we can see that transcription is a very hard task to accomplish perfectly well. Noisy recordings contributed to worse performance on some recordings, as well as certain limitations in the performance of Bing’s API (on both the speaker recognition and transcription front). </a:t>
+            </a:r>
+          </a:p>
+          <a:p>
+            <a:endParaRPr lang="en-US" dirty="0"/>
+          </a:p>
+          <a:p>
+            <a:r>
+              <a:rPr lang="en-US" dirty="0" smtClean="0"/>
+              <a:t>In the end, however, we believe our tool could be a good start at creating a tool that could help journalists transcribe their interviews. It integrates some machine learning by utilizing the Bing API, as well as audio signal processing by constructing a self similarity matrix to determine how to segment the audio into individual speakers. Overall, we learned quite a bit!</a:t>
+            </a:r>
+            <a:endParaRPr lang="en-US" dirty="0"/>
           </a:p>
         </p:txBody>
       </p:sp>
@@ -15344,8 +15357,8 @@
         </p:nvSpPr>
         <p:spPr>
           <a:xfrm>
-            <a:off x="34292096" y="29592363"/>
-            <a:ext cx="15844570" cy="1561720"/>
+            <a:off x="34338590" y="29592363"/>
+            <a:ext cx="15844570" cy="2398872"/>
           </a:xfrm>
         </p:spPr>
         <p:txBody>
@@ -15353,263 +15366,255 @@
           <a:lstStyle/>
           <a:p>
             <a:r>
-              <a:rPr lang="en-US" sz="1200" dirty="0"/>
+              <a:rPr lang="en-US" sz="1600" dirty="0"/>
               <a:t> </a:t>
             </a:r>
             <a:r>
-              <a:rPr lang="en-US" sz="1200" dirty="0" smtClean="0"/>
+              <a:rPr lang="en-US" sz="1600" dirty="0" smtClean="0"/>
               <a:t>    </a:t>
             </a:r>
             <a:r>
-              <a:rPr lang="en-US" sz="1200" dirty="0" err="1" smtClean="0"/>
+              <a:rPr lang="en-US" sz="1600" dirty="0" err="1" smtClean="0"/>
               <a:t>Bongjun</a:t>
             </a:r>
             <a:r>
-              <a:rPr lang="en-US" sz="1200" dirty="0" smtClean="0"/>
-              <a:t> Kim and Bryan Pardo. </a:t>
-            </a:r>
-            <a:r>
-              <a:rPr lang="en-US" sz="1200" dirty="0" smtClean="0"/>
-              <a:t>2017. I-SED: an Interactive Sound Event Detector. In </a:t>
-            </a:r>
-            <a:r>
-              <a:rPr lang="en-US" sz="1200" i="1" dirty="0" smtClean="0"/>
+              <a:rPr lang="en-US" sz="1600" dirty="0" smtClean="0"/>
+              <a:t> Kim and Bryan Pardo. 2017. I-SED: an Interactive Sound Event Detector. In </a:t>
+            </a:r>
+            <a:r>
+              <a:rPr lang="en-US" sz="1600" i="1" dirty="0" smtClean="0"/>
               <a:t>ACM </a:t>
             </a:r>
             <a:r>
-              <a:rPr lang="en-US" sz="1200" i="1" dirty="0"/>
+              <a:rPr lang="en-US" sz="1600" i="1" dirty="0"/>
               <a:t>International Conference on Intelligent User </a:t>
             </a:r>
             <a:r>
-              <a:rPr lang="en-US" sz="1200" i="1" dirty="0" smtClean="0"/>
+              <a:rPr lang="en-US" sz="1600" i="1" dirty="0" smtClean="0"/>
               <a:t>Interfaces. </a:t>
             </a:r>
             <a:r>
-              <a:rPr lang="en-US" sz="1200" dirty="0"/>
+              <a:rPr lang="en-US" sz="1600" dirty="0"/>
               <a:t>Retrieved from </a:t>
             </a:r>
             <a:r>
-              <a:rPr lang="en-US" sz="1200" dirty="0">
+              <a:rPr lang="en-US" sz="1600" dirty="0">
                 <a:hlinkClick r:id="rId3"/>
               </a:rPr>
               <a:t>http://</a:t>
             </a:r>
             <a:r>
-              <a:rPr lang="en-US" sz="1200" dirty="0" smtClean="0">
+              <a:rPr lang="en-US" sz="1600" dirty="0" smtClean="0">
                 <a:hlinkClick r:id="rId3"/>
               </a:rPr>
               <a:t>music.cs.northwestern.edu/publications/Kim_Pardo_IUI2017.pdf</a:t>
             </a:r>
             <a:r>
-              <a:rPr lang="en-US" sz="1200" dirty="0" smtClean="0"/>
+              <a:rPr lang="en-US" sz="1600" dirty="0" smtClean="0"/>
               <a:t>.</a:t>
             </a:r>
-            <a:endParaRPr lang="en-US" sz="1200" i="1" dirty="0" smtClean="0"/>
+            <a:endParaRPr lang="en-US" sz="1600" i="1" dirty="0" smtClean="0"/>
           </a:p>
           <a:p>
             <a:r>
-              <a:rPr lang="en-US" sz="1200" dirty="0" smtClean="0"/>
+              <a:rPr lang="en-US" sz="1600" dirty="0" smtClean="0"/>
               <a:t>     Steve Rubin, </a:t>
             </a:r>
             <a:r>
-              <a:rPr lang="en-US" sz="1200" dirty="0" err="1"/>
+              <a:rPr lang="en-US" sz="1600" dirty="0" err="1"/>
               <a:t>Floraine</a:t>
             </a:r>
             <a:r>
-              <a:rPr lang="en-US" sz="1200" dirty="0"/>
+              <a:rPr lang="en-US" sz="1600" dirty="0"/>
               <a:t> </a:t>
             </a:r>
             <a:r>
-              <a:rPr lang="en-US" sz="1200" dirty="0" err="1" smtClean="0"/>
+              <a:rPr lang="en-US" sz="1600" dirty="0" err="1" smtClean="0"/>
               <a:t>Berthouzoz</a:t>
             </a:r>
             <a:r>
-              <a:rPr lang="en-US" sz="1200" dirty="0" smtClean="0"/>
+              <a:rPr lang="en-US" sz="1600" dirty="0" smtClean="0"/>
               <a:t>, </a:t>
             </a:r>
             <a:r>
-              <a:rPr lang="en-US" sz="1200" dirty="0" err="1"/>
+              <a:rPr lang="en-US" sz="1600" dirty="0" err="1"/>
               <a:t>Gautham</a:t>
             </a:r>
             <a:r>
-              <a:rPr lang="en-US" sz="1200" dirty="0"/>
+              <a:rPr lang="en-US" sz="1600" dirty="0"/>
               <a:t> J. </a:t>
             </a:r>
             <a:r>
-              <a:rPr lang="en-US" sz="1200" dirty="0" smtClean="0"/>
+              <a:rPr lang="en-US" sz="1600" dirty="0" smtClean="0"/>
               <a:t>Mysore, </a:t>
             </a:r>
             <a:r>
-              <a:rPr lang="en-US" sz="1200" dirty="0"/>
+              <a:rPr lang="en-US" sz="1600" dirty="0"/>
               <a:t>Wilmot </a:t>
             </a:r>
             <a:r>
-              <a:rPr lang="en-US" sz="1200" dirty="0" smtClean="0"/>
+              <a:rPr lang="en-US" sz="1600" dirty="0" smtClean="0"/>
               <a:t>Li, and </a:t>
             </a:r>
             <a:r>
-              <a:rPr lang="en-US" sz="1200" dirty="0" err="1"/>
+              <a:rPr lang="en-US" sz="1600" dirty="0" err="1"/>
               <a:t>Maneesh</a:t>
             </a:r>
             <a:r>
-              <a:rPr lang="en-US" sz="1200" dirty="0"/>
+              <a:rPr lang="en-US" sz="1600" dirty="0"/>
               <a:t> </a:t>
             </a:r>
             <a:r>
-              <a:rPr lang="en-US" sz="1200" dirty="0" err="1" smtClean="0"/>
+              <a:rPr lang="en-US" sz="1600" dirty="0" err="1" smtClean="0"/>
               <a:t>Agrawala</a:t>
             </a:r>
             <a:r>
-              <a:rPr lang="en-US" sz="1200" dirty="0" smtClean="0"/>
+              <a:rPr lang="en-US" sz="1600" dirty="0" smtClean="0"/>
               <a:t>. 2013.  Content-Based Tools for Editing Audio Stories. In </a:t>
             </a:r>
             <a:r>
-              <a:rPr lang="en-US" sz="1200" i="1" dirty="0"/>
+              <a:rPr lang="en-US" sz="1600" i="1" dirty="0"/>
               <a:t>UIST 2013, October 2013. pp. </a:t>
             </a:r>
             <a:r>
-              <a:rPr lang="en-US" sz="1200" dirty="0" smtClean="0"/>
+              <a:rPr lang="en-US" sz="1600" dirty="0" smtClean="0"/>
               <a:t>113-122. Retrieved </a:t>
             </a:r>
             <a:r>
-              <a:rPr lang="en-US" sz="1200" dirty="0"/>
+              <a:rPr lang="en-US" sz="1600" dirty="0"/>
               <a:t>from </a:t>
             </a:r>
             <a:r>
-              <a:rPr lang="en-US" sz="1200" dirty="0">
+              <a:rPr lang="en-US" sz="1600" dirty="0">
                 <a:hlinkClick r:id="rId4"/>
               </a:rPr>
               <a:t>http://</a:t>
             </a:r>
             <a:r>
-              <a:rPr lang="en-US" sz="1200" dirty="0" smtClean="0">
+              <a:rPr lang="en-US" sz="1600" dirty="0" smtClean="0">
                 <a:hlinkClick r:id="rId4"/>
               </a:rPr>
               <a:t>vis.berkeley.edu/papers/audiostories/audiostories.pdf</a:t>
             </a:r>
             <a:r>
-              <a:rPr lang="en-US" sz="1200" dirty="0" smtClean="0"/>
+              <a:rPr lang="en-US" sz="1600" dirty="0" smtClean="0"/>
               <a:t>.</a:t>
             </a:r>
           </a:p>
           <a:p>
             <a:r>
-              <a:rPr lang="en-US" sz="1200" i="1" dirty="0" smtClean="0"/>
+              <a:rPr lang="en-US" sz="1600" i="1" dirty="0" smtClean="0"/>
               <a:t>     </a:t>
             </a:r>
             <a:r>
-              <a:rPr lang="en-US" sz="1200" dirty="0" smtClean="0"/>
+              <a:rPr lang="en-US" sz="1600" dirty="0" smtClean="0"/>
               <a:t>Waveforms on the interface were created </a:t>
             </a:r>
             <a:r>
-              <a:rPr lang="en-US" sz="1200" dirty="0"/>
+              <a:rPr lang="en-US" sz="1600" dirty="0"/>
               <a:t>with </a:t>
             </a:r>
             <a:r>
-              <a:rPr lang="en-US" sz="1200" dirty="0" err="1"/>
+              <a:rPr lang="en-US" sz="1600" dirty="0" err="1"/>
               <a:t>wavesurfer.js</a:t>
             </a:r>
             <a:r>
-              <a:rPr lang="en-US" sz="1200" dirty="0" smtClean="0"/>
-              <a:t>. </a:t>
-            </a:r>
-            <a:r>
-              <a:rPr lang="en-US" sz="1200" smtClean="0"/>
-              <a:t>Retrieved from </a:t>
-            </a:r>
-            <a:r>
-              <a:rPr lang="en-US" sz="1200" dirty="0">
+              <a:rPr lang="en-US" sz="1600" dirty="0" smtClean="0"/>
+              <a:t>. Retrieved from </a:t>
+            </a:r>
+            <a:r>
+              <a:rPr lang="en-US" sz="1600" dirty="0">
                 <a:hlinkClick r:id="rId5"/>
               </a:rPr>
               <a:t>https://wavesurfer-js.org</a:t>
             </a:r>
             <a:r>
-              <a:rPr lang="en-US" sz="1200" dirty="0" smtClean="0">
+              <a:rPr lang="en-US" sz="1600" dirty="0" smtClean="0">
                 <a:hlinkClick r:id="rId5"/>
               </a:rPr>
               <a:t>/</a:t>
             </a:r>
             <a:r>
-              <a:rPr lang="en-US" sz="1200" dirty="0" smtClean="0"/>
+              <a:rPr lang="en-US" sz="1600" dirty="0" smtClean="0"/>
               <a:t> </a:t>
             </a:r>
           </a:p>
           <a:p>
             <a:r>
-              <a:rPr lang="en-US" sz="1200" i="1" dirty="0"/>
+              <a:rPr lang="en-US" sz="1600" i="1" dirty="0"/>
               <a:t> </a:t>
             </a:r>
             <a:r>
-              <a:rPr lang="en-US" sz="1200" i="1" dirty="0" smtClean="0"/>
+              <a:rPr lang="en-US" sz="1600" i="1" dirty="0" smtClean="0"/>
               <a:t>    </a:t>
             </a:r>
             <a:r>
-              <a:rPr lang="en-US" sz="1200" dirty="0" err="1"/>
+              <a:rPr lang="en-US" sz="1600" dirty="0" err="1"/>
               <a:t>Theodoros</a:t>
             </a:r>
             <a:r>
-              <a:rPr lang="en-US" sz="1200" dirty="0"/>
+              <a:rPr lang="en-US" sz="1600" dirty="0"/>
               <a:t> </a:t>
             </a:r>
             <a:r>
-              <a:rPr lang="en-US" sz="1200" dirty="0" smtClean="0"/>
+              <a:rPr lang="en-US" sz="1600" dirty="0" smtClean="0"/>
               <a:t>Giannakopoulos. 2015. </a:t>
             </a:r>
             <a:r>
-              <a:rPr lang="en-US" sz="1200" dirty="0" err="1" smtClean="0"/>
+              <a:rPr lang="en-US" sz="1600" dirty="0" err="1" smtClean="0"/>
               <a:t>pyAudioAnalysis</a:t>
             </a:r>
             <a:r>
-              <a:rPr lang="en-US" sz="1200" dirty="0"/>
+              <a:rPr lang="en-US" sz="1600" dirty="0"/>
               <a:t>: An Open-Source Python Library for Audio Signal Analysis. </a:t>
             </a:r>
             <a:r>
-              <a:rPr lang="en-US" sz="1200" dirty="0" smtClean="0"/>
+              <a:rPr lang="en-US" sz="1600" dirty="0" smtClean="0"/>
               <a:t>In </a:t>
             </a:r>
             <a:r>
-              <a:rPr lang="en-US" sz="1200" i="1" dirty="0" err="1" smtClean="0"/>
+              <a:rPr lang="en-US" sz="1600" i="1" dirty="0" err="1" smtClean="0"/>
               <a:t>PLoS</a:t>
             </a:r>
             <a:r>
-              <a:rPr lang="en-US" sz="1200" i="1" dirty="0" smtClean="0"/>
+              <a:rPr lang="en-US" sz="1600" i="1" dirty="0" smtClean="0"/>
               <a:t> </a:t>
             </a:r>
             <a:r>
-              <a:rPr lang="en-US" sz="1200" i="1" dirty="0"/>
+              <a:rPr lang="en-US" sz="1600" i="1" dirty="0"/>
               <a:t>ONE 10(12</a:t>
             </a:r>
             <a:r>
-              <a:rPr lang="en-US" sz="1200" i="1" dirty="0" smtClean="0"/>
+              <a:rPr lang="en-US" sz="1600" i="1" dirty="0" smtClean="0"/>
               <a:t>). </a:t>
             </a:r>
             <a:r>
-              <a:rPr lang="en-US" sz="1200" dirty="0" smtClean="0"/>
+              <a:rPr lang="en-US" sz="1600" dirty="0" smtClean="0"/>
               <a:t> Retrieved from </a:t>
             </a:r>
             <a:r>
-              <a:rPr lang="en-US" sz="1200" dirty="0" smtClean="0">
+              <a:rPr lang="en-US" sz="1600" dirty="0" smtClean="0">
                 <a:hlinkClick r:id="rId6"/>
               </a:rPr>
               <a:t>http</a:t>
             </a:r>
             <a:r>
-              <a:rPr lang="en-US" sz="1200" dirty="0">
+              <a:rPr lang="en-US" sz="1600" dirty="0">
                 <a:hlinkClick r:id="rId6"/>
               </a:rPr>
               <a:t>://</a:t>
             </a:r>
             <a:r>
-              <a:rPr lang="en-US" sz="1200" dirty="0" smtClean="0">
+              <a:rPr lang="en-US" sz="1600" dirty="0" smtClean="0">
                 <a:hlinkClick r:id="rId6"/>
               </a:rPr>
               <a:t>journals.plos.org/plosone/article/file?id=10.1371/journal.pone.0144610&amp;type=printable</a:t>
             </a:r>
             <a:r>
-              <a:rPr lang="en-US" sz="1200" dirty="0" smtClean="0"/>
+              <a:rPr lang="en-US" sz="1600" dirty="0" smtClean="0"/>
               <a:t>. </a:t>
             </a:r>
-            <a:endParaRPr lang="en-US" sz="1200" i="1" dirty="0"/>
+            <a:endParaRPr lang="en-US" sz="1600" i="1" dirty="0"/>
           </a:p>
         </p:txBody>
       </p:sp>
@@ -16108,14 +16113,7 @@
                 <a:latin typeface="Times New Roman" panose="02020603050405020304" pitchFamily="18" charset="0"/>
                 <a:cs typeface="Times New Roman" panose="02020603050405020304" pitchFamily="18" charset="0"/>
               </a:rPr>
-              <a:t> b. </a:t>
-            </a:r>
-            <a:r>
-              <a:rPr lang="en-US" sz="2000" dirty="0" smtClean="0">
-                <a:latin typeface="Times New Roman" panose="02020603050405020304" pitchFamily="18" charset="0"/>
-                <a:cs typeface="Times New Roman" panose="02020603050405020304" pitchFamily="18" charset="0"/>
-              </a:rPr>
-              <a:t>User uploads .wav file (system will reject if not wav format)</a:t>
+              <a:t> b. User uploads .wav file (system will reject if not wav format)</a:t>
             </a:r>
             <a:endParaRPr lang="en-US" sz="2000" dirty="0">
               <a:latin typeface="Times New Roman" panose="02020603050405020304" pitchFamily="18" charset="0"/>

</xml_diff>

<commit_message>
Edited Poster and Excel Doc with graphs
</commit_message>
<xml_diff>
--- a/Poster.pptx
+++ b/Poster.pptx
@@ -178,6 +178,2093 @@
 </p:presentation>
 </file>
 
+<file path=ppt/charts/chart1.xml><?xml version="1.0" encoding="utf-8"?>
+<c:chartSpace xmlns:c="http://schemas.openxmlformats.org/drawingml/2006/chart" xmlns:a="http://schemas.openxmlformats.org/drawingml/2006/main" xmlns:r="http://schemas.openxmlformats.org/officeDocument/2006/relationships" xmlns:c16r2="http://schemas.microsoft.com/office/drawing/2015/06/chart">
+  <c:date1904 val="0"/>
+  <c:lang val="en-US"/>
+  <c:roundedCorners val="0"/>
+  <mc:AlternateContent xmlns:mc="http://schemas.openxmlformats.org/markup-compatibility/2006">
+    <mc:Choice xmlns:c14="http://schemas.microsoft.com/office/drawing/2007/8/2/chart" Requires="c14">
+      <c14:style val="102"/>
+    </mc:Choice>
+    <mc:Fallback>
+      <c:style val="2"/>
+    </mc:Fallback>
+  </mc:AlternateContent>
+  <c:chart>
+    <c:title>
+      <c:tx>
+        <c:rich>
+          <a:bodyPr rot="0" spcFirstLastPara="1" vertOverflow="ellipsis" vert="horz" wrap="square" anchor="ctr" anchorCtr="1"/>
+          <a:lstStyle/>
+          <a:p>
+            <a:pPr>
+              <a:defRPr sz="3200" b="0" i="0" u="none" strike="noStrike" kern="1200" spc="0" baseline="0">
+                <a:solidFill>
+                  <a:schemeClr val="tx1"/>
+                </a:solidFill>
+                <a:latin typeface="+mn-lt"/>
+                <a:ea typeface="+mn-ea"/>
+                <a:cs typeface="+mn-cs"/>
+              </a:defRPr>
+            </a:pPr>
+            <a:r>
+              <a:rPr lang="en-US" sz="3200" b="0">
+                <a:solidFill>
+                  <a:schemeClr val="tx1"/>
+                </a:solidFill>
+              </a:rPr>
+              <a:t>F-Score</a:t>
+            </a:r>
+            <a:r>
+              <a:rPr lang="en-US" sz="3200" b="0" baseline="0">
+                <a:solidFill>
+                  <a:schemeClr val="tx1"/>
+                </a:solidFill>
+              </a:rPr>
+              <a:t> on Obama Interview </a:t>
+            </a:r>
+            <a:endParaRPr lang="en-US" sz="3200" b="0">
+              <a:solidFill>
+                <a:schemeClr val="tx1"/>
+              </a:solidFill>
+            </a:endParaRPr>
+          </a:p>
+        </c:rich>
+      </c:tx>
+      <c:overlay val="0"/>
+      <c:spPr>
+        <a:noFill/>
+        <a:ln>
+          <a:noFill/>
+        </a:ln>
+        <a:effectLst/>
+      </c:spPr>
+      <c:txPr>
+        <a:bodyPr rot="0" spcFirstLastPara="1" vertOverflow="ellipsis" vert="horz" wrap="square" anchor="ctr" anchorCtr="1"/>
+        <a:lstStyle/>
+        <a:p>
+          <a:pPr>
+            <a:defRPr sz="3200" b="0" i="0" u="none" strike="noStrike" kern="1200" spc="0" baseline="0">
+              <a:solidFill>
+                <a:schemeClr val="tx1"/>
+              </a:solidFill>
+              <a:latin typeface="+mn-lt"/>
+              <a:ea typeface="+mn-ea"/>
+              <a:cs typeface="+mn-cs"/>
+            </a:defRPr>
+          </a:pPr>
+          <a:endParaRPr lang="en-US"/>
+        </a:p>
+      </c:txPr>
+    </c:title>
+    <c:autoTitleDeleted val="0"/>
+    <c:plotArea>
+      <c:layout>
+        <c:manualLayout>
+          <c:layoutTarget val="inner"/>
+          <c:xMode val="edge"/>
+          <c:yMode val="edge"/>
+          <c:x val="7.6225187198134883E-2"/>
+          <c:y val="0.20598053691804266"/>
+          <c:w val="0.9155301837270341"/>
+          <c:h val="0.65675477678830829"/>
+        </c:manualLayout>
+      </c:layout>
+      <c:barChart>
+        <c:barDir val="col"/>
+        <c:grouping val="clustered"/>
+        <c:varyColors val="0"/>
+        <c:ser>
+          <c:idx val="0"/>
+          <c:order val="0"/>
+          <c:tx>
+            <c:strRef>
+              <c:f>Sheet1!$E$49</c:f>
+              <c:strCache>
+                <c:ptCount val="1"/>
+                <c:pt idx="0">
+                  <c:v>Interviewer</c:v>
+                </c:pt>
+              </c:strCache>
+            </c:strRef>
+          </c:tx>
+          <c:spPr>
+            <a:solidFill>
+              <a:schemeClr val="accent1">
+                <a:lumMod val="75000"/>
+              </a:schemeClr>
+            </a:solidFill>
+            <a:ln>
+              <a:noFill/>
+            </a:ln>
+            <a:effectLst/>
+          </c:spPr>
+          <c:invertIfNegative val="0"/>
+          <c:cat>
+            <c:strRef>
+              <c:f>Sheet1!$F$48:$K$48</c:f>
+              <c:strCache>
+                <c:ptCount val="6"/>
+                <c:pt idx="0">
+                  <c:v>Log Start</c:v>
+                </c:pt>
+                <c:pt idx="1">
+                  <c:v>Log Neighbor</c:v>
+                </c:pt>
+                <c:pt idx="2">
+                  <c:v>Mfcc Start</c:v>
+                </c:pt>
+                <c:pt idx="3">
+                  <c:v>Mfcc Neighbor</c:v>
+                </c:pt>
+                <c:pt idx="4">
+                  <c:v>Chroma Neighbor</c:v>
+                </c:pt>
+                <c:pt idx="5">
+                  <c:v>Chroma Start</c:v>
+                </c:pt>
+              </c:strCache>
+            </c:strRef>
+          </c:cat>
+          <c:val>
+            <c:numRef>
+              <c:f>Sheet1!$F$49:$K$49</c:f>
+              <c:numCache>
+                <c:formatCode>General</c:formatCode>
+                <c:ptCount val="6"/>
+                <c:pt idx="0">
+                  <c:v>0.89285714289999996</c:v>
+                </c:pt>
+                <c:pt idx="1">
+                  <c:v>0.74358974359999996</c:v>
+                </c:pt>
+                <c:pt idx="2">
+                  <c:v>0.86956521740000003</c:v>
+                </c:pt>
+                <c:pt idx="3">
+                  <c:v>0.92</c:v>
+                </c:pt>
+                <c:pt idx="4">
+                  <c:v>0.70454545449999995</c:v>
+                </c:pt>
+                <c:pt idx="5">
+                  <c:v>0.70454545449999995</c:v>
+                </c:pt>
+              </c:numCache>
+            </c:numRef>
+          </c:val>
+          <c:extLst>
+            <c:ext xmlns:c16="http://schemas.microsoft.com/office/drawing/2014/chart" uri="{C3380CC4-5D6E-409C-BE32-E72D297353CC}">
+              <c16:uniqueId val="{00000000-D993-4FC7-8EFA-FBB5382EB190}"/>
+            </c:ext>
+          </c:extLst>
+        </c:ser>
+        <c:ser>
+          <c:idx val="1"/>
+          <c:order val="1"/>
+          <c:tx>
+            <c:strRef>
+              <c:f>Sheet1!$E$50</c:f>
+              <c:strCache>
+                <c:ptCount val="1"/>
+                <c:pt idx="0">
+                  <c:v>Obama</c:v>
+                </c:pt>
+              </c:strCache>
+            </c:strRef>
+          </c:tx>
+          <c:spPr>
+            <a:solidFill>
+              <a:schemeClr val="accent2">
+                <a:lumMod val="75000"/>
+              </a:schemeClr>
+            </a:solidFill>
+            <a:ln>
+              <a:noFill/>
+            </a:ln>
+            <a:effectLst/>
+          </c:spPr>
+          <c:invertIfNegative val="0"/>
+          <c:cat>
+            <c:strRef>
+              <c:f>Sheet1!$F$48:$K$48</c:f>
+              <c:strCache>
+                <c:ptCount val="6"/>
+                <c:pt idx="0">
+                  <c:v>Log Start</c:v>
+                </c:pt>
+                <c:pt idx="1">
+                  <c:v>Log Neighbor</c:v>
+                </c:pt>
+                <c:pt idx="2">
+                  <c:v>Mfcc Start</c:v>
+                </c:pt>
+                <c:pt idx="3">
+                  <c:v>Mfcc Neighbor</c:v>
+                </c:pt>
+                <c:pt idx="4">
+                  <c:v>Chroma Neighbor</c:v>
+                </c:pt>
+                <c:pt idx="5">
+                  <c:v>Chroma Start</c:v>
+                </c:pt>
+              </c:strCache>
+            </c:strRef>
+          </c:cat>
+          <c:val>
+            <c:numRef>
+              <c:f>Sheet1!$F$50:$K$50</c:f>
+              <c:numCache>
+                <c:formatCode>General</c:formatCode>
+                <c:ptCount val="6"/>
+                <c:pt idx="0">
+                  <c:v>0.84210526320000001</c:v>
+                </c:pt>
+                <c:pt idx="1">
+                  <c:v>0.85714285710000004</c:v>
+                </c:pt>
+                <c:pt idx="2">
+                  <c:v>0.05</c:v>
+                </c:pt>
+                <c:pt idx="3">
+                  <c:v>0.80952380950000002</c:v>
+                </c:pt>
+                <c:pt idx="4">
+                  <c:v>0.83333333330000003</c:v>
+                </c:pt>
+                <c:pt idx="5">
+                  <c:v>0.83333333330000003</c:v>
+                </c:pt>
+              </c:numCache>
+            </c:numRef>
+          </c:val>
+          <c:extLst>
+            <c:ext xmlns:c16="http://schemas.microsoft.com/office/drawing/2014/chart" uri="{C3380CC4-5D6E-409C-BE32-E72D297353CC}">
+              <c16:uniqueId val="{00000001-D993-4FC7-8EFA-FBB5382EB190}"/>
+            </c:ext>
+          </c:extLst>
+        </c:ser>
+        <c:dLbls>
+          <c:showLegendKey val="0"/>
+          <c:showVal val="0"/>
+          <c:showCatName val="0"/>
+          <c:showSerName val="0"/>
+          <c:showPercent val="0"/>
+          <c:showBubbleSize val="0"/>
+        </c:dLbls>
+        <c:gapWidth val="219"/>
+        <c:overlap val="-27"/>
+        <c:axId val="515106232"/>
+        <c:axId val="515109840"/>
+      </c:barChart>
+      <c:catAx>
+        <c:axId val="515106232"/>
+        <c:scaling>
+          <c:orientation val="minMax"/>
+        </c:scaling>
+        <c:delete val="0"/>
+        <c:axPos val="b"/>
+        <c:numFmt formatCode="General" sourceLinked="1"/>
+        <c:majorTickMark val="none"/>
+        <c:minorTickMark val="none"/>
+        <c:tickLblPos val="nextTo"/>
+        <c:spPr>
+          <a:noFill/>
+          <a:ln w="9525" cap="flat" cmpd="sng" algn="ctr">
+            <a:solidFill>
+              <a:schemeClr val="tx1">
+                <a:lumMod val="15000"/>
+                <a:lumOff val="85000"/>
+              </a:schemeClr>
+            </a:solidFill>
+            <a:round/>
+          </a:ln>
+          <a:effectLst/>
+        </c:spPr>
+        <c:txPr>
+          <a:bodyPr rot="-60000000" spcFirstLastPara="1" vertOverflow="ellipsis" vert="horz" wrap="square" anchor="ctr" anchorCtr="1"/>
+          <a:lstStyle/>
+          <a:p>
+            <a:pPr>
+              <a:defRPr sz="1600" b="0" i="0" u="none" strike="noStrike" kern="1200" baseline="0">
+                <a:solidFill>
+                  <a:schemeClr val="tx1">
+                    <a:lumMod val="65000"/>
+                    <a:lumOff val="35000"/>
+                  </a:schemeClr>
+                </a:solidFill>
+                <a:latin typeface="+mn-lt"/>
+                <a:ea typeface="+mn-ea"/>
+                <a:cs typeface="+mn-cs"/>
+              </a:defRPr>
+            </a:pPr>
+            <a:endParaRPr lang="en-US"/>
+          </a:p>
+        </c:txPr>
+        <c:crossAx val="515109840"/>
+        <c:crosses val="autoZero"/>
+        <c:auto val="1"/>
+        <c:lblAlgn val="ctr"/>
+        <c:lblOffset val="100"/>
+        <c:noMultiLvlLbl val="0"/>
+      </c:catAx>
+      <c:valAx>
+        <c:axId val="515109840"/>
+        <c:scaling>
+          <c:orientation val="minMax"/>
+        </c:scaling>
+        <c:delete val="0"/>
+        <c:axPos val="l"/>
+        <c:majorGridlines>
+          <c:spPr>
+            <a:ln w="9525" cap="flat" cmpd="sng" algn="ctr">
+              <a:solidFill>
+                <a:schemeClr val="tx1">
+                  <a:lumMod val="15000"/>
+                  <a:lumOff val="85000"/>
+                </a:schemeClr>
+              </a:solidFill>
+              <a:round/>
+            </a:ln>
+            <a:effectLst/>
+          </c:spPr>
+        </c:majorGridlines>
+        <c:numFmt formatCode="General" sourceLinked="1"/>
+        <c:majorTickMark val="none"/>
+        <c:minorTickMark val="none"/>
+        <c:tickLblPos val="nextTo"/>
+        <c:spPr>
+          <a:noFill/>
+          <a:ln>
+            <a:noFill/>
+          </a:ln>
+          <a:effectLst/>
+        </c:spPr>
+        <c:txPr>
+          <a:bodyPr rot="-60000000" spcFirstLastPara="1" vertOverflow="ellipsis" vert="horz" wrap="square" anchor="ctr" anchorCtr="1"/>
+          <a:lstStyle/>
+          <a:p>
+            <a:pPr>
+              <a:defRPr sz="1600" b="0" i="0" u="none" strike="noStrike" kern="1200" baseline="0">
+                <a:solidFill>
+                  <a:schemeClr val="tx1">
+                    <a:lumMod val="65000"/>
+                    <a:lumOff val="35000"/>
+                  </a:schemeClr>
+                </a:solidFill>
+                <a:latin typeface="+mn-lt"/>
+                <a:ea typeface="+mn-ea"/>
+                <a:cs typeface="+mn-cs"/>
+              </a:defRPr>
+            </a:pPr>
+            <a:endParaRPr lang="en-US"/>
+          </a:p>
+        </c:txPr>
+        <c:crossAx val="515106232"/>
+        <c:crosses val="autoZero"/>
+        <c:crossBetween val="between"/>
+      </c:valAx>
+      <c:spPr>
+        <a:noFill/>
+        <a:ln>
+          <a:noFill/>
+        </a:ln>
+        <a:effectLst/>
+      </c:spPr>
+    </c:plotArea>
+    <c:legend>
+      <c:legendPos val="tr"/>
+      <c:layout>
+        <c:manualLayout>
+          <c:xMode val="edge"/>
+          <c:yMode val="edge"/>
+          <c:x val="0.76822662075497439"/>
+          <c:y val="0.11528791246781241"/>
+          <c:w val="0.22211065359949272"/>
+          <c:h val="0.16997625876573028"/>
+        </c:manualLayout>
+      </c:layout>
+      <c:overlay val="0"/>
+      <c:spPr>
+        <a:noFill/>
+        <a:ln>
+          <a:noFill/>
+        </a:ln>
+        <a:effectLst/>
+      </c:spPr>
+      <c:txPr>
+        <a:bodyPr rot="0" spcFirstLastPara="1" vertOverflow="ellipsis" vert="horz" wrap="square" anchor="ctr" anchorCtr="1"/>
+        <a:lstStyle/>
+        <a:p>
+          <a:pPr>
+            <a:defRPr sz="2000" b="0" i="0" u="none" strike="noStrike" kern="1200" baseline="0">
+              <a:solidFill>
+                <a:schemeClr val="tx1">
+                  <a:lumMod val="65000"/>
+                  <a:lumOff val="35000"/>
+                </a:schemeClr>
+              </a:solidFill>
+              <a:latin typeface="+mn-lt"/>
+              <a:ea typeface="+mn-ea"/>
+              <a:cs typeface="+mn-cs"/>
+            </a:defRPr>
+          </a:pPr>
+          <a:endParaRPr lang="en-US"/>
+        </a:p>
+      </c:txPr>
+    </c:legend>
+    <c:plotVisOnly val="1"/>
+    <c:dispBlanksAs val="gap"/>
+    <c:showDLblsOverMax val="0"/>
+  </c:chart>
+  <c:spPr>
+    <a:noFill/>
+    <a:ln>
+      <a:noFill/>
+    </a:ln>
+    <a:effectLst/>
+  </c:spPr>
+  <c:txPr>
+    <a:bodyPr/>
+    <a:lstStyle/>
+    <a:p>
+      <a:pPr>
+        <a:defRPr/>
+      </a:pPr>
+      <a:endParaRPr lang="en-US"/>
+    </a:p>
+  </c:txPr>
+  <c:externalData r:id="rId3">
+    <c:autoUpdate val="0"/>
+  </c:externalData>
+</c:chartSpace>
+</file>
+
+<file path=ppt/charts/chart2.xml><?xml version="1.0" encoding="utf-8"?>
+<c:chartSpace xmlns:c="http://schemas.openxmlformats.org/drawingml/2006/chart" xmlns:a="http://schemas.openxmlformats.org/drawingml/2006/main" xmlns:r="http://schemas.openxmlformats.org/officeDocument/2006/relationships" xmlns:c16r2="http://schemas.microsoft.com/office/drawing/2015/06/chart">
+  <c:date1904 val="0"/>
+  <c:lang val="en-US"/>
+  <c:roundedCorners val="0"/>
+  <mc:AlternateContent xmlns:mc="http://schemas.openxmlformats.org/markup-compatibility/2006">
+    <mc:Choice xmlns:c14="http://schemas.microsoft.com/office/drawing/2007/8/2/chart" Requires="c14">
+      <c14:style val="102"/>
+    </mc:Choice>
+    <mc:Fallback>
+      <c:style val="2"/>
+    </mc:Fallback>
+  </mc:AlternateContent>
+  <c:chart>
+    <c:title>
+      <c:tx>
+        <c:rich>
+          <a:bodyPr rot="0" spcFirstLastPara="1" vertOverflow="ellipsis" vert="horz" wrap="square" anchor="ctr" anchorCtr="1"/>
+          <a:lstStyle/>
+          <a:p>
+            <a:pPr algn="ctr">
+              <a:defRPr lang="en-US" sz="3200" b="0" i="0" u="none" strike="noStrike" kern="1200" spc="0" baseline="0">
+                <a:solidFill>
+                  <a:schemeClr val="tx1"/>
+                </a:solidFill>
+                <a:latin typeface="+mn-lt"/>
+                <a:ea typeface="+mn-ea"/>
+                <a:cs typeface="+mn-cs"/>
+              </a:defRPr>
+            </a:pPr>
+            <a:r>
+              <a:rPr lang="en-US" sz="3200" dirty="0">
+                <a:solidFill>
+                  <a:schemeClr val="tx1"/>
+                </a:solidFill>
+              </a:rPr>
+              <a:t>F-Score on Room Conversation </a:t>
+            </a:r>
+          </a:p>
+        </c:rich>
+      </c:tx>
+      <c:layout>
+        <c:manualLayout>
+          <c:xMode val="edge"/>
+          <c:yMode val="edge"/>
+          <c:x val="0.19698949620216519"/>
+          <c:y val="4.2064107515523537E-2"/>
+        </c:manualLayout>
+      </c:layout>
+      <c:overlay val="0"/>
+      <c:spPr>
+        <a:noFill/>
+        <a:ln>
+          <a:noFill/>
+        </a:ln>
+        <a:effectLst/>
+      </c:spPr>
+      <c:txPr>
+        <a:bodyPr rot="0" spcFirstLastPara="1" vertOverflow="ellipsis" vert="horz" wrap="square" anchor="ctr" anchorCtr="1"/>
+        <a:lstStyle/>
+        <a:p>
+          <a:pPr algn="ctr">
+            <a:defRPr lang="en-US" sz="3200" b="0" i="0" u="none" strike="noStrike" kern="1200" spc="0" baseline="0">
+              <a:solidFill>
+                <a:schemeClr val="tx1"/>
+              </a:solidFill>
+              <a:latin typeface="+mn-lt"/>
+              <a:ea typeface="+mn-ea"/>
+              <a:cs typeface="+mn-cs"/>
+            </a:defRPr>
+          </a:pPr>
+          <a:endParaRPr lang="en-US"/>
+        </a:p>
+      </c:txPr>
+    </c:title>
+    <c:autoTitleDeleted val="0"/>
+    <c:plotArea>
+      <c:layout>
+        <c:manualLayout>
+          <c:layoutTarget val="inner"/>
+          <c:xMode val="edge"/>
+          <c:yMode val="edge"/>
+          <c:x val="5.6886751111484758E-2"/>
+          <c:y val="0.16575738034974941"/>
+          <c:w val="0.92138892502867686"/>
+          <c:h val="0.71397322336830915"/>
+        </c:manualLayout>
+      </c:layout>
+      <c:barChart>
+        <c:barDir val="col"/>
+        <c:grouping val="clustered"/>
+        <c:varyColors val="0"/>
+        <c:ser>
+          <c:idx val="0"/>
+          <c:order val="0"/>
+          <c:tx>
+            <c:strRef>
+              <c:f>Sheet3!$E$72</c:f>
+              <c:strCache>
+                <c:ptCount val="1"/>
+                <c:pt idx="0">
+                  <c:v>Madhav</c:v>
+                </c:pt>
+              </c:strCache>
+            </c:strRef>
+          </c:tx>
+          <c:spPr>
+            <a:solidFill>
+              <a:schemeClr val="bg2">
+                <a:lumMod val="50000"/>
+              </a:schemeClr>
+            </a:solidFill>
+            <a:ln>
+              <a:noFill/>
+            </a:ln>
+            <a:effectLst/>
+          </c:spPr>
+          <c:invertIfNegative val="0"/>
+          <c:cat>
+            <c:strRef>
+              <c:f>Sheet3!$F$71:$K$71</c:f>
+              <c:strCache>
+                <c:ptCount val="6"/>
+                <c:pt idx="0">
+                  <c:v>Log Start</c:v>
+                </c:pt>
+                <c:pt idx="1">
+                  <c:v>Log Neighbor</c:v>
+                </c:pt>
+                <c:pt idx="2">
+                  <c:v>Mfcc Start</c:v>
+                </c:pt>
+                <c:pt idx="3">
+                  <c:v>Mfcc Neighbor</c:v>
+                </c:pt>
+                <c:pt idx="4">
+                  <c:v>Chroma Start</c:v>
+                </c:pt>
+                <c:pt idx="5">
+                  <c:v>Chroma Neighbor</c:v>
+                </c:pt>
+              </c:strCache>
+            </c:strRef>
+          </c:cat>
+          <c:val>
+            <c:numRef>
+              <c:f>Sheet3!$F$72:$K$72</c:f>
+              <c:numCache>
+                <c:formatCode>General</c:formatCode>
+                <c:ptCount val="6"/>
+                <c:pt idx="0">
+                  <c:v>0.34285714290000002</c:v>
+                </c:pt>
+                <c:pt idx="1">
+                  <c:v>0.29629629629999998</c:v>
+                </c:pt>
+                <c:pt idx="2">
+                  <c:v>0.29629629629999998</c:v>
+                </c:pt>
+                <c:pt idx="3">
+                  <c:v>8.3333333329999995E-2</c:v>
+                </c:pt>
+                <c:pt idx="4">
+                  <c:v>0.29629629629999998</c:v>
+                </c:pt>
+                <c:pt idx="5">
+                  <c:v>0.29629629629999998</c:v>
+                </c:pt>
+              </c:numCache>
+            </c:numRef>
+          </c:val>
+          <c:extLst>
+            <c:ext xmlns:c16="http://schemas.microsoft.com/office/drawing/2014/chart" uri="{C3380CC4-5D6E-409C-BE32-E72D297353CC}">
+              <c16:uniqueId val="{00000000-B95F-4CFA-AE36-B51A3E54ABDB}"/>
+            </c:ext>
+          </c:extLst>
+        </c:ser>
+        <c:ser>
+          <c:idx val="1"/>
+          <c:order val="1"/>
+          <c:tx>
+            <c:strRef>
+              <c:f>Sheet3!$E$73</c:f>
+              <c:strCache>
+                <c:ptCount val="1"/>
+                <c:pt idx="0">
+                  <c:v>Vincent</c:v>
+                </c:pt>
+              </c:strCache>
+            </c:strRef>
+          </c:tx>
+          <c:spPr>
+            <a:solidFill>
+              <a:schemeClr val="accent6">
+                <a:lumMod val="75000"/>
+              </a:schemeClr>
+            </a:solidFill>
+            <a:ln>
+              <a:noFill/>
+            </a:ln>
+            <a:effectLst/>
+          </c:spPr>
+          <c:invertIfNegative val="0"/>
+          <c:cat>
+            <c:strRef>
+              <c:f>Sheet3!$F$71:$K$71</c:f>
+              <c:strCache>
+                <c:ptCount val="6"/>
+                <c:pt idx="0">
+                  <c:v>Log Start</c:v>
+                </c:pt>
+                <c:pt idx="1">
+                  <c:v>Log Neighbor</c:v>
+                </c:pt>
+                <c:pt idx="2">
+                  <c:v>Mfcc Start</c:v>
+                </c:pt>
+                <c:pt idx="3">
+                  <c:v>Mfcc Neighbor</c:v>
+                </c:pt>
+                <c:pt idx="4">
+                  <c:v>Chroma Start</c:v>
+                </c:pt>
+                <c:pt idx="5">
+                  <c:v>Chroma Neighbor</c:v>
+                </c:pt>
+              </c:strCache>
+            </c:strRef>
+          </c:cat>
+          <c:val>
+            <c:numRef>
+              <c:f>Sheet3!$F$73:$K$73</c:f>
+              <c:numCache>
+                <c:formatCode>General</c:formatCode>
+                <c:ptCount val="6"/>
+                <c:pt idx="0">
+                  <c:v>0.51359516620000001</c:v>
+                </c:pt>
+                <c:pt idx="1">
+                  <c:v>0.49681528660000002</c:v>
+                </c:pt>
+                <c:pt idx="2">
+                  <c:v>0.05</c:v>
+                </c:pt>
+                <c:pt idx="3">
+                  <c:v>0.05</c:v>
+                </c:pt>
+                <c:pt idx="4">
+                  <c:v>0.59259259259999997</c:v>
+                </c:pt>
+                <c:pt idx="5">
+                  <c:v>0.59259259259999997</c:v>
+                </c:pt>
+              </c:numCache>
+            </c:numRef>
+          </c:val>
+          <c:extLst>
+            <c:ext xmlns:c16="http://schemas.microsoft.com/office/drawing/2014/chart" uri="{C3380CC4-5D6E-409C-BE32-E72D297353CC}">
+              <c16:uniqueId val="{00000001-B95F-4CFA-AE36-B51A3E54ABDB}"/>
+            </c:ext>
+          </c:extLst>
+        </c:ser>
+        <c:ser>
+          <c:idx val="2"/>
+          <c:order val="2"/>
+          <c:tx>
+            <c:strRef>
+              <c:f>Sheet3!$E$74</c:f>
+              <c:strCache>
+                <c:ptCount val="1"/>
+                <c:pt idx="0">
+                  <c:v>Jeremy</c:v>
+                </c:pt>
+              </c:strCache>
+            </c:strRef>
+          </c:tx>
+          <c:spPr>
+            <a:solidFill>
+              <a:schemeClr val="accent5">
+                <a:lumMod val="75000"/>
+              </a:schemeClr>
+            </a:solidFill>
+            <a:ln>
+              <a:noFill/>
+            </a:ln>
+            <a:effectLst/>
+          </c:spPr>
+          <c:invertIfNegative val="0"/>
+          <c:cat>
+            <c:strRef>
+              <c:f>Sheet3!$F$71:$K$71</c:f>
+              <c:strCache>
+                <c:ptCount val="6"/>
+                <c:pt idx="0">
+                  <c:v>Log Start</c:v>
+                </c:pt>
+                <c:pt idx="1">
+                  <c:v>Log Neighbor</c:v>
+                </c:pt>
+                <c:pt idx="2">
+                  <c:v>Mfcc Start</c:v>
+                </c:pt>
+                <c:pt idx="3">
+                  <c:v>Mfcc Neighbor</c:v>
+                </c:pt>
+                <c:pt idx="4">
+                  <c:v>Chroma Start</c:v>
+                </c:pt>
+                <c:pt idx="5">
+                  <c:v>Chroma Neighbor</c:v>
+                </c:pt>
+              </c:strCache>
+            </c:strRef>
+          </c:cat>
+          <c:val>
+            <c:numRef>
+              <c:f>Sheet3!$F$74:$K$74</c:f>
+              <c:numCache>
+                <c:formatCode>General</c:formatCode>
+                <c:ptCount val="6"/>
+                <c:pt idx="0">
+                  <c:v>0.62983425410000005</c:v>
+                </c:pt>
+                <c:pt idx="1">
+                  <c:v>0.30821917809999999</c:v>
+                </c:pt>
+                <c:pt idx="2">
+                  <c:v>0.05</c:v>
+                </c:pt>
+                <c:pt idx="3">
+                  <c:v>0.48484848479999998</c:v>
+                </c:pt>
+                <c:pt idx="4">
+                  <c:v>0.05</c:v>
+                </c:pt>
+                <c:pt idx="5">
+                  <c:v>0.05</c:v>
+                </c:pt>
+              </c:numCache>
+            </c:numRef>
+          </c:val>
+          <c:extLst>
+            <c:ext xmlns:c16="http://schemas.microsoft.com/office/drawing/2014/chart" uri="{C3380CC4-5D6E-409C-BE32-E72D297353CC}">
+              <c16:uniqueId val="{00000002-B95F-4CFA-AE36-B51A3E54ABDB}"/>
+            </c:ext>
+          </c:extLst>
+        </c:ser>
+        <c:dLbls>
+          <c:showLegendKey val="0"/>
+          <c:showVal val="0"/>
+          <c:showCatName val="0"/>
+          <c:showSerName val="0"/>
+          <c:showPercent val="0"/>
+          <c:showBubbleSize val="0"/>
+        </c:dLbls>
+        <c:gapWidth val="219"/>
+        <c:overlap val="-27"/>
+        <c:axId val="516734984"/>
+        <c:axId val="516741216"/>
+      </c:barChart>
+      <c:catAx>
+        <c:axId val="516734984"/>
+        <c:scaling>
+          <c:orientation val="minMax"/>
+        </c:scaling>
+        <c:delete val="0"/>
+        <c:axPos val="b"/>
+        <c:numFmt formatCode="General" sourceLinked="1"/>
+        <c:majorTickMark val="out"/>
+        <c:minorTickMark val="none"/>
+        <c:tickLblPos val="nextTo"/>
+        <c:spPr>
+          <a:noFill/>
+          <a:ln w="9525" cap="flat" cmpd="sng" algn="ctr">
+            <a:solidFill>
+              <a:schemeClr val="tx1">
+                <a:lumMod val="15000"/>
+                <a:lumOff val="85000"/>
+              </a:schemeClr>
+            </a:solidFill>
+            <a:round/>
+          </a:ln>
+          <a:effectLst/>
+        </c:spPr>
+        <c:txPr>
+          <a:bodyPr rot="-60000000" spcFirstLastPara="1" vertOverflow="ellipsis" vert="horz" wrap="square" anchor="ctr" anchorCtr="1"/>
+          <a:lstStyle/>
+          <a:p>
+            <a:pPr>
+              <a:defRPr lang="en-US" sz="1600" b="0" i="0" u="none" strike="noStrike" kern="1200" baseline="0">
+                <a:solidFill>
+                  <a:schemeClr val="tx1"/>
+                </a:solidFill>
+                <a:latin typeface="+mn-lt"/>
+                <a:ea typeface="+mn-ea"/>
+                <a:cs typeface="+mn-cs"/>
+              </a:defRPr>
+            </a:pPr>
+            <a:endParaRPr lang="en-US"/>
+          </a:p>
+        </c:txPr>
+        <c:crossAx val="516741216"/>
+        <c:crosses val="autoZero"/>
+        <c:auto val="1"/>
+        <c:lblAlgn val="ctr"/>
+        <c:lblOffset val="100"/>
+        <c:noMultiLvlLbl val="0"/>
+      </c:catAx>
+      <c:valAx>
+        <c:axId val="516741216"/>
+        <c:scaling>
+          <c:orientation val="minMax"/>
+          <c:max val="1"/>
+        </c:scaling>
+        <c:delete val="0"/>
+        <c:axPos val="l"/>
+        <c:majorGridlines>
+          <c:spPr>
+            <a:ln w="22225" cap="flat" cmpd="sng" algn="ctr">
+              <a:solidFill>
+                <a:schemeClr val="tx1">
+                  <a:alpha val="15000"/>
+                </a:schemeClr>
+              </a:solidFill>
+              <a:round/>
+            </a:ln>
+            <a:effectLst/>
+          </c:spPr>
+        </c:majorGridlines>
+        <c:numFmt formatCode="General" sourceLinked="1"/>
+        <c:majorTickMark val="out"/>
+        <c:minorTickMark val="none"/>
+        <c:tickLblPos val="nextTo"/>
+        <c:spPr>
+          <a:noFill/>
+          <a:ln>
+            <a:noFill/>
+          </a:ln>
+          <a:effectLst/>
+        </c:spPr>
+        <c:txPr>
+          <a:bodyPr rot="-60000000" spcFirstLastPara="1" vertOverflow="ellipsis" vert="horz" wrap="square" anchor="ctr" anchorCtr="1"/>
+          <a:lstStyle/>
+          <a:p>
+            <a:pPr>
+              <a:defRPr lang="en-US" sz="1600" b="0" i="0" u="none" strike="noStrike" kern="1200" baseline="0">
+                <a:solidFill>
+                  <a:schemeClr val="tx1"/>
+                </a:solidFill>
+                <a:latin typeface="+mn-lt"/>
+                <a:ea typeface="+mn-ea"/>
+                <a:cs typeface="+mn-cs"/>
+              </a:defRPr>
+            </a:pPr>
+            <a:endParaRPr lang="en-US"/>
+          </a:p>
+        </c:txPr>
+        <c:crossAx val="516734984"/>
+        <c:crosses val="autoZero"/>
+        <c:crossBetween val="between"/>
+      </c:valAx>
+      <c:spPr>
+        <a:noFill/>
+        <a:ln>
+          <a:noFill/>
+        </a:ln>
+        <a:effectLst/>
+      </c:spPr>
+    </c:plotArea>
+    <c:legend>
+      <c:legendPos val="tr"/>
+      <c:layout>
+        <c:manualLayout>
+          <c:xMode val="edge"/>
+          <c:yMode val="edge"/>
+          <c:x val="0.78745826922509765"/>
+          <c:y val="0.14062297941413515"/>
+          <c:w val="0.18257392825896759"/>
+          <c:h val="0.25508782926793433"/>
+        </c:manualLayout>
+      </c:layout>
+      <c:overlay val="1"/>
+      <c:spPr>
+        <a:noFill/>
+        <a:ln>
+          <a:noFill/>
+        </a:ln>
+        <a:effectLst/>
+      </c:spPr>
+      <c:txPr>
+        <a:bodyPr rot="0" spcFirstLastPara="1" vertOverflow="ellipsis" vert="horz" wrap="square" anchor="ctr" anchorCtr="1"/>
+        <a:lstStyle/>
+        <a:p>
+          <a:pPr>
+            <a:defRPr lang="en-US" sz="2000" b="0" i="0" u="none" strike="noStrike" kern="1200" baseline="0">
+              <a:solidFill>
+                <a:schemeClr val="tx1"/>
+              </a:solidFill>
+              <a:latin typeface="+mn-lt"/>
+              <a:ea typeface="+mn-ea"/>
+              <a:cs typeface="+mn-cs"/>
+            </a:defRPr>
+          </a:pPr>
+          <a:endParaRPr lang="en-US"/>
+        </a:p>
+      </c:txPr>
+    </c:legend>
+    <c:plotVisOnly val="1"/>
+    <c:dispBlanksAs val="gap"/>
+    <c:showDLblsOverMax val="0"/>
+  </c:chart>
+  <c:spPr>
+    <a:noFill/>
+    <a:ln>
+      <a:noFill/>
+    </a:ln>
+    <a:effectLst/>
+  </c:spPr>
+  <c:txPr>
+    <a:bodyPr/>
+    <a:lstStyle/>
+    <a:p>
+      <a:pPr>
+        <a:defRPr lang="en-US" sz="1000" b="0" i="0" u="none" strike="noStrike" kern="1200" baseline="0">
+          <a:solidFill>
+            <a:schemeClr val="tx1"/>
+          </a:solidFill>
+          <a:latin typeface="+mn-lt"/>
+          <a:ea typeface="+mn-ea"/>
+          <a:cs typeface="+mn-cs"/>
+        </a:defRPr>
+      </a:pPr>
+      <a:endParaRPr lang="en-US"/>
+    </a:p>
+  </c:txPr>
+  <c:externalData r:id="rId3">
+    <c:autoUpdate val="0"/>
+  </c:externalData>
+</c:chartSpace>
+</file>
+
+<file path=ppt/charts/colors1.xml><?xml version="1.0" encoding="utf-8"?>
+<cs:colorStyle xmlns:cs="http://schemas.microsoft.com/office/drawing/2012/chartStyle" xmlns:a="http://schemas.openxmlformats.org/drawingml/2006/main" meth="cycle" id="10">
+  <a:schemeClr val="accent1"/>
+  <a:schemeClr val="accent2"/>
+  <a:schemeClr val="accent3"/>
+  <a:schemeClr val="accent4"/>
+  <a:schemeClr val="accent5"/>
+  <a:schemeClr val="accent6"/>
+  <cs:variation/>
+  <cs:variation>
+    <a:lumMod val="60000"/>
+  </cs:variation>
+  <cs:variation>
+    <a:lumMod val="80000"/>
+    <a:lumOff val="20000"/>
+  </cs:variation>
+  <cs:variation>
+    <a:lumMod val="80000"/>
+  </cs:variation>
+  <cs:variation>
+    <a:lumMod val="60000"/>
+    <a:lumOff val="40000"/>
+  </cs:variation>
+  <cs:variation>
+    <a:lumMod val="50000"/>
+  </cs:variation>
+  <cs:variation>
+    <a:lumMod val="70000"/>
+    <a:lumOff val="30000"/>
+  </cs:variation>
+  <cs:variation>
+    <a:lumMod val="70000"/>
+  </cs:variation>
+  <cs:variation>
+    <a:lumMod val="50000"/>
+    <a:lumOff val="50000"/>
+  </cs:variation>
+</cs:colorStyle>
+</file>
+
+<file path=ppt/charts/colors2.xml><?xml version="1.0" encoding="utf-8"?>
+<cs:colorStyle xmlns:cs="http://schemas.microsoft.com/office/drawing/2012/chartStyle" xmlns:a="http://schemas.openxmlformats.org/drawingml/2006/main" meth="cycle" id="13">
+  <a:schemeClr val="accent6"/>
+  <a:schemeClr val="accent5"/>
+  <a:schemeClr val="accent4"/>
+  <cs:variation/>
+  <cs:variation>
+    <a:lumMod val="60000"/>
+  </cs:variation>
+  <cs:variation>
+    <a:lumMod val="80000"/>
+    <a:lumOff val="20000"/>
+  </cs:variation>
+  <cs:variation>
+    <a:lumMod val="80000"/>
+  </cs:variation>
+  <cs:variation>
+    <a:lumMod val="60000"/>
+    <a:lumOff val="40000"/>
+  </cs:variation>
+  <cs:variation>
+    <a:lumMod val="50000"/>
+  </cs:variation>
+  <cs:variation>
+    <a:lumMod val="70000"/>
+    <a:lumOff val="30000"/>
+  </cs:variation>
+  <cs:variation>
+    <a:lumMod val="70000"/>
+  </cs:variation>
+  <cs:variation>
+    <a:lumMod val="50000"/>
+    <a:lumOff val="50000"/>
+  </cs:variation>
+</cs:colorStyle>
+</file>
+
+<file path=ppt/charts/style1.xml><?xml version="1.0" encoding="utf-8"?>
+<cs:chartStyle xmlns:cs="http://schemas.microsoft.com/office/drawing/2012/chartStyle" xmlns:a="http://schemas.openxmlformats.org/drawingml/2006/main" id="201">
+  <cs:axisTitle>
+    <cs:lnRef idx="0"/>
+    <cs:fillRef idx="0"/>
+    <cs:effectRef idx="0"/>
+    <cs:fontRef idx="minor">
+      <a:schemeClr val="tx1">
+        <a:lumMod val="65000"/>
+        <a:lumOff val="35000"/>
+      </a:schemeClr>
+    </cs:fontRef>
+    <cs:defRPr sz="1000" kern="1200"/>
+  </cs:axisTitle>
+  <cs:categoryAxis>
+    <cs:lnRef idx="0"/>
+    <cs:fillRef idx="0"/>
+    <cs:effectRef idx="0"/>
+    <cs:fontRef idx="minor">
+      <a:schemeClr val="tx1">
+        <a:lumMod val="65000"/>
+        <a:lumOff val="35000"/>
+      </a:schemeClr>
+    </cs:fontRef>
+    <cs:spPr>
+      <a:ln w="9525" cap="flat" cmpd="sng" algn="ctr">
+        <a:solidFill>
+          <a:schemeClr val="tx1">
+            <a:lumMod val="15000"/>
+            <a:lumOff val="85000"/>
+          </a:schemeClr>
+        </a:solidFill>
+        <a:round/>
+      </a:ln>
+    </cs:spPr>
+    <cs:defRPr sz="900" kern="1200"/>
+  </cs:categoryAxis>
+  <cs:chartArea mods="allowNoFillOverride allowNoLineOverride">
+    <cs:lnRef idx="0"/>
+    <cs:fillRef idx="0"/>
+    <cs:effectRef idx="0"/>
+    <cs:fontRef idx="minor">
+      <a:schemeClr val="tx1"/>
+    </cs:fontRef>
+    <cs:spPr>
+      <a:solidFill>
+        <a:schemeClr val="bg1"/>
+      </a:solidFill>
+      <a:ln w="9525" cap="flat" cmpd="sng" algn="ctr">
+        <a:solidFill>
+          <a:schemeClr val="tx1">
+            <a:lumMod val="15000"/>
+            <a:lumOff val="85000"/>
+          </a:schemeClr>
+        </a:solidFill>
+        <a:round/>
+      </a:ln>
+    </cs:spPr>
+    <cs:defRPr sz="1000" kern="1200"/>
+  </cs:chartArea>
+  <cs:dataLabel>
+    <cs:lnRef idx="0"/>
+    <cs:fillRef idx="0"/>
+    <cs:effectRef idx="0"/>
+    <cs:fontRef idx="minor">
+      <a:schemeClr val="tx1">
+        <a:lumMod val="75000"/>
+        <a:lumOff val="25000"/>
+      </a:schemeClr>
+    </cs:fontRef>
+    <cs:defRPr sz="900" kern="1200"/>
+  </cs:dataLabel>
+  <cs:dataLabelCallout>
+    <cs:lnRef idx="0"/>
+    <cs:fillRef idx="0"/>
+    <cs:effectRef idx="0"/>
+    <cs:fontRef idx="minor">
+      <a:schemeClr val="dk1">
+        <a:lumMod val="65000"/>
+        <a:lumOff val="35000"/>
+      </a:schemeClr>
+    </cs:fontRef>
+    <cs:spPr>
+      <a:solidFill>
+        <a:schemeClr val="lt1"/>
+      </a:solidFill>
+      <a:ln>
+        <a:solidFill>
+          <a:schemeClr val="dk1">
+            <a:lumMod val="25000"/>
+            <a:lumOff val="75000"/>
+          </a:schemeClr>
+        </a:solidFill>
+      </a:ln>
+    </cs:spPr>
+    <cs:defRPr sz="900" kern="1200"/>
+    <cs:bodyPr rot="0" spcFirstLastPara="1" vertOverflow="clip" horzOverflow="clip" vert="horz" wrap="square" lIns="36576" tIns="18288" rIns="36576" bIns="18288" anchor="ctr" anchorCtr="1">
+      <a:spAutoFit/>
+    </cs:bodyPr>
+  </cs:dataLabelCallout>
+  <cs:dataPoint>
+    <cs:lnRef idx="0"/>
+    <cs:fillRef idx="1">
+      <cs:styleClr val="auto"/>
+    </cs:fillRef>
+    <cs:effectRef idx="0"/>
+    <cs:fontRef idx="minor">
+      <a:schemeClr val="tx1"/>
+    </cs:fontRef>
+  </cs:dataPoint>
+  <cs:dataPoint3D>
+    <cs:lnRef idx="0"/>
+    <cs:fillRef idx="1">
+      <cs:styleClr val="auto"/>
+    </cs:fillRef>
+    <cs:effectRef idx="0"/>
+    <cs:fontRef idx="minor">
+      <a:schemeClr val="tx1"/>
+    </cs:fontRef>
+  </cs:dataPoint3D>
+  <cs:dataPointLine>
+    <cs:lnRef idx="0">
+      <cs:styleClr val="auto"/>
+    </cs:lnRef>
+    <cs:fillRef idx="1"/>
+    <cs:effectRef idx="0"/>
+    <cs:fontRef idx="minor">
+      <a:schemeClr val="tx1"/>
+    </cs:fontRef>
+    <cs:spPr>
+      <a:ln w="28575" cap="rnd">
+        <a:solidFill>
+          <a:schemeClr val="phClr"/>
+        </a:solidFill>
+        <a:round/>
+      </a:ln>
+    </cs:spPr>
+  </cs:dataPointLine>
+  <cs:dataPointMarker>
+    <cs:lnRef idx="0">
+      <cs:styleClr val="auto"/>
+    </cs:lnRef>
+    <cs:fillRef idx="1">
+      <cs:styleClr val="auto"/>
+    </cs:fillRef>
+    <cs:effectRef idx="0"/>
+    <cs:fontRef idx="minor">
+      <a:schemeClr val="tx1"/>
+    </cs:fontRef>
+    <cs:spPr>
+      <a:ln w="9525">
+        <a:solidFill>
+          <a:schemeClr val="phClr"/>
+        </a:solidFill>
+      </a:ln>
+    </cs:spPr>
+  </cs:dataPointMarker>
+  <cs:dataPointMarkerLayout symbol="circle" size="5"/>
+  <cs:dataPointWireframe>
+    <cs:lnRef idx="0">
+      <cs:styleClr val="auto"/>
+    </cs:lnRef>
+    <cs:fillRef idx="1"/>
+    <cs:effectRef idx="0"/>
+    <cs:fontRef idx="minor">
+      <a:schemeClr val="tx1"/>
+    </cs:fontRef>
+    <cs:spPr>
+      <a:ln w="9525" cap="rnd">
+        <a:solidFill>
+          <a:schemeClr val="phClr"/>
+        </a:solidFill>
+        <a:round/>
+      </a:ln>
+    </cs:spPr>
+  </cs:dataPointWireframe>
+  <cs:dataTable>
+    <cs:lnRef idx="0"/>
+    <cs:fillRef idx="0"/>
+    <cs:effectRef idx="0"/>
+    <cs:fontRef idx="minor">
+      <a:schemeClr val="tx1">
+        <a:lumMod val="65000"/>
+        <a:lumOff val="35000"/>
+      </a:schemeClr>
+    </cs:fontRef>
+    <cs:spPr>
+      <a:noFill/>
+      <a:ln w="9525" cap="flat" cmpd="sng" algn="ctr">
+        <a:solidFill>
+          <a:schemeClr val="tx1">
+            <a:lumMod val="15000"/>
+            <a:lumOff val="85000"/>
+          </a:schemeClr>
+        </a:solidFill>
+        <a:round/>
+      </a:ln>
+    </cs:spPr>
+    <cs:defRPr sz="900" kern="1200"/>
+  </cs:dataTable>
+  <cs:downBar>
+    <cs:lnRef idx="0"/>
+    <cs:fillRef idx="0"/>
+    <cs:effectRef idx="0"/>
+    <cs:fontRef idx="minor">
+      <a:schemeClr val="dk1"/>
+    </cs:fontRef>
+    <cs:spPr>
+      <a:solidFill>
+        <a:schemeClr val="dk1">
+          <a:lumMod val="65000"/>
+          <a:lumOff val="35000"/>
+        </a:schemeClr>
+      </a:solidFill>
+      <a:ln w="9525">
+        <a:solidFill>
+          <a:schemeClr val="tx1">
+            <a:lumMod val="65000"/>
+            <a:lumOff val="35000"/>
+          </a:schemeClr>
+        </a:solidFill>
+      </a:ln>
+    </cs:spPr>
+  </cs:downBar>
+  <cs:dropLine>
+    <cs:lnRef idx="0"/>
+    <cs:fillRef idx="0"/>
+    <cs:effectRef idx="0"/>
+    <cs:fontRef idx="minor">
+      <a:schemeClr val="tx1"/>
+    </cs:fontRef>
+    <cs:spPr>
+      <a:ln w="9525" cap="flat" cmpd="sng" algn="ctr">
+        <a:solidFill>
+          <a:schemeClr val="tx1">
+            <a:lumMod val="35000"/>
+            <a:lumOff val="65000"/>
+          </a:schemeClr>
+        </a:solidFill>
+        <a:round/>
+      </a:ln>
+    </cs:spPr>
+  </cs:dropLine>
+  <cs:errorBar>
+    <cs:lnRef idx="0"/>
+    <cs:fillRef idx="0"/>
+    <cs:effectRef idx="0"/>
+    <cs:fontRef idx="minor">
+      <a:schemeClr val="tx1"/>
+    </cs:fontRef>
+    <cs:spPr>
+      <a:ln w="9525" cap="flat" cmpd="sng" algn="ctr">
+        <a:solidFill>
+          <a:schemeClr val="tx1">
+            <a:lumMod val="65000"/>
+            <a:lumOff val="35000"/>
+          </a:schemeClr>
+        </a:solidFill>
+        <a:round/>
+      </a:ln>
+    </cs:spPr>
+  </cs:errorBar>
+  <cs:floor>
+    <cs:lnRef idx="0"/>
+    <cs:fillRef idx="0"/>
+    <cs:effectRef idx="0"/>
+    <cs:fontRef idx="minor">
+      <a:schemeClr val="tx1"/>
+    </cs:fontRef>
+    <cs:spPr>
+      <a:noFill/>
+      <a:ln>
+        <a:noFill/>
+      </a:ln>
+    </cs:spPr>
+  </cs:floor>
+  <cs:gridlineMajor>
+    <cs:lnRef idx="0"/>
+    <cs:fillRef idx="0"/>
+    <cs:effectRef idx="0"/>
+    <cs:fontRef idx="minor">
+      <a:schemeClr val="tx1"/>
+    </cs:fontRef>
+    <cs:spPr>
+      <a:ln w="9525" cap="flat" cmpd="sng" algn="ctr">
+        <a:solidFill>
+          <a:schemeClr val="tx1">
+            <a:lumMod val="15000"/>
+            <a:lumOff val="85000"/>
+          </a:schemeClr>
+        </a:solidFill>
+        <a:round/>
+      </a:ln>
+    </cs:spPr>
+  </cs:gridlineMajor>
+  <cs:gridlineMinor>
+    <cs:lnRef idx="0"/>
+    <cs:fillRef idx="0"/>
+    <cs:effectRef idx="0"/>
+    <cs:fontRef idx="minor">
+      <a:schemeClr val="tx1"/>
+    </cs:fontRef>
+    <cs:spPr>
+      <a:ln w="9525" cap="flat" cmpd="sng" algn="ctr">
+        <a:solidFill>
+          <a:schemeClr val="tx1">
+            <a:lumMod val="5000"/>
+            <a:lumOff val="95000"/>
+          </a:schemeClr>
+        </a:solidFill>
+        <a:round/>
+      </a:ln>
+    </cs:spPr>
+  </cs:gridlineMinor>
+  <cs:hiLoLine>
+    <cs:lnRef idx="0"/>
+    <cs:fillRef idx="0"/>
+    <cs:effectRef idx="0"/>
+    <cs:fontRef idx="minor">
+      <a:schemeClr val="tx1"/>
+    </cs:fontRef>
+    <cs:spPr>
+      <a:ln w="9525" cap="flat" cmpd="sng" algn="ctr">
+        <a:solidFill>
+          <a:schemeClr val="tx1">
+            <a:lumMod val="75000"/>
+            <a:lumOff val="25000"/>
+          </a:schemeClr>
+        </a:solidFill>
+        <a:round/>
+      </a:ln>
+    </cs:spPr>
+  </cs:hiLoLine>
+  <cs:leaderLine>
+    <cs:lnRef idx="0"/>
+    <cs:fillRef idx="0"/>
+    <cs:effectRef idx="0"/>
+    <cs:fontRef idx="minor">
+      <a:schemeClr val="tx1"/>
+    </cs:fontRef>
+    <cs:spPr>
+      <a:ln w="9525" cap="flat" cmpd="sng" algn="ctr">
+        <a:solidFill>
+          <a:schemeClr val="tx1">
+            <a:lumMod val="35000"/>
+            <a:lumOff val="65000"/>
+          </a:schemeClr>
+        </a:solidFill>
+        <a:round/>
+      </a:ln>
+    </cs:spPr>
+  </cs:leaderLine>
+  <cs:legend>
+    <cs:lnRef idx="0"/>
+    <cs:fillRef idx="0"/>
+    <cs:effectRef idx="0"/>
+    <cs:fontRef idx="minor">
+      <a:schemeClr val="tx1">
+        <a:lumMod val="65000"/>
+        <a:lumOff val="35000"/>
+      </a:schemeClr>
+    </cs:fontRef>
+    <cs:defRPr sz="900" kern="1200"/>
+  </cs:legend>
+  <cs:plotArea mods="allowNoFillOverride allowNoLineOverride">
+    <cs:lnRef idx="0"/>
+    <cs:fillRef idx="0"/>
+    <cs:effectRef idx="0"/>
+    <cs:fontRef idx="minor">
+      <a:schemeClr val="tx1"/>
+    </cs:fontRef>
+  </cs:plotArea>
+  <cs:plotArea3D mods="allowNoFillOverride allowNoLineOverride">
+    <cs:lnRef idx="0"/>
+    <cs:fillRef idx="0"/>
+    <cs:effectRef idx="0"/>
+    <cs:fontRef idx="minor">
+      <a:schemeClr val="tx1"/>
+    </cs:fontRef>
+  </cs:plotArea3D>
+  <cs:seriesAxis>
+    <cs:lnRef idx="0"/>
+    <cs:fillRef idx="0"/>
+    <cs:effectRef idx="0"/>
+    <cs:fontRef idx="minor">
+      <a:schemeClr val="tx1">
+        <a:lumMod val="65000"/>
+        <a:lumOff val="35000"/>
+      </a:schemeClr>
+    </cs:fontRef>
+    <cs:defRPr sz="900" kern="1200"/>
+  </cs:seriesAxis>
+  <cs:seriesLine>
+    <cs:lnRef idx="0"/>
+    <cs:fillRef idx="0"/>
+    <cs:effectRef idx="0"/>
+    <cs:fontRef idx="minor">
+      <a:schemeClr val="tx1"/>
+    </cs:fontRef>
+    <cs:spPr>
+      <a:ln w="9525" cap="flat" cmpd="sng" algn="ctr">
+        <a:solidFill>
+          <a:schemeClr val="tx1">
+            <a:lumMod val="35000"/>
+            <a:lumOff val="65000"/>
+          </a:schemeClr>
+        </a:solidFill>
+        <a:round/>
+      </a:ln>
+    </cs:spPr>
+  </cs:seriesLine>
+  <cs:title>
+    <cs:lnRef idx="0"/>
+    <cs:fillRef idx="0"/>
+    <cs:effectRef idx="0"/>
+    <cs:fontRef idx="minor">
+      <a:schemeClr val="tx1">
+        <a:lumMod val="65000"/>
+        <a:lumOff val="35000"/>
+      </a:schemeClr>
+    </cs:fontRef>
+    <cs:defRPr sz="1400" b="0" kern="1200" spc="0" baseline="0"/>
+  </cs:title>
+  <cs:trendline>
+    <cs:lnRef idx="0">
+      <cs:styleClr val="auto"/>
+    </cs:lnRef>
+    <cs:fillRef idx="0"/>
+    <cs:effectRef idx="0"/>
+    <cs:fontRef idx="minor">
+      <a:schemeClr val="tx1"/>
+    </cs:fontRef>
+    <cs:spPr>
+      <a:ln w="19050" cap="rnd">
+        <a:solidFill>
+          <a:schemeClr val="phClr"/>
+        </a:solidFill>
+        <a:prstDash val="sysDot"/>
+      </a:ln>
+    </cs:spPr>
+  </cs:trendline>
+  <cs:trendlineLabel>
+    <cs:lnRef idx="0"/>
+    <cs:fillRef idx="0"/>
+    <cs:effectRef idx="0"/>
+    <cs:fontRef idx="minor">
+      <a:schemeClr val="tx1">
+        <a:lumMod val="65000"/>
+        <a:lumOff val="35000"/>
+      </a:schemeClr>
+    </cs:fontRef>
+    <cs:defRPr sz="900" kern="1200"/>
+  </cs:trendlineLabel>
+  <cs:upBar>
+    <cs:lnRef idx="0"/>
+    <cs:fillRef idx="0"/>
+    <cs:effectRef idx="0"/>
+    <cs:fontRef idx="minor">
+      <a:schemeClr val="dk1"/>
+    </cs:fontRef>
+    <cs:spPr>
+      <a:solidFill>
+        <a:schemeClr val="lt1"/>
+      </a:solidFill>
+      <a:ln w="9525">
+        <a:solidFill>
+          <a:schemeClr val="tx1">
+            <a:lumMod val="15000"/>
+            <a:lumOff val="85000"/>
+          </a:schemeClr>
+        </a:solidFill>
+      </a:ln>
+    </cs:spPr>
+  </cs:upBar>
+  <cs:valueAxis>
+    <cs:lnRef idx="0"/>
+    <cs:fillRef idx="0"/>
+    <cs:effectRef idx="0"/>
+    <cs:fontRef idx="minor">
+      <a:schemeClr val="tx1">
+        <a:lumMod val="65000"/>
+        <a:lumOff val="35000"/>
+      </a:schemeClr>
+    </cs:fontRef>
+    <cs:defRPr sz="900" kern="1200"/>
+  </cs:valueAxis>
+  <cs:wall>
+    <cs:lnRef idx="0"/>
+    <cs:fillRef idx="0"/>
+    <cs:effectRef idx="0"/>
+    <cs:fontRef idx="minor">
+      <a:schemeClr val="tx1"/>
+    </cs:fontRef>
+    <cs:spPr>
+      <a:noFill/>
+      <a:ln>
+        <a:noFill/>
+      </a:ln>
+    </cs:spPr>
+  </cs:wall>
+</cs:chartStyle>
+</file>
+
+<file path=ppt/charts/style2.xml><?xml version="1.0" encoding="utf-8"?>
+<cs:chartStyle xmlns:cs="http://schemas.microsoft.com/office/drawing/2012/chartStyle" xmlns:a="http://schemas.openxmlformats.org/drawingml/2006/main" id="201">
+  <cs:axisTitle>
+    <cs:lnRef idx="0"/>
+    <cs:fillRef idx="0"/>
+    <cs:effectRef idx="0"/>
+    <cs:fontRef idx="minor">
+      <a:schemeClr val="tx1">
+        <a:lumMod val="65000"/>
+        <a:lumOff val="35000"/>
+      </a:schemeClr>
+    </cs:fontRef>
+    <cs:defRPr sz="1000" kern="1200"/>
+  </cs:axisTitle>
+  <cs:categoryAxis>
+    <cs:lnRef idx="0"/>
+    <cs:fillRef idx="0"/>
+    <cs:effectRef idx="0"/>
+    <cs:fontRef idx="minor">
+      <a:schemeClr val="tx1">
+        <a:lumMod val="65000"/>
+        <a:lumOff val="35000"/>
+      </a:schemeClr>
+    </cs:fontRef>
+    <cs:spPr>
+      <a:ln w="9525" cap="flat" cmpd="sng" algn="ctr">
+        <a:solidFill>
+          <a:schemeClr val="tx1">
+            <a:lumMod val="15000"/>
+            <a:lumOff val="85000"/>
+          </a:schemeClr>
+        </a:solidFill>
+        <a:round/>
+      </a:ln>
+    </cs:spPr>
+    <cs:defRPr sz="900" kern="1200"/>
+  </cs:categoryAxis>
+  <cs:chartArea mods="allowNoFillOverride allowNoLineOverride">
+    <cs:lnRef idx="0"/>
+    <cs:fillRef idx="0"/>
+    <cs:effectRef idx="0"/>
+    <cs:fontRef idx="minor">
+      <a:schemeClr val="tx1"/>
+    </cs:fontRef>
+    <cs:spPr>
+      <a:solidFill>
+        <a:schemeClr val="bg1"/>
+      </a:solidFill>
+      <a:ln w="9525" cap="flat" cmpd="sng" algn="ctr">
+        <a:solidFill>
+          <a:schemeClr val="tx1">
+            <a:lumMod val="15000"/>
+            <a:lumOff val="85000"/>
+          </a:schemeClr>
+        </a:solidFill>
+        <a:round/>
+      </a:ln>
+    </cs:spPr>
+    <cs:defRPr sz="1000" kern="1200"/>
+  </cs:chartArea>
+  <cs:dataLabel>
+    <cs:lnRef idx="0"/>
+    <cs:fillRef idx="0"/>
+    <cs:effectRef idx="0"/>
+    <cs:fontRef idx="minor">
+      <a:schemeClr val="tx1">
+        <a:lumMod val="75000"/>
+        <a:lumOff val="25000"/>
+      </a:schemeClr>
+    </cs:fontRef>
+    <cs:defRPr sz="900" kern="1200"/>
+  </cs:dataLabel>
+  <cs:dataLabelCallout>
+    <cs:lnRef idx="0"/>
+    <cs:fillRef idx="0"/>
+    <cs:effectRef idx="0"/>
+    <cs:fontRef idx="minor">
+      <a:schemeClr val="dk1">
+        <a:lumMod val="65000"/>
+        <a:lumOff val="35000"/>
+      </a:schemeClr>
+    </cs:fontRef>
+    <cs:spPr>
+      <a:solidFill>
+        <a:schemeClr val="lt1"/>
+      </a:solidFill>
+      <a:ln>
+        <a:solidFill>
+          <a:schemeClr val="dk1">
+            <a:lumMod val="25000"/>
+            <a:lumOff val="75000"/>
+          </a:schemeClr>
+        </a:solidFill>
+      </a:ln>
+    </cs:spPr>
+    <cs:defRPr sz="900" kern="1200"/>
+    <cs:bodyPr rot="0" spcFirstLastPara="1" vertOverflow="clip" horzOverflow="clip" vert="horz" wrap="square" lIns="36576" tIns="18288" rIns="36576" bIns="18288" anchor="ctr" anchorCtr="1">
+      <a:spAutoFit/>
+    </cs:bodyPr>
+  </cs:dataLabelCallout>
+  <cs:dataPoint>
+    <cs:lnRef idx="0"/>
+    <cs:fillRef idx="1">
+      <cs:styleClr val="auto"/>
+    </cs:fillRef>
+    <cs:effectRef idx="0"/>
+    <cs:fontRef idx="minor">
+      <a:schemeClr val="tx1"/>
+    </cs:fontRef>
+  </cs:dataPoint>
+  <cs:dataPoint3D>
+    <cs:lnRef idx="0"/>
+    <cs:fillRef idx="1">
+      <cs:styleClr val="auto"/>
+    </cs:fillRef>
+    <cs:effectRef idx="0"/>
+    <cs:fontRef idx="minor">
+      <a:schemeClr val="tx1"/>
+    </cs:fontRef>
+  </cs:dataPoint3D>
+  <cs:dataPointLine>
+    <cs:lnRef idx="0">
+      <cs:styleClr val="auto"/>
+    </cs:lnRef>
+    <cs:fillRef idx="1"/>
+    <cs:effectRef idx="0"/>
+    <cs:fontRef idx="minor">
+      <a:schemeClr val="tx1"/>
+    </cs:fontRef>
+    <cs:spPr>
+      <a:ln w="28575" cap="rnd">
+        <a:solidFill>
+          <a:schemeClr val="phClr"/>
+        </a:solidFill>
+        <a:round/>
+      </a:ln>
+    </cs:spPr>
+  </cs:dataPointLine>
+  <cs:dataPointMarker>
+    <cs:lnRef idx="0">
+      <cs:styleClr val="auto"/>
+    </cs:lnRef>
+    <cs:fillRef idx="1">
+      <cs:styleClr val="auto"/>
+    </cs:fillRef>
+    <cs:effectRef idx="0"/>
+    <cs:fontRef idx="minor">
+      <a:schemeClr val="tx1"/>
+    </cs:fontRef>
+    <cs:spPr>
+      <a:ln w="9525">
+        <a:solidFill>
+          <a:schemeClr val="phClr"/>
+        </a:solidFill>
+      </a:ln>
+    </cs:spPr>
+  </cs:dataPointMarker>
+  <cs:dataPointMarkerLayout symbol="circle" size="5"/>
+  <cs:dataPointWireframe>
+    <cs:lnRef idx="0">
+      <cs:styleClr val="auto"/>
+    </cs:lnRef>
+    <cs:fillRef idx="1"/>
+    <cs:effectRef idx="0"/>
+    <cs:fontRef idx="minor">
+      <a:schemeClr val="tx1"/>
+    </cs:fontRef>
+    <cs:spPr>
+      <a:ln w="9525" cap="rnd">
+        <a:solidFill>
+          <a:schemeClr val="phClr"/>
+        </a:solidFill>
+        <a:round/>
+      </a:ln>
+    </cs:spPr>
+  </cs:dataPointWireframe>
+  <cs:dataTable>
+    <cs:lnRef idx="0"/>
+    <cs:fillRef idx="0"/>
+    <cs:effectRef idx="0"/>
+    <cs:fontRef idx="minor">
+      <a:schemeClr val="tx1">
+        <a:lumMod val="65000"/>
+        <a:lumOff val="35000"/>
+      </a:schemeClr>
+    </cs:fontRef>
+    <cs:spPr>
+      <a:noFill/>
+      <a:ln w="9525" cap="flat" cmpd="sng" algn="ctr">
+        <a:solidFill>
+          <a:schemeClr val="tx1">
+            <a:lumMod val="15000"/>
+            <a:lumOff val="85000"/>
+          </a:schemeClr>
+        </a:solidFill>
+        <a:round/>
+      </a:ln>
+    </cs:spPr>
+    <cs:defRPr sz="900" kern="1200"/>
+  </cs:dataTable>
+  <cs:downBar>
+    <cs:lnRef idx="0"/>
+    <cs:fillRef idx="0"/>
+    <cs:effectRef idx="0"/>
+    <cs:fontRef idx="minor">
+      <a:schemeClr val="dk1"/>
+    </cs:fontRef>
+    <cs:spPr>
+      <a:solidFill>
+        <a:schemeClr val="dk1">
+          <a:lumMod val="65000"/>
+          <a:lumOff val="35000"/>
+        </a:schemeClr>
+      </a:solidFill>
+      <a:ln w="9525">
+        <a:solidFill>
+          <a:schemeClr val="tx1">
+            <a:lumMod val="65000"/>
+            <a:lumOff val="35000"/>
+          </a:schemeClr>
+        </a:solidFill>
+      </a:ln>
+    </cs:spPr>
+  </cs:downBar>
+  <cs:dropLine>
+    <cs:lnRef idx="0"/>
+    <cs:fillRef idx="0"/>
+    <cs:effectRef idx="0"/>
+    <cs:fontRef idx="minor">
+      <a:schemeClr val="tx1"/>
+    </cs:fontRef>
+    <cs:spPr>
+      <a:ln w="9525" cap="flat" cmpd="sng" algn="ctr">
+        <a:solidFill>
+          <a:schemeClr val="tx1">
+            <a:lumMod val="35000"/>
+            <a:lumOff val="65000"/>
+          </a:schemeClr>
+        </a:solidFill>
+        <a:round/>
+      </a:ln>
+    </cs:spPr>
+  </cs:dropLine>
+  <cs:errorBar>
+    <cs:lnRef idx="0"/>
+    <cs:fillRef idx="0"/>
+    <cs:effectRef idx="0"/>
+    <cs:fontRef idx="minor">
+      <a:schemeClr val="tx1"/>
+    </cs:fontRef>
+    <cs:spPr>
+      <a:ln w="9525" cap="flat" cmpd="sng" algn="ctr">
+        <a:solidFill>
+          <a:schemeClr val="tx1">
+            <a:lumMod val="65000"/>
+            <a:lumOff val="35000"/>
+          </a:schemeClr>
+        </a:solidFill>
+        <a:round/>
+      </a:ln>
+    </cs:spPr>
+  </cs:errorBar>
+  <cs:floor>
+    <cs:lnRef idx="0"/>
+    <cs:fillRef idx="0"/>
+    <cs:effectRef idx="0"/>
+    <cs:fontRef idx="minor">
+      <a:schemeClr val="tx1"/>
+    </cs:fontRef>
+    <cs:spPr>
+      <a:noFill/>
+      <a:ln>
+        <a:noFill/>
+      </a:ln>
+    </cs:spPr>
+  </cs:floor>
+  <cs:gridlineMajor>
+    <cs:lnRef idx="0"/>
+    <cs:fillRef idx="0"/>
+    <cs:effectRef idx="0"/>
+    <cs:fontRef idx="minor">
+      <a:schemeClr val="tx1"/>
+    </cs:fontRef>
+    <cs:spPr>
+      <a:ln w="9525" cap="flat" cmpd="sng" algn="ctr">
+        <a:solidFill>
+          <a:schemeClr val="tx1">
+            <a:lumMod val="15000"/>
+            <a:lumOff val="85000"/>
+          </a:schemeClr>
+        </a:solidFill>
+        <a:round/>
+      </a:ln>
+    </cs:spPr>
+  </cs:gridlineMajor>
+  <cs:gridlineMinor>
+    <cs:lnRef idx="0"/>
+    <cs:fillRef idx="0"/>
+    <cs:effectRef idx="0"/>
+    <cs:fontRef idx="minor">
+      <a:schemeClr val="tx1"/>
+    </cs:fontRef>
+    <cs:spPr>
+      <a:ln w="9525" cap="flat" cmpd="sng" algn="ctr">
+        <a:solidFill>
+          <a:schemeClr val="tx1">
+            <a:lumMod val="5000"/>
+            <a:lumOff val="95000"/>
+          </a:schemeClr>
+        </a:solidFill>
+        <a:round/>
+      </a:ln>
+    </cs:spPr>
+  </cs:gridlineMinor>
+  <cs:hiLoLine>
+    <cs:lnRef idx="0"/>
+    <cs:fillRef idx="0"/>
+    <cs:effectRef idx="0"/>
+    <cs:fontRef idx="minor">
+      <a:schemeClr val="tx1"/>
+    </cs:fontRef>
+    <cs:spPr>
+      <a:ln w="9525" cap="flat" cmpd="sng" algn="ctr">
+        <a:solidFill>
+          <a:schemeClr val="tx1">
+            <a:lumMod val="75000"/>
+            <a:lumOff val="25000"/>
+          </a:schemeClr>
+        </a:solidFill>
+        <a:round/>
+      </a:ln>
+    </cs:spPr>
+  </cs:hiLoLine>
+  <cs:leaderLine>
+    <cs:lnRef idx="0"/>
+    <cs:fillRef idx="0"/>
+    <cs:effectRef idx="0"/>
+    <cs:fontRef idx="minor">
+      <a:schemeClr val="tx1"/>
+    </cs:fontRef>
+    <cs:spPr>
+      <a:ln w="9525" cap="flat" cmpd="sng" algn="ctr">
+        <a:solidFill>
+          <a:schemeClr val="tx1">
+            <a:lumMod val="35000"/>
+            <a:lumOff val="65000"/>
+          </a:schemeClr>
+        </a:solidFill>
+        <a:round/>
+      </a:ln>
+    </cs:spPr>
+  </cs:leaderLine>
+  <cs:legend>
+    <cs:lnRef idx="0"/>
+    <cs:fillRef idx="0"/>
+    <cs:effectRef idx="0"/>
+    <cs:fontRef idx="minor">
+      <a:schemeClr val="tx1">
+        <a:lumMod val="65000"/>
+        <a:lumOff val="35000"/>
+      </a:schemeClr>
+    </cs:fontRef>
+    <cs:defRPr sz="900" kern="1200"/>
+  </cs:legend>
+  <cs:plotArea mods="allowNoFillOverride allowNoLineOverride">
+    <cs:lnRef idx="0"/>
+    <cs:fillRef idx="0"/>
+    <cs:effectRef idx="0"/>
+    <cs:fontRef idx="minor">
+      <a:schemeClr val="tx1"/>
+    </cs:fontRef>
+  </cs:plotArea>
+  <cs:plotArea3D mods="allowNoFillOverride allowNoLineOverride">
+    <cs:lnRef idx="0"/>
+    <cs:fillRef idx="0"/>
+    <cs:effectRef idx="0"/>
+    <cs:fontRef idx="minor">
+      <a:schemeClr val="tx1"/>
+    </cs:fontRef>
+  </cs:plotArea3D>
+  <cs:seriesAxis>
+    <cs:lnRef idx="0"/>
+    <cs:fillRef idx="0"/>
+    <cs:effectRef idx="0"/>
+    <cs:fontRef idx="minor">
+      <a:schemeClr val="tx1">
+        <a:lumMod val="65000"/>
+        <a:lumOff val="35000"/>
+      </a:schemeClr>
+    </cs:fontRef>
+    <cs:defRPr sz="900" kern="1200"/>
+  </cs:seriesAxis>
+  <cs:seriesLine>
+    <cs:lnRef idx="0"/>
+    <cs:fillRef idx="0"/>
+    <cs:effectRef idx="0"/>
+    <cs:fontRef idx="minor">
+      <a:schemeClr val="tx1"/>
+    </cs:fontRef>
+    <cs:spPr>
+      <a:ln w="9525" cap="flat" cmpd="sng" algn="ctr">
+        <a:solidFill>
+          <a:schemeClr val="tx1">
+            <a:lumMod val="35000"/>
+            <a:lumOff val="65000"/>
+          </a:schemeClr>
+        </a:solidFill>
+        <a:round/>
+      </a:ln>
+    </cs:spPr>
+  </cs:seriesLine>
+  <cs:title>
+    <cs:lnRef idx="0"/>
+    <cs:fillRef idx="0"/>
+    <cs:effectRef idx="0"/>
+    <cs:fontRef idx="minor">
+      <a:schemeClr val="tx1">
+        <a:lumMod val="65000"/>
+        <a:lumOff val="35000"/>
+      </a:schemeClr>
+    </cs:fontRef>
+    <cs:defRPr sz="1400" b="0" kern="1200" spc="0" baseline="0"/>
+  </cs:title>
+  <cs:trendline>
+    <cs:lnRef idx="0">
+      <cs:styleClr val="auto"/>
+    </cs:lnRef>
+    <cs:fillRef idx="0"/>
+    <cs:effectRef idx="0"/>
+    <cs:fontRef idx="minor">
+      <a:schemeClr val="tx1"/>
+    </cs:fontRef>
+    <cs:spPr>
+      <a:ln w="19050" cap="rnd">
+        <a:solidFill>
+          <a:schemeClr val="phClr"/>
+        </a:solidFill>
+        <a:prstDash val="sysDot"/>
+      </a:ln>
+    </cs:spPr>
+  </cs:trendline>
+  <cs:trendlineLabel>
+    <cs:lnRef idx="0"/>
+    <cs:fillRef idx="0"/>
+    <cs:effectRef idx="0"/>
+    <cs:fontRef idx="minor">
+      <a:schemeClr val="tx1">
+        <a:lumMod val="65000"/>
+        <a:lumOff val="35000"/>
+      </a:schemeClr>
+    </cs:fontRef>
+    <cs:defRPr sz="900" kern="1200"/>
+  </cs:trendlineLabel>
+  <cs:upBar>
+    <cs:lnRef idx="0"/>
+    <cs:fillRef idx="0"/>
+    <cs:effectRef idx="0"/>
+    <cs:fontRef idx="minor">
+      <a:schemeClr val="dk1"/>
+    </cs:fontRef>
+    <cs:spPr>
+      <a:solidFill>
+        <a:schemeClr val="lt1"/>
+      </a:solidFill>
+      <a:ln w="9525">
+        <a:solidFill>
+          <a:schemeClr val="tx1">
+            <a:lumMod val="15000"/>
+            <a:lumOff val="85000"/>
+          </a:schemeClr>
+        </a:solidFill>
+      </a:ln>
+    </cs:spPr>
+  </cs:upBar>
+  <cs:valueAxis>
+    <cs:lnRef idx="0"/>
+    <cs:fillRef idx="0"/>
+    <cs:effectRef idx="0"/>
+    <cs:fontRef idx="minor">
+      <a:schemeClr val="tx1">
+        <a:lumMod val="65000"/>
+        <a:lumOff val="35000"/>
+      </a:schemeClr>
+    </cs:fontRef>
+    <cs:defRPr sz="900" kern="1200"/>
+  </cs:valueAxis>
+  <cs:wall>
+    <cs:lnRef idx="0"/>
+    <cs:fillRef idx="0"/>
+    <cs:effectRef idx="0"/>
+    <cs:fontRef idx="minor">
+      <a:schemeClr val="tx1"/>
+    </cs:fontRef>
+    <cs:spPr>
+      <a:noFill/>
+      <a:ln>
+        <a:noFill/>
+      </a:ln>
+    </cs:spPr>
+  </cs:wall>
+</cs:chartStyle>
+</file>
+
 <file path=ppt/notesMasters/notesMaster1.xml><?xml version="1.0" encoding="utf-8"?>
 <p:notesMaster xmlns:a="http://schemas.openxmlformats.org/drawingml/2006/main" xmlns:r="http://schemas.openxmlformats.org/officeDocument/2006/relationships" xmlns:p="http://schemas.openxmlformats.org/presentationml/2006/main">
   <p:cSld>
@@ -287,7 +2374,7 @@
               <a:pPr>
                 <a:defRPr/>
               </a:pPr>
-              <a:t>3/16/17</a:t>
+              <a:t>3/16/2017</a:t>
             </a:fld>
             <a:endParaRPr lang="en-US" dirty="0"/>
           </a:p>
@@ -4630,15 +6717,6 @@
                 </a:rPr>
                 <a:t>PosterPresentations.com</a:t>
               </a:r>
-              <a:r>
-                <a:rPr lang="en-US" sz="2800" dirty="0">
-                  <a:solidFill>
-                    <a:schemeClr val="bg1"/>
-                  </a:solidFill>
-                  <a:latin typeface="Trebuchet MS" pitchFamily="34" charset="0"/>
-                </a:rPr>
-                <a:t/>
-              </a:r>
               <a:br>
                 <a:rPr lang="en-US" sz="2800" dirty="0">
                   <a:solidFill>
@@ -4874,15 +6952,6 @@
             </a:p>
             <a:p>
               <a:pPr algn="l"/>
-              <a:r>
-                <a:rPr lang="en-US" sz="2800" b="1" baseline="0" dirty="0">
-                  <a:solidFill>
-                    <a:schemeClr val="bg1"/>
-                  </a:solidFill>
-                  <a:latin typeface="Trebuchet MS" pitchFamily="34" charset="0"/>
-                </a:rPr>
-                <a:t/>
-              </a:r>
               <a:br>
                 <a:rPr lang="en-US" sz="2800" b="1" baseline="0" dirty="0">
                   <a:solidFill>
@@ -5491,7 +7560,7 @@
               <a:graphicData uri="http://schemas.openxmlformats.org/presentationml/2006/ole">
                 <mc:AlternateContent xmlns:mc="http://schemas.openxmlformats.org/markup-compatibility/2006">
                   <mc:Choice xmlns:v="urn:schemas-microsoft-com:vml" Requires="v">
-                    <p:oleObj spid="_x0000_s1153" name="Image" r:id="rId8" imgW="1828440" imgH="1117440" progId="Photoshop.Image.13">
+                    <p:oleObj spid="_x0000_s1165" name="Image" r:id="rId8" imgW="1828440" imgH="1117440" progId="Photoshop.Image.13">
                       <p:embed/>
                     </p:oleObj>
                   </mc:Choice>
@@ -5548,7 +7617,7 @@
               <a:graphicData uri="http://schemas.openxmlformats.org/presentationml/2006/ole">
                 <mc:AlternateContent xmlns:mc="http://schemas.openxmlformats.org/markup-compatibility/2006">
                   <mc:Choice xmlns:v="urn:schemas-microsoft-com:vml" Requires="v">
-                    <p:oleObj spid="_x0000_s1154" name="Image" r:id="rId10" imgW="1828440" imgH="1117440" progId="Photoshop.Image.13">
+                    <p:oleObj spid="_x0000_s1166" name="Image" r:id="rId10" imgW="1828440" imgH="1117440" progId="Photoshop.Image.13">
                       <p:embed/>
                     </p:oleObj>
                   </mc:Choice>
@@ -6671,7 +8740,7 @@
             <a:graphicData uri="http://schemas.openxmlformats.org/presentationml/2006/ole">
               <mc:AlternateContent xmlns:mc="http://schemas.openxmlformats.org/markup-compatibility/2006">
                 <mc:Choice xmlns:v="urn:schemas-microsoft-com:vml" Requires="v">
-                  <p:oleObj spid="_x0000_s1155" name="Image" r:id="rId12" imgW="4571280" imgH="1688760" progId="Photoshop.Image.13">
+                  <p:oleObj spid="_x0000_s1167" name="Image" r:id="rId12" imgW="4571280" imgH="1688760" progId="Photoshop.Image.13">
                     <p:embed/>
                   </p:oleObj>
                 </mc:Choice>
@@ -6755,7 +8824,7 @@
             <a:graphicData uri="http://schemas.openxmlformats.org/presentationml/2006/ole">
               <mc:AlternateContent xmlns:mc="http://schemas.openxmlformats.org/markup-compatibility/2006">
                 <mc:Choice xmlns:v="urn:schemas-microsoft-com:vml" Requires="v">
-                  <p:oleObj spid="_x0000_s1156" name="Image" r:id="rId15" imgW="1574280" imgH="1053720" progId="Photoshop.Image.13">
+                  <p:oleObj spid="_x0000_s1168" name="Image" r:id="rId15" imgW="1574280" imgH="1053720" progId="Photoshop.Image.13">
                     <p:embed/>
                   </p:oleObj>
                 </mc:Choice>
@@ -7083,14 +9152,6 @@
                   </a:solidFill>
                 </a:rPr>
                 <a:t>94710</a:t>
-              </a:r>
-              <a:r>
-                <a:rPr lang="en-US" sz="2400" baseline="0" dirty="0">
-                  <a:solidFill>
-                    <a:schemeClr val="bg1"/>
-                  </a:solidFill>
-                </a:rPr>
-                <a:t/>
               </a:r>
               <a:br>
                 <a:rPr lang="en-US" sz="2400" baseline="0" dirty="0">
@@ -8171,15 +10232,6 @@
                 </a:rPr>
                 <a:t>PosterPresentations.com</a:t>
               </a:r>
-              <a:r>
-                <a:rPr lang="en-US" sz="2800" dirty="0">
-                  <a:solidFill>
-                    <a:schemeClr val="bg1"/>
-                  </a:solidFill>
-                  <a:latin typeface="Trebuchet MS" pitchFamily="34" charset="0"/>
-                </a:rPr>
-                <a:t/>
-              </a:r>
               <a:br>
                 <a:rPr lang="en-US" sz="2800" dirty="0">
                   <a:solidFill>
@@ -8415,15 +10467,6 @@
             </a:p>
             <a:p>
               <a:pPr algn="l"/>
-              <a:r>
-                <a:rPr lang="en-US" sz="2800" b="1" baseline="0" dirty="0">
-                  <a:solidFill>
-                    <a:schemeClr val="bg1"/>
-                  </a:solidFill>
-                  <a:latin typeface="Trebuchet MS" pitchFamily="34" charset="0"/>
-                </a:rPr>
-                <a:t/>
-              </a:r>
               <a:br>
                 <a:rPr lang="en-US" sz="2800" b="1" baseline="0" dirty="0">
                   <a:solidFill>
@@ -9032,7 +11075,7 @@
               <a:graphicData uri="http://schemas.openxmlformats.org/presentationml/2006/ole">
                 <mc:AlternateContent xmlns:mc="http://schemas.openxmlformats.org/markup-compatibility/2006">
                   <mc:Choice xmlns:v="urn:schemas-microsoft-com:vml" Requires="v">
-                    <p:oleObj spid="_x0000_s2177" name="Image" r:id="rId8" imgW="1828440" imgH="1117440" progId="Photoshop.Image.13">
+                    <p:oleObj spid="_x0000_s2189" name="Image" r:id="rId8" imgW="1828440" imgH="1117440" progId="Photoshop.Image.13">
                       <p:embed/>
                     </p:oleObj>
                   </mc:Choice>
@@ -9089,7 +11132,7 @@
               <a:graphicData uri="http://schemas.openxmlformats.org/presentationml/2006/ole">
                 <mc:AlternateContent xmlns:mc="http://schemas.openxmlformats.org/markup-compatibility/2006">
                   <mc:Choice xmlns:v="urn:schemas-microsoft-com:vml" Requires="v">
-                    <p:oleObj spid="_x0000_s2178" name="Image" r:id="rId10" imgW="1828440" imgH="1117440" progId="Photoshop.Image.13">
+                    <p:oleObj spid="_x0000_s2190" name="Image" r:id="rId10" imgW="1828440" imgH="1117440" progId="Photoshop.Image.13">
                       <p:embed/>
                     </p:oleObj>
                   </mc:Choice>
@@ -10212,7 +12255,7 @@
             <a:graphicData uri="http://schemas.openxmlformats.org/presentationml/2006/ole">
               <mc:AlternateContent xmlns:mc="http://schemas.openxmlformats.org/markup-compatibility/2006">
                 <mc:Choice xmlns:v="urn:schemas-microsoft-com:vml" Requires="v">
-                  <p:oleObj spid="_x0000_s2179" name="Image" r:id="rId12" imgW="4571280" imgH="1688760" progId="Photoshop.Image.13">
+                  <p:oleObj spid="_x0000_s2191" name="Image" r:id="rId12" imgW="4571280" imgH="1688760" progId="Photoshop.Image.13">
                     <p:embed/>
                   </p:oleObj>
                 </mc:Choice>
@@ -10296,7 +12339,7 @@
             <a:graphicData uri="http://schemas.openxmlformats.org/presentationml/2006/ole">
               <mc:AlternateContent xmlns:mc="http://schemas.openxmlformats.org/markup-compatibility/2006">
                 <mc:Choice xmlns:v="urn:schemas-microsoft-com:vml" Requires="v">
-                  <p:oleObj spid="_x0000_s2180" name="Image" r:id="rId15" imgW="1574280" imgH="1053720" progId="Photoshop.Image.13">
+                  <p:oleObj spid="_x0000_s2192" name="Image" r:id="rId15" imgW="1574280" imgH="1053720" progId="Photoshop.Image.13">
                     <p:embed/>
                   </p:oleObj>
                 </mc:Choice>
@@ -10625,14 +12668,6 @@
                 </a:solidFill>
               </a:rPr>
               <a:t>94710</a:t>
-            </a:r>
-            <a:r>
-              <a:rPr lang="en-US" sz="2400" baseline="0" dirty="0">
-                <a:solidFill>
-                  <a:schemeClr val="bg1"/>
-                </a:solidFill>
-              </a:rPr>
-              <a:t/>
             </a:r>
             <a:br>
               <a:rPr lang="en-US" sz="2400" baseline="0" dirty="0">
@@ -11896,15 +13931,6 @@
                 </a:rPr>
                 <a:t>PosterPresentations.com</a:t>
               </a:r>
-              <a:r>
-                <a:rPr lang="en-US" sz="2800" dirty="0">
-                  <a:solidFill>
-                    <a:schemeClr val="bg1"/>
-                  </a:solidFill>
-                  <a:latin typeface="Trebuchet MS" pitchFamily="34" charset="0"/>
-                </a:rPr>
-                <a:t/>
-              </a:r>
               <a:br>
                 <a:rPr lang="en-US" sz="2800" dirty="0">
                   <a:solidFill>
@@ -12140,15 +14166,6 @@
             </a:p>
             <a:p>
               <a:pPr algn="l"/>
-              <a:r>
-                <a:rPr lang="en-US" sz="2800" b="1" baseline="0" dirty="0">
-                  <a:solidFill>
-                    <a:schemeClr val="bg1"/>
-                  </a:solidFill>
-                  <a:latin typeface="Trebuchet MS" pitchFamily="34" charset="0"/>
-                </a:rPr>
-                <a:t/>
-              </a:r>
               <a:br>
                 <a:rPr lang="en-US" sz="2800" b="1" baseline="0" dirty="0">
                   <a:solidFill>
@@ -12757,7 +14774,7 @@
               <a:graphicData uri="http://schemas.openxmlformats.org/presentationml/2006/ole">
                 <mc:AlternateContent xmlns:mc="http://schemas.openxmlformats.org/markup-compatibility/2006">
                   <mc:Choice xmlns:v="urn:schemas-microsoft-com:vml" Requires="v">
-                    <p:oleObj spid="_x0000_s3201" name="Image" r:id="rId8" imgW="1828440" imgH="1117440" progId="Photoshop.Image.13">
+                    <p:oleObj spid="_x0000_s3213" name="Image" r:id="rId8" imgW="1828440" imgH="1117440" progId="Photoshop.Image.13">
                       <p:embed/>
                     </p:oleObj>
                   </mc:Choice>
@@ -12814,7 +14831,7 @@
               <a:graphicData uri="http://schemas.openxmlformats.org/presentationml/2006/ole">
                 <mc:AlternateContent xmlns:mc="http://schemas.openxmlformats.org/markup-compatibility/2006">
                   <mc:Choice xmlns:v="urn:schemas-microsoft-com:vml" Requires="v">
-                    <p:oleObj spid="_x0000_s3202" name="Image" r:id="rId10" imgW="1828440" imgH="1117440" progId="Photoshop.Image.13">
+                    <p:oleObj spid="_x0000_s3214" name="Image" r:id="rId10" imgW="1828440" imgH="1117440" progId="Photoshop.Image.13">
                       <p:embed/>
                     </p:oleObj>
                   </mc:Choice>
@@ -13937,7 +15954,7 @@
             <a:graphicData uri="http://schemas.openxmlformats.org/presentationml/2006/ole">
               <mc:AlternateContent xmlns:mc="http://schemas.openxmlformats.org/markup-compatibility/2006">
                 <mc:Choice xmlns:v="urn:schemas-microsoft-com:vml" Requires="v">
-                  <p:oleObj spid="_x0000_s3203" name="Image" r:id="rId12" imgW="4571280" imgH="1688760" progId="Photoshop.Image.13">
+                  <p:oleObj spid="_x0000_s3215" name="Image" r:id="rId12" imgW="4571280" imgH="1688760" progId="Photoshop.Image.13">
                     <p:embed/>
                   </p:oleObj>
                 </mc:Choice>
@@ -14021,7 +16038,7 @@
             <a:graphicData uri="http://schemas.openxmlformats.org/presentationml/2006/ole">
               <mc:AlternateContent xmlns:mc="http://schemas.openxmlformats.org/markup-compatibility/2006">
                 <mc:Choice xmlns:v="urn:schemas-microsoft-com:vml" Requires="v">
-                  <p:oleObj spid="_x0000_s3204" name="Image" r:id="rId15" imgW="1574280" imgH="1053720" progId="Photoshop.Image.13">
+                  <p:oleObj spid="_x0000_s3216" name="Image" r:id="rId15" imgW="1574280" imgH="1053720" progId="Photoshop.Image.13">
                     <p:embed/>
                   </p:oleObj>
                 </mc:Choice>
@@ -14350,14 +16367,6 @@
                 </a:solidFill>
               </a:rPr>
               <a:t>94710</a:t>
-            </a:r>
-            <a:r>
-              <a:rPr lang="en-US" sz="2400" baseline="0" dirty="0">
-                <a:solidFill>
-                  <a:schemeClr val="bg1"/>
-                </a:solidFill>
-              </a:rPr>
-              <a:t/>
             </a:r>
             <a:br>
               <a:rPr lang="en-US" sz="2400" baseline="0" dirty="0">
@@ -15190,25 +17199,171 @@
           </a:p>
         </p:txBody>
       </p:sp>
-      <p:sp>
-        <p:nvSpPr>
-          <p:cNvPr id="29" name="Text Placeholder 28"/>
-          <p:cNvSpPr>
-            <a:spLocks noGrp="1"/>
-          </p:cNvSpPr>
-          <p:nvPr>
-            <p:ph type="body" sz="quarter" idx="23"/>
-          </p:nvPr>
-        </p:nvSpPr>
-        <p:spPr/>
-        <p:txBody>
-          <a:bodyPr/>
-          <a:lstStyle/>
-          <a:p>
-            <a:endParaRPr lang="en-US"/>
-          </a:p>
-        </p:txBody>
-      </p:sp>
+      <mc:AlternateContent xmlns:mc="http://schemas.openxmlformats.org/markup-compatibility/2006">
+        <mc:Choice xmlns:a14="http://schemas.microsoft.com/office/drawing/2010/main" Requires="a14">
+          <p:sp>
+            <p:nvSpPr>
+              <p:cNvPr id="29" name="Text Placeholder 28"/>
+              <p:cNvSpPr>
+                <a:spLocks noGrp="1"/>
+              </p:cNvSpPr>
+              <p:nvPr>
+                <p:ph type="body" sz="quarter" idx="23"/>
+              </p:nvPr>
+            </p:nvSpPr>
+            <p:spPr>
+              <a:xfrm>
+                <a:off x="17689252" y="6420045"/>
+                <a:ext cx="15833456" cy="3261800"/>
+              </a:xfrm>
+            </p:spPr>
+            <p:txBody>
+              <a:bodyPr/>
+              <a:lstStyle/>
+              <a:p>
+                <a:r>
+                  <a:rPr lang="en-US" dirty="0"/>
+                  <a:t>We should put something like </a:t>
+                </a:r>
+                <a:r>
+                  <a:rPr lang="en-US" dirty="0" err="1"/>
+                  <a:t>srsly</a:t>
+                </a:r>
+                <a:r>
+                  <a:rPr lang="en-US" dirty="0"/>
+                  <a:t> but probably not whatever </a:t>
+                </a:r>
+                <a:r>
+                  <a:rPr lang="en-US" dirty="0" err="1"/>
+                  <a:t>b.s.</a:t>
+                </a:r>
+                <a:r>
+                  <a:rPr lang="en-US" dirty="0"/>
+                  <a:t> this is:</a:t>
+                </a:r>
+              </a:p>
+              <a:p>
+                <a:r>
+                  <a:rPr lang="en-US" dirty="0"/>
+                  <a:t>F1 score = </a:t>
+                </a:r>
+                <a14:m>
+                  <m:oMath xmlns:m="http://schemas.openxmlformats.org/officeDocument/2006/math">
+                    <m:r>
+                      <a:rPr lang="en-US" b="0" i="1" smtClean="0">
+                        <a:latin typeface="Cambria Math" panose="02040503050406030204" pitchFamily="18" charset="0"/>
+                      </a:rPr>
+                      <m:t>2∗</m:t>
+                    </m:r>
+                    <m:f>
+                      <m:fPr>
+                        <m:ctrlPr>
+                          <a:rPr lang="en-US" b="0" i="1" smtClean="0">
+                            <a:latin typeface="Cambria Math" panose="02040503050406030204" pitchFamily="18" charset="0"/>
+                          </a:rPr>
+                        </m:ctrlPr>
+                      </m:fPr>
+                      <m:num>
+                        <m:r>
+                          <a:rPr lang="en-US" b="0" i="1" smtClean="0">
+                            <a:latin typeface="Cambria Math" panose="02040503050406030204" pitchFamily="18" charset="0"/>
+                          </a:rPr>
+                          <m:t>𝑅𝑒𝑐𝑎𝑙𝑙</m:t>
+                        </m:r>
+                        <m:r>
+                          <a:rPr lang="en-US" b="0" i="1" smtClean="0">
+                            <a:latin typeface="Cambria Math" panose="02040503050406030204" pitchFamily="18" charset="0"/>
+                          </a:rPr>
+                          <m:t>∗</m:t>
+                        </m:r>
+                        <m:r>
+                          <a:rPr lang="en-US" b="0" i="1" smtClean="0">
+                            <a:latin typeface="Cambria Math" panose="02040503050406030204" pitchFamily="18" charset="0"/>
+                          </a:rPr>
+                          <m:t>𝑃𝑟𝑒𝑐𝑖𝑠𝑖𝑜𝑛</m:t>
+                        </m:r>
+                      </m:num>
+                      <m:den>
+                        <m:r>
+                          <a:rPr lang="en-US" b="0" i="1" smtClean="0">
+                            <a:latin typeface="Cambria Math" panose="02040503050406030204" pitchFamily="18" charset="0"/>
+                          </a:rPr>
+                          <m:t>𝑃𝑟𝑒𝑐𝑖𝑠𝑖𝑜𝑛</m:t>
+                        </m:r>
+                        <m:r>
+                          <a:rPr lang="en-US" b="0" i="1" smtClean="0">
+                            <a:latin typeface="Cambria Math" panose="02040503050406030204" pitchFamily="18" charset="0"/>
+                          </a:rPr>
+                          <m:t>+</m:t>
+                        </m:r>
+                        <m:r>
+                          <a:rPr lang="en-US" b="0" i="1" smtClean="0">
+                            <a:latin typeface="Cambria Math" panose="02040503050406030204" pitchFamily="18" charset="0"/>
+                          </a:rPr>
+                          <m:t>𝑅𝑒𝑐𝑎𝑙𝑙</m:t>
+                        </m:r>
+                      </m:den>
+                    </m:f>
+                  </m:oMath>
+                </a14:m>
+                <a:endParaRPr lang="en-US" dirty="0"/>
+              </a:p>
+              <a:p>
+                <a:r>
+                  <a:rPr lang="en-US" dirty="0"/>
+                  <a:t>Precision: Words found in transcript that were actually spoken by the correct speaker</a:t>
+                </a:r>
+              </a:p>
+              <a:p>
+                <a:r>
+                  <a:rPr lang="en-US" dirty="0"/>
+                  <a:t>Recall: Words </a:t>
+                </a:r>
+              </a:p>
+              <a:p>
+                <a:endParaRPr lang="en-US" dirty="0"/>
+              </a:p>
+            </p:txBody>
+          </p:sp>
+        </mc:Choice>
+        <mc:Fallback>
+          <p:sp>
+            <p:nvSpPr>
+              <p:cNvPr id="29" name="Text Placeholder 28"/>
+              <p:cNvSpPr>
+                <a:spLocks noGrp="1" noRot="1" noChangeAspect="1" noMove="1" noResize="1" noEditPoints="1" noAdjustHandles="1" noChangeArrowheads="1" noChangeShapeType="1" noTextEdit="1"/>
+              </p:cNvSpPr>
+              <p:nvPr>
+                <p:ph type="body" sz="quarter" idx="23"/>
+              </p:nvPr>
+            </p:nvSpPr>
+            <p:spPr>
+              <a:xfrm>
+                <a:off x="17689252" y="6420045"/>
+                <a:ext cx="15833456" cy="3261800"/>
+              </a:xfrm>
+              <a:blipFill>
+                <a:blip r:embed="rId3"/>
+                <a:stretch>
+                  <a:fillRect/>
+                </a:stretch>
+              </a:blipFill>
+            </p:spPr>
+            <p:txBody>
+              <a:bodyPr/>
+              <a:lstStyle/>
+              <a:p>
+                <a:r>
+                  <a:rPr lang="en-US">
+                    <a:noFill/>
+                  </a:rPr>
+                  <a:t> </a:t>
+                </a:r>
+              </a:p>
+            </p:txBody>
+          </p:sp>
+        </mc:Fallback>
+      </mc:AlternateContent>
       <p:sp>
         <p:nvSpPr>
           <p:cNvPr id="30" name="Text Placeholder 29"/>
@@ -15301,7 +17456,7 @@
           <a:lstStyle/>
           <a:p>
             <a:r>
-              <a:rPr lang="en-US" dirty="0" smtClean="0"/>
+              <a:rPr lang="en-US" dirty="0"/>
               <a:t>After all the work we have done, we can see that transcription is a very hard task to accomplish perfectly well. Noisy recordings contributed to worse performance on some recordings, as well as certain limitations in the performance of Bing’s API (on both the speaker recognition and transcription front). </a:t>
             </a:r>
           </a:p>
@@ -15310,10 +17465,9 @@
           </a:p>
           <a:p>
             <a:r>
-              <a:rPr lang="en-US" dirty="0" smtClean="0"/>
+              <a:rPr lang="en-US" dirty="0"/>
               <a:t>In the end, however, we believe our tool could be a good start at creating a tool that could help journalists transcribe their interviews. It integrates some machine learning by utilizing the Bing API, as well as audio signal processing by constructing a self similarity matrix to determine how to segment the audio into individual speakers. Overall, we learned quite a bit!</a:t>
             </a:r>
-            <a:endParaRPr lang="en-US" dirty="0"/>
           </a:p>
         </p:txBody>
       </p:sp>
@@ -15338,10 +17492,9 @@
           <a:lstStyle/>
           <a:p>
             <a:r>
-              <a:rPr lang="en-US" dirty="0" smtClean="0"/>
+              <a:rPr lang="en-US" dirty="0"/>
               <a:t>References</a:t>
             </a:r>
-            <a:endParaRPr lang="en-US" dirty="0"/>
           </a:p>
         </p:txBody>
       </p:sp>
@@ -15367,31 +17520,19 @@
           <a:p>
             <a:r>
               <a:rPr lang="en-US" sz="1600" dirty="0"/>
-              <a:t> </a:t>
+              <a:t>     </a:t>
             </a:r>
             <a:r>
-              <a:rPr lang="en-US" sz="1600" dirty="0" smtClean="0"/>
-              <a:t>    </a:t>
-            </a:r>
-            <a:r>
-              <a:rPr lang="en-US" sz="1600" dirty="0" err="1" smtClean="0"/>
+              <a:rPr lang="en-US" sz="1600" dirty="0" err="1"/>
               <a:t>Bongjun</a:t>
             </a:r>
             <a:r>
-              <a:rPr lang="en-US" sz="1600" dirty="0" smtClean="0"/>
+              <a:rPr lang="en-US" sz="1600" dirty="0"/>
               <a:t> Kim and Bryan Pardo. 2017. I-SED: an Interactive Sound Event Detector. In </a:t>
             </a:r>
             <a:r>
-              <a:rPr lang="en-US" sz="1600" i="1" dirty="0" smtClean="0"/>
-              <a:t>ACM </a:t>
-            </a:r>
-            <a:r>
               <a:rPr lang="en-US" sz="1600" i="1" dirty="0"/>
-              <a:t>International Conference on Intelligent User </a:t>
-            </a:r>
-            <a:r>
-              <a:rPr lang="en-US" sz="1600" i="1" dirty="0" smtClean="0"/>
-              <a:t>Interfaces. </a:t>
+              <a:t>ACM International Conference on Intelligent User Interfaces. </a:t>
             </a:r>
             <a:r>
               <a:rPr lang="en-US" sz="1600" dirty="0"/>
@@ -15399,25 +17540,19 @@
             </a:r>
             <a:r>
               <a:rPr lang="en-US" sz="1600" dirty="0">
-                <a:hlinkClick r:id="rId3"/>
+                <a:hlinkClick r:id="rId4"/>
               </a:rPr>
-              <a:t>http://</a:t>
+              <a:t>http://music.cs.northwestern.edu/publications/Kim_Pardo_IUI2017.pdf</a:t>
             </a:r>
             <a:r>
-              <a:rPr lang="en-US" sz="1600" dirty="0" smtClean="0">
-                <a:hlinkClick r:id="rId3"/>
-              </a:rPr>
-              <a:t>music.cs.northwestern.edu/publications/Kim_Pardo_IUI2017.pdf</a:t>
-            </a:r>
-            <a:r>
-              <a:rPr lang="en-US" sz="1600" dirty="0" smtClean="0"/>
+              <a:rPr lang="en-US" sz="1600" dirty="0"/>
               <a:t>.</a:t>
             </a:r>
-            <a:endParaRPr lang="en-US" sz="1600" i="1" dirty="0" smtClean="0"/>
+            <a:endParaRPr lang="en-US" sz="1600" i="1" dirty="0"/>
           </a:p>
           <a:p>
             <a:r>
-              <a:rPr lang="en-US" sz="1600" dirty="0" smtClean="0"/>
+              <a:rPr lang="en-US" sz="1600" dirty="0"/>
               <a:t>     Steve Rubin, </a:t>
             </a:r>
             <a:r>
@@ -15429,11 +17564,11 @@
               <a:t> </a:t>
             </a:r>
             <a:r>
-              <a:rPr lang="en-US" sz="1600" dirty="0" err="1" smtClean="0"/>
+              <a:rPr lang="en-US" sz="1600" dirty="0" err="1"/>
               <a:t>Berthouzoz</a:t>
             </a:r>
             <a:r>
-              <a:rPr lang="en-US" sz="1600" dirty="0" smtClean="0"/>
+              <a:rPr lang="en-US" sz="1600" dirty="0"/>
               <a:t>, </a:t>
             </a:r>
             <a:r>
@@ -15442,19 +17577,7 @@
             </a:r>
             <a:r>
               <a:rPr lang="en-US" sz="1600" dirty="0"/>
-              <a:t> J. </a:t>
-            </a:r>
-            <a:r>
-              <a:rPr lang="en-US" sz="1600" dirty="0" smtClean="0"/>
-              <a:t>Mysore, </a:t>
-            </a:r>
-            <a:r>
-              <a:rPr lang="en-US" sz="1600" dirty="0"/>
-              <a:t>Wilmot </a:t>
-            </a:r>
-            <a:r>
-              <a:rPr lang="en-US" sz="1600" dirty="0" smtClean="0"/>
-              <a:t>Li, and </a:t>
+              <a:t> J. Mysore, Wilmot Li, and </a:t>
             </a:r>
             <a:r>
               <a:rPr lang="en-US" sz="1600" dirty="0" err="1"/>
@@ -15465,11 +17588,11 @@
               <a:t> </a:t>
             </a:r>
             <a:r>
-              <a:rPr lang="en-US" sz="1600" dirty="0" err="1" smtClean="0"/>
+              <a:rPr lang="en-US" sz="1600" dirty="0" err="1"/>
               <a:t>Agrawala</a:t>
             </a:r>
             <a:r>
-              <a:rPr lang="en-US" sz="1600" dirty="0" smtClean="0"/>
+              <a:rPr lang="en-US" sz="1600" dirty="0"/>
               <a:t>. 2013.  Content-Based Tools for Editing Audio Stories. In </a:t>
             </a:r>
             <a:r>
@@ -15477,76 +17600,52 @@
               <a:t>UIST 2013, October 2013. pp. </a:t>
             </a:r>
             <a:r>
-              <a:rPr lang="en-US" sz="1600" dirty="0" smtClean="0"/>
-              <a:t>113-122. Retrieved </a:t>
+              <a:rPr lang="en-US" sz="1600" dirty="0"/>
+              <a:t>113-122. Retrieved from </a:t>
+            </a:r>
+            <a:r>
+              <a:rPr lang="en-US" sz="1600" dirty="0">
+                <a:hlinkClick r:id="rId5"/>
+              </a:rPr>
+              <a:t>http://vis.berkeley.edu/papers/audiostories/audiostories.pdf</a:t>
             </a:r>
             <a:r>
               <a:rPr lang="en-US" sz="1600" dirty="0"/>
-              <a:t>from </a:t>
-            </a:r>
-            <a:r>
-              <a:rPr lang="en-US" sz="1600" dirty="0">
-                <a:hlinkClick r:id="rId4"/>
-              </a:rPr>
-              <a:t>http://</a:t>
-            </a:r>
-            <a:r>
-              <a:rPr lang="en-US" sz="1600" dirty="0" smtClean="0">
-                <a:hlinkClick r:id="rId4"/>
-              </a:rPr>
-              <a:t>vis.berkeley.edu/papers/audiostories/audiostories.pdf</a:t>
-            </a:r>
-            <a:r>
-              <a:rPr lang="en-US" sz="1600" dirty="0" smtClean="0"/>
               <a:t>.</a:t>
             </a:r>
           </a:p>
           <a:p>
             <a:r>
-              <a:rPr lang="en-US" sz="1600" i="1" dirty="0" smtClean="0"/>
+              <a:rPr lang="en-US" sz="1600" i="1" dirty="0"/>
               <a:t>     </a:t>
             </a:r>
             <a:r>
-              <a:rPr lang="en-US" sz="1600" dirty="0" smtClean="0"/>
-              <a:t>Waveforms on the interface were created </a:t>
-            </a:r>
-            <a:r>
               <a:rPr lang="en-US" sz="1600" dirty="0"/>
-              <a:t>with </a:t>
+              <a:t>Waveforms on the interface were created with </a:t>
             </a:r>
             <a:r>
               <a:rPr lang="en-US" sz="1600" dirty="0" err="1"/>
               <a:t>wavesurfer.js</a:t>
             </a:r>
             <a:r>
-              <a:rPr lang="en-US" sz="1600" dirty="0" smtClean="0"/>
+              <a:rPr lang="en-US" sz="1600" dirty="0"/>
               <a:t>. Retrieved from </a:t>
             </a:r>
             <a:r>
               <a:rPr lang="en-US" sz="1600" dirty="0">
-                <a:hlinkClick r:id="rId5"/>
+                <a:hlinkClick r:id="rId6"/>
               </a:rPr>
-              <a:t>https://wavesurfer-js.org</a:t>
+              <a:t>https://wavesurfer-js.org/</a:t>
             </a:r>
             <a:r>
-              <a:rPr lang="en-US" sz="1600" dirty="0" smtClean="0">
-                <a:hlinkClick r:id="rId5"/>
-              </a:rPr>
-              <a:t>/</a:t>
-            </a:r>
-            <a:r>
-              <a:rPr lang="en-US" sz="1600" dirty="0" smtClean="0"/>
+              <a:rPr lang="en-US" sz="1600" dirty="0"/>
               <a:t> </a:t>
             </a:r>
           </a:p>
           <a:p>
             <a:r>
               <a:rPr lang="en-US" sz="1600" i="1" dirty="0"/>
-              <a:t> </a:t>
-            </a:r>
-            <a:r>
-              <a:rPr lang="en-US" sz="1600" i="1" dirty="0" smtClean="0"/>
-              <a:t>    </a:t>
+              <a:t>     </a:t>
             </a:r>
             <a:r>
               <a:rPr lang="en-US" sz="1600" dirty="0" err="1"/>
@@ -15554,64 +17653,36 @@
             </a:r>
             <a:r>
               <a:rPr lang="en-US" sz="1600" dirty="0"/>
-              <a:t> </a:t>
+              <a:t> Giannakopoulos. 2015. </a:t>
             </a:r>
             <a:r>
-              <a:rPr lang="en-US" sz="1600" dirty="0" smtClean="0"/>
-              <a:t>Giannakopoulos. 2015. </a:t>
-            </a:r>
-            <a:r>
-              <a:rPr lang="en-US" sz="1600" dirty="0" err="1" smtClean="0"/>
+              <a:rPr lang="en-US" sz="1600" dirty="0" err="1"/>
               <a:t>pyAudioAnalysis</a:t>
             </a:r>
             <a:r>
               <a:rPr lang="en-US" sz="1600" dirty="0"/>
-              <a:t>: An Open-Source Python Library for Audio Signal Analysis. </a:t>
+              <a:t>: An Open-Source Python Library for Audio Signal Analysis. In </a:t>
             </a:r>
             <a:r>
-              <a:rPr lang="en-US" sz="1600" dirty="0" smtClean="0"/>
-              <a:t>In </a:t>
-            </a:r>
-            <a:r>
-              <a:rPr lang="en-US" sz="1600" i="1" dirty="0" err="1" smtClean="0"/>
+              <a:rPr lang="en-US" sz="1600" i="1" dirty="0" err="1"/>
               <a:t>PLoS</a:t>
             </a:r>
             <a:r>
-              <a:rPr lang="en-US" sz="1600" i="1" dirty="0" smtClean="0"/>
-              <a:t> </a:t>
+              <a:rPr lang="en-US" sz="1600" i="1" dirty="0"/>
+              <a:t> ONE 10(12). </a:t>
             </a:r>
             <a:r>
-              <a:rPr lang="en-US" sz="1600" i="1" dirty="0"/>
-              <a:t>ONE 10(12</a:t>
-            </a:r>
-            <a:r>
-              <a:rPr lang="en-US" sz="1600" i="1" dirty="0" smtClean="0"/>
-              <a:t>). </a:t>
-            </a:r>
-            <a:r>
-              <a:rPr lang="en-US" sz="1600" dirty="0" smtClean="0"/>
+              <a:rPr lang="en-US" sz="1600" dirty="0"/>
               <a:t> Retrieved from </a:t>
             </a:r>
             <a:r>
-              <a:rPr lang="en-US" sz="1600" dirty="0" smtClean="0">
-                <a:hlinkClick r:id="rId6"/>
+              <a:rPr lang="en-US" sz="1600" dirty="0">
+                <a:hlinkClick r:id="rId7"/>
               </a:rPr>
-              <a:t>http</a:t>
+              <a:t>http://journals.plos.org/plosone/article/file?id=10.1371/journal.pone.0144610&amp;type=printable</a:t>
             </a:r>
             <a:r>
-              <a:rPr lang="en-US" sz="1600" dirty="0">
-                <a:hlinkClick r:id="rId6"/>
-              </a:rPr>
-              <a:t>://</a:t>
-            </a:r>
-            <a:r>
-              <a:rPr lang="en-US" sz="1600" dirty="0" smtClean="0">
-                <a:hlinkClick r:id="rId6"/>
-              </a:rPr>
-              <a:t>journals.plos.org/plosone/article/file?id=10.1371/journal.pone.0144610&amp;type=printable</a:t>
-            </a:r>
-            <a:r>
-              <a:rPr lang="en-US" sz="1600" dirty="0" smtClean="0"/>
+              <a:rPr lang="en-US" sz="1600" dirty="0"/>
               <a:t>. </a:t>
             </a:r>
             <a:endParaRPr lang="en-US" sz="1600" i="1" dirty="0"/>
@@ -15637,7 +17708,7 @@
           <a:p>
             <a:r>
               <a:rPr lang="en-US" dirty="0">
-                <a:hlinkClick r:id="rId7"/>
+                <a:hlinkClick r:id="rId8"/>
               </a:rPr>
               <a:t>vincentbommier2018@u.northwestern.edu</a:t>
             </a:r>
@@ -15647,7 +17718,7 @@
             </a:r>
             <a:r>
               <a:rPr lang="en-US" dirty="0">
-                <a:hlinkClick r:id="rId8"/>
+                <a:hlinkClick r:id="rId9"/>
               </a:rPr>
               <a:t>jeremykaish2018@u.northwestern.edu</a:t>
             </a:r>
@@ -15657,7 +17728,7 @@
             </a:r>
             <a:r>
               <a:rPr lang="en-US" dirty="0">
-                <a:hlinkClick r:id="rId9"/>
+                <a:hlinkClick r:id="rId10"/>
               </a:rPr>
               <a:t>madhavghei2018@u.northwestern.edu</a:t>
             </a:r>
@@ -15852,7 +17923,7 @@
           <p:nvPr/>
         </p:nvPicPr>
         <p:blipFill>
-          <a:blip r:embed="rId10" cstate="print">
+          <a:blip r:embed="rId11" cstate="print">
             <a:extLst>
               <a:ext uri="{28A0092B-C50C-407E-A947-70E740481C1C}">
                 <a14:useLocalDpi xmlns:a14="http://schemas.microsoft.com/office/drawing/2010/main" val="0"/>
@@ -15882,7 +17953,7 @@
           <p:nvPr/>
         </p:nvPicPr>
         <p:blipFill>
-          <a:blip r:embed="rId11">
+          <a:blip r:embed="rId12">
             <a:extLst>
               <a:ext uri="{28A0092B-C50C-407E-A947-70E740481C1C}">
                 <a14:useLocalDpi xmlns:a14="http://schemas.microsoft.com/office/drawing/2010/main" val="0"/>
@@ -15912,7 +17983,7 @@
           <p:nvPr/>
         </p:nvPicPr>
         <p:blipFill>
-          <a:blip r:embed="rId12">
+          <a:blip r:embed="rId13">
             <a:extLst>
               <a:ext uri="{28A0092B-C50C-407E-A947-70E740481C1C}">
                 <a14:useLocalDpi xmlns:a14="http://schemas.microsoft.com/office/drawing/2010/main" val="0"/>
@@ -15991,7 +18062,7 @@
           <a:lstStyle/>
           <a:p>
             <a:r>
-              <a:rPr lang="en-US" sz="2800" smtClean="0">
+              <a:rPr lang="en-US" sz="2800">
                 <a:solidFill>
                   <a:schemeClr val="bg1"/>
                 </a:solidFill>
@@ -16035,7 +18106,7 @@
           <a:lstStyle/>
           <a:p>
             <a:r>
-              <a:rPr lang="en-US" sz="2800" smtClean="0">
+              <a:rPr lang="en-US" sz="2800">
                 <a:solidFill>
                   <a:schemeClr val="bg1"/>
                 </a:solidFill>
@@ -16090,14 +18161,7 @@
                 <a:latin typeface="Times New Roman" panose="02020603050405020304" pitchFamily="18" charset="0"/>
                 <a:cs typeface="Times New Roman" panose="02020603050405020304" pitchFamily="18" charset="0"/>
               </a:rPr>
-              <a:t>  a. </a:t>
-            </a:r>
-            <a:r>
-              <a:rPr lang="en-US" sz="2000" dirty="0" smtClean="0">
-                <a:latin typeface="Times New Roman" panose="02020603050405020304" pitchFamily="18" charset="0"/>
-                <a:cs typeface="Times New Roman" panose="02020603050405020304" pitchFamily="18" charset="0"/>
-              </a:rPr>
-              <a:t>Home screen</a:t>
+              <a:t>  a. Home screen</a:t>
             </a:r>
           </a:p>
           <a:p>
@@ -16106,19 +18170,8 @@
                 <a:latin typeface="Times New Roman" panose="02020603050405020304" pitchFamily="18" charset="0"/>
                 <a:cs typeface="Times New Roman" panose="02020603050405020304" pitchFamily="18" charset="0"/>
               </a:rPr>
-              <a:t> </a:t>
+              <a:t>  b. User uploads .wav file (system will reject if not wav format)</a:t>
             </a:r>
-            <a:r>
-              <a:rPr lang="en-US" sz="2000" dirty="0" smtClean="0">
-                <a:latin typeface="Times New Roman" panose="02020603050405020304" pitchFamily="18" charset="0"/>
-                <a:cs typeface="Times New Roman" panose="02020603050405020304" pitchFamily="18" charset="0"/>
-              </a:rPr>
-              <a:t> b. User uploads .wav file (system will reject if not wav format)</a:t>
-            </a:r>
-            <a:endParaRPr lang="en-US" sz="2000" dirty="0">
-              <a:latin typeface="Times New Roman" panose="02020603050405020304" pitchFamily="18" charset="0"/>
-              <a:cs typeface="Times New Roman" panose="02020603050405020304" pitchFamily="18" charset="0"/>
-            </a:endParaRPr>
           </a:p>
           <a:p>
             <a:endParaRPr lang="en-US" sz="2000" dirty="0">
@@ -16141,33 +18194,8 @@
                 <a:latin typeface="Times New Roman" panose="02020603050405020304" pitchFamily="18" charset="0"/>
                 <a:cs typeface="Times New Roman" panose="02020603050405020304" pitchFamily="18" charset="0"/>
               </a:rPr>
-              <a:t>  a. User selects portions of audio </a:t>
+              <a:t>  a. User selects portions of audio in which only one speaker is talking</a:t>
             </a:r>
-            <a:r>
-              <a:rPr lang="en-US" sz="2000" dirty="0" smtClean="0">
-                <a:latin typeface="Times New Roman" panose="02020603050405020304" pitchFamily="18" charset="0"/>
-                <a:cs typeface="Times New Roman" panose="02020603050405020304" pitchFamily="18" charset="0"/>
-              </a:rPr>
-              <a:t>in which only </a:t>
-            </a:r>
-            <a:r>
-              <a:rPr lang="en-US" sz="2000" dirty="0">
-                <a:latin typeface="Times New Roman" panose="02020603050405020304" pitchFamily="18" charset="0"/>
-                <a:cs typeface="Times New Roman" panose="02020603050405020304" pitchFamily="18" charset="0"/>
-              </a:rPr>
-              <a:t>one speaker is </a:t>
-            </a:r>
-            <a:r>
-              <a:rPr lang="en-US" sz="2000" dirty="0" smtClean="0">
-                <a:latin typeface="Times New Roman" panose="02020603050405020304" pitchFamily="18" charset="0"/>
-                <a:cs typeface="Times New Roman" panose="02020603050405020304" pitchFamily="18" charset="0"/>
-              </a:rPr>
-              <a:t>talking</a:t>
-            </a:r>
-            <a:endParaRPr lang="en-US" sz="2000" dirty="0">
-              <a:latin typeface="Times New Roman" panose="02020603050405020304" pitchFamily="18" charset="0"/>
-              <a:cs typeface="Times New Roman" panose="02020603050405020304" pitchFamily="18" charset="0"/>
-            </a:endParaRPr>
           </a:p>
           <a:p>
             <a:r>
@@ -16175,19 +18203,8 @@
                 <a:latin typeface="Times New Roman" panose="02020603050405020304" pitchFamily="18" charset="0"/>
                 <a:cs typeface="Times New Roman" panose="02020603050405020304" pitchFamily="18" charset="0"/>
               </a:rPr>
-              <a:t>  b. User assigns a name to the speaker of the current </a:t>
+              <a:t>  b. User assigns a name to the speaker of the current selection and enrolls the speaker (training the speaker recognition API)</a:t>
             </a:r>
-            <a:r>
-              <a:rPr lang="en-US" sz="2000" dirty="0" smtClean="0">
-                <a:latin typeface="Times New Roman" panose="02020603050405020304" pitchFamily="18" charset="0"/>
-                <a:cs typeface="Times New Roman" panose="02020603050405020304" pitchFamily="18" charset="0"/>
-              </a:rPr>
-              <a:t>selection and enrolls the speaker (training the speaker recognition API)</a:t>
-            </a:r>
-            <a:endParaRPr lang="en-US" sz="2000" dirty="0">
-              <a:latin typeface="Times New Roman" panose="02020603050405020304" pitchFamily="18" charset="0"/>
-              <a:cs typeface="Times New Roman" panose="02020603050405020304" pitchFamily="18" charset="0"/>
-            </a:endParaRPr>
           </a:p>
           <a:p>
             <a:r>
@@ -16255,7 +18272,7 @@
           <a:lstStyle/>
           <a:p>
             <a:r>
-              <a:rPr lang="en-US" sz="2800" smtClean="0">
+              <a:rPr lang="en-US" sz="2800">
                 <a:solidFill>
                   <a:schemeClr val="bg1"/>
                 </a:solidFill>
@@ -16274,473 +18291,488 @@
           </a:p>
         </p:txBody>
       </p:sp>
-      <p:pic>
-        <p:nvPicPr>
-          <p:cNvPr id="7" name="Picture 6"/>
-          <p:cNvPicPr>
-            <a:picLocks noChangeAspect="1"/>
-          </p:cNvPicPr>
+      <p:grpSp>
+        <p:nvGrpSpPr>
+          <p:cNvPr id="6" name="Group 5"/>
+          <p:cNvGrpSpPr/>
           <p:nvPr/>
-        </p:nvPicPr>
-        <p:blipFill>
-          <a:blip r:embed="rId13">
-            <a:extLst>
-              <a:ext uri="{BEBA8EAE-BF5A-486C-A8C5-ECC9F3942E4B}">
-                <a14:imgProps xmlns:a14="http://schemas.microsoft.com/office/drawing/2010/main">
-                  <a14:imgLayer r:embed="rId14">
-                    <a14:imgEffect>
-                      <a14:brightnessContrast bright="20000" contrast="20000"/>
-                    </a14:imgEffect>
-                  </a14:imgLayer>
-                </a14:imgProps>
-              </a:ext>
-              <a:ext uri="{28A0092B-C50C-407E-A947-70E740481C1C}">
-                <a14:useLocalDpi xmlns:a14="http://schemas.microsoft.com/office/drawing/2010/main" val="0"/>
-              </a:ext>
-            </a:extLst>
-          </a:blip>
-          <a:stretch>
-            <a:fillRect/>
-          </a:stretch>
-        </p:blipFill>
-        <p:spPr>
+        </p:nvGrpSpPr>
+        <p:grpSpPr>
           <a:xfrm>
-            <a:off x="1054885" y="25031771"/>
-            <a:ext cx="7517026" cy="7311337"/>
+            <a:off x="2563829" y="25031771"/>
+            <a:ext cx="12838601" cy="7311337"/>
+            <a:chOff x="1109538" y="25108766"/>
+            <a:chExt cx="12838601" cy="7311337"/>
           </a:xfrm>
-          <a:prstGeom prst="rect">
-            <a:avLst/>
-          </a:prstGeom>
-        </p:spPr>
-      </p:pic>
-      <p:sp>
-        <p:nvSpPr>
-          <p:cNvPr id="8" name="Oval 7"/>
-          <p:cNvSpPr/>
-          <p:nvPr/>
-        </p:nvSpPr>
-        <p:spPr>
-          <a:xfrm>
-            <a:off x="3886200" y="27241500"/>
-            <a:ext cx="4685711" cy="509923"/>
-          </a:xfrm>
-          <a:prstGeom prst="ellipse">
-            <a:avLst/>
-          </a:prstGeom>
-          <a:noFill/>
-          <a:ln w="76200">
-            <a:solidFill>
-              <a:srgbClr val="FF0000"/>
-            </a:solidFill>
-          </a:ln>
-        </p:spPr>
-        <p:style>
-          <a:lnRef idx="2">
-            <a:schemeClr val="accent1">
-              <a:shade val="50000"/>
-            </a:schemeClr>
-          </a:lnRef>
-          <a:fillRef idx="1">
-            <a:schemeClr val="accent1"/>
-          </a:fillRef>
-          <a:effectRef idx="0">
-            <a:schemeClr val="accent1"/>
-          </a:effectRef>
-          <a:fontRef idx="minor">
-            <a:schemeClr val="lt1"/>
-          </a:fontRef>
-        </p:style>
-        <p:txBody>
-          <a:bodyPr rtlCol="0" anchor="ctr"/>
-          <a:lstStyle/>
-          <a:p>
-            <a:pPr algn="ctr"/>
-            <a:endParaRPr lang="en-US"/>
-          </a:p>
-        </p:txBody>
-      </p:sp>
-      <p:cxnSp>
-        <p:nvCxnSpPr>
-          <p:cNvPr id="12" name="Straight Arrow Connector 11"/>
-          <p:cNvCxnSpPr/>
-          <p:nvPr/>
-        </p:nvCxnSpPr>
-        <p:spPr>
-          <a:xfrm>
-            <a:off x="2420452" y="25850599"/>
-            <a:ext cx="1855183" cy="1843278"/>
-          </a:xfrm>
-          <a:prstGeom prst="straightConnector1">
-            <a:avLst/>
-          </a:prstGeom>
-          <a:ln w="76200">
-            <a:solidFill>
-              <a:srgbClr val="FFFF00"/>
-            </a:solidFill>
-            <a:headEnd type="triangle"/>
-            <a:tailEnd type="triangle"/>
-          </a:ln>
-        </p:spPr>
-        <p:style>
-          <a:lnRef idx="1">
-            <a:schemeClr val="accent1"/>
-          </a:lnRef>
-          <a:fillRef idx="0">
-            <a:schemeClr val="accent1"/>
-          </a:fillRef>
-          <a:effectRef idx="0">
-            <a:schemeClr val="accent1"/>
-          </a:effectRef>
-          <a:fontRef idx="minor">
-            <a:schemeClr val="tx1"/>
-          </a:fontRef>
-        </p:style>
-      </p:cxnSp>
-      <p:cxnSp>
-        <p:nvCxnSpPr>
-          <p:cNvPr id="55" name="Straight Arrow Connector 54"/>
-          <p:cNvCxnSpPr/>
-          <p:nvPr/>
-        </p:nvCxnSpPr>
-        <p:spPr>
-          <a:xfrm>
-            <a:off x="4379320" y="27822404"/>
-            <a:ext cx="3654325" cy="3630875"/>
-          </a:xfrm>
-          <a:prstGeom prst="straightConnector1">
-            <a:avLst/>
-          </a:prstGeom>
-          <a:ln w="76200">
-            <a:solidFill>
-              <a:srgbClr val="FFFF00"/>
-            </a:solidFill>
-            <a:headEnd type="triangle"/>
-            <a:tailEnd type="triangle"/>
-          </a:ln>
-        </p:spPr>
-        <p:style>
-          <a:lnRef idx="1">
-            <a:schemeClr val="accent1"/>
-          </a:lnRef>
-          <a:fillRef idx="0">
-            <a:schemeClr val="accent1"/>
-          </a:fillRef>
-          <a:effectRef idx="0">
-            <a:schemeClr val="accent1"/>
-          </a:effectRef>
-          <a:fontRef idx="minor">
-            <a:schemeClr val="tx1"/>
-          </a:fontRef>
-        </p:style>
-      </p:cxnSp>
-      <p:cxnSp>
-        <p:nvCxnSpPr>
-          <p:cNvPr id="24" name="Straight Arrow Connector 23"/>
-          <p:cNvCxnSpPr>
-            <a:stCxn id="8" idx="6"/>
-          </p:cNvCxnSpPr>
-          <p:nvPr/>
-        </p:nvCxnSpPr>
-        <p:spPr>
-          <a:xfrm flipV="1">
-            <a:off x="8571911" y="26289000"/>
-            <a:ext cx="745586" cy="1207462"/>
-          </a:xfrm>
-          <a:prstGeom prst="straightConnector1">
-            <a:avLst/>
-          </a:prstGeom>
-          <a:ln w="76200">
-            <a:solidFill>
-              <a:srgbClr val="FF0000"/>
-            </a:solidFill>
-            <a:tailEnd type="triangle"/>
-          </a:ln>
-        </p:spPr>
-        <p:style>
-          <a:lnRef idx="1">
-            <a:schemeClr val="accent1"/>
-          </a:lnRef>
-          <a:fillRef idx="0">
-            <a:schemeClr val="accent1"/>
-          </a:fillRef>
-          <a:effectRef idx="0">
-            <a:schemeClr val="accent1"/>
-          </a:effectRef>
-          <a:fontRef idx="minor">
-            <a:schemeClr val="tx1"/>
-          </a:fontRef>
-        </p:style>
-      </p:cxnSp>
-      <p:sp>
-        <p:nvSpPr>
-          <p:cNvPr id="234" name="TextBox 233"/>
-          <p:cNvSpPr txBox="1"/>
-          <p:nvPr/>
-        </p:nvSpPr>
-        <p:spPr>
-          <a:xfrm>
-            <a:off x="9317497" y="25850598"/>
-            <a:ext cx="4296276" cy="724151"/>
-          </a:xfrm>
-          <a:prstGeom prst="rect">
-            <a:avLst/>
-          </a:prstGeom>
-          <a:noFill/>
-        </p:spPr>
-        <p:txBody>
-          <a:bodyPr wrap="square" rtlCol="0">
-            <a:spAutoFit/>
-          </a:bodyPr>
-          <a:lstStyle/>
-          <a:p>
-            <a:r>
-              <a:rPr lang="en-US" sz="4000" dirty="0">
-                <a:solidFill>
-                  <a:schemeClr val="accent5">
-                    <a:lumMod val="50000"/>
-                  </a:schemeClr>
-                </a:solidFill>
-                <a:latin typeface="Times New Roman" panose="02020603050405020304" pitchFamily="18" charset="0"/>
-                <a:cs typeface="Times New Roman" panose="02020603050405020304" pitchFamily="18" charset="0"/>
-              </a:rPr>
-              <a:t>Change</a:t>
-            </a:r>
-            <a:r>
-              <a:rPr lang="en-US" sz="4000" dirty="0">
-                <a:latin typeface="Times New Roman" panose="02020603050405020304" pitchFamily="18" charset="0"/>
-                <a:cs typeface="Times New Roman" panose="02020603050405020304" pitchFamily="18" charset="0"/>
-              </a:rPr>
-              <a:t> </a:t>
-            </a:r>
-            <a:r>
-              <a:rPr lang="en-US" sz="4000" dirty="0">
-                <a:solidFill>
-                  <a:schemeClr val="accent5">
-                    <a:lumMod val="50000"/>
-                  </a:schemeClr>
-                </a:solidFill>
-                <a:latin typeface="Times New Roman" panose="02020603050405020304" pitchFamily="18" charset="0"/>
-                <a:cs typeface="Times New Roman" panose="02020603050405020304" pitchFamily="18" charset="0"/>
-              </a:rPr>
-              <a:t>in speakers</a:t>
-            </a:r>
-          </a:p>
-        </p:txBody>
-      </p:sp>
-      <p:cxnSp>
-        <p:nvCxnSpPr>
-          <p:cNvPr id="62" name="Straight Arrow Connector 61"/>
-          <p:cNvCxnSpPr/>
-          <p:nvPr/>
-        </p:nvCxnSpPr>
-        <p:spPr>
-          <a:xfrm>
-            <a:off x="6206482" y="29534566"/>
-            <a:ext cx="2608748" cy="357251"/>
-          </a:xfrm>
-          <a:prstGeom prst="straightConnector1">
-            <a:avLst/>
-          </a:prstGeom>
-          <a:ln w="76200">
-            <a:solidFill>
-              <a:srgbClr val="FFFF00"/>
-            </a:solidFill>
-            <a:prstDash val="lgDashDot"/>
-            <a:tailEnd type="triangle"/>
-          </a:ln>
-        </p:spPr>
-        <p:style>
-          <a:lnRef idx="1">
-            <a:schemeClr val="accent1"/>
-          </a:lnRef>
-          <a:fillRef idx="0">
-            <a:schemeClr val="accent1"/>
-          </a:fillRef>
-          <a:effectRef idx="0">
-            <a:schemeClr val="accent1"/>
-          </a:effectRef>
-          <a:fontRef idx="minor">
-            <a:schemeClr val="tx1"/>
-          </a:fontRef>
-        </p:style>
-      </p:cxnSp>
-      <p:sp>
-        <p:nvSpPr>
-          <p:cNvPr id="66" name="TextBox 65"/>
-          <p:cNvSpPr txBox="1"/>
-          <p:nvPr/>
-        </p:nvSpPr>
-        <p:spPr>
-          <a:xfrm>
-            <a:off x="8983130" y="29523474"/>
-            <a:ext cx="4855703" cy="707886"/>
-          </a:xfrm>
-          <a:prstGeom prst="rect">
-            <a:avLst/>
-          </a:prstGeom>
-          <a:noFill/>
-        </p:spPr>
-        <p:txBody>
-          <a:bodyPr wrap="square" rtlCol="0">
-            <a:spAutoFit/>
-          </a:bodyPr>
-          <a:lstStyle/>
-          <a:p>
-            <a:r>
-              <a:rPr lang="en-US" sz="4000" dirty="0">
-                <a:solidFill>
-                  <a:schemeClr val="accent5">
-                    <a:lumMod val="50000"/>
-                  </a:schemeClr>
-                </a:solidFill>
-                <a:latin typeface="Times New Roman" panose="02020603050405020304" pitchFamily="18" charset="0"/>
-                <a:cs typeface="Times New Roman" panose="02020603050405020304" pitchFamily="18" charset="0"/>
-              </a:rPr>
-              <a:t>Speaker #2’s dialogue</a:t>
-            </a:r>
-          </a:p>
-        </p:txBody>
-      </p:sp>
-      <p:sp>
-        <p:nvSpPr>
-          <p:cNvPr id="240" name="Freeform: Shape 239"/>
-          <p:cNvSpPr/>
-          <p:nvPr/>
-        </p:nvSpPr>
-        <p:spPr>
-          <a:xfrm>
-            <a:off x="3140323" y="26708100"/>
-            <a:ext cx="5832228" cy="2152711"/>
-          </a:xfrm>
-          <a:custGeom>
-            <a:avLst/>
-            <a:gdLst>
-              <a:gd name="connsiteX0" fmla="*/ 343085 w 6096185"/>
-              <a:gd name="connsiteY0" fmla="*/ 0 h 2412099"/>
-              <a:gd name="connsiteX1" fmla="*/ 628835 w 6096185"/>
-              <a:gd name="connsiteY1" fmla="*/ 2305050 h 2412099"/>
-              <a:gd name="connsiteX2" fmla="*/ 6096185 w 6096185"/>
-              <a:gd name="connsiteY2" fmla="*/ 2057400 h 2412099"/>
-              <a:gd name="connsiteX3" fmla="*/ 6096185 w 6096185"/>
-              <a:gd name="connsiteY3" fmla="*/ 2057400 h 2412099"/>
-              <a:gd name="connsiteX0" fmla="*/ 79128 w 5832228"/>
-              <a:gd name="connsiteY0" fmla="*/ 0 h 2152711"/>
-              <a:gd name="connsiteX1" fmla="*/ 1488828 w 5832228"/>
-              <a:gd name="connsiteY1" fmla="*/ 1981200 h 2152711"/>
-              <a:gd name="connsiteX2" fmla="*/ 5832228 w 5832228"/>
-              <a:gd name="connsiteY2" fmla="*/ 2057400 h 2152711"/>
-              <a:gd name="connsiteX3" fmla="*/ 5832228 w 5832228"/>
-              <a:gd name="connsiteY3" fmla="*/ 2057400 h 2152711"/>
-            </a:gdLst>
-            <a:ahLst/>
-            <a:cxnLst>
-              <a:cxn ang="0">
-                <a:pos x="connsiteX0" y="connsiteY0"/>
-              </a:cxn>
-              <a:cxn ang="0">
-                <a:pos x="connsiteX1" y="connsiteY1"/>
-              </a:cxn>
-              <a:cxn ang="0">
-                <a:pos x="connsiteX2" y="connsiteY2"/>
-              </a:cxn>
-              <a:cxn ang="0">
-                <a:pos x="connsiteX3" y="connsiteY3"/>
-              </a:cxn>
-            </a:cxnLst>
-            <a:rect l="l" t="t" r="r" b="b"/>
-            <a:pathLst>
-              <a:path w="5832228" h="2152711">
-                <a:moveTo>
-                  <a:pt x="79128" y="0"/>
-                </a:moveTo>
-                <a:cubicBezTo>
-                  <a:pt x="-257422" y="981075"/>
-                  <a:pt x="529978" y="1638300"/>
-                  <a:pt x="1488828" y="1981200"/>
-                </a:cubicBezTo>
-                <a:cubicBezTo>
-                  <a:pt x="2447678" y="2324100"/>
-                  <a:pt x="5108328" y="2044700"/>
-                  <a:pt x="5832228" y="2057400"/>
-                </a:cubicBezTo>
-                <a:lnTo>
-                  <a:pt x="5832228" y="2057400"/>
-                </a:lnTo>
-              </a:path>
-            </a:pathLst>
-          </a:custGeom>
-          <a:noFill/>
-          <a:ln w="76200">
-            <a:solidFill>
-              <a:srgbClr val="FFFF00"/>
-            </a:solidFill>
-            <a:prstDash val="lgDashDot"/>
-            <a:headEnd type="none" w="med" len="med"/>
-            <a:tailEnd type="triangle" w="med" len="med"/>
-          </a:ln>
-        </p:spPr>
-        <p:style>
-          <a:lnRef idx="2">
-            <a:schemeClr val="accent1">
-              <a:shade val="50000"/>
-            </a:schemeClr>
-          </a:lnRef>
-          <a:fillRef idx="1">
-            <a:schemeClr val="accent1"/>
-          </a:fillRef>
-          <a:effectRef idx="0">
-            <a:schemeClr val="accent1"/>
-          </a:effectRef>
-          <a:fontRef idx="minor">
-            <a:schemeClr val="lt1"/>
-          </a:fontRef>
-        </p:style>
-        <p:txBody>
-          <a:bodyPr rtlCol="0" anchor="ctr"/>
-          <a:lstStyle/>
-          <a:p>
-            <a:pPr algn="ctr"/>
-            <a:endParaRPr lang="en-US" dirty="0"/>
-          </a:p>
-        </p:txBody>
-      </p:sp>
-      <p:sp>
-        <p:nvSpPr>
-          <p:cNvPr id="70" name="TextBox 69"/>
-          <p:cNvSpPr txBox="1"/>
-          <p:nvPr/>
-        </p:nvSpPr>
-        <p:spPr>
-          <a:xfrm>
-            <a:off x="9037783" y="28408238"/>
-            <a:ext cx="4855703" cy="707886"/>
-          </a:xfrm>
-          <a:prstGeom prst="rect">
-            <a:avLst/>
-          </a:prstGeom>
-          <a:noFill/>
-        </p:spPr>
-        <p:txBody>
-          <a:bodyPr wrap="square" rtlCol="0">
-            <a:spAutoFit/>
-          </a:bodyPr>
-          <a:lstStyle/>
-          <a:p>
-            <a:r>
-              <a:rPr lang="en-US" sz="4000" dirty="0">
-                <a:solidFill>
-                  <a:schemeClr val="accent5">
-                    <a:lumMod val="50000"/>
-                  </a:schemeClr>
-                </a:solidFill>
-                <a:latin typeface="Times New Roman" panose="02020603050405020304" pitchFamily="18" charset="0"/>
-                <a:cs typeface="Times New Roman" panose="02020603050405020304" pitchFamily="18" charset="0"/>
-              </a:rPr>
-              <a:t>Speaker #1’s dialogue</a:t>
-            </a:r>
-          </a:p>
-        </p:txBody>
-      </p:sp>
+        </p:grpSpPr>
+        <p:pic>
+          <p:nvPicPr>
+            <p:cNvPr id="7" name="Picture 6"/>
+            <p:cNvPicPr>
+              <a:picLocks noChangeAspect="1"/>
+            </p:cNvPicPr>
+            <p:nvPr/>
+          </p:nvPicPr>
+          <p:blipFill>
+            <a:blip r:embed="rId14">
+              <a:extLst>
+                <a:ext uri="{BEBA8EAE-BF5A-486C-A8C5-ECC9F3942E4B}">
+                  <a14:imgProps xmlns:a14="http://schemas.microsoft.com/office/drawing/2010/main">
+                    <a14:imgLayer r:embed="rId15">
+                      <a14:imgEffect>
+                        <a14:brightnessContrast bright="20000" contrast="20000"/>
+                      </a14:imgEffect>
+                    </a14:imgLayer>
+                  </a14:imgProps>
+                </a:ext>
+                <a:ext uri="{28A0092B-C50C-407E-A947-70E740481C1C}">
+                  <a14:useLocalDpi xmlns:a14="http://schemas.microsoft.com/office/drawing/2010/main" val="0"/>
+                </a:ext>
+              </a:extLst>
+            </a:blip>
+            <a:stretch>
+              <a:fillRect/>
+            </a:stretch>
+          </p:blipFill>
+          <p:spPr>
+            <a:xfrm>
+              <a:off x="1109538" y="25108766"/>
+              <a:ext cx="7517026" cy="7311337"/>
+            </a:xfrm>
+            <a:prstGeom prst="rect">
+              <a:avLst/>
+            </a:prstGeom>
+          </p:spPr>
+        </p:pic>
+        <p:sp>
+          <p:nvSpPr>
+            <p:cNvPr id="8" name="Oval 7"/>
+            <p:cNvSpPr/>
+            <p:nvPr/>
+          </p:nvSpPr>
+          <p:spPr>
+            <a:xfrm>
+              <a:off x="3940853" y="27318495"/>
+              <a:ext cx="4685711" cy="509923"/>
+            </a:xfrm>
+            <a:prstGeom prst="ellipse">
+              <a:avLst/>
+            </a:prstGeom>
+            <a:noFill/>
+            <a:ln w="76200">
+              <a:solidFill>
+                <a:srgbClr val="FF0000"/>
+              </a:solidFill>
+            </a:ln>
+          </p:spPr>
+          <p:style>
+            <a:lnRef idx="2">
+              <a:schemeClr val="accent1">
+                <a:shade val="50000"/>
+              </a:schemeClr>
+            </a:lnRef>
+            <a:fillRef idx="1">
+              <a:schemeClr val="accent1"/>
+            </a:fillRef>
+            <a:effectRef idx="0">
+              <a:schemeClr val="accent1"/>
+            </a:effectRef>
+            <a:fontRef idx="minor">
+              <a:schemeClr val="lt1"/>
+            </a:fontRef>
+          </p:style>
+          <p:txBody>
+            <a:bodyPr rtlCol="0" anchor="ctr"/>
+            <a:lstStyle/>
+            <a:p>
+              <a:pPr algn="ctr"/>
+              <a:endParaRPr lang="en-US"/>
+            </a:p>
+          </p:txBody>
+        </p:sp>
+        <p:cxnSp>
+          <p:nvCxnSpPr>
+            <p:cNvPr id="12" name="Straight Arrow Connector 11"/>
+            <p:cNvCxnSpPr/>
+            <p:nvPr/>
+          </p:nvCxnSpPr>
+          <p:spPr>
+            <a:xfrm>
+              <a:off x="2475105" y="25927594"/>
+              <a:ext cx="1855183" cy="1843278"/>
+            </a:xfrm>
+            <a:prstGeom prst="straightConnector1">
+              <a:avLst/>
+            </a:prstGeom>
+            <a:ln w="76200">
+              <a:solidFill>
+                <a:srgbClr val="FFFF00"/>
+              </a:solidFill>
+              <a:headEnd type="triangle"/>
+              <a:tailEnd type="triangle"/>
+            </a:ln>
+          </p:spPr>
+          <p:style>
+            <a:lnRef idx="1">
+              <a:schemeClr val="accent1"/>
+            </a:lnRef>
+            <a:fillRef idx="0">
+              <a:schemeClr val="accent1"/>
+            </a:fillRef>
+            <a:effectRef idx="0">
+              <a:schemeClr val="accent1"/>
+            </a:effectRef>
+            <a:fontRef idx="minor">
+              <a:schemeClr val="tx1"/>
+            </a:fontRef>
+          </p:style>
+        </p:cxnSp>
+        <p:cxnSp>
+          <p:nvCxnSpPr>
+            <p:cNvPr id="55" name="Straight Arrow Connector 54"/>
+            <p:cNvCxnSpPr/>
+            <p:nvPr/>
+          </p:nvCxnSpPr>
+          <p:spPr>
+            <a:xfrm>
+              <a:off x="4433973" y="27899399"/>
+              <a:ext cx="3654325" cy="3630875"/>
+            </a:xfrm>
+            <a:prstGeom prst="straightConnector1">
+              <a:avLst/>
+            </a:prstGeom>
+            <a:ln w="76200">
+              <a:solidFill>
+                <a:srgbClr val="FFFF00"/>
+              </a:solidFill>
+              <a:headEnd type="triangle"/>
+              <a:tailEnd type="triangle"/>
+            </a:ln>
+          </p:spPr>
+          <p:style>
+            <a:lnRef idx="1">
+              <a:schemeClr val="accent1"/>
+            </a:lnRef>
+            <a:fillRef idx="0">
+              <a:schemeClr val="accent1"/>
+            </a:fillRef>
+            <a:effectRef idx="0">
+              <a:schemeClr val="accent1"/>
+            </a:effectRef>
+            <a:fontRef idx="minor">
+              <a:schemeClr val="tx1"/>
+            </a:fontRef>
+          </p:style>
+        </p:cxnSp>
+        <p:cxnSp>
+          <p:nvCxnSpPr>
+            <p:cNvPr id="24" name="Straight Arrow Connector 23"/>
+            <p:cNvCxnSpPr>
+              <a:stCxn id="8" idx="6"/>
+            </p:cNvCxnSpPr>
+            <p:nvPr/>
+          </p:nvCxnSpPr>
+          <p:spPr>
+            <a:xfrm flipV="1">
+              <a:off x="8626564" y="27368400"/>
+              <a:ext cx="778650" cy="205057"/>
+            </a:xfrm>
+            <a:prstGeom prst="straightConnector1">
+              <a:avLst/>
+            </a:prstGeom>
+            <a:ln w="76200">
+              <a:solidFill>
+                <a:srgbClr val="FF0000"/>
+              </a:solidFill>
+              <a:tailEnd type="triangle"/>
+            </a:ln>
+          </p:spPr>
+          <p:style>
+            <a:lnRef idx="1">
+              <a:schemeClr val="accent1"/>
+            </a:lnRef>
+            <a:fillRef idx="0">
+              <a:schemeClr val="accent1"/>
+            </a:fillRef>
+            <a:effectRef idx="0">
+              <a:schemeClr val="accent1"/>
+            </a:effectRef>
+            <a:fontRef idx="minor">
+              <a:schemeClr val="tx1"/>
+            </a:fontRef>
+          </p:style>
+        </p:cxnSp>
+        <p:sp>
+          <p:nvSpPr>
+            <p:cNvPr id="234" name="TextBox 233"/>
+            <p:cNvSpPr txBox="1"/>
+            <p:nvPr/>
+          </p:nvSpPr>
+          <p:spPr>
+            <a:xfrm>
+              <a:off x="9629068" y="26969726"/>
+              <a:ext cx="4296276" cy="724151"/>
+            </a:xfrm>
+            <a:prstGeom prst="rect">
+              <a:avLst/>
+            </a:prstGeom>
+            <a:noFill/>
+          </p:spPr>
+          <p:txBody>
+            <a:bodyPr wrap="square" rtlCol="0">
+              <a:spAutoFit/>
+            </a:bodyPr>
+            <a:lstStyle/>
+            <a:p>
+              <a:r>
+                <a:rPr lang="en-US" sz="4000" dirty="0">
+                  <a:solidFill>
+                    <a:schemeClr val="accent5">
+                      <a:lumMod val="50000"/>
+                    </a:schemeClr>
+                  </a:solidFill>
+                  <a:latin typeface="Times New Roman" panose="02020603050405020304" pitchFamily="18" charset="0"/>
+                  <a:cs typeface="Times New Roman" panose="02020603050405020304" pitchFamily="18" charset="0"/>
+                </a:rPr>
+                <a:t>Change</a:t>
+              </a:r>
+              <a:r>
+                <a:rPr lang="en-US" sz="4000" dirty="0">
+                  <a:latin typeface="Times New Roman" panose="02020603050405020304" pitchFamily="18" charset="0"/>
+                  <a:cs typeface="Times New Roman" panose="02020603050405020304" pitchFamily="18" charset="0"/>
+                </a:rPr>
+                <a:t> </a:t>
+              </a:r>
+              <a:r>
+                <a:rPr lang="en-US" sz="4000" dirty="0">
+                  <a:solidFill>
+                    <a:schemeClr val="accent5">
+                      <a:lumMod val="50000"/>
+                    </a:schemeClr>
+                  </a:solidFill>
+                  <a:latin typeface="Times New Roman" panose="02020603050405020304" pitchFamily="18" charset="0"/>
+                  <a:cs typeface="Times New Roman" panose="02020603050405020304" pitchFamily="18" charset="0"/>
+                </a:rPr>
+                <a:t>in speakers</a:t>
+              </a:r>
+            </a:p>
+          </p:txBody>
+        </p:sp>
+        <p:cxnSp>
+          <p:nvCxnSpPr>
+            <p:cNvPr id="62" name="Straight Arrow Connector 61"/>
+            <p:cNvCxnSpPr/>
+            <p:nvPr/>
+          </p:nvCxnSpPr>
+          <p:spPr>
+            <a:xfrm>
+              <a:off x="6261135" y="29611561"/>
+              <a:ext cx="2608748" cy="357251"/>
+            </a:xfrm>
+            <a:prstGeom prst="straightConnector1">
+              <a:avLst/>
+            </a:prstGeom>
+            <a:ln w="76200">
+              <a:solidFill>
+                <a:srgbClr val="FFFF00"/>
+              </a:solidFill>
+              <a:prstDash val="lgDashDot"/>
+              <a:tailEnd type="triangle"/>
+            </a:ln>
+          </p:spPr>
+          <p:style>
+            <a:lnRef idx="1">
+              <a:schemeClr val="accent1"/>
+            </a:lnRef>
+            <a:fillRef idx="0">
+              <a:schemeClr val="accent1"/>
+            </a:fillRef>
+            <a:effectRef idx="0">
+              <a:schemeClr val="accent1"/>
+            </a:effectRef>
+            <a:fontRef idx="minor">
+              <a:schemeClr val="tx1"/>
+            </a:fontRef>
+          </p:style>
+        </p:cxnSp>
+        <p:sp>
+          <p:nvSpPr>
+            <p:cNvPr id="66" name="TextBox 65"/>
+            <p:cNvSpPr txBox="1"/>
+            <p:nvPr/>
+          </p:nvSpPr>
+          <p:spPr>
+            <a:xfrm>
+              <a:off x="9037783" y="29523474"/>
+              <a:ext cx="4855703" cy="707886"/>
+            </a:xfrm>
+            <a:prstGeom prst="rect">
+              <a:avLst/>
+            </a:prstGeom>
+            <a:noFill/>
+          </p:spPr>
+          <p:txBody>
+            <a:bodyPr wrap="square" rtlCol="0">
+              <a:spAutoFit/>
+            </a:bodyPr>
+            <a:lstStyle/>
+            <a:p>
+              <a:r>
+                <a:rPr lang="en-US" sz="4000" dirty="0">
+                  <a:solidFill>
+                    <a:schemeClr val="accent5">
+                      <a:lumMod val="50000"/>
+                    </a:schemeClr>
+                  </a:solidFill>
+                  <a:latin typeface="Times New Roman" panose="02020603050405020304" pitchFamily="18" charset="0"/>
+                  <a:cs typeface="Times New Roman" panose="02020603050405020304" pitchFamily="18" charset="0"/>
+                </a:rPr>
+                <a:t>Speaker #2’s dialogue</a:t>
+              </a:r>
+            </a:p>
+          </p:txBody>
+        </p:sp>
+        <p:sp>
+          <p:nvSpPr>
+            <p:cNvPr id="240" name="Freeform: Shape 239"/>
+            <p:cNvSpPr/>
+            <p:nvPr/>
+          </p:nvSpPr>
+          <p:spPr>
+            <a:xfrm>
+              <a:off x="3194976" y="26785095"/>
+              <a:ext cx="5832228" cy="2152711"/>
+            </a:xfrm>
+            <a:custGeom>
+              <a:avLst/>
+              <a:gdLst>
+                <a:gd name="connsiteX0" fmla="*/ 343085 w 6096185"/>
+                <a:gd name="connsiteY0" fmla="*/ 0 h 2412099"/>
+                <a:gd name="connsiteX1" fmla="*/ 628835 w 6096185"/>
+                <a:gd name="connsiteY1" fmla="*/ 2305050 h 2412099"/>
+                <a:gd name="connsiteX2" fmla="*/ 6096185 w 6096185"/>
+                <a:gd name="connsiteY2" fmla="*/ 2057400 h 2412099"/>
+                <a:gd name="connsiteX3" fmla="*/ 6096185 w 6096185"/>
+                <a:gd name="connsiteY3" fmla="*/ 2057400 h 2412099"/>
+                <a:gd name="connsiteX0" fmla="*/ 79128 w 5832228"/>
+                <a:gd name="connsiteY0" fmla="*/ 0 h 2152711"/>
+                <a:gd name="connsiteX1" fmla="*/ 1488828 w 5832228"/>
+                <a:gd name="connsiteY1" fmla="*/ 1981200 h 2152711"/>
+                <a:gd name="connsiteX2" fmla="*/ 5832228 w 5832228"/>
+                <a:gd name="connsiteY2" fmla="*/ 2057400 h 2152711"/>
+                <a:gd name="connsiteX3" fmla="*/ 5832228 w 5832228"/>
+                <a:gd name="connsiteY3" fmla="*/ 2057400 h 2152711"/>
+              </a:gdLst>
+              <a:ahLst/>
+              <a:cxnLst>
+                <a:cxn ang="0">
+                  <a:pos x="connsiteX0" y="connsiteY0"/>
+                </a:cxn>
+                <a:cxn ang="0">
+                  <a:pos x="connsiteX1" y="connsiteY1"/>
+                </a:cxn>
+                <a:cxn ang="0">
+                  <a:pos x="connsiteX2" y="connsiteY2"/>
+                </a:cxn>
+                <a:cxn ang="0">
+                  <a:pos x="connsiteX3" y="connsiteY3"/>
+                </a:cxn>
+              </a:cxnLst>
+              <a:rect l="l" t="t" r="r" b="b"/>
+              <a:pathLst>
+                <a:path w="5832228" h="2152711">
+                  <a:moveTo>
+                    <a:pt x="79128" y="0"/>
+                  </a:moveTo>
+                  <a:cubicBezTo>
+                    <a:pt x="-257422" y="981075"/>
+                    <a:pt x="529978" y="1638300"/>
+                    <a:pt x="1488828" y="1981200"/>
+                  </a:cubicBezTo>
+                  <a:cubicBezTo>
+                    <a:pt x="2447678" y="2324100"/>
+                    <a:pt x="5108328" y="2044700"/>
+                    <a:pt x="5832228" y="2057400"/>
+                  </a:cubicBezTo>
+                  <a:lnTo>
+                    <a:pt x="5832228" y="2057400"/>
+                  </a:lnTo>
+                </a:path>
+              </a:pathLst>
+            </a:custGeom>
+            <a:noFill/>
+            <a:ln w="76200">
+              <a:solidFill>
+                <a:srgbClr val="FFFF00"/>
+              </a:solidFill>
+              <a:prstDash val="lgDashDot"/>
+              <a:headEnd type="none" w="med" len="med"/>
+              <a:tailEnd type="triangle" w="med" len="med"/>
+            </a:ln>
+          </p:spPr>
+          <p:style>
+            <a:lnRef idx="2">
+              <a:schemeClr val="accent1">
+                <a:shade val="50000"/>
+              </a:schemeClr>
+            </a:lnRef>
+            <a:fillRef idx="1">
+              <a:schemeClr val="accent1"/>
+            </a:fillRef>
+            <a:effectRef idx="0">
+              <a:schemeClr val="accent1"/>
+            </a:effectRef>
+            <a:fontRef idx="minor">
+              <a:schemeClr val="lt1"/>
+            </a:fontRef>
+          </p:style>
+          <p:txBody>
+            <a:bodyPr rtlCol="0" anchor="ctr"/>
+            <a:lstStyle/>
+            <a:p>
+              <a:pPr algn="ctr"/>
+              <a:endParaRPr lang="en-US" dirty="0"/>
+            </a:p>
+          </p:txBody>
+        </p:sp>
+        <p:sp>
+          <p:nvSpPr>
+            <p:cNvPr id="70" name="TextBox 69"/>
+            <p:cNvSpPr txBox="1"/>
+            <p:nvPr/>
+          </p:nvSpPr>
+          <p:spPr>
+            <a:xfrm>
+              <a:off x="9092436" y="28408238"/>
+              <a:ext cx="4855703" cy="707886"/>
+            </a:xfrm>
+            <a:prstGeom prst="rect">
+              <a:avLst/>
+            </a:prstGeom>
+            <a:noFill/>
+          </p:spPr>
+          <p:txBody>
+            <a:bodyPr wrap="square" rtlCol="0">
+              <a:spAutoFit/>
+            </a:bodyPr>
+            <a:lstStyle/>
+            <a:p>
+              <a:r>
+                <a:rPr lang="en-US" sz="4000" dirty="0">
+                  <a:solidFill>
+                    <a:schemeClr val="accent5">
+                      <a:lumMod val="50000"/>
+                    </a:schemeClr>
+                  </a:solidFill>
+                  <a:latin typeface="Times New Roman" panose="02020603050405020304" pitchFamily="18" charset="0"/>
+                  <a:cs typeface="Times New Roman" panose="02020603050405020304" pitchFamily="18" charset="0"/>
+                </a:rPr>
+                <a:t>Speaker #1’s dialogue</a:t>
+              </a:r>
+            </a:p>
+          </p:txBody>
+        </p:sp>
+      </p:grpSp>
       <p:pic>
         <p:nvPicPr>
           <p:cNvPr id="39" name="Picture 38"/>
@@ -16750,7 +18782,7 @@
           <p:nvPr/>
         </p:nvPicPr>
         <p:blipFill>
-          <a:blip r:embed="rId15">
+          <a:blip r:embed="rId16">
             <a:extLst>
               <a:ext uri="{28A0092B-C50C-407E-A947-70E740481C1C}">
                 <a14:useLocalDpi xmlns:a14="http://schemas.microsoft.com/office/drawing/2010/main" val="0"/>
@@ -16780,7 +18812,7 @@
           <p:nvPr/>
         </p:nvPicPr>
         <p:blipFill>
-          <a:blip r:embed="rId16">
+          <a:blip r:embed="rId17">
             <a:extLst>
               <a:ext uri="{28A0092B-C50C-407E-A947-70E740481C1C}">
                 <a14:useLocalDpi xmlns:a14="http://schemas.microsoft.com/office/drawing/2010/main" val="0"/>
@@ -16826,7 +18858,7 @@
           <a:lstStyle/>
           <a:p>
             <a:r>
-              <a:rPr lang="en-US" sz="2800" smtClean="0">
+              <a:rPr lang="en-US" sz="2800">
                 <a:solidFill>
                   <a:schemeClr val="bg1"/>
                 </a:solidFill>
@@ -16870,7 +18902,7 @@
           <a:lstStyle/>
           <a:p>
             <a:r>
-              <a:rPr lang="en-US" sz="2800" dirty="0" smtClean="0">
+              <a:rPr lang="en-US" sz="2800" dirty="0">
                 <a:solidFill>
                   <a:schemeClr val="bg1"/>
                 </a:solidFill>
@@ -16879,13 +18911,6 @@
               </a:rPr>
               <a:t>2b</a:t>
             </a:r>
-            <a:endParaRPr lang="en-US" sz="2800" dirty="0">
-              <a:solidFill>
-                <a:schemeClr val="bg1"/>
-              </a:solidFill>
-              <a:latin typeface="Times New Roman" panose="02020603050405020304" pitchFamily="18" charset="0"/>
-              <a:cs typeface="Times New Roman" panose="02020603050405020304" pitchFamily="18" charset="0"/>
-            </a:endParaRPr>
           </a:p>
         </p:txBody>
       </p:sp>
@@ -16898,7 +18923,7 @@
           <p:nvPr/>
         </p:nvPicPr>
         <p:blipFill>
-          <a:blip r:embed="rId17">
+          <a:blip r:embed="rId18">
             <a:extLst>
               <a:ext uri="{28A0092B-C50C-407E-A947-70E740481C1C}">
                 <a14:useLocalDpi xmlns:a14="http://schemas.microsoft.com/office/drawing/2010/main" val="0"/>
@@ -16944,7 +18969,7 @@
           <a:lstStyle/>
           <a:p>
             <a:r>
-              <a:rPr lang="en-US" sz="2800" smtClean="0">
+              <a:rPr lang="en-US" sz="2800">
                 <a:solidFill>
                   <a:schemeClr val="bg1"/>
                 </a:solidFill>
@@ -17107,6 +19132,96 @@
           </a:fontRef>
         </p:style>
       </p:cxnSp>
+      <p:graphicFrame>
+        <p:nvGraphicFramePr>
+          <p:cNvPr id="48" name="Chart 47">
+            <a:extLst>
+              <a:ext uri="{FF2B5EF4-FFF2-40B4-BE49-F238E27FC236}">
+                <a16:creationId xmlns:a16="http://schemas.microsoft.com/office/drawing/2014/main" id="{E5183793-22C3-404D-A526-12117498FDE2}"/>
+              </a:ext>
+            </a:extLst>
+          </p:cNvPr>
+          <p:cNvGraphicFramePr>
+            <a:graphicFrameLocks/>
+          </p:cNvGraphicFramePr>
+          <p:nvPr>
+            <p:extLst>
+              <p:ext uri="{D42A27DB-BD31-4B8C-83A1-F6EECF244321}">
+                <p14:modId xmlns:p14="http://schemas.microsoft.com/office/powerpoint/2010/main" val="4263559025"/>
+              </p:ext>
+            </p:extLst>
+          </p:nvPr>
+        </p:nvGraphicFramePr>
+        <p:xfrm>
+          <a:off x="20517715" y="7598363"/>
+          <a:ext cx="8593844" cy="5003202"/>
+        </p:xfrm>
+        <a:graphic>
+          <a:graphicData uri="http://schemas.openxmlformats.org/drawingml/2006/chart">
+            <c:chart xmlns:c="http://schemas.openxmlformats.org/drawingml/2006/chart" xmlns:r="http://schemas.openxmlformats.org/officeDocument/2006/relationships" r:id="rId19"/>
+          </a:graphicData>
+        </a:graphic>
+      </p:graphicFrame>
+      <p:graphicFrame>
+        <p:nvGraphicFramePr>
+          <p:cNvPr id="53" name="Chart 52">
+            <a:extLst>
+              <a:ext uri="{FF2B5EF4-FFF2-40B4-BE49-F238E27FC236}">
+                <a16:creationId xmlns:a16="http://schemas.microsoft.com/office/drawing/2014/main" id="{47A63E27-C029-44A2-A9E2-0EB713C6092A}"/>
+              </a:ext>
+            </a:extLst>
+          </p:cNvPr>
+          <p:cNvGraphicFramePr>
+            <a:graphicFrameLocks/>
+          </p:cNvGraphicFramePr>
+          <p:nvPr>
+            <p:extLst>
+              <p:ext uri="{D42A27DB-BD31-4B8C-83A1-F6EECF244321}">
+                <p14:modId xmlns:p14="http://schemas.microsoft.com/office/powerpoint/2010/main" val="1324069107"/>
+              </p:ext>
+            </p:extLst>
+          </p:nvPr>
+        </p:nvGraphicFramePr>
+        <p:xfrm>
+          <a:off x="20517716" y="12679686"/>
+          <a:ext cx="8593844" cy="4593346"/>
+        </p:xfrm>
+        <a:graphic>
+          <a:graphicData uri="http://schemas.openxmlformats.org/drawingml/2006/chart">
+            <c:chart xmlns:c="http://schemas.openxmlformats.org/drawingml/2006/chart" xmlns:r="http://schemas.openxmlformats.org/officeDocument/2006/relationships" r:id="rId20"/>
+          </a:graphicData>
+        </a:graphic>
+      </p:graphicFrame>
+      <p:pic>
+        <p:nvPicPr>
+          <p:cNvPr id="16" name="Picture 15"/>
+          <p:cNvPicPr>
+            <a:picLocks noChangeAspect="1"/>
+          </p:cNvPicPr>
+          <p:nvPr/>
+        </p:nvPicPr>
+        <p:blipFill>
+          <a:blip r:embed="rId21">
+            <a:extLst>
+              <a:ext uri="{28A0092B-C50C-407E-A947-70E740481C1C}">
+                <a14:useLocalDpi xmlns:a14="http://schemas.microsoft.com/office/drawing/2010/main" val="0"/>
+              </a:ext>
+            </a:extLst>
+          </a:blip>
+          <a:stretch>
+            <a:fillRect/>
+          </a:stretch>
+        </p:blipFill>
+        <p:spPr>
+          <a:xfrm>
+            <a:off x="2563829" y="14289661"/>
+            <a:ext cx="12283887" cy="3246357"/>
+          </a:xfrm>
+          <a:prstGeom prst="rect">
+            <a:avLst/>
+          </a:prstGeom>
+        </p:spPr>
+      </p:pic>
     </p:spTree>
     <p:extLst>
       <p:ext uri="{BB962C8B-B14F-4D97-AF65-F5344CB8AC3E}">

</xml_diff>

<commit_message>
bullet points on poster
</commit_message>
<xml_diff>
--- a/Poster.pptx
+++ b/Poster.pptx
@@ -179,7 +179,7 @@
 </file>
 
 <file path=ppt/charts/chart1.xml><?xml version="1.0" encoding="utf-8"?>
-<c:chartSpace xmlns:c="http://schemas.openxmlformats.org/drawingml/2006/chart" xmlns:a="http://schemas.openxmlformats.org/drawingml/2006/main" xmlns:r="http://schemas.openxmlformats.org/officeDocument/2006/relationships" xmlns:c16r2="http://schemas.microsoft.com/office/drawing/2015/06/chart">
+<c:chartSpace xmlns:c="http://schemas.openxmlformats.org/drawingml/2006/chart" xmlns:a="http://schemas.openxmlformats.org/drawingml/2006/main" xmlns:r="http://schemas.openxmlformats.org/officeDocument/2006/relationships">
   <c:date1904 val="0"/>
   <c:lang val="en-US"/>
   <c:roundedCorners val="0"/>
@@ -232,6 +232,7 @@
           </a:p>
         </c:rich>
       </c:tx>
+      <c:layout/>
       <c:overlay val="0"/>
       <c:spPr>
         <a:noFill/>
@@ -265,10 +266,10 @@
           <c:layoutTarget val="inner"/>
           <c:xMode val="edge"/>
           <c:yMode val="edge"/>
-          <c:x val="7.6225187198134883E-2"/>
-          <c:y val="0.20598053691804266"/>
-          <c:w val="0.9155301837270341"/>
-          <c:h val="0.65675477678830829"/>
+          <c:x val="0.0762251871981349"/>
+          <c:y val="0.205980536918043"/>
+          <c:w val="0.915530183727034"/>
+          <c:h val="0.656754776788308"/>
         </c:manualLayout>
       </c:layout>
       <c:barChart>
@@ -334,27 +335,27 @@
                 <c:formatCode>General</c:formatCode>
                 <c:ptCount val="6"/>
                 <c:pt idx="0">
-                  <c:v>0.89285714289999996</c:v>
+                  <c:v>0.8928571429</c:v>
                 </c:pt>
                 <c:pt idx="1">
-                  <c:v>0.74358974359999996</c:v>
+                  <c:v>0.7435897436</c:v>
                 </c:pt>
                 <c:pt idx="2">
-                  <c:v>0.86956521740000003</c:v>
+                  <c:v>0.8695652174</c:v>
                 </c:pt>
                 <c:pt idx="3">
                   <c:v>0.92</c:v>
                 </c:pt>
                 <c:pt idx="4">
-                  <c:v>0.70454545449999995</c:v>
+                  <c:v>0.7045454545</c:v>
                 </c:pt>
                 <c:pt idx="5">
-                  <c:v>0.70454545449999995</c:v>
+                  <c:v>0.7045454545</c:v>
                 </c:pt>
               </c:numCache>
             </c:numRef>
           </c:val>
-          <c:extLst>
+          <c:extLst xmlns:c16r2="http://schemas.microsoft.com/office/drawing/2015/06/chart">
             <c:ext xmlns:c16="http://schemas.microsoft.com/office/drawing/2014/chart" uri="{C3380CC4-5D6E-409C-BE32-E72D297353CC}">
               <c16:uniqueId val="{00000000-D993-4FC7-8EFA-FBB5382EB190}"/>
             </c:ext>
@@ -419,27 +420,27 @@
                 <c:formatCode>General</c:formatCode>
                 <c:ptCount val="6"/>
                 <c:pt idx="0">
-                  <c:v>0.84210526320000001</c:v>
+                  <c:v>0.8421052632</c:v>
                 </c:pt>
                 <c:pt idx="1">
-                  <c:v>0.85714285710000004</c:v>
+                  <c:v>0.8571428571</c:v>
                 </c:pt>
                 <c:pt idx="2">
                   <c:v>0.05</c:v>
                 </c:pt>
                 <c:pt idx="3">
-                  <c:v>0.80952380950000002</c:v>
+                  <c:v>0.8095238095</c:v>
                 </c:pt>
                 <c:pt idx="4">
-                  <c:v>0.83333333330000003</c:v>
+                  <c:v>0.8333333333</c:v>
                 </c:pt>
                 <c:pt idx="5">
-                  <c:v>0.83333333330000003</c:v>
+                  <c:v>0.8333333333</c:v>
                 </c:pt>
               </c:numCache>
             </c:numRef>
           </c:val>
-          <c:extLst>
+          <c:extLst xmlns:c16r2="http://schemas.microsoft.com/office/drawing/2015/06/chart">
             <c:ext xmlns:c16="http://schemas.microsoft.com/office/drawing/2014/chart" uri="{C3380CC4-5D6E-409C-BE32-E72D297353CC}">
               <c16:uniqueId val="{00000001-D993-4FC7-8EFA-FBB5382EB190}"/>
             </c:ext>
@@ -455,11 +456,11 @@
         </c:dLbls>
         <c:gapWidth val="219"/>
         <c:overlap val="-27"/>
-        <c:axId val="515106232"/>
-        <c:axId val="515109840"/>
+        <c:axId val="-1113042240"/>
+        <c:axId val="-1113037536"/>
       </c:barChart>
       <c:catAx>
-        <c:axId val="515106232"/>
+        <c:axId val="-1113042240"/>
         <c:scaling>
           <c:orientation val="minMax"/>
         </c:scaling>
@@ -502,7 +503,7 @@
             <a:endParaRPr lang="en-US"/>
           </a:p>
         </c:txPr>
-        <c:crossAx val="515109840"/>
+        <c:crossAx val="-1113037536"/>
         <c:crosses val="autoZero"/>
         <c:auto val="1"/>
         <c:lblAlgn val="ctr"/>
@@ -510,7 +511,7 @@
         <c:noMultiLvlLbl val="0"/>
       </c:catAx>
       <c:valAx>
-        <c:axId val="515109840"/>
+        <c:axId val="-1113037536"/>
         <c:scaling>
           <c:orientation val="minMax"/>
         </c:scaling>
@@ -561,7 +562,7 @@
             <a:endParaRPr lang="en-US"/>
           </a:p>
         </c:txPr>
-        <c:crossAx val="515106232"/>
+        <c:crossAx val="-1113042240"/>
         <c:crosses val="autoZero"/>
         <c:crossBetween val="between"/>
       </c:valAx>
@@ -579,10 +580,10 @@
         <c:manualLayout>
           <c:xMode val="edge"/>
           <c:yMode val="edge"/>
-          <c:x val="0.76822662075497439"/>
-          <c:y val="0.11528791246781241"/>
-          <c:w val="0.22211065359949272"/>
-          <c:h val="0.16997625876573028"/>
+          <c:x val="0.768226620754974"/>
+          <c:y val="0.115287912467812"/>
+          <c:w val="0.222110653599493"/>
+          <c:h val="0.16997625876573"/>
         </c:manualLayout>
       </c:layout>
       <c:overlay val="0"/>
@@ -642,7 +643,7 @@
 </file>
 
 <file path=ppt/charts/chart2.xml><?xml version="1.0" encoding="utf-8"?>
-<c:chartSpace xmlns:c="http://schemas.openxmlformats.org/drawingml/2006/chart" xmlns:a="http://schemas.openxmlformats.org/drawingml/2006/main" xmlns:r="http://schemas.openxmlformats.org/officeDocument/2006/relationships" xmlns:c16r2="http://schemas.microsoft.com/office/drawing/2015/06/chart">
+<c:chartSpace xmlns:c="http://schemas.openxmlformats.org/drawingml/2006/chart" xmlns:a="http://schemas.openxmlformats.org/drawingml/2006/main" xmlns:r="http://schemas.openxmlformats.org/officeDocument/2006/relationships">
   <c:date1904 val="0"/>
   <c:lang val="en-US"/>
   <c:roundedCorners val="0"/>
@@ -686,8 +687,8 @@
         <c:manualLayout>
           <c:xMode val="edge"/>
           <c:yMode val="edge"/>
-          <c:x val="0.19698949620216519"/>
-          <c:y val="4.2064107515523537E-2"/>
+          <c:x val="0.196989496202165"/>
+          <c:y val="0.0420641075155235"/>
         </c:manualLayout>
       </c:layout>
       <c:overlay val="0"/>
@@ -723,10 +724,10 @@
           <c:layoutTarget val="inner"/>
           <c:xMode val="edge"/>
           <c:yMode val="edge"/>
-          <c:x val="5.6886751111484758E-2"/>
-          <c:y val="0.16575738034974941"/>
-          <c:w val="0.92138892502867686"/>
-          <c:h val="0.71397322336830915"/>
+          <c:x val="0.0568867511114848"/>
+          <c:y val="0.165757380349749"/>
+          <c:w val="0.921388925028677"/>
+          <c:h val="0.713973223368309"/>
         </c:manualLayout>
       </c:layout>
       <c:barChart>
@@ -792,27 +793,27 @@
                 <c:formatCode>General</c:formatCode>
                 <c:ptCount val="6"/>
                 <c:pt idx="0">
-                  <c:v>0.34285714290000002</c:v>
+                  <c:v>0.3428571429</c:v>
                 </c:pt>
                 <c:pt idx="1">
-                  <c:v>0.29629629629999998</c:v>
+                  <c:v>0.2962962963</c:v>
                 </c:pt>
                 <c:pt idx="2">
-                  <c:v>0.29629629629999998</c:v>
+                  <c:v>0.2962962963</c:v>
                 </c:pt>
                 <c:pt idx="3">
-                  <c:v>8.3333333329999995E-2</c:v>
+                  <c:v>0.08333333333</c:v>
                 </c:pt>
                 <c:pt idx="4">
-                  <c:v>0.29629629629999998</c:v>
+                  <c:v>0.2962962963</c:v>
                 </c:pt>
                 <c:pt idx="5">
-                  <c:v>0.29629629629999998</c:v>
+                  <c:v>0.2962962963</c:v>
                 </c:pt>
               </c:numCache>
             </c:numRef>
           </c:val>
-          <c:extLst>
+          <c:extLst xmlns:c16r2="http://schemas.microsoft.com/office/drawing/2015/06/chart">
             <c:ext xmlns:c16="http://schemas.microsoft.com/office/drawing/2014/chart" uri="{C3380CC4-5D6E-409C-BE32-E72D297353CC}">
               <c16:uniqueId val="{00000000-B95F-4CFA-AE36-B51A3E54ABDB}"/>
             </c:ext>
@@ -877,10 +878,10 @@
                 <c:formatCode>General</c:formatCode>
                 <c:ptCount val="6"/>
                 <c:pt idx="0">
-                  <c:v>0.51359516620000001</c:v>
+                  <c:v>0.5135951662</c:v>
                 </c:pt>
                 <c:pt idx="1">
-                  <c:v>0.49681528660000002</c:v>
+                  <c:v>0.4968152866</c:v>
                 </c:pt>
                 <c:pt idx="2">
                   <c:v>0.05</c:v>
@@ -889,15 +890,15 @@
                   <c:v>0.05</c:v>
                 </c:pt>
                 <c:pt idx="4">
-                  <c:v>0.59259259259999997</c:v>
+                  <c:v>0.5925925926</c:v>
                 </c:pt>
                 <c:pt idx="5">
-                  <c:v>0.59259259259999997</c:v>
+                  <c:v>0.5925925926</c:v>
                 </c:pt>
               </c:numCache>
             </c:numRef>
           </c:val>
-          <c:extLst>
+          <c:extLst xmlns:c16r2="http://schemas.microsoft.com/office/drawing/2015/06/chart">
             <c:ext xmlns:c16="http://schemas.microsoft.com/office/drawing/2014/chart" uri="{C3380CC4-5D6E-409C-BE32-E72D297353CC}">
               <c16:uniqueId val="{00000001-B95F-4CFA-AE36-B51A3E54ABDB}"/>
             </c:ext>
@@ -962,16 +963,16 @@
                 <c:formatCode>General</c:formatCode>
                 <c:ptCount val="6"/>
                 <c:pt idx="0">
-                  <c:v>0.62983425410000005</c:v>
+                  <c:v>0.6298342541</c:v>
                 </c:pt>
                 <c:pt idx="1">
-                  <c:v>0.30821917809999999</c:v>
+                  <c:v>0.3082191781</c:v>
                 </c:pt>
                 <c:pt idx="2">
                   <c:v>0.05</c:v>
                 </c:pt>
                 <c:pt idx="3">
-                  <c:v>0.48484848479999998</c:v>
+                  <c:v>0.4848484848</c:v>
                 </c:pt>
                 <c:pt idx="4">
                   <c:v>0.05</c:v>
@@ -982,7 +983,7 @@
               </c:numCache>
             </c:numRef>
           </c:val>
-          <c:extLst>
+          <c:extLst xmlns:c16r2="http://schemas.microsoft.com/office/drawing/2015/06/chart">
             <c:ext xmlns:c16="http://schemas.microsoft.com/office/drawing/2014/chart" uri="{C3380CC4-5D6E-409C-BE32-E72D297353CC}">
               <c16:uniqueId val="{00000002-B95F-4CFA-AE36-B51A3E54ABDB}"/>
             </c:ext>
@@ -998,11 +999,11 @@
         </c:dLbls>
         <c:gapWidth val="219"/>
         <c:overlap val="-27"/>
-        <c:axId val="516734984"/>
-        <c:axId val="516741216"/>
+        <c:axId val="-1112368528"/>
+        <c:axId val="-1112363664"/>
       </c:barChart>
       <c:catAx>
-        <c:axId val="516734984"/>
+        <c:axId val="-1112368528"/>
         <c:scaling>
           <c:orientation val="minMax"/>
         </c:scaling>
@@ -1042,7 +1043,7 @@
             <a:endParaRPr lang="en-US"/>
           </a:p>
         </c:txPr>
-        <c:crossAx val="516741216"/>
+        <c:crossAx val="-1112363664"/>
         <c:crosses val="autoZero"/>
         <c:auto val="1"/>
         <c:lblAlgn val="ctr"/>
@@ -1050,10 +1051,10 @@
         <c:noMultiLvlLbl val="0"/>
       </c:catAx>
       <c:valAx>
-        <c:axId val="516741216"/>
+        <c:axId val="-1112363664"/>
         <c:scaling>
           <c:orientation val="minMax"/>
-          <c:max val="1"/>
+          <c:max val="1.0"/>
         </c:scaling>
         <c:delete val="0"/>
         <c:axPos val="l"/>
@@ -1098,7 +1099,7 @@
             <a:endParaRPr lang="en-US"/>
           </a:p>
         </c:txPr>
-        <c:crossAx val="516734984"/>
+        <c:crossAx val="-1112368528"/>
         <c:crosses val="autoZero"/>
         <c:crossBetween val="between"/>
       </c:valAx>
@@ -1116,10 +1117,10 @@
         <c:manualLayout>
           <c:xMode val="edge"/>
           <c:yMode val="edge"/>
-          <c:x val="0.78745826922509765"/>
-          <c:y val="0.14062297941413515"/>
-          <c:w val="0.18257392825896759"/>
-          <c:h val="0.25508782926793433"/>
+          <c:x val="0.787458269225097"/>
+          <c:y val="0.140622979414135"/>
+          <c:w val="0.182573928258968"/>
+          <c:h val="0.255087829267934"/>
         </c:manualLayout>
       </c:layout>
       <c:overlay val="1"/>
@@ -2374,7 +2375,7 @@
               <a:pPr>
                 <a:defRPr/>
               </a:pPr>
-              <a:t>3/16/2017</a:t>
+              <a:t>3/16/17</a:t>
             </a:fld>
             <a:endParaRPr lang="en-US" dirty="0"/>
           </a:p>
@@ -6717,6 +6718,15 @@
                 </a:rPr>
                 <a:t>PosterPresentations.com</a:t>
               </a:r>
+              <a:r>
+                <a:rPr lang="en-US" sz="2800" dirty="0">
+                  <a:solidFill>
+                    <a:schemeClr val="bg1"/>
+                  </a:solidFill>
+                  <a:latin typeface="Trebuchet MS" pitchFamily="34" charset="0"/>
+                </a:rPr>
+                <a:t/>
+              </a:r>
               <a:br>
                 <a:rPr lang="en-US" sz="2800" dirty="0">
                   <a:solidFill>
@@ -6952,6 +6962,15 @@
             </a:p>
             <a:p>
               <a:pPr algn="l"/>
+              <a:r>
+                <a:rPr lang="en-US" sz="2800" b="1" baseline="0" dirty="0">
+                  <a:solidFill>
+                    <a:schemeClr val="bg1"/>
+                  </a:solidFill>
+                  <a:latin typeface="Trebuchet MS" pitchFamily="34" charset="0"/>
+                </a:rPr>
+                <a:t/>
+              </a:r>
               <a:br>
                 <a:rPr lang="en-US" sz="2800" b="1" baseline="0" dirty="0">
                   <a:solidFill>
@@ -7560,7 +7579,7 @@
               <a:graphicData uri="http://schemas.openxmlformats.org/presentationml/2006/ole">
                 <mc:AlternateContent xmlns:mc="http://schemas.openxmlformats.org/markup-compatibility/2006">
                   <mc:Choice xmlns:v="urn:schemas-microsoft-com:vml" Requires="v">
-                    <p:oleObj spid="_x0000_s1165" name="Image" r:id="rId8" imgW="1828440" imgH="1117440" progId="Photoshop.Image.13">
+                    <p:oleObj spid="_x0000_s1182" name="Image" r:id="rId8" imgW="1828440" imgH="1117440" progId="Photoshop.Image.13">
                       <p:embed/>
                     </p:oleObj>
                   </mc:Choice>
@@ -7617,7 +7636,7 @@
               <a:graphicData uri="http://schemas.openxmlformats.org/presentationml/2006/ole">
                 <mc:AlternateContent xmlns:mc="http://schemas.openxmlformats.org/markup-compatibility/2006">
                   <mc:Choice xmlns:v="urn:schemas-microsoft-com:vml" Requires="v">
-                    <p:oleObj spid="_x0000_s1166" name="Image" r:id="rId10" imgW="1828440" imgH="1117440" progId="Photoshop.Image.13">
+                    <p:oleObj spid="_x0000_s1183" name="Image" r:id="rId10" imgW="1828440" imgH="1117440" progId="Photoshop.Image.13">
                       <p:embed/>
                     </p:oleObj>
                   </mc:Choice>
@@ -8740,7 +8759,7 @@
             <a:graphicData uri="http://schemas.openxmlformats.org/presentationml/2006/ole">
               <mc:AlternateContent xmlns:mc="http://schemas.openxmlformats.org/markup-compatibility/2006">
                 <mc:Choice xmlns:v="urn:schemas-microsoft-com:vml" Requires="v">
-                  <p:oleObj spid="_x0000_s1167" name="Image" r:id="rId12" imgW="4571280" imgH="1688760" progId="Photoshop.Image.13">
+                  <p:oleObj spid="_x0000_s1184" name="Image" r:id="rId12" imgW="4571280" imgH="1688760" progId="Photoshop.Image.13">
                     <p:embed/>
                   </p:oleObj>
                 </mc:Choice>
@@ -8824,7 +8843,7 @@
             <a:graphicData uri="http://schemas.openxmlformats.org/presentationml/2006/ole">
               <mc:AlternateContent xmlns:mc="http://schemas.openxmlformats.org/markup-compatibility/2006">
                 <mc:Choice xmlns:v="urn:schemas-microsoft-com:vml" Requires="v">
-                  <p:oleObj spid="_x0000_s1168" name="Image" r:id="rId15" imgW="1574280" imgH="1053720" progId="Photoshop.Image.13">
+                  <p:oleObj spid="_x0000_s1185" name="Image" r:id="rId15" imgW="1574280" imgH="1053720" progId="Photoshop.Image.13">
                     <p:embed/>
                   </p:oleObj>
                 </mc:Choice>
@@ -9152,6 +9171,14 @@
                   </a:solidFill>
                 </a:rPr>
                 <a:t>94710</a:t>
+              </a:r>
+              <a:r>
+                <a:rPr lang="en-US" sz="2400" baseline="0" dirty="0">
+                  <a:solidFill>
+                    <a:schemeClr val="bg1"/>
+                  </a:solidFill>
+                </a:rPr>
+                <a:t/>
               </a:r>
               <a:br>
                 <a:rPr lang="en-US" sz="2400" baseline="0" dirty="0">
@@ -10232,6 +10259,15 @@
                 </a:rPr>
                 <a:t>PosterPresentations.com</a:t>
               </a:r>
+              <a:r>
+                <a:rPr lang="en-US" sz="2800" dirty="0">
+                  <a:solidFill>
+                    <a:schemeClr val="bg1"/>
+                  </a:solidFill>
+                  <a:latin typeface="Trebuchet MS" pitchFamily="34" charset="0"/>
+                </a:rPr>
+                <a:t/>
+              </a:r>
               <a:br>
                 <a:rPr lang="en-US" sz="2800" dirty="0">
                   <a:solidFill>
@@ -10467,6 +10503,15 @@
             </a:p>
             <a:p>
               <a:pPr algn="l"/>
+              <a:r>
+                <a:rPr lang="en-US" sz="2800" b="1" baseline="0" dirty="0">
+                  <a:solidFill>
+                    <a:schemeClr val="bg1"/>
+                  </a:solidFill>
+                  <a:latin typeface="Trebuchet MS" pitchFamily="34" charset="0"/>
+                </a:rPr>
+                <a:t/>
+              </a:r>
               <a:br>
                 <a:rPr lang="en-US" sz="2800" b="1" baseline="0" dirty="0">
                   <a:solidFill>
@@ -11075,7 +11120,7 @@
               <a:graphicData uri="http://schemas.openxmlformats.org/presentationml/2006/ole">
                 <mc:AlternateContent xmlns:mc="http://schemas.openxmlformats.org/markup-compatibility/2006">
                   <mc:Choice xmlns:v="urn:schemas-microsoft-com:vml" Requires="v">
-                    <p:oleObj spid="_x0000_s2189" name="Image" r:id="rId8" imgW="1828440" imgH="1117440" progId="Photoshop.Image.13">
+                    <p:oleObj spid="_x0000_s2206" name="Image" r:id="rId8" imgW="1828440" imgH="1117440" progId="Photoshop.Image.13">
                       <p:embed/>
                     </p:oleObj>
                   </mc:Choice>
@@ -11132,7 +11177,7 @@
               <a:graphicData uri="http://schemas.openxmlformats.org/presentationml/2006/ole">
                 <mc:AlternateContent xmlns:mc="http://schemas.openxmlformats.org/markup-compatibility/2006">
                   <mc:Choice xmlns:v="urn:schemas-microsoft-com:vml" Requires="v">
-                    <p:oleObj spid="_x0000_s2190" name="Image" r:id="rId10" imgW="1828440" imgH="1117440" progId="Photoshop.Image.13">
+                    <p:oleObj spid="_x0000_s2207" name="Image" r:id="rId10" imgW="1828440" imgH="1117440" progId="Photoshop.Image.13">
                       <p:embed/>
                     </p:oleObj>
                   </mc:Choice>
@@ -12255,7 +12300,7 @@
             <a:graphicData uri="http://schemas.openxmlformats.org/presentationml/2006/ole">
               <mc:AlternateContent xmlns:mc="http://schemas.openxmlformats.org/markup-compatibility/2006">
                 <mc:Choice xmlns:v="urn:schemas-microsoft-com:vml" Requires="v">
-                  <p:oleObj spid="_x0000_s2191" name="Image" r:id="rId12" imgW="4571280" imgH="1688760" progId="Photoshop.Image.13">
+                  <p:oleObj spid="_x0000_s2208" name="Image" r:id="rId12" imgW="4571280" imgH="1688760" progId="Photoshop.Image.13">
                     <p:embed/>
                   </p:oleObj>
                 </mc:Choice>
@@ -12339,7 +12384,7 @@
             <a:graphicData uri="http://schemas.openxmlformats.org/presentationml/2006/ole">
               <mc:AlternateContent xmlns:mc="http://schemas.openxmlformats.org/markup-compatibility/2006">
                 <mc:Choice xmlns:v="urn:schemas-microsoft-com:vml" Requires="v">
-                  <p:oleObj spid="_x0000_s2192" name="Image" r:id="rId15" imgW="1574280" imgH="1053720" progId="Photoshop.Image.13">
+                  <p:oleObj spid="_x0000_s2209" name="Image" r:id="rId15" imgW="1574280" imgH="1053720" progId="Photoshop.Image.13">
                     <p:embed/>
                   </p:oleObj>
                 </mc:Choice>
@@ -12668,6 +12713,14 @@
                 </a:solidFill>
               </a:rPr>
               <a:t>94710</a:t>
+            </a:r>
+            <a:r>
+              <a:rPr lang="en-US" sz="2400" baseline="0" dirty="0">
+                <a:solidFill>
+                  <a:schemeClr val="bg1"/>
+                </a:solidFill>
+              </a:rPr>
+              <a:t/>
             </a:r>
             <a:br>
               <a:rPr lang="en-US" sz="2400" baseline="0" dirty="0">
@@ -13931,6 +13984,15 @@
                 </a:rPr>
                 <a:t>PosterPresentations.com</a:t>
               </a:r>
+              <a:r>
+                <a:rPr lang="en-US" sz="2800" dirty="0">
+                  <a:solidFill>
+                    <a:schemeClr val="bg1"/>
+                  </a:solidFill>
+                  <a:latin typeface="Trebuchet MS" pitchFamily="34" charset="0"/>
+                </a:rPr>
+                <a:t/>
+              </a:r>
               <a:br>
                 <a:rPr lang="en-US" sz="2800" dirty="0">
                   <a:solidFill>
@@ -14166,6 +14228,15 @@
             </a:p>
             <a:p>
               <a:pPr algn="l"/>
+              <a:r>
+                <a:rPr lang="en-US" sz="2800" b="1" baseline="0" dirty="0">
+                  <a:solidFill>
+                    <a:schemeClr val="bg1"/>
+                  </a:solidFill>
+                  <a:latin typeface="Trebuchet MS" pitchFamily="34" charset="0"/>
+                </a:rPr>
+                <a:t/>
+              </a:r>
               <a:br>
                 <a:rPr lang="en-US" sz="2800" b="1" baseline="0" dirty="0">
                   <a:solidFill>
@@ -14774,7 +14845,7 @@
               <a:graphicData uri="http://schemas.openxmlformats.org/presentationml/2006/ole">
                 <mc:AlternateContent xmlns:mc="http://schemas.openxmlformats.org/markup-compatibility/2006">
                   <mc:Choice xmlns:v="urn:schemas-microsoft-com:vml" Requires="v">
-                    <p:oleObj spid="_x0000_s3213" name="Image" r:id="rId8" imgW="1828440" imgH="1117440" progId="Photoshop.Image.13">
+                    <p:oleObj spid="_x0000_s3230" name="Image" r:id="rId8" imgW="1828440" imgH="1117440" progId="Photoshop.Image.13">
                       <p:embed/>
                     </p:oleObj>
                   </mc:Choice>
@@ -14831,7 +14902,7 @@
               <a:graphicData uri="http://schemas.openxmlformats.org/presentationml/2006/ole">
                 <mc:AlternateContent xmlns:mc="http://schemas.openxmlformats.org/markup-compatibility/2006">
                   <mc:Choice xmlns:v="urn:schemas-microsoft-com:vml" Requires="v">
-                    <p:oleObj spid="_x0000_s3214" name="Image" r:id="rId10" imgW="1828440" imgH="1117440" progId="Photoshop.Image.13">
+                    <p:oleObj spid="_x0000_s3231" name="Image" r:id="rId10" imgW="1828440" imgH="1117440" progId="Photoshop.Image.13">
                       <p:embed/>
                     </p:oleObj>
                   </mc:Choice>
@@ -15954,7 +16025,7 @@
             <a:graphicData uri="http://schemas.openxmlformats.org/presentationml/2006/ole">
               <mc:AlternateContent xmlns:mc="http://schemas.openxmlformats.org/markup-compatibility/2006">
                 <mc:Choice xmlns:v="urn:schemas-microsoft-com:vml" Requires="v">
-                  <p:oleObj spid="_x0000_s3215" name="Image" r:id="rId12" imgW="4571280" imgH="1688760" progId="Photoshop.Image.13">
+                  <p:oleObj spid="_x0000_s3232" name="Image" r:id="rId12" imgW="4571280" imgH="1688760" progId="Photoshop.Image.13">
                     <p:embed/>
                   </p:oleObj>
                 </mc:Choice>
@@ -16038,7 +16109,7 @@
             <a:graphicData uri="http://schemas.openxmlformats.org/presentationml/2006/ole">
               <mc:AlternateContent xmlns:mc="http://schemas.openxmlformats.org/markup-compatibility/2006">
                 <mc:Choice xmlns:v="urn:schemas-microsoft-com:vml" Requires="v">
-                  <p:oleObj spid="_x0000_s3216" name="Image" r:id="rId15" imgW="1574280" imgH="1053720" progId="Photoshop.Image.13">
+                  <p:oleObj spid="_x0000_s3233" name="Image" r:id="rId15" imgW="1574280" imgH="1053720" progId="Photoshop.Image.13">
                     <p:embed/>
                   </p:oleObj>
                 </mc:Choice>
@@ -16367,6 +16438,14 @@
                 </a:solidFill>
               </a:rPr>
               <a:t>94710</a:t>
+            </a:r>
+            <a:r>
+              <a:rPr lang="en-US" sz="2400" baseline="0" dirty="0">
+                <a:solidFill>
+                  <a:schemeClr val="bg1"/>
+                </a:solidFill>
+              </a:rPr>
+              <a:t/>
             </a:r>
             <a:br>
               <a:rPr lang="en-US" sz="2400" baseline="0" dirty="0">
@@ -17020,27 +17099,94 @@
         </p:nvSpPr>
         <p:spPr>
           <a:xfrm>
-            <a:off x="1054885" y="6525551"/>
-            <a:ext cx="15856490" cy="8776002"/>
+            <a:off x="1051179" y="5966681"/>
+            <a:ext cx="15856490" cy="8098894"/>
           </a:xfrm>
         </p:spPr>
         <p:txBody>
           <a:bodyPr/>
           <a:lstStyle/>
           <a:p>
+            <a:pPr marL="457200" indent="-457200">
+              <a:buFont typeface="Arial" charset="0"/>
+              <a:buChar char="•"/>
+            </a:pPr>
             <a:r>
-              <a:rPr lang="en-US" sz="4000" dirty="0"/>
-              <a:t>The main motivation for our project is to provide a tool for transcribing interviews, podcasts, and anything in which two or more people are talking and an auto-generated caption might be useful. This would be a tool that journalists could use to streamline their workflow and concentrate their efforts on other aspects of their job, as opposed to the menial and often time-consuming task of transcription. At the very least, this tool aims to reduce the amount of work a journalist must spend on transcription.  </a:t>
+              <a:rPr lang="en-US" sz="3600" dirty="0" smtClean="0"/>
+              <a:t>Provide a tool for transcription or auto captioning</a:t>
             </a:r>
           </a:p>
           <a:p>
+            <a:pPr marL="457200" indent="-457200">
+              <a:buFont typeface="Arial" charset="0"/>
+              <a:buChar char="•"/>
+            </a:pPr>
             <a:r>
-              <a:rPr lang="en-US" sz="4000" dirty="0"/>
-              <a:t>Tools for both speech transcription and speaker identification already exist but they do not work in parallel to identify multiple speakers in a single audio file while assigning transcribed words to their respective speaker. Our project’s goal is to combine these two existing tools and make one streamlined interface for creating transcriptions from an audio file.</a:t>
+              <a:rPr lang="en-US" sz="3600" dirty="0" smtClean="0"/>
+              <a:t>Potential use cases: transcribing interviews, podcasts, </a:t>
+            </a:r>
+            <a:r>
+              <a:rPr lang="en-US" sz="3600" dirty="0" smtClean="0"/>
+              <a:t>captioning </a:t>
+            </a:r>
+            <a:r>
+              <a:rPr lang="en-US" sz="3600" dirty="0" smtClean="0"/>
+              <a:t>videos, etc. </a:t>
             </a:r>
           </a:p>
           <a:p>
-            <a:endParaRPr lang="en-US" sz="4000" dirty="0"/>
+            <a:pPr marL="457200" indent="-457200">
+              <a:buFont typeface="Arial" charset="0"/>
+              <a:buChar char="•"/>
+            </a:pPr>
+            <a:r>
+              <a:rPr lang="en-US" sz="3600" dirty="0" smtClean="0"/>
+              <a:t>Journalists could use this to streamline their workflow, and avoid the menial/time-consuming task of transcription by hand</a:t>
+            </a:r>
+          </a:p>
+          <a:p>
+            <a:pPr marL="457200" indent="-457200">
+              <a:buFont typeface="Arial" charset="0"/>
+              <a:buChar char="•"/>
+            </a:pPr>
+            <a:r>
+              <a:rPr lang="en-US" sz="3600" dirty="0" smtClean="0"/>
+              <a:t>Aims to reduce the amount of work a journalist must spend on transcription</a:t>
+            </a:r>
+          </a:p>
+          <a:p>
+            <a:pPr marL="457200" indent="-457200">
+              <a:buFont typeface="Arial" charset="0"/>
+              <a:buChar char="•"/>
+            </a:pPr>
+            <a:r>
+              <a:rPr lang="en-US" sz="3600" dirty="0" smtClean="0"/>
+              <a:t>Tools for speech transcription and speaker ID already exist but do not work in parallel</a:t>
+            </a:r>
+          </a:p>
+          <a:p>
+            <a:pPr marL="457200" indent="-457200">
+              <a:buFont typeface="Arial" charset="0"/>
+              <a:buChar char="•"/>
+            </a:pPr>
+            <a:r>
+              <a:rPr lang="en-US" sz="3600" dirty="0" smtClean="0"/>
+              <a:t>We combined these tools to identify multiple speakers in a single audio file, while assigning transcribed words to their respective speakers</a:t>
+            </a:r>
+          </a:p>
+          <a:p>
+            <a:pPr marL="457200" indent="-457200">
+              <a:buFont typeface="Arial" charset="0"/>
+              <a:buChar char="•"/>
+            </a:pPr>
+            <a:r>
+              <a:rPr lang="en-US" sz="3600" dirty="0" smtClean="0"/>
+              <a:t>Our goal is to make one streamlined interface for creating transcriptions from an audio file</a:t>
+            </a:r>
+            <a:endParaRPr lang="en-US" sz="3600" dirty="0"/>
+          </a:p>
+          <a:p>
+            <a:endParaRPr lang="en-US" sz="4800" dirty="0"/>
           </a:p>
         </p:txBody>
       </p:sp>
@@ -17084,17 +17230,102 @@
         <p:spPr>
           <a:xfrm>
             <a:off x="1076061" y="18159683"/>
-            <a:ext cx="15858342" cy="7298675"/>
+            <a:ext cx="15858342" cy="8061961"/>
           </a:xfrm>
         </p:spPr>
         <p:txBody>
           <a:bodyPr/>
           <a:lstStyle/>
           <a:p>
+            <a:pPr marL="457200" indent="-457200">
+              <a:buFont typeface="Arial" charset="0"/>
+              <a:buChar char="•"/>
+            </a:pPr>
             <a:r>
-              <a:rPr lang="en-US" sz="4000" dirty="0"/>
-              <a:t>Users will submit a wave audio file containing a conversation between two or more people. The user will then select portions of the audio in which only one person is talking, and will do this for each speaker in the conversation. Then, a profile for that user is created with that audio clip, which will be used for speaker identification. The program then uses a self-similarity measure to identify points in the audio at which one speaker stops speaking and another starts. It segments the original audio file and splits it into multiple files. Each file will then be analyzed by the speech identification API, the speaker will be identified, and the text of the audio file transcribed. This will be written in the format of a transcript, where the speaker’s name precedes the words they said. </a:t>
+              <a:rPr lang="en-US" sz="3600" dirty="0" smtClean="0"/>
+              <a:t>Users submit wave file (16kHz sample rate, monophonic)</a:t>
             </a:r>
+          </a:p>
+          <a:p>
+            <a:pPr marL="457200" indent="-457200">
+              <a:buFont typeface="Arial" charset="0"/>
+              <a:buChar char="•"/>
+            </a:pPr>
+            <a:r>
+              <a:rPr lang="en-US" sz="3600" dirty="0" smtClean="0"/>
+              <a:t>User selects portions of audio in which only one person is talking</a:t>
+            </a:r>
+          </a:p>
+          <a:p>
+            <a:pPr marL="457200" indent="-457200">
+              <a:buFont typeface="Arial" charset="0"/>
+              <a:buChar char="•"/>
+            </a:pPr>
+            <a:r>
+              <a:rPr lang="en-US" sz="3600" dirty="0" smtClean="0"/>
+              <a:t>Repeat for each speaker in conversation</a:t>
+            </a:r>
+          </a:p>
+          <a:p>
+            <a:pPr marL="457200" indent="-457200">
+              <a:buFont typeface="Arial" charset="0"/>
+              <a:buChar char="•"/>
+            </a:pPr>
+            <a:r>
+              <a:rPr lang="en-US" sz="3600" dirty="0" smtClean="0"/>
+              <a:t>Profile created for each speaker, trains the Speaker ID API to fingerprint each speaker</a:t>
+            </a:r>
+          </a:p>
+          <a:p>
+            <a:pPr marL="457200" indent="-457200">
+              <a:buFont typeface="Arial" charset="0"/>
+              <a:buChar char="•"/>
+            </a:pPr>
+            <a:r>
+              <a:rPr lang="en-US" sz="3600" dirty="0" smtClean="0"/>
+              <a:t>Program uses self-similarity matrix to automatically determine where to split between speakers</a:t>
+            </a:r>
+          </a:p>
+          <a:p>
+            <a:pPr marL="457200" indent="-457200">
+              <a:buFont typeface="Arial" charset="0"/>
+              <a:buChar char="•"/>
+            </a:pPr>
+            <a:r>
+              <a:rPr lang="en-US" sz="3600" dirty="0" smtClean="0"/>
+              <a:t>Segments audio into multiple distinct audio files</a:t>
+            </a:r>
+          </a:p>
+          <a:p>
+            <a:pPr marL="457200" indent="-457200">
+              <a:buFont typeface="Arial" charset="0"/>
+              <a:buChar char="•"/>
+            </a:pPr>
+            <a:r>
+              <a:rPr lang="en-US" sz="3600" dirty="0" smtClean="0"/>
+              <a:t>Speech-to-text is run on every file in order</a:t>
+            </a:r>
+          </a:p>
+          <a:p>
+            <a:pPr marL="457200" indent="-457200">
+              <a:buFont typeface="Arial" charset="0"/>
+              <a:buChar char="•"/>
+            </a:pPr>
+            <a:r>
+              <a:rPr lang="en-US" sz="3600" dirty="0" smtClean="0"/>
+              <a:t>Speaker ID is run on every file, and prepends identified speaker to their associated audio clip.</a:t>
+            </a:r>
+          </a:p>
+          <a:p>
+            <a:pPr marL="457200" indent="-457200">
+              <a:buFont typeface="Arial" charset="0"/>
+              <a:buChar char="•"/>
+            </a:pPr>
+            <a:r>
+              <a:rPr lang="en-US" sz="3600" dirty="0" smtClean="0"/>
+              <a:t>Results printed to screen for user to see. </a:t>
+            </a:r>
+            <a:endParaRPr lang="en-US" sz="3600" dirty="0"/>
           </a:p>
         </p:txBody>
       </p:sp>
@@ -17138,37 +17369,185 @@
         <p:spPr>
           <a:xfrm>
             <a:off x="17679990" y="18164130"/>
-            <a:ext cx="15833456" cy="12469321"/>
+            <a:ext cx="15833456" cy="6953965"/>
           </a:xfrm>
         </p:spPr>
         <p:txBody>
           <a:bodyPr/>
           <a:lstStyle/>
           <a:p>
+            <a:pPr marL="457200" indent="-457200">
+              <a:buFont typeface="Arial" charset="0"/>
+              <a:buChar char="•"/>
+            </a:pPr>
             <a:r>
-              <a:rPr lang="en-US" sz="4000" dirty="0"/>
-              <a:t>We used Python 3 to accomplish all the backend processing, segmenting and transcribing of the audio files. For speaker recognition and transcription, we used Microsoft’s Bing Speaker Identification and Speech to Text APIs. We used a HTML/CSS/JavaScript frontend along with the </a:t>
-            </a:r>
-            <a:r>
-              <a:rPr lang="en-US" sz="4000" dirty="0" err="1"/>
-              <a:t>wavesurfer.js</a:t>
-            </a:r>
-            <a:r>
-              <a:rPr lang="en-US" sz="4000" dirty="0"/>
-              <a:t> library for manipulating waveforms and displaying them to the user. </a:t>
+              <a:rPr lang="en-US" sz="3600" dirty="0" smtClean="0">
+                <a:latin typeface="Times" charset="0"/>
+                <a:ea typeface="Times" charset="0"/>
+                <a:cs typeface="Times" charset="0"/>
+              </a:rPr>
+              <a:t>Python 3 backend: Audio segmentation, transcription and speaker recognition</a:t>
             </a:r>
           </a:p>
           <a:p>
+            <a:pPr marL="2155286" lvl="1" indent="-457200">
+              <a:buFont typeface="Arial" charset="0"/>
+              <a:buChar char="•"/>
+            </a:pPr>
             <a:r>
-              <a:rPr lang="en-US" sz="4000" dirty="0"/>
-              <a:t>We tested the performance of our transcription software upon two major criteria: (1) How well it segmented the audio files into smaller files where only one speaker was talking, and (2) How accurate the final transcription was (regarding both the speaker identification and the speech to text conversion). For both of these instances we utilized f-score as a measure of our success. </a:t>
+              <a:rPr lang="en-US" sz="3600" dirty="0" smtClean="0">
+                <a:solidFill>
+                  <a:schemeClr val="accent5">
+                    <a:lumMod val="50000"/>
+                  </a:schemeClr>
+                </a:solidFill>
+                <a:latin typeface="Times" charset="0"/>
+                <a:ea typeface="Times" charset="0"/>
+                <a:cs typeface="Times" charset="0"/>
+              </a:rPr>
+              <a:t>Microsoft Bing API used for speaker identification and speech to text</a:t>
             </a:r>
           </a:p>
           <a:p>
+            <a:pPr marL="457200" indent="-457200">
+              <a:buFont typeface="Arial" charset="0"/>
+              <a:buChar char="•"/>
+            </a:pPr>
             <a:r>
-              <a:rPr lang="en-US" sz="4000" dirty="0"/>
-              <a:t>In terms of testing data, we primarily used two files: one of a clip of an NPR interview, where an interviewer asked President Obama a question, and he started his response, and another of the three of us reading different sections from a Wikipedia article on sports in Latvia. Because we are using the Bing API, our speech to text and speech recognition f-scores are something that would primarily be determined by how well our audio was segmented</a:t>
+              <a:rPr lang="en-US" sz="3600" dirty="0" smtClean="0">
+                <a:latin typeface="Times" charset="0"/>
+                <a:ea typeface="Times" charset="0"/>
+                <a:cs typeface="Times" charset="0"/>
+              </a:rPr>
+              <a:t>HTML/CSS/JavaScript frontend</a:t>
             </a:r>
+          </a:p>
+          <a:p>
+            <a:pPr marL="2155286" lvl="1" indent="-457200">
+              <a:buFont typeface="Arial" charset="0"/>
+              <a:buChar char="•"/>
+            </a:pPr>
+            <a:r>
+              <a:rPr lang="en-US" sz="3600" dirty="0" err="1" smtClean="0">
+                <a:solidFill>
+                  <a:schemeClr val="accent5">
+                    <a:lumMod val="50000"/>
+                  </a:schemeClr>
+                </a:solidFill>
+                <a:latin typeface="Times" charset="0"/>
+                <a:ea typeface="Times" charset="0"/>
+                <a:cs typeface="Times" charset="0"/>
+              </a:rPr>
+              <a:t>Wavesurfer.js</a:t>
+            </a:r>
+            <a:r>
+              <a:rPr lang="en-US" sz="3600" dirty="0" smtClean="0">
+                <a:solidFill>
+                  <a:schemeClr val="accent5">
+                    <a:lumMod val="50000"/>
+                  </a:schemeClr>
+                </a:solidFill>
+                <a:latin typeface="Times" charset="0"/>
+                <a:ea typeface="Times" charset="0"/>
+                <a:cs typeface="Times" charset="0"/>
+              </a:rPr>
+              <a:t> library for displaying and manipulating waveforms</a:t>
+            </a:r>
+          </a:p>
+          <a:p>
+            <a:pPr marL="457200" indent="-457200">
+              <a:buFont typeface="Arial" charset="0"/>
+              <a:buChar char="•"/>
+            </a:pPr>
+            <a:r>
+              <a:rPr lang="en-US" sz="3600" dirty="0" smtClean="0">
+                <a:latin typeface="Times" charset="0"/>
+                <a:ea typeface="Times" charset="0"/>
+                <a:cs typeface="Times" charset="0"/>
+              </a:rPr>
+              <a:t>Performance assessed by f-score of transcription:</a:t>
+            </a:r>
+          </a:p>
+          <a:p>
+            <a:pPr marL="2155286" lvl="1" indent="-457200">
+              <a:buFont typeface="Arial" charset="0"/>
+              <a:buChar char="•"/>
+            </a:pPr>
+            <a:r>
+              <a:rPr lang="en-US" sz="3600" dirty="0" smtClean="0">
+                <a:solidFill>
+                  <a:schemeClr val="accent5">
+                    <a:lumMod val="50000"/>
+                  </a:schemeClr>
+                </a:solidFill>
+                <a:latin typeface="Times" charset="0"/>
+                <a:ea typeface="Times" charset="0"/>
+                <a:cs typeface="Times" charset="0"/>
+              </a:rPr>
+              <a:t>This also measured the performance of our audio segmentation and speaker identification/speech to text API</a:t>
+            </a:r>
+          </a:p>
+          <a:p>
+            <a:pPr marL="457200" indent="-457200">
+              <a:buFont typeface="Arial" charset="0"/>
+              <a:buChar char="•"/>
+            </a:pPr>
+            <a:r>
+              <a:rPr lang="en-US" sz="3600" dirty="0" smtClean="0">
+                <a:latin typeface="Times" charset="0"/>
+                <a:ea typeface="Times" charset="0"/>
+                <a:cs typeface="Times" charset="0"/>
+              </a:rPr>
+              <a:t>Testing data: primarily consisted of two files:</a:t>
+            </a:r>
+          </a:p>
+          <a:p>
+            <a:pPr marL="2155286" lvl="1" indent="-457200">
+              <a:buFont typeface="Arial" charset="0"/>
+              <a:buChar char="•"/>
+            </a:pPr>
+            <a:r>
+              <a:rPr lang="en-US" sz="3600" dirty="0" smtClean="0">
+                <a:solidFill>
+                  <a:schemeClr val="accent5">
+                    <a:lumMod val="50000"/>
+                  </a:schemeClr>
+                </a:solidFill>
+                <a:latin typeface="Times" charset="0"/>
+                <a:ea typeface="Times" charset="0"/>
+                <a:cs typeface="Times" charset="0"/>
+              </a:rPr>
+              <a:t>NPR Interview with President Obama</a:t>
+            </a:r>
+          </a:p>
+          <a:p>
+            <a:pPr marL="2155286" lvl="1" indent="-457200">
+              <a:buFont typeface="Arial" charset="0"/>
+              <a:buChar char="•"/>
+            </a:pPr>
+            <a:r>
+              <a:rPr lang="en-US" sz="3600" dirty="0" smtClean="0">
+                <a:solidFill>
+                  <a:schemeClr val="accent5">
+                    <a:lumMod val="50000"/>
+                  </a:schemeClr>
+                </a:solidFill>
+                <a:latin typeface="Times" charset="0"/>
+                <a:ea typeface="Times" charset="0"/>
+                <a:cs typeface="Times" charset="0"/>
+              </a:rPr>
+              <a:t>Three of us reading a Wikipedia article on sports in Latvia</a:t>
+            </a:r>
+            <a:endParaRPr lang="en-US" sz="3600" dirty="0" smtClean="0">
+              <a:solidFill>
+                <a:schemeClr val="accent5">
+                  <a:lumMod val="50000"/>
+                </a:schemeClr>
+              </a:solidFill>
+              <a:latin typeface="Times" charset="0"/>
+              <a:ea typeface="Times" charset="0"/>
+              <a:cs typeface="Times" charset="0"/>
+            </a:endParaRPr>
           </a:p>
         </p:txBody>
       </p:sp>
@@ -17199,171 +17578,6 @@
           </a:p>
         </p:txBody>
       </p:sp>
-      <mc:AlternateContent xmlns:mc="http://schemas.openxmlformats.org/markup-compatibility/2006">
-        <mc:Choice xmlns:a14="http://schemas.microsoft.com/office/drawing/2010/main" Requires="a14">
-          <p:sp>
-            <p:nvSpPr>
-              <p:cNvPr id="29" name="Text Placeholder 28"/>
-              <p:cNvSpPr>
-                <a:spLocks noGrp="1"/>
-              </p:cNvSpPr>
-              <p:nvPr>
-                <p:ph type="body" sz="quarter" idx="23"/>
-              </p:nvPr>
-            </p:nvSpPr>
-            <p:spPr>
-              <a:xfrm>
-                <a:off x="17689252" y="6420045"/>
-                <a:ext cx="15833456" cy="3261800"/>
-              </a:xfrm>
-            </p:spPr>
-            <p:txBody>
-              <a:bodyPr/>
-              <a:lstStyle/>
-              <a:p>
-                <a:r>
-                  <a:rPr lang="en-US" dirty="0"/>
-                  <a:t>We should put something like </a:t>
-                </a:r>
-                <a:r>
-                  <a:rPr lang="en-US" dirty="0" err="1"/>
-                  <a:t>srsly</a:t>
-                </a:r>
-                <a:r>
-                  <a:rPr lang="en-US" dirty="0"/>
-                  <a:t> but probably not whatever </a:t>
-                </a:r>
-                <a:r>
-                  <a:rPr lang="en-US" dirty="0" err="1"/>
-                  <a:t>b.s.</a:t>
-                </a:r>
-                <a:r>
-                  <a:rPr lang="en-US" dirty="0"/>
-                  <a:t> this is:</a:t>
-                </a:r>
-              </a:p>
-              <a:p>
-                <a:r>
-                  <a:rPr lang="en-US" dirty="0"/>
-                  <a:t>F1 score = </a:t>
-                </a:r>
-                <a14:m>
-                  <m:oMath xmlns:m="http://schemas.openxmlformats.org/officeDocument/2006/math">
-                    <m:r>
-                      <a:rPr lang="en-US" b="0" i="1" smtClean="0">
-                        <a:latin typeface="Cambria Math" panose="02040503050406030204" pitchFamily="18" charset="0"/>
-                      </a:rPr>
-                      <m:t>2∗</m:t>
-                    </m:r>
-                    <m:f>
-                      <m:fPr>
-                        <m:ctrlPr>
-                          <a:rPr lang="en-US" b="0" i="1" smtClean="0">
-                            <a:latin typeface="Cambria Math" panose="02040503050406030204" pitchFamily="18" charset="0"/>
-                          </a:rPr>
-                        </m:ctrlPr>
-                      </m:fPr>
-                      <m:num>
-                        <m:r>
-                          <a:rPr lang="en-US" b="0" i="1" smtClean="0">
-                            <a:latin typeface="Cambria Math" panose="02040503050406030204" pitchFamily="18" charset="0"/>
-                          </a:rPr>
-                          <m:t>𝑅𝑒𝑐𝑎𝑙𝑙</m:t>
-                        </m:r>
-                        <m:r>
-                          <a:rPr lang="en-US" b="0" i="1" smtClean="0">
-                            <a:latin typeface="Cambria Math" panose="02040503050406030204" pitchFamily="18" charset="0"/>
-                          </a:rPr>
-                          <m:t>∗</m:t>
-                        </m:r>
-                        <m:r>
-                          <a:rPr lang="en-US" b="0" i="1" smtClean="0">
-                            <a:latin typeface="Cambria Math" panose="02040503050406030204" pitchFamily="18" charset="0"/>
-                          </a:rPr>
-                          <m:t>𝑃𝑟𝑒𝑐𝑖𝑠𝑖𝑜𝑛</m:t>
-                        </m:r>
-                      </m:num>
-                      <m:den>
-                        <m:r>
-                          <a:rPr lang="en-US" b="0" i="1" smtClean="0">
-                            <a:latin typeface="Cambria Math" panose="02040503050406030204" pitchFamily="18" charset="0"/>
-                          </a:rPr>
-                          <m:t>𝑃𝑟𝑒𝑐𝑖𝑠𝑖𝑜𝑛</m:t>
-                        </m:r>
-                        <m:r>
-                          <a:rPr lang="en-US" b="0" i="1" smtClean="0">
-                            <a:latin typeface="Cambria Math" panose="02040503050406030204" pitchFamily="18" charset="0"/>
-                          </a:rPr>
-                          <m:t>+</m:t>
-                        </m:r>
-                        <m:r>
-                          <a:rPr lang="en-US" b="0" i="1" smtClean="0">
-                            <a:latin typeface="Cambria Math" panose="02040503050406030204" pitchFamily="18" charset="0"/>
-                          </a:rPr>
-                          <m:t>𝑅𝑒𝑐𝑎𝑙𝑙</m:t>
-                        </m:r>
-                      </m:den>
-                    </m:f>
-                  </m:oMath>
-                </a14:m>
-                <a:endParaRPr lang="en-US" dirty="0"/>
-              </a:p>
-              <a:p>
-                <a:r>
-                  <a:rPr lang="en-US" dirty="0"/>
-                  <a:t>Precision: Words found in transcript that were actually spoken by the correct speaker</a:t>
-                </a:r>
-              </a:p>
-              <a:p>
-                <a:r>
-                  <a:rPr lang="en-US" dirty="0"/>
-                  <a:t>Recall: Words </a:t>
-                </a:r>
-              </a:p>
-              <a:p>
-                <a:endParaRPr lang="en-US" dirty="0"/>
-              </a:p>
-            </p:txBody>
-          </p:sp>
-        </mc:Choice>
-        <mc:Fallback>
-          <p:sp>
-            <p:nvSpPr>
-              <p:cNvPr id="29" name="Text Placeholder 28"/>
-              <p:cNvSpPr>
-                <a:spLocks noGrp="1" noRot="1" noChangeAspect="1" noMove="1" noResize="1" noEditPoints="1" noAdjustHandles="1" noChangeArrowheads="1" noChangeShapeType="1" noTextEdit="1"/>
-              </p:cNvSpPr>
-              <p:nvPr>
-                <p:ph type="body" sz="quarter" idx="23"/>
-              </p:nvPr>
-            </p:nvSpPr>
-            <p:spPr>
-              <a:xfrm>
-                <a:off x="17689252" y="6420045"/>
-                <a:ext cx="15833456" cy="3261800"/>
-              </a:xfrm>
-              <a:blipFill>
-                <a:blip r:embed="rId3"/>
-                <a:stretch>
-                  <a:fillRect/>
-                </a:stretch>
-              </a:blipFill>
-            </p:spPr>
-            <p:txBody>
-              <a:bodyPr/>
-              <a:lstStyle/>
-              <a:p>
-                <a:r>
-                  <a:rPr lang="en-US">
-                    <a:noFill/>
-                  </a:rPr>
-                  <a:t> </a:t>
-                </a:r>
-              </a:p>
-            </p:txBody>
-          </p:sp>
-        </mc:Fallback>
-      </mc:AlternateContent>
       <p:sp>
         <p:nvSpPr>
           <p:cNvPr id="30" name="Text Placeholder 29"/>
@@ -17540,7 +17754,7 @@
             </a:r>
             <a:r>
               <a:rPr lang="en-US" sz="1600" dirty="0">
-                <a:hlinkClick r:id="rId4"/>
+                <a:hlinkClick r:id="rId3"/>
               </a:rPr>
               <a:t>http://music.cs.northwestern.edu/publications/Kim_Pardo_IUI2017.pdf</a:t>
             </a:r>
@@ -17605,7 +17819,7 @@
             </a:r>
             <a:r>
               <a:rPr lang="en-US" sz="1600" dirty="0">
-                <a:hlinkClick r:id="rId5"/>
+                <a:hlinkClick r:id="rId4"/>
               </a:rPr>
               <a:t>http://vis.berkeley.edu/papers/audiostories/audiostories.pdf</a:t>
             </a:r>
@@ -17633,7 +17847,7 @@
             </a:r>
             <a:r>
               <a:rPr lang="en-US" sz="1600" dirty="0">
-                <a:hlinkClick r:id="rId6"/>
+                <a:hlinkClick r:id="rId5"/>
               </a:rPr>
               <a:t>https://wavesurfer-js.org/</a:t>
             </a:r>
@@ -17677,7 +17891,7 @@
             </a:r>
             <a:r>
               <a:rPr lang="en-US" sz="1600" dirty="0">
-                <a:hlinkClick r:id="rId7"/>
+                <a:hlinkClick r:id="rId6"/>
               </a:rPr>
               <a:t>http://journals.plos.org/plosone/article/file?id=10.1371/journal.pone.0144610&amp;type=printable</a:t>
             </a:r>
@@ -17708,7 +17922,7 @@
           <a:p>
             <a:r>
               <a:rPr lang="en-US" dirty="0">
-                <a:hlinkClick r:id="rId8"/>
+                <a:hlinkClick r:id="rId7"/>
               </a:rPr>
               <a:t>vincentbommier2018@u.northwestern.edu</a:t>
             </a:r>
@@ -17718,7 +17932,7 @@
             </a:r>
             <a:r>
               <a:rPr lang="en-US" dirty="0">
-                <a:hlinkClick r:id="rId9"/>
+                <a:hlinkClick r:id="rId8"/>
               </a:rPr>
               <a:t>jeremykaish2018@u.northwestern.edu</a:t>
             </a:r>
@@ -17728,7 +17942,7 @@
             </a:r>
             <a:r>
               <a:rPr lang="en-US" dirty="0">
-                <a:hlinkClick r:id="rId10"/>
+                <a:hlinkClick r:id="rId9"/>
               </a:rPr>
               <a:t>madhavghei2018@u.northwestern.edu</a:t>
             </a:r>
@@ -17923,7 +18137,7 @@
           <p:nvPr/>
         </p:nvPicPr>
         <p:blipFill>
-          <a:blip r:embed="rId11" cstate="print">
+          <a:blip r:embed="rId10" cstate="print">
             <a:extLst>
               <a:ext uri="{28A0092B-C50C-407E-A947-70E740481C1C}">
                 <a14:useLocalDpi xmlns:a14="http://schemas.microsoft.com/office/drawing/2010/main" val="0"/>
@@ -17953,7 +18167,7 @@
           <p:nvPr/>
         </p:nvPicPr>
         <p:blipFill>
-          <a:blip r:embed="rId12">
+          <a:blip r:embed="rId11">
             <a:extLst>
               <a:ext uri="{28A0092B-C50C-407E-A947-70E740481C1C}">
                 <a14:useLocalDpi xmlns:a14="http://schemas.microsoft.com/office/drawing/2010/main" val="0"/>
@@ -17983,7 +18197,7 @@
           <p:nvPr/>
         </p:nvPicPr>
         <p:blipFill>
-          <a:blip r:embed="rId13">
+          <a:blip r:embed="rId12">
             <a:extLst>
               <a:ext uri="{28A0092B-C50C-407E-A947-70E740481C1C}">
                 <a14:useLocalDpi xmlns:a14="http://schemas.microsoft.com/office/drawing/2010/main" val="0"/>
@@ -18314,11 +18528,11 @@
             <p:nvPr/>
           </p:nvPicPr>
           <p:blipFill>
-            <a:blip r:embed="rId14">
+            <a:blip r:embed="rId13">
               <a:extLst>
                 <a:ext uri="{BEBA8EAE-BF5A-486C-A8C5-ECC9F3942E4B}">
                   <a14:imgProps xmlns:a14="http://schemas.microsoft.com/office/drawing/2010/main">
-                    <a14:imgLayer r:embed="rId15">
+                    <a14:imgLayer r:embed="rId14">
                       <a14:imgEffect>
                         <a14:brightnessContrast bright="20000" contrast="20000"/>
                       </a14:imgEffect>
@@ -18782,7 +18996,7 @@
           <p:nvPr/>
         </p:nvPicPr>
         <p:blipFill>
-          <a:blip r:embed="rId16">
+          <a:blip r:embed="rId15">
             <a:extLst>
               <a:ext uri="{28A0092B-C50C-407E-A947-70E740481C1C}">
                 <a14:useLocalDpi xmlns:a14="http://schemas.microsoft.com/office/drawing/2010/main" val="0"/>
@@ -18812,7 +19026,7 @@
           <p:nvPr/>
         </p:nvPicPr>
         <p:blipFill>
-          <a:blip r:embed="rId17">
+          <a:blip r:embed="rId16">
             <a:extLst>
               <a:ext uri="{28A0092B-C50C-407E-A947-70E740481C1C}">
                 <a14:useLocalDpi xmlns:a14="http://schemas.microsoft.com/office/drawing/2010/main" val="0"/>
@@ -18923,7 +19137,7 @@
           <p:nvPr/>
         </p:nvPicPr>
         <p:blipFill>
-          <a:blip r:embed="rId18">
+          <a:blip r:embed="rId17">
             <a:extLst>
               <a:ext uri="{28A0092B-C50C-407E-A947-70E740481C1C}">
                 <a14:useLocalDpi xmlns:a14="http://schemas.microsoft.com/office/drawing/2010/main" val="0"/>
@@ -19137,7 +19351,7 @@
           <p:cNvPr id="48" name="Chart 47">
             <a:extLst>
               <a:ext uri="{FF2B5EF4-FFF2-40B4-BE49-F238E27FC236}">
-                <a16:creationId xmlns:a16="http://schemas.microsoft.com/office/drawing/2014/main" id="{E5183793-22C3-404D-A526-12117498FDE2}"/>
+                <a16:creationId xmlns:a16="http://schemas.microsoft.com/office/drawing/2014/main" xmlns="" id="{E5183793-22C3-404D-A526-12117498FDE2}"/>
               </a:ext>
             </a:extLst>
           </p:cNvPr>
@@ -19158,7 +19372,7 @@
         </p:xfrm>
         <a:graphic>
           <a:graphicData uri="http://schemas.openxmlformats.org/drawingml/2006/chart">
-            <c:chart xmlns:c="http://schemas.openxmlformats.org/drawingml/2006/chart" xmlns:r="http://schemas.openxmlformats.org/officeDocument/2006/relationships" r:id="rId19"/>
+            <c:chart xmlns:c="http://schemas.openxmlformats.org/drawingml/2006/chart" xmlns:r="http://schemas.openxmlformats.org/officeDocument/2006/relationships" r:id="rId18"/>
           </a:graphicData>
         </a:graphic>
       </p:graphicFrame>
@@ -19167,7 +19381,7 @@
           <p:cNvPr id="53" name="Chart 52">
             <a:extLst>
               <a:ext uri="{FF2B5EF4-FFF2-40B4-BE49-F238E27FC236}">
-                <a16:creationId xmlns:a16="http://schemas.microsoft.com/office/drawing/2014/main" id="{47A63E27-C029-44A2-A9E2-0EB713C6092A}"/>
+                <a16:creationId xmlns:a16="http://schemas.microsoft.com/office/drawing/2014/main" xmlns="" id="{47A63E27-C029-44A2-A9E2-0EB713C6092A}"/>
               </a:ext>
             </a:extLst>
           </p:cNvPr>
@@ -19188,7 +19402,7 @@
         </p:xfrm>
         <a:graphic>
           <a:graphicData uri="http://schemas.openxmlformats.org/drawingml/2006/chart">
-            <c:chart xmlns:c="http://schemas.openxmlformats.org/drawingml/2006/chart" xmlns:r="http://schemas.openxmlformats.org/officeDocument/2006/relationships" r:id="rId20"/>
+            <c:chart xmlns:c="http://schemas.openxmlformats.org/drawingml/2006/chart" xmlns:r="http://schemas.openxmlformats.org/officeDocument/2006/relationships" r:id="rId19"/>
           </a:graphicData>
         </a:graphic>
       </p:graphicFrame>
@@ -19201,7 +19415,7 @@
           <p:nvPr/>
         </p:nvPicPr>
         <p:blipFill>
-          <a:blip r:embed="rId21">
+          <a:blip r:embed="rId20">
             <a:extLst>
               <a:ext uri="{28A0092B-C50C-407E-A947-70E740481C1C}">
                 <a14:useLocalDpi xmlns:a14="http://schemas.microsoft.com/office/drawing/2010/main" val="0"/>

</xml_diff>

<commit_message>
Moved interfaces into its own column, trying to make more space for images
</commit_message>
<xml_diff>
--- a/Poster.pptx
+++ b/Poster.pptx
@@ -7579,7 +7579,7 @@
               <a:graphicData uri="http://schemas.openxmlformats.org/presentationml/2006/ole">
                 <mc:AlternateContent xmlns:mc="http://schemas.openxmlformats.org/markup-compatibility/2006">
                   <mc:Choice xmlns:v="urn:schemas-microsoft-com:vml" Requires="v">
-                    <p:oleObj spid="_x0000_s1182" name="Image" r:id="rId8" imgW="1828440" imgH="1117440" progId="Photoshop.Image.13">
+                    <p:oleObj spid="_x0000_s1190" name="Image" r:id="rId8" imgW="1828440" imgH="1117440" progId="Photoshop.Image.13">
                       <p:embed/>
                     </p:oleObj>
                   </mc:Choice>
@@ -7636,7 +7636,7 @@
               <a:graphicData uri="http://schemas.openxmlformats.org/presentationml/2006/ole">
                 <mc:AlternateContent xmlns:mc="http://schemas.openxmlformats.org/markup-compatibility/2006">
                   <mc:Choice xmlns:v="urn:schemas-microsoft-com:vml" Requires="v">
-                    <p:oleObj spid="_x0000_s1183" name="Image" r:id="rId10" imgW="1828440" imgH="1117440" progId="Photoshop.Image.13">
+                    <p:oleObj spid="_x0000_s1191" name="Image" r:id="rId10" imgW="1828440" imgH="1117440" progId="Photoshop.Image.13">
                       <p:embed/>
                     </p:oleObj>
                   </mc:Choice>
@@ -8759,7 +8759,7 @@
             <a:graphicData uri="http://schemas.openxmlformats.org/presentationml/2006/ole">
               <mc:AlternateContent xmlns:mc="http://schemas.openxmlformats.org/markup-compatibility/2006">
                 <mc:Choice xmlns:v="urn:schemas-microsoft-com:vml" Requires="v">
-                  <p:oleObj spid="_x0000_s1184" name="Image" r:id="rId12" imgW="4571280" imgH="1688760" progId="Photoshop.Image.13">
+                  <p:oleObj spid="_x0000_s1192" name="Image" r:id="rId12" imgW="4571280" imgH="1688760" progId="Photoshop.Image.13">
                     <p:embed/>
                   </p:oleObj>
                 </mc:Choice>
@@ -8843,7 +8843,7 @@
             <a:graphicData uri="http://schemas.openxmlformats.org/presentationml/2006/ole">
               <mc:AlternateContent xmlns:mc="http://schemas.openxmlformats.org/markup-compatibility/2006">
                 <mc:Choice xmlns:v="urn:schemas-microsoft-com:vml" Requires="v">
-                  <p:oleObj spid="_x0000_s1185" name="Image" r:id="rId15" imgW="1574280" imgH="1053720" progId="Photoshop.Image.13">
+                  <p:oleObj spid="_x0000_s1193" name="Image" r:id="rId15" imgW="1574280" imgH="1053720" progId="Photoshop.Image.13">
                     <p:embed/>
                   </p:oleObj>
                 </mc:Choice>
@@ -11120,7 +11120,7 @@
               <a:graphicData uri="http://schemas.openxmlformats.org/presentationml/2006/ole">
                 <mc:AlternateContent xmlns:mc="http://schemas.openxmlformats.org/markup-compatibility/2006">
                   <mc:Choice xmlns:v="urn:schemas-microsoft-com:vml" Requires="v">
-                    <p:oleObj spid="_x0000_s2206" name="Image" r:id="rId8" imgW="1828440" imgH="1117440" progId="Photoshop.Image.13">
+                    <p:oleObj spid="_x0000_s2214" name="Image" r:id="rId8" imgW="1828440" imgH="1117440" progId="Photoshop.Image.13">
                       <p:embed/>
                     </p:oleObj>
                   </mc:Choice>
@@ -11177,7 +11177,7 @@
               <a:graphicData uri="http://schemas.openxmlformats.org/presentationml/2006/ole">
                 <mc:AlternateContent xmlns:mc="http://schemas.openxmlformats.org/markup-compatibility/2006">
                   <mc:Choice xmlns:v="urn:schemas-microsoft-com:vml" Requires="v">
-                    <p:oleObj spid="_x0000_s2207" name="Image" r:id="rId10" imgW="1828440" imgH="1117440" progId="Photoshop.Image.13">
+                    <p:oleObj spid="_x0000_s2215" name="Image" r:id="rId10" imgW="1828440" imgH="1117440" progId="Photoshop.Image.13">
                       <p:embed/>
                     </p:oleObj>
                   </mc:Choice>
@@ -12300,7 +12300,7 @@
             <a:graphicData uri="http://schemas.openxmlformats.org/presentationml/2006/ole">
               <mc:AlternateContent xmlns:mc="http://schemas.openxmlformats.org/markup-compatibility/2006">
                 <mc:Choice xmlns:v="urn:schemas-microsoft-com:vml" Requires="v">
-                  <p:oleObj spid="_x0000_s2208" name="Image" r:id="rId12" imgW="4571280" imgH="1688760" progId="Photoshop.Image.13">
+                  <p:oleObj spid="_x0000_s2216" name="Image" r:id="rId12" imgW="4571280" imgH="1688760" progId="Photoshop.Image.13">
                     <p:embed/>
                   </p:oleObj>
                 </mc:Choice>
@@ -12384,7 +12384,7 @@
             <a:graphicData uri="http://schemas.openxmlformats.org/presentationml/2006/ole">
               <mc:AlternateContent xmlns:mc="http://schemas.openxmlformats.org/markup-compatibility/2006">
                 <mc:Choice xmlns:v="urn:schemas-microsoft-com:vml" Requires="v">
-                  <p:oleObj spid="_x0000_s2209" name="Image" r:id="rId15" imgW="1574280" imgH="1053720" progId="Photoshop.Image.13">
+                  <p:oleObj spid="_x0000_s2217" name="Image" r:id="rId15" imgW="1574280" imgH="1053720" progId="Photoshop.Image.13">
                     <p:embed/>
                   </p:oleObj>
                 </mc:Choice>
@@ -14845,7 +14845,7 @@
               <a:graphicData uri="http://schemas.openxmlformats.org/presentationml/2006/ole">
                 <mc:AlternateContent xmlns:mc="http://schemas.openxmlformats.org/markup-compatibility/2006">
                   <mc:Choice xmlns:v="urn:schemas-microsoft-com:vml" Requires="v">
-                    <p:oleObj spid="_x0000_s3230" name="Image" r:id="rId8" imgW="1828440" imgH="1117440" progId="Photoshop.Image.13">
+                    <p:oleObj spid="_x0000_s3238" name="Image" r:id="rId8" imgW="1828440" imgH="1117440" progId="Photoshop.Image.13">
                       <p:embed/>
                     </p:oleObj>
                   </mc:Choice>
@@ -14902,7 +14902,7 @@
               <a:graphicData uri="http://schemas.openxmlformats.org/presentationml/2006/ole">
                 <mc:AlternateContent xmlns:mc="http://schemas.openxmlformats.org/markup-compatibility/2006">
                   <mc:Choice xmlns:v="urn:schemas-microsoft-com:vml" Requires="v">
-                    <p:oleObj spid="_x0000_s3231" name="Image" r:id="rId10" imgW="1828440" imgH="1117440" progId="Photoshop.Image.13">
+                    <p:oleObj spid="_x0000_s3239" name="Image" r:id="rId10" imgW="1828440" imgH="1117440" progId="Photoshop.Image.13">
                       <p:embed/>
                     </p:oleObj>
                   </mc:Choice>
@@ -16025,7 +16025,7 @@
             <a:graphicData uri="http://schemas.openxmlformats.org/presentationml/2006/ole">
               <mc:AlternateContent xmlns:mc="http://schemas.openxmlformats.org/markup-compatibility/2006">
                 <mc:Choice xmlns:v="urn:schemas-microsoft-com:vml" Requires="v">
-                  <p:oleObj spid="_x0000_s3232" name="Image" r:id="rId12" imgW="4571280" imgH="1688760" progId="Photoshop.Image.13">
+                  <p:oleObj spid="_x0000_s3240" name="Image" r:id="rId12" imgW="4571280" imgH="1688760" progId="Photoshop.Image.13">
                     <p:embed/>
                   </p:oleObj>
                 </mc:Choice>
@@ -16109,7 +16109,7 @@
             <a:graphicData uri="http://schemas.openxmlformats.org/presentationml/2006/ole">
               <mc:AlternateContent xmlns:mc="http://schemas.openxmlformats.org/markup-compatibility/2006">
                 <mc:Choice xmlns:v="urn:schemas-microsoft-com:vml" Requires="v">
-                  <p:oleObj spid="_x0000_s3233" name="Image" r:id="rId15" imgW="1574280" imgH="1053720" progId="Photoshop.Image.13">
+                  <p:oleObj spid="_x0000_s3241" name="Image" r:id="rId15" imgW="1574280" imgH="1053720" progId="Photoshop.Image.13">
                     <p:embed/>
                   </p:oleObj>
                 </mc:Choice>
@@ -17099,8 +17099,8 @@
         </p:nvSpPr>
         <p:spPr>
           <a:xfrm>
-            <a:off x="1051179" y="5966681"/>
-            <a:ext cx="15856490" cy="8098894"/>
+            <a:off x="1051179" y="6165461"/>
+            <a:ext cx="15856490" cy="5845969"/>
           </a:xfrm>
         </p:spPr>
         <p:txBody>
@@ -17141,7 +17141,7 @@
             </a:pPr>
             <a:r>
               <a:rPr lang="en-US" sz="3600" dirty="0" smtClean="0"/>
-              <a:t>Journalists could use this to streamline their workflow, and avoid the menial/time-consuming task of transcription by hand</a:t>
+              <a:t>Journalists could streamline their workflow, avoid doing transcription by hand</a:t>
             </a:r>
           </a:p>
           <a:p>
@@ -17151,17 +17151,7 @@
             </a:pPr>
             <a:r>
               <a:rPr lang="en-US" sz="3600" dirty="0" smtClean="0"/>
-              <a:t>Aims to reduce the amount of work a journalist must spend on transcription</a:t>
-            </a:r>
-          </a:p>
-          <a:p>
-            <a:pPr marL="457200" indent="-457200">
-              <a:buFont typeface="Arial" charset="0"/>
-              <a:buChar char="•"/>
-            </a:pPr>
-            <a:r>
-              <a:rPr lang="en-US" sz="3600" dirty="0" smtClean="0"/>
-              <a:t>Tools for speech transcription and speaker ID already exist but do not work in parallel</a:t>
+              <a:t>Speech transcription and speaker ID tools already exist but don’t work in parallel</a:t>
             </a:r>
           </a:p>
           <a:p>
@@ -17181,7 +17171,7 @@
             </a:pPr>
             <a:r>
               <a:rPr lang="en-US" sz="3600" dirty="0" smtClean="0"/>
-              <a:t>Our goal is to make one streamlined interface for creating transcriptions from an audio file</a:t>
+              <a:t>Goal: one streamlined interface for creating transcriptions from an audio file</a:t>
             </a:r>
             <a:endParaRPr lang="en-US" sz="3600" dirty="0"/>
           </a:p>
@@ -17229,8 +17219,8 @@
         </p:nvSpPr>
         <p:spPr>
           <a:xfrm>
-            <a:off x="1076061" y="18159683"/>
-            <a:ext cx="15858342" cy="8061961"/>
+            <a:off x="1076061" y="15078556"/>
+            <a:ext cx="15858342" cy="6843165"/>
           </a:xfrm>
         </p:spPr>
         <p:txBody>
@@ -17253,7 +17243,7 @@
             </a:pPr>
             <a:r>
               <a:rPr lang="en-US" sz="3600" dirty="0" smtClean="0"/>
-              <a:t>User selects portions of audio in which only one person is talking</a:t>
+              <a:t>User selects segment of audio in which only one person is talking</a:t>
             </a:r>
           </a:p>
           <a:p>
@@ -17283,7 +17273,7 @@
             </a:pPr>
             <a:r>
               <a:rPr lang="en-US" sz="3600" dirty="0" smtClean="0"/>
-              <a:t>Program uses self-similarity matrix to automatically determine where to split between speakers</a:t>
+              <a:t>Self-similarity matrix automatically determines where to split between speakers</a:t>
             </a:r>
           </a:p>
           <a:p>
@@ -17293,7 +17283,7 @@
             </a:pPr>
             <a:r>
               <a:rPr lang="en-US" sz="3600" dirty="0" smtClean="0"/>
-              <a:t>Segments audio into multiple distinct audio files</a:t>
+              <a:t>Segments audio into multiple distinct audio files (one speaker per file)</a:t>
             </a:r>
           </a:p>
           <a:p>
@@ -17303,17 +17293,7 @@
             </a:pPr>
             <a:r>
               <a:rPr lang="en-US" sz="3600" dirty="0" smtClean="0"/>
-              <a:t>Speech-to-text is run on every file in order</a:t>
-            </a:r>
-          </a:p>
-          <a:p>
-            <a:pPr marL="457200" indent="-457200">
-              <a:buFont typeface="Arial" charset="0"/>
-              <a:buChar char="•"/>
-            </a:pPr>
-            <a:r>
-              <a:rPr lang="en-US" sz="3600" dirty="0" smtClean="0"/>
-              <a:t>Speaker ID is run on every file, and prepends identified speaker to their associated audio clip.</a:t>
+              <a:t>Speech to text and speaker ID run on every file, and prepends identified speaker to their associated audio clip.</a:t>
             </a:r>
           </a:p>
           <a:p>
@@ -17341,7 +17321,7 @@
         </p:nvSpPr>
         <p:spPr>
           <a:xfrm>
-            <a:off x="1099092" y="17307692"/>
+            <a:off x="1099092" y="14226565"/>
             <a:ext cx="15835312" cy="1226700"/>
           </a:xfrm>
         </p:spPr>
@@ -17368,7 +17348,7 @@
         </p:nvSpPr>
         <p:spPr>
           <a:xfrm>
-            <a:off x="17679990" y="18164130"/>
+            <a:off x="34323954" y="18553173"/>
             <a:ext cx="15833456" cy="6953965"/>
           </a:xfrm>
         </p:spPr>
@@ -17563,8 +17543,8 @@
         </p:nvSpPr>
         <p:spPr>
           <a:xfrm>
-            <a:off x="17679990" y="17351154"/>
-            <a:ext cx="15833456" cy="1134367"/>
+            <a:off x="34555921" y="17818168"/>
+            <a:ext cx="15833456" cy="888145"/>
           </a:xfrm>
         </p:spPr>
         <p:txBody>
@@ -17572,7 +17552,7 @@
           <a:lstStyle/>
           <a:p>
             <a:r>
-              <a:rPr lang="en-US" sz="6000" dirty="0"/>
+              <a:rPr lang="en-US" sz="4400" dirty="0"/>
               <a:t>How we Built and Tested the Project</a:t>
             </a:r>
           </a:p>
@@ -17588,7 +17568,12 @@
             <p:ph type="body" sz="quarter" idx="24"/>
           </p:nvPr>
         </p:nvSpPr>
-        <p:spPr/>
+        <p:spPr>
+          <a:xfrm>
+            <a:off x="35176378" y="5878667"/>
+            <a:ext cx="15842722" cy="857368"/>
+          </a:xfrm>
+        </p:spPr>
         <p:txBody>
           <a:bodyPr/>
           <a:lstStyle/>
@@ -17610,7 +17595,12 @@
             <p:ph type="body" sz="quarter" idx="25"/>
           </p:nvPr>
         </p:nvSpPr>
-        <p:spPr/>
+        <p:spPr>
+          <a:xfrm>
+            <a:off x="17683850" y="5566163"/>
+            <a:ext cx="15838700" cy="857368"/>
+          </a:xfrm>
+        </p:spPr>
         <p:txBody>
           <a:bodyPr/>
           <a:lstStyle/>
@@ -17634,7 +17624,7 @@
         </p:nvSpPr>
         <p:spPr>
           <a:xfrm>
-            <a:off x="34295031" y="22637638"/>
+            <a:off x="34295031" y="25203038"/>
             <a:ext cx="15838700" cy="857368"/>
           </a:xfrm>
         </p:spPr>
@@ -17661,27 +17651,83 @@
         </p:nvSpPr>
         <p:spPr>
           <a:xfrm>
-            <a:off x="34292096" y="23584125"/>
-            <a:ext cx="15844570" cy="4147043"/>
+            <a:off x="34292096" y="25844731"/>
+            <a:ext cx="15844570" cy="3075980"/>
           </a:xfrm>
         </p:spPr>
         <p:txBody>
           <a:bodyPr/>
           <a:lstStyle/>
           <a:p>
+            <a:pPr marL="342900" indent="-342900">
+              <a:buFont typeface="Arial" charset="0"/>
+              <a:buChar char="•"/>
+            </a:pPr>
             <a:r>
-              <a:rPr lang="en-US" dirty="0"/>
-              <a:t>After all the work we have done, we can see that transcription is a very hard task to accomplish perfectly well. Noisy recordings contributed to worse performance on some recordings, as well as certain limitations in the performance of Bing’s API (on both the speaker recognition and transcription front). </a:t>
+              <a:rPr lang="en-US" sz="3600" dirty="0" smtClean="0">
+                <a:latin typeface="Times" charset="0"/>
+                <a:ea typeface="Times" charset="0"/>
+                <a:cs typeface="Times" charset="0"/>
+              </a:rPr>
+              <a:t>Transcription is hard to perform perfectly (or even close to perfectly) well</a:t>
             </a:r>
           </a:p>
           <a:p>
-            <a:endParaRPr lang="en-US" dirty="0"/>
+            <a:pPr marL="342900" indent="-342900">
+              <a:buFont typeface="Arial" charset="0"/>
+              <a:buChar char="•"/>
+            </a:pPr>
+            <a:r>
+              <a:rPr lang="en-US" sz="3600" dirty="0" smtClean="0">
+                <a:latin typeface="Times" charset="0"/>
+                <a:ea typeface="Times" charset="0"/>
+                <a:cs typeface="Times" charset="0"/>
+              </a:rPr>
+              <a:t>Noisy audio files destroy Bing’s API</a:t>
+            </a:r>
           </a:p>
           <a:p>
+            <a:pPr marL="342900" indent="-342900">
+              <a:buFont typeface="Arial" charset="0"/>
+              <a:buChar char="•"/>
+            </a:pPr>
             <a:r>
-              <a:rPr lang="en-US" dirty="0"/>
-              <a:t>In the end, however, we believe our tool could be a good start at creating a tool that could help journalists transcribe their interviews. It integrates some machine learning by utilizing the Bing API, as well as audio signal processing by constructing a self similarity matrix to determine how to segment the audio into individual speakers. Overall, we learned quite a bit!</a:t>
+              <a:rPr lang="en-US" sz="3600" dirty="0" smtClean="0">
+                <a:latin typeface="Times" charset="0"/>
+                <a:ea typeface="Times" charset="0"/>
+                <a:cs typeface="Times" charset="0"/>
+              </a:rPr>
+              <a:t>This tool could be a good start at something that could be optimized further</a:t>
             </a:r>
+          </a:p>
+          <a:p>
+            <a:pPr marL="2040986" lvl="1" indent="-342900">
+              <a:buFont typeface="Arial" charset="0"/>
+              <a:buChar char="•"/>
+            </a:pPr>
+            <a:r>
+              <a:rPr lang="en-US" sz="3600" dirty="0" smtClean="0">
+                <a:solidFill>
+                  <a:schemeClr val="accent5">
+                    <a:lumMod val="50000"/>
+                  </a:schemeClr>
+                </a:solidFill>
+                <a:latin typeface="Times" charset="0"/>
+                <a:ea typeface="Times" charset="0"/>
+                <a:cs typeface="Times" charset="0"/>
+              </a:rPr>
+              <a:t>But it’s not good enough for professional use just yet</a:t>
+            </a:r>
+            <a:endParaRPr lang="en-US" sz="3600" dirty="0">
+              <a:solidFill>
+                <a:schemeClr val="accent5">
+                  <a:lumMod val="50000"/>
+                </a:schemeClr>
+              </a:solidFill>
+              <a:latin typeface="Times" charset="0"/>
+              <a:ea typeface="Times" charset="0"/>
+              <a:cs typeface="Times" charset="0"/>
+            </a:endParaRPr>
           </a:p>
         </p:txBody>
       </p:sp>
@@ -17706,9 +17752,10 @@
           <a:lstStyle/>
           <a:p>
             <a:r>
-              <a:rPr lang="en-US" dirty="0"/>
-              <a:t>References</a:t>
+              <a:rPr lang="en-US" dirty="0" smtClean="0"/>
+              <a:t> References</a:t>
             </a:r>
+            <a:endParaRPr lang="en-US" dirty="0"/>
           </a:p>
         </p:txBody>
       </p:sp>
@@ -18150,8 +18197,8 @@
         </p:blipFill>
         <p:spPr>
           <a:xfrm>
-            <a:off x="34805070" y="6446708"/>
-            <a:ext cx="6660842" cy="3656698"/>
+            <a:off x="19975814" y="6401350"/>
+            <a:ext cx="11734498" cy="6442056"/>
           </a:xfrm>
           <a:prstGeom prst="rect">
             <a:avLst/>
@@ -18180,8 +18227,8 @@
         </p:blipFill>
         <p:spPr>
           <a:xfrm>
-            <a:off x="42012882" y="14248243"/>
-            <a:ext cx="6751813" cy="2943929"/>
+            <a:off x="25850911" y="20339102"/>
+            <a:ext cx="7419095" cy="3724229"/>
           </a:xfrm>
           <a:prstGeom prst="rect">
             <a:avLst/>
@@ -18210,7 +18257,7 @@
         </p:blipFill>
         <p:spPr>
           <a:xfrm>
-            <a:off x="42012881" y="7192378"/>
+            <a:off x="22467157" y="13212234"/>
             <a:ext cx="6751813" cy="2159671"/>
           </a:xfrm>
           <a:prstGeom prst="rect">
@@ -18259,8 +18306,8 @@
         </p:nvSpPr>
         <p:spPr>
           <a:xfrm>
-            <a:off x="40898617" y="6447499"/>
-            <a:ext cx="561289" cy="523220"/>
+            <a:off x="31115517" y="6406385"/>
+            <a:ext cx="594795" cy="536963"/>
           </a:xfrm>
           <a:prstGeom prst="rect">
             <a:avLst/>
@@ -18276,7 +18323,7 @@
           <a:lstStyle/>
           <a:p>
             <a:r>
-              <a:rPr lang="en-US" sz="2800">
+              <a:rPr lang="en-US" sz="2800" dirty="0">
                 <a:solidFill>
                   <a:schemeClr val="bg1"/>
                 </a:solidFill>
@@ -18285,13 +18332,6 @@
               </a:rPr>
               <a:t>1a</a:t>
             </a:r>
-            <a:endParaRPr lang="en-US" sz="2800" dirty="0">
-              <a:solidFill>
-                <a:schemeClr val="bg1"/>
-              </a:solidFill>
-              <a:latin typeface="Times New Roman" panose="02020603050405020304" pitchFamily="18" charset="0"/>
-              <a:cs typeface="Times New Roman" panose="02020603050405020304" pitchFamily="18" charset="0"/>
-            </a:endParaRPr>
           </a:p>
         </p:txBody>
       </p:sp>
@@ -18303,7 +18343,7 @@
         </p:nvSpPr>
         <p:spPr>
           <a:xfrm>
-            <a:off x="48197192" y="7193487"/>
+            <a:off x="28656744" y="13212234"/>
             <a:ext cx="567503" cy="523220"/>
           </a:xfrm>
           <a:prstGeom prst="rect">
@@ -18347,8 +18387,8 @@
         </p:nvSpPr>
         <p:spPr>
           <a:xfrm>
-            <a:off x="42012883" y="17542703"/>
-            <a:ext cx="7415815" cy="4401205"/>
+            <a:off x="17868753" y="29367043"/>
+            <a:ext cx="15519400" cy="4241650"/>
           </a:xfrm>
           <a:prstGeom prst="rect">
             <a:avLst/>
@@ -18356,13 +18396,13 @@
           <a:noFill/>
         </p:spPr>
         <p:txBody>
-          <a:bodyPr wrap="square" rtlCol="0">
+          <a:bodyPr wrap="square" numCol="3" rtlCol="0">
             <a:spAutoFit/>
           </a:bodyPr>
           <a:lstStyle/>
           <a:p>
             <a:r>
-              <a:rPr lang="en-US" sz="2000" b="1" dirty="0">
+              <a:rPr lang="en-US" sz="2400" b="1" dirty="0">
                 <a:latin typeface="Times New Roman" panose="02020603050405020304" pitchFamily="18" charset="0"/>
                 <a:cs typeface="Times New Roman" panose="02020603050405020304" pitchFamily="18" charset="0"/>
               </a:rPr>
@@ -18371,7 +18411,7 @@
           </a:p>
           <a:p>
             <a:r>
-              <a:rPr lang="en-US" sz="2000" dirty="0">
+              <a:rPr lang="en-US" sz="2400" dirty="0">
                 <a:latin typeface="Times New Roman" panose="02020603050405020304" pitchFamily="18" charset="0"/>
                 <a:cs typeface="Times New Roman" panose="02020603050405020304" pitchFamily="18" charset="0"/>
               </a:rPr>
@@ -18380,7 +18420,7 @@
           </a:p>
           <a:p>
             <a:r>
-              <a:rPr lang="en-US" sz="2000" dirty="0">
+              <a:rPr lang="en-US" sz="2400" dirty="0">
                 <a:latin typeface="Times New Roman" panose="02020603050405020304" pitchFamily="18" charset="0"/>
                 <a:cs typeface="Times New Roman" panose="02020603050405020304" pitchFamily="18" charset="0"/>
               </a:rPr>
@@ -18388,73 +18428,247 @@
             </a:r>
           </a:p>
           <a:p>
-            <a:endParaRPr lang="en-US" sz="2000" dirty="0">
+            <a:endParaRPr lang="en-US" sz="2400" dirty="0" smtClean="0">
+              <a:latin typeface="Times New Roman" panose="02020603050405020304" pitchFamily="18" charset="0"/>
+              <a:cs typeface="Times New Roman" panose="02020603050405020304" pitchFamily="18" charset="0"/>
+            </a:endParaRPr>
+          </a:p>
+          <a:p>
+            <a:endParaRPr lang="en-US" sz="2400" dirty="0">
+              <a:latin typeface="Times New Roman" panose="02020603050405020304" pitchFamily="18" charset="0"/>
+              <a:cs typeface="Times New Roman" panose="02020603050405020304" pitchFamily="18" charset="0"/>
+            </a:endParaRPr>
+          </a:p>
+          <a:p>
+            <a:endParaRPr lang="en-US" sz="2400" dirty="0" smtClean="0">
+              <a:latin typeface="Times New Roman" panose="02020603050405020304" pitchFamily="18" charset="0"/>
+              <a:cs typeface="Times New Roman" panose="02020603050405020304" pitchFamily="18" charset="0"/>
+            </a:endParaRPr>
+          </a:p>
+          <a:p>
+            <a:endParaRPr lang="en-US" sz="2400" dirty="0">
+              <a:latin typeface="Times New Roman" panose="02020603050405020304" pitchFamily="18" charset="0"/>
+              <a:cs typeface="Times New Roman" panose="02020603050405020304" pitchFamily="18" charset="0"/>
+            </a:endParaRPr>
+          </a:p>
+          <a:p>
+            <a:endParaRPr lang="en-US" sz="2400" dirty="0" smtClean="0">
+              <a:latin typeface="Times New Roman" panose="02020603050405020304" pitchFamily="18" charset="0"/>
+              <a:cs typeface="Times New Roman" panose="02020603050405020304" pitchFamily="18" charset="0"/>
+            </a:endParaRPr>
+          </a:p>
+          <a:p>
+            <a:endParaRPr lang="en-US" sz="2400" dirty="0" smtClean="0">
+              <a:latin typeface="Times New Roman" panose="02020603050405020304" pitchFamily="18" charset="0"/>
+              <a:cs typeface="Times New Roman" panose="02020603050405020304" pitchFamily="18" charset="0"/>
+            </a:endParaRPr>
+          </a:p>
+          <a:p>
+            <a:endParaRPr lang="en-US" sz="2400" dirty="0">
               <a:latin typeface="Times New Roman" panose="02020603050405020304" pitchFamily="18" charset="0"/>
               <a:cs typeface="Times New Roman" panose="02020603050405020304" pitchFamily="18" charset="0"/>
             </a:endParaRPr>
           </a:p>
           <a:p>
             <a:r>
-              <a:rPr lang="en-US" sz="2000" b="1" dirty="0">
+              <a:rPr lang="en-US" sz="2400" b="1" dirty="0" smtClean="0">
                 <a:latin typeface="Times New Roman" panose="02020603050405020304" pitchFamily="18" charset="0"/>
                 <a:cs typeface="Times New Roman" panose="02020603050405020304" pitchFamily="18" charset="0"/>
               </a:rPr>
-              <a:t>2. Waveform editing/segmentation screen</a:t>
+              <a:t>2</a:t>
+            </a:r>
+            <a:r>
+              <a:rPr lang="en-US" sz="2400" b="1" dirty="0">
+                <a:latin typeface="Times New Roman" panose="02020603050405020304" pitchFamily="18" charset="0"/>
+                <a:cs typeface="Times New Roman" panose="02020603050405020304" pitchFamily="18" charset="0"/>
+              </a:rPr>
+              <a:t>. Waveform editing/segmentation screen</a:t>
             </a:r>
           </a:p>
           <a:p>
             <a:r>
-              <a:rPr lang="en-US" sz="2000" dirty="0">
+              <a:rPr lang="en-US" sz="2400" dirty="0">
                 <a:latin typeface="Times New Roman" panose="02020603050405020304" pitchFamily="18" charset="0"/>
                 <a:cs typeface="Times New Roman" panose="02020603050405020304" pitchFamily="18" charset="0"/>
               </a:rPr>
-              <a:t>  a. User selects portions of audio in which only one speaker is talking</a:t>
+              <a:t>  a. User selects </a:t>
+            </a:r>
+            <a:r>
+              <a:rPr lang="en-US" sz="2400" dirty="0" smtClean="0">
+                <a:latin typeface="Times New Roman" panose="02020603050405020304" pitchFamily="18" charset="0"/>
+                <a:cs typeface="Times New Roman" panose="02020603050405020304" pitchFamily="18" charset="0"/>
+              </a:rPr>
+              <a:t>portion </a:t>
+            </a:r>
+            <a:r>
+              <a:rPr lang="en-US" sz="2400" dirty="0">
+                <a:latin typeface="Times New Roman" panose="02020603050405020304" pitchFamily="18" charset="0"/>
+                <a:cs typeface="Times New Roman" panose="02020603050405020304" pitchFamily="18" charset="0"/>
+              </a:rPr>
+              <a:t>of </a:t>
+            </a:r>
+            <a:r>
+              <a:rPr lang="en-US" sz="2400" dirty="0" smtClean="0">
+                <a:latin typeface="Times New Roman" panose="02020603050405020304" pitchFamily="18" charset="0"/>
+                <a:cs typeface="Times New Roman" panose="02020603050405020304" pitchFamily="18" charset="0"/>
+              </a:rPr>
+              <a:t>audio  </a:t>
             </a:r>
           </a:p>
           <a:p>
             <a:r>
-              <a:rPr lang="en-US" sz="2000" dirty="0">
+              <a:rPr lang="en-US" sz="2400" dirty="0">
                 <a:latin typeface="Times New Roman" panose="02020603050405020304" pitchFamily="18" charset="0"/>
                 <a:cs typeface="Times New Roman" panose="02020603050405020304" pitchFamily="18" charset="0"/>
               </a:rPr>
-              <a:t>  b. User assigns a name to the speaker of the current selection and enrolls the speaker (training the speaker recognition API)</a:t>
+              <a:t> </a:t>
             </a:r>
-          </a:p>
-          <a:p>
             <a:r>
-              <a:rPr lang="en-US" sz="2000" dirty="0">
+              <a:rPr lang="en-US" sz="2400" dirty="0" smtClean="0">
                 <a:latin typeface="Times New Roman" panose="02020603050405020304" pitchFamily="18" charset="0"/>
                 <a:cs typeface="Times New Roman" panose="02020603050405020304" pitchFamily="18" charset="0"/>
               </a:rPr>
-              <a:t>  c. User repeats this for each speaker in the file (once per speaker)</a:t>
+              <a:t> </a:t>
             </a:r>
-          </a:p>
-          <a:p>
             <a:r>
-              <a:rPr lang="en-US" sz="2000" dirty="0">
+              <a:rPr lang="en-US" sz="2400" dirty="0" smtClean="0">
                 <a:latin typeface="Times New Roman" panose="02020603050405020304" pitchFamily="18" charset="0"/>
                 <a:cs typeface="Times New Roman" panose="02020603050405020304" pitchFamily="18" charset="0"/>
               </a:rPr>
-              <a:t>  d. Once satisfied with the selections, the user only needs to press transcribe and the text will be generated!</a:t>
+              <a:t>b</a:t>
             </a:r>
-          </a:p>
-          <a:p>
-            <a:endParaRPr lang="en-US" sz="2000" dirty="0">
+            <a:r>
+              <a:rPr lang="en-US" sz="2400" dirty="0">
+                <a:latin typeface="Times New Roman" panose="02020603050405020304" pitchFamily="18" charset="0"/>
+                <a:cs typeface="Times New Roman" panose="02020603050405020304" pitchFamily="18" charset="0"/>
+              </a:rPr>
+              <a:t>. User assigns </a:t>
+            </a:r>
+            <a:r>
+              <a:rPr lang="en-US" sz="2400" dirty="0" smtClean="0">
+                <a:latin typeface="Times New Roman" panose="02020603050405020304" pitchFamily="18" charset="0"/>
+                <a:cs typeface="Times New Roman" panose="02020603050405020304" pitchFamily="18" charset="0"/>
+              </a:rPr>
+              <a:t>name to current </a:t>
+            </a:r>
+            <a:r>
+              <a:rPr lang="en-US" sz="2400" dirty="0" smtClean="0">
+                <a:latin typeface="Times New Roman" panose="02020603050405020304" pitchFamily="18" charset="0"/>
+                <a:cs typeface="Times New Roman" panose="02020603050405020304" pitchFamily="18" charset="0"/>
+              </a:rPr>
+              <a:t>speaker,</a:t>
+            </a:r>
+            <a:r>
+              <a:rPr lang="en-US" sz="2400" dirty="0" smtClean="0">
+                <a:latin typeface="Times New Roman" panose="02020603050405020304" pitchFamily="18" charset="0"/>
+                <a:cs typeface="Times New Roman" panose="02020603050405020304" pitchFamily="18" charset="0"/>
+              </a:rPr>
+              <a:t> </a:t>
+            </a:r>
+            <a:r>
+              <a:rPr lang="en-US" sz="2400" dirty="0">
+                <a:latin typeface="Times New Roman" panose="02020603050405020304" pitchFamily="18" charset="0"/>
+                <a:cs typeface="Times New Roman" panose="02020603050405020304" pitchFamily="18" charset="0"/>
+              </a:rPr>
+              <a:t>enrolls </a:t>
+            </a:r>
+            <a:r>
+              <a:rPr lang="en-US" sz="2400" dirty="0" smtClean="0">
+                <a:latin typeface="Times New Roman" panose="02020603050405020304" pitchFamily="18" charset="0"/>
+                <a:cs typeface="Times New Roman" panose="02020603050405020304" pitchFamily="18" charset="0"/>
+              </a:rPr>
+              <a:t>them (trains the API)</a:t>
+            </a:r>
+            <a:endParaRPr lang="en-US" sz="2400" dirty="0">
               <a:latin typeface="Times New Roman" panose="02020603050405020304" pitchFamily="18" charset="0"/>
               <a:cs typeface="Times New Roman" panose="02020603050405020304" pitchFamily="18" charset="0"/>
             </a:endParaRPr>
           </a:p>
           <a:p>
             <a:r>
-              <a:rPr lang="en-US" sz="2000" b="1" dirty="0">
+              <a:rPr lang="en-US" sz="2400" dirty="0">
                 <a:latin typeface="Times New Roman" panose="02020603050405020304" pitchFamily="18" charset="0"/>
                 <a:cs typeface="Times New Roman" panose="02020603050405020304" pitchFamily="18" charset="0"/>
               </a:rPr>
-              <a:t>3. Generated transcript is displayed!</a:t>
+              <a:t>  c. </a:t>
+            </a:r>
+            <a:r>
+              <a:rPr lang="en-US" sz="2400" dirty="0" smtClean="0">
+                <a:latin typeface="Times New Roman" panose="02020603050405020304" pitchFamily="18" charset="0"/>
+                <a:cs typeface="Times New Roman" panose="02020603050405020304" pitchFamily="18" charset="0"/>
+              </a:rPr>
+              <a:t>Repeat for each speaker</a:t>
             </a:r>
           </a:p>
           <a:p>
-            <a:endParaRPr lang="en-US" sz="2000" dirty="0">
+            <a:r>
+              <a:rPr lang="en-US" sz="2400" dirty="0" smtClean="0">
+                <a:latin typeface="Times New Roman" panose="02020603050405020304" pitchFamily="18" charset="0"/>
+                <a:cs typeface="Times New Roman" panose="02020603050405020304" pitchFamily="18" charset="0"/>
+              </a:rPr>
+              <a:t>  d</a:t>
+            </a:r>
+            <a:r>
+              <a:rPr lang="en-US" sz="2400" dirty="0">
+                <a:latin typeface="Times New Roman" panose="02020603050405020304" pitchFamily="18" charset="0"/>
+                <a:cs typeface="Times New Roman" panose="02020603050405020304" pitchFamily="18" charset="0"/>
+              </a:rPr>
+              <a:t>. </a:t>
+            </a:r>
+            <a:r>
+              <a:rPr lang="en-US" sz="2400" dirty="0" smtClean="0">
+                <a:latin typeface="Times New Roman" panose="02020603050405020304" pitchFamily="18" charset="0"/>
+                <a:cs typeface="Times New Roman" panose="02020603050405020304" pitchFamily="18" charset="0"/>
+              </a:rPr>
+              <a:t>Click to transcribe!</a:t>
+            </a:r>
+            <a:endParaRPr lang="en-US" sz="2400" dirty="0">
+              <a:latin typeface="Times New Roman" panose="02020603050405020304" pitchFamily="18" charset="0"/>
+              <a:cs typeface="Times New Roman" panose="02020603050405020304" pitchFamily="18" charset="0"/>
+            </a:endParaRPr>
+          </a:p>
+          <a:p>
+            <a:endParaRPr lang="en-US" sz="2400" dirty="0" smtClean="0">
+              <a:latin typeface="Times New Roman" panose="02020603050405020304" pitchFamily="18" charset="0"/>
+              <a:cs typeface="Times New Roman" panose="02020603050405020304" pitchFamily="18" charset="0"/>
+            </a:endParaRPr>
+          </a:p>
+          <a:p>
+            <a:endParaRPr lang="en-US" sz="2400" dirty="0">
+              <a:latin typeface="Times New Roman" panose="02020603050405020304" pitchFamily="18" charset="0"/>
+              <a:cs typeface="Times New Roman" panose="02020603050405020304" pitchFamily="18" charset="0"/>
+            </a:endParaRPr>
+          </a:p>
+          <a:p>
+            <a:endParaRPr lang="en-US" sz="2400" dirty="0" smtClean="0">
+              <a:latin typeface="Times New Roman" panose="02020603050405020304" pitchFamily="18" charset="0"/>
+              <a:cs typeface="Times New Roman" panose="02020603050405020304" pitchFamily="18" charset="0"/>
+            </a:endParaRPr>
+          </a:p>
+          <a:p>
+            <a:endParaRPr lang="en-US" sz="2400" dirty="0">
+              <a:latin typeface="Times New Roman" panose="02020603050405020304" pitchFamily="18" charset="0"/>
+              <a:cs typeface="Times New Roman" panose="02020603050405020304" pitchFamily="18" charset="0"/>
+            </a:endParaRPr>
+          </a:p>
+          <a:p>
+            <a:r>
+              <a:rPr lang="en-US" sz="2400" b="1" dirty="0" smtClean="0">
+                <a:latin typeface="Times New Roman" panose="02020603050405020304" pitchFamily="18" charset="0"/>
+                <a:cs typeface="Times New Roman" panose="02020603050405020304" pitchFamily="18" charset="0"/>
+              </a:rPr>
+              <a:t>3. </a:t>
+            </a:r>
+            <a:r>
+              <a:rPr lang="en-US" sz="2400" b="1" dirty="0">
+                <a:latin typeface="Times New Roman" panose="02020603050405020304" pitchFamily="18" charset="0"/>
+                <a:cs typeface="Times New Roman" panose="02020603050405020304" pitchFamily="18" charset="0"/>
+              </a:rPr>
+              <a:t>Generated transcript is displayed!</a:t>
+            </a:r>
+          </a:p>
+          <a:p>
+            <a:endParaRPr lang="en-US" sz="2400" dirty="0">
               <a:latin typeface="Times New Roman" panose="02020603050405020304" pitchFamily="18" charset="0"/>
               <a:cs typeface="Times New Roman" panose="02020603050405020304" pitchFamily="18" charset="0"/>
             </a:endParaRPr>
@@ -18469,7 +18683,7 @@
         </p:nvSpPr>
         <p:spPr>
           <a:xfrm>
-            <a:off x="48206546" y="14248226"/>
+            <a:off x="32704009" y="20339102"/>
             <a:ext cx="565997" cy="518588"/>
           </a:xfrm>
           <a:prstGeom prst="rect">
@@ -18513,7 +18727,7 @@
         </p:nvGrpSpPr>
         <p:grpSpPr>
           <a:xfrm>
-            <a:off x="2563829" y="25031771"/>
+            <a:off x="3299325" y="22030156"/>
             <a:ext cx="12838601" cy="7311337"/>
             <a:chOff x="1109538" y="25108766"/>
             <a:chExt cx="12838601" cy="7311337"/>
@@ -19009,8 +19223,8 @@
         </p:blipFill>
         <p:spPr>
           <a:xfrm>
-            <a:off x="34781560" y="10393302"/>
-            <a:ext cx="6678346" cy="3531930"/>
+            <a:off x="17977599" y="15510479"/>
+            <a:ext cx="7437693" cy="4236208"/>
           </a:xfrm>
           <a:prstGeom prst="rect">
             <a:avLst/>
@@ -19039,8 +19253,8 @@
         </p:blipFill>
         <p:spPr>
           <a:xfrm>
-            <a:off x="42012882" y="10359617"/>
-            <a:ext cx="6751813" cy="3599300"/>
+            <a:off x="25850911" y="15510479"/>
+            <a:ext cx="7419095" cy="4251006"/>
           </a:xfrm>
           <a:prstGeom prst="rect">
             <a:avLst/>
@@ -19055,7 +19269,7 @@
         </p:nvSpPr>
         <p:spPr>
           <a:xfrm>
-            <a:off x="40898617" y="10391027"/>
+            <a:off x="24868640" y="15514036"/>
             <a:ext cx="561289" cy="523220"/>
           </a:xfrm>
           <a:prstGeom prst="rect">
@@ -19099,7 +19313,7 @@
         </p:nvSpPr>
         <p:spPr>
           <a:xfrm>
-            <a:off x="48197192" y="10403509"/>
+            <a:off x="32702503" y="15514036"/>
             <a:ext cx="567503" cy="523220"/>
           </a:xfrm>
           <a:prstGeom prst="rect">
@@ -19150,8 +19364,8 @@
         </p:blipFill>
         <p:spPr>
           <a:xfrm>
-            <a:off x="34781560" y="14248243"/>
-            <a:ext cx="6619910" cy="2946667"/>
+            <a:off x="17977599" y="20339102"/>
+            <a:ext cx="7437693" cy="3724229"/>
           </a:xfrm>
           <a:prstGeom prst="rect">
             <a:avLst/>
@@ -19166,7 +19380,7 @@
         </p:nvSpPr>
         <p:spPr>
           <a:xfrm>
-            <a:off x="40841098" y="14254660"/>
+            <a:off x="24854920" y="20353900"/>
             <a:ext cx="560372" cy="523220"/>
           </a:xfrm>
           <a:prstGeom prst="rect">
@@ -19206,51 +19420,15 @@
         <p:nvCxnSpPr>
           <p:cNvPr id="76" name="Straight Arrow Connector 75"/>
           <p:cNvCxnSpPr>
-            <a:stCxn id="4" idx="3"/>
-            <a:endCxn id="47" idx="1"/>
-          </p:cNvCxnSpPr>
-          <p:nvPr/>
-        </p:nvCxnSpPr>
-        <p:spPr>
-          <a:xfrm flipV="1">
-            <a:off x="41465912" y="8272214"/>
-            <a:ext cx="546969" cy="2843"/>
-          </a:xfrm>
-          <a:prstGeom prst="straightConnector1">
-            <a:avLst/>
-          </a:prstGeom>
-          <a:ln>
-            <a:tailEnd type="triangle"/>
-          </a:ln>
-        </p:spPr>
-        <p:style>
-          <a:lnRef idx="3">
-            <a:schemeClr val="accent2"/>
-          </a:lnRef>
-          <a:fillRef idx="0">
-            <a:schemeClr val="accent2"/>
-          </a:fillRef>
-          <a:effectRef idx="2">
-            <a:schemeClr val="accent2"/>
-          </a:effectRef>
-          <a:fontRef idx="minor">
-            <a:schemeClr val="tx1"/>
-          </a:fontRef>
-        </p:style>
-      </p:cxnSp>
-      <p:cxnSp>
-        <p:nvCxnSpPr>
-          <p:cNvPr id="80" name="Straight Arrow Connector 79"/>
-          <p:cNvCxnSpPr>
-            <a:stCxn id="39" idx="3"/>
-            <a:endCxn id="71" idx="1"/>
+            <a:stCxn id="4" idx="2"/>
+            <a:endCxn id="47" idx="0"/>
           </p:cNvCxnSpPr>
           <p:nvPr/>
         </p:nvCxnSpPr>
         <p:spPr>
           <a:xfrm>
-            <a:off x="41459906" y="12159267"/>
-            <a:ext cx="552976" cy="0"/>
+            <a:off x="25843063" y="12843406"/>
+            <a:ext cx="1" cy="368828"/>
           </a:xfrm>
           <a:prstGeom prst="straightConnector1">
             <a:avLst/>
@@ -19285,13 +19463,16 @@
         </p:nvCxnSpPr>
         <p:spPr>
           <a:xfrm rot="5400000">
-            <a:off x="41595489" y="10454943"/>
-            <a:ext cx="289326" cy="7297274"/>
+            <a:off x="25339645" y="16118287"/>
+            <a:ext cx="577617" cy="7864013"/>
           </a:xfrm>
           <a:prstGeom prst="bentConnector3">
             <a:avLst/>
           </a:prstGeom>
-          <a:ln>
+          <a:ln w="76200">
+            <a:solidFill>
+              <a:schemeClr val="accent2"/>
+            </a:solidFill>
             <a:tailEnd type="triangle"/>
           </a:ln>
         </p:spPr>
@@ -19320,14 +19501,17 @@
           <p:nvPr/>
         </p:nvCxnSpPr>
         <p:spPr>
-          <a:xfrm flipV="1">
-            <a:off x="41401470" y="15720208"/>
-            <a:ext cx="611412" cy="1369"/>
+          <a:xfrm>
+            <a:off x="25415292" y="22201217"/>
+            <a:ext cx="435619" cy="0"/>
           </a:xfrm>
           <a:prstGeom prst="straightConnector1">
             <a:avLst/>
           </a:prstGeom>
-          <a:ln>
+          <a:ln w="76200">
+            <a:solidFill>
+              <a:schemeClr val="accent2"/>
+            </a:solidFill>
             <a:tailEnd type="triangle"/>
           </a:ln>
         </p:spPr>
@@ -19361,14 +19545,14 @@
           <p:nvPr>
             <p:extLst>
               <p:ext uri="{D42A27DB-BD31-4B8C-83A1-F6EECF244321}">
-                <p14:modId xmlns:p14="http://schemas.microsoft.com/office/powerpoint/2010/main" val="4263559025"/>
+                <p14:modId xmlns:p14="http://schemas.microsoft.com/office/powerpoint/2010/main" val="1172332296"/>
               </p:ext>
             </p:extLst>
           </p:nvPr>
         </p:nvGraphicFramePr>
         <p:xfrm>
-          <a:off x="20517715" y="7598363"/>
-          <a:ext cx="8593844" cy="5003202"/>
+          <a:off x="35901531" y="6898614"/>
+          <a:ext cx="13142237" cy="5445499"/>
         </p:xfrm>
         <a:graphic>
           <a:graphicData uri="http://schemas.openxmlformats.org/drawingml/2006/chart">
@@ -19391,14 +19575,14 @@
           <p:nvPr>
             <p:extLst>
               <p:ext uri="{D42A27DB-BD31-4B8C-83A1-F6EECF244321}">
-                <p14:modId xmlns:p14="http://schemas.microsoft.com/office/powerpoint/2010/main" val="1324069107"/>
+                <p14:modId xmlns:p14="http://schemas.microsoft.com/office/powerpoint/2010/main" val="226437647"/>
               </p:ext>
             </p:extLst>
           </p:nvPr>
         </p:nvGraphicFramePr>
         <p:xfrm>
-          <a:off x="20517716" y="12679686"/>
-          <a:ext cx="8593844" cy="4593346"/>
+          <a:off x="36208699" y="12391668"/>
+          <a:ext cx="12527900" cy="4749590"/>
         </p:xfrm>
         <a:graphic>
           <a:graphicData uri="http://schemas.openxmlformats.org/drawingml/2006/chart">
@@ -19428,7 +19612,7 @@
         </p:blipFill>
         <p:spPr>
           <a:xfrm>
-            <a:off x="2563829" y="14289661"/>
+            <a:off x="2563829" y="11009747"/>
             <a:ext cx="12283887" cy="3246357"/>
           </a:xfrm>
           <a:prstGeom prst="rect">
@@ -19436,6 +19620,45 @@
           </a:prstGeom>
         </p:spPr>
       </p:pic>
+      <p:cxnSp>
+        <p:nvCxnSpPr>
+          <p:cNvPr id="69" name="Straight Arrow Connector 68"/>
+          <p:cNvCxnSpPr>
+            <a:stCxn id="39" idx="3"/>
+            <a:endCxn id="71" idx="1"/>
+          </p:cNvCxnSpPr>
+          <p:nvPr/>
+        </p:nvCxnSpPr>
+        <p:spPr>
+          <a:xfrm>
+            <a:off x="25415292" y="17628583"/>
+            <a:ext cx="435619" cy="7399"/>
+          </a:xfrm>
+          <a:prstGeom prst="straightConnector1">
+            <a:avLst/>
+          </a:prstGeom>
+          <a:ln w="76200">
+            <a:solidFill>
+              <a:schemeClr val="accent2"/>
+            </a:solidFill>
+            <a:tailEnd type="triangle"/>
+          </a:ln>
+        </p:spPr>
+        <p:style>
+          <a:lnRef idx="3">
+            <a:schemeClr val="accent2"/>
+          </a:lnRef>
+          <a:fillRef idx="0">
+            <a:schemeClr val="accent2"/>
+          </a:fillRef>
+          <a:effectRef idx="2">
+            <a:schemeClr val="accent2"/>
+          </a:effectRef>
+          <a:fontRef idx="minor">
+            <a:schemeClr val="tx1"/>
+          </a:fontRef>
+        </p:style>
+      </p:cxnSp>
     </p:spTree>
     <p:extLst>
       <p:ext uri="{BB962C8B-B14F-4D97-AF65-F5344CB8AC3E}">

</xml_diff>

<commit_message>
grammar fix on the poster
</commit_message>
<xml_diff>
--- a/Poster.pptx
+++ b/Poster.pptx
@@ -2537,7 +2537,7 @@
               <a:pPr>
                 <a:defRPr/>
               </a:pPr>
-              <a:t>3/16/2017</a:t>
+              <a:t>3/17/2017</a:t>
             </a:fld>
             <a:endParaRPr lang="en-US" dirty="0"/>
           </a:p>
@@ -7723,7 +7723,7 @@
               <a:graphicData uri="http://schemas.openxmlformats.org/presentationml/2006/ole">
                 <mc:AlternateContent xmlns:mc="http://schemas.openxmlformats.org/markup-compatibility/2006">
                   <mc:Choice xmlns:v="urn:schemas-microsoft-com:vml" Requires="v">
-                    <p:oleObj spid="_x0000_s1214" name="Image" r:id="rId8" imgW="1828440" imgH="1117440" progId="Photoshop.Image.13">
+                    <p:oleObj spid="_x0000_s1222" name="Image" r:id="rId8" imgW="1828440" imgH="1117440" progId="Photoshop.Image.13">
                       <p:embed/>
                     </p:oleObj>
                   </mc:Choice>
@@ -7780,7 +7780,7 @@
               <a:graphicData uri="http://schemas.openxmlformats.org/presentationml/2006/ole">
                 <mc:AlternateContent xmlns:mc="http://schemas.openxmlformats.org/markup-compatibility/2006">
                   <mc:Choice xmlns:v="urn:schemas-microsoft-com:vml" Requires="v">
-                    <p:oleObj spid="_x0000_s1215" name="Image" r:id="rId10" imgW="1828440" imgH="1117440" progId="Photoshop.Image.13">
+                    <p:oleObj spid="_x0000_s1223" name="Image" r:id="rId10" imgW="1828440" imgH="1117440" progId="Photoshop.Image.13">
                       <p:embed/>
                     </p:oleObj>
                   </mc:Choice>
@@ -8903,7 +8903,7 @@
             <a:graphicData uri="http://schemas.openxmlformats.org/presentationml/2006/ole">
               <mc:AlternateContent xmlns:mc="http://schemas.openxmlformats.org/markup-compatibility/2006">
                 <mc:Choice xmlns:v="urn:schemas-microsoft-com:vml" Requires="v">
-                  <p:oleObj spid="_x0000_s1216" name="Image" r:id="rId12" imgW="4571280" imgH="1688760" progId="Photoshop.Image.13">
+                  <p:oleObj spid="_x0000_s1224" name="Image" r:id="rId12" imgW="4571280" imgH="1688760" progId="Photoshop.Image.13">
                     <p:embed/>
                   </p:oleObj>
                 </mc:Choice>
@@ -8987,7 +8987,7 @@
             <a:graphicData uri="http://schemas.openxmlformats.org/presentationml/2006/ole">
               <mc:AlternateContent xmlns:mc="http://schemas.openxmlformats.org/markup-compatibility/2006">
                 <mc:Choice xmlns:v="urn:schemas-microsoft-com:vml" Requires="v">
-                  <p:oleObj spid="_x0000_s1217" name="Image" r:id="rId15" imgW="1574280" imgH="1053720" progId="Photoshop.Image.13">
+                  <p:oleObj spid="_x0000_s1225" name="Image" r:id="rId15" imgW="1574280" imgH="1053720" progId="Photoshop.Image.13">
                     <p:embed/>
                   </p:oleObj>
                 </mc:Choice>
@@ -11238,7 +11238,7 @@
               <a:graphicData uri="http://schemas.openxmlformats.org/presentationml/2006/ole">
                 <mc:AlternateContent xmlns:mc="http://schemas.openxmlformats.org/markup-compatibility/2006">
                   <mc:Choice xmlns:v="urn:schemas-microsoft-com:vml" Requires="v">
-                    <p:oleObj spid="_x0000_s2238" name="Image" r:id="rId8" imgW="1828440" imgH="1117440" progId="Photoshop.Image.13">
+                    <p:oleObj spid="_x0000_s2246" name="Image" r:id="rId8" imgW="1828440" imgH="1117440" progId="Photoshop.Image.13">
                       <p:embed/>
                     </p:oleObj>
                   </mc:Choice>
@@ -11295,7 +11295,7 @@
               <a:graphicData uri="http://schemas.openxmlformats.org/presentationml/2006/ole">
                 <mc:AlternateContent xmlns:mc="http://schemas.openxmlformats.org/markup-compatibility/2006">
                   <mc:Choice xmlns:v="urn:schemas-microsoft-com:vml" Requires="v">
-                    <p:oleObj spid="_x0000_s2239" name="Image" r:id="rId10" imgW="1828440" imgH="1117440" progId="Photoshop.Image.13">
+                    <p:oleObj spid="_x0000_s2247" name="Image" r:id="rId10" imgW="1828440" imgH="1117440" progId="Photoshop.Image.13">
                       <p:embed/>
                     </p:oleObj>
                   </mc:Choice>
@@ -12418,7 +12418,7 @@
             <a:graphicData uri="http://schemas.openxmlformats.org/presentationml/2006/ole">
               <mc:AlternateContent xmlns:mc="http://schemas.openxmlformats.org/markup-compatibility/2006">
                 <mc:Choice xmlns:v="urn:schemas-microsoft-com:vml" Requires="v">
-                  <p:oleObj spid="_x0000_s2240" name="Image" r:id="rId12" imgW="4571280" imgH="1688760" progId="Photoshop.Image.13">
+                  <p:oleObj spid="_x0000_s2248" name="Image" r:id="rId12" imgW="4571280" imgH="1688760" progId="Photoshop.Image.13">
                     <p:embed/>
                   </p:oleObj>
                 </mc:Choice>
@@ -12502,7 +12502,7 @@
             <a:graphicData uri="http://schemas.openxmlformats.org/presentationml/2006/ole">
               <mc:AlternateContent xmlns:mc="http://schemas.openxmlformats.org/markup-compatibility/2006">
                 <mc:Choice xmlns:v="urn:schemas-microsoft-com:vml" Requires="v">
-                  <p:oleObj spid="_x0000_s2241" name="Image" r:id="rId15" imgW="1574280" imgH="1053720" progId="Photoshop.Image.13">
+                  <p:oleObj spid="_x0000_s2249" name="Image" r:id="rId15" imgW="1574280" imgH="1053720" progId="Photoshop.Image.13">
                     <p:embed/>
                   </p:oleObj>
                 </mc:Choice>
@@ -14937,7 +14937,7 @@
               <a:graphicData uri="http://schemas.openxmlformats.org/presentationml/2006/ole">
                 <mc:AlternateContent xmlns:mc="http://schemas.openxmlformats.org/markup-compatibility/2006">
                   <mc:Choice xmlns:v="urn:schemas-microsoft-com:vml" Requires="v">
-                    <p:oleObj spid="_x0000_s3262" name="Image" r:id="rId8" imgW="1828440" imgH="1117440" progId="Photoshop.Image.13">
+                    <p:oleObj spid="_x0000_s3270" name="Image" r:id="rId8" imgW="1828440" imgH="1117440" progId="Photoshop.Image.13">
                       <p:embed/>
                     </p:oleObj>
                   </mc:Choice>
@@ -14994,7 +14994,7 @@
               <a:graphicData uri="http://schemas.openxmlformats.org/presentationml/2006/ole">
                 <mc:AlternateContent xmlns:mc="http://schemas.openxmlformats.org/markup-compatibility/2006">
                   <mc:Choice xmlns:v="urn:schemas-microsoft-com:vml" Requires="v">
-                    <p:oleObj spid="_x0000_s3263" name="Image" r:id="rId10" imgW="1828440" imgH="1117440" progId="Photoshop.Image.13">
+                    <p:oleObj spid="_x0000_s3271" name="Image" r:id="rId10" imgW="1828440" imgH="1117440" progId="Photoshop.Image.13">
                       <p:embed/>
                     </p:oleObj>
                   </mc:Choice>
@@ -16117,7 +16117,7 @@
             <a:graphicData uri="http://schemas.openxmlformats.org/presentationml/2006/ole">
               <mc:AlternateContent xmlns:mc="http://schemas.openxmlformats.org/markup-compatibility/2006">
                 <mc:Choice xmlns:v="urn:schemas-microsoft-com:vml" Requires="v">
-                  <p:oleObj spid="_x0000_s3264" name="Image" r:id="rId12" imgW="4571280" imgH="1688760" progId="Photoshop.Image.13">
+                  <p:oleObj spid="_x0000_s3272" name="Image" r:id="rId12" imgW="4571280" imgH="1688760" progId="Photoshop.Image.13">
                     <p:embed/>
                   </p:oleObj>
                 </mc:Choice>
@@ -16201,7 +16201,7 @@
             <a:graphicData uri="http://schemas.openxmlformats.org/presentationml/2006/ole">
               <mc:AlternateContent xmlns:mc="http://schemas.openxmlformats.org/markup-compatibility/2006">
                 <mc:Choice xmlns:v="urn:schemas-microsoft-com:vml" Requires="v">
-                  <p:oleObj spid="_x0000_s3265" name="Image" r:id="rId15" imgW="1574280" imgH="1053720" progId="Photoshop.Image.13">
+                  <p:oleObj spid="_x0000_s3273" name="Image" r:id="rId15" imgW="1574280" imgH="1053720" progId="Photoshop.Image.13">
                     <p:embed/>
                   </p:oleObj>
                 </mc:Choice>
@@ -17737,7 +17737,7 @@
                 <a:ea typeface="Times" charset="0"/>
                 <a:cs typeface="Times" charset="0"/>
               </a:rPr>
-              <a:t>Transcription is hard to perform perfectly (or even close to perfectly) well</a:t>
+              <a:t>Transcription is hard to perform perfectly (or even close to perfectly)</a:t>
             </a:r>
           </a:p>
           <a:p>
@@ -18017,7 +18017,6 @@
               <a:rPr lang="en-US" sz="1600" dirty="0"/>
               <a:t>. Fundamentals of Music Processing: Audio, Analysis, Algorithms, Applications. Springer, 2015.</a:t>
             </a:r>
-            <a:endParaRPr lang="en-US" sz="1600" dirty="0"/>
           </a:p>
           <a:p>
             <a:endParaRPr lang="en-US" sz="1600" i="1" dirty="0"/>

</xml_diff>